<commit_message>
Tag-3_3: Tagging von Docker Images abgeschlossen
</commit_message>
<xml_diff>
--- a/slides/Tag-3_3-Release-und-Tagged-Images.pptx
+++ b/slides/Tag-3_3-Release-und-Tagged-Images.pptx
@@ -6,16 +6,25 @@
     <p:sldMasterId id="2147483649" r:id="rId2"/>
   </p:sldMasterIdLst>
   <p:notesMasterIdLst>
-    <p:notesMasterId r:id="rId7"/>
+    <p:notesMasterId r:id="rId16"/>
   </p:notesMasterIdLst>
   <p:handoutMasterIdLst>
-    <p:handoutMasterId r:id="rId8"/>
+    <p:handoutMasterId r:id="rId17"/>
   </p:handoutMasterIdLst>
   <p:sldIdLst>
     <p:sldId id="288" r:id="rId3"/>
     <p:sldId id="289" r:id="rId4"/>
     <p:sldId id="291" r:id="rId5"/>
     <p:sldId id="587" r:id="rId6"/>
+    <p:sldId id="589" r:id="rId7"/>
+    <p:sldId id="590" r:id="rId8"/>
+    <p:sldId id="597" r:id="rId9"/>
+    <p:sldId id="598" r:id="rId10"/>
+    <p:sldId id="594" r:id="rId11"/>
+    <p:sldId id="595" r:id="rId12"/>
+    <p:sldId id="596" r:id="rId13"/>
+    <p:sldId id="591" r:id="rId14"/>
+    <p:sldId id="588" r:id="rId15"/>
   </p:sldIdLst>
   <p:sldSz cx="9144000" cy="6858000" type="screen4x3"/>
   <p:notesSz cx="6784975" cy="9921875"/>
@@ -921,6 +930,176 @@
     </a:lvl9pPr>
   </p:notesStyle>
 </p:notesMaster>
+</file>
+
+<file path=ppt/notesSlides/notesSlide1.xml><?xml version="1.0" encoding="utf-8"?>
+<p:notes xmlns:a="http://schemas.openxmlformats.org/drawingml/2006/main" xmlns:r="http://schemas.openxmlformats.org/officeDocument/2006/relationships" xmlns:p="http://schemas.openxmlformats.org/presentationml/2006/main">
+  <p:cSld>
+    <p:spTree>
+      <p:nvGrpSpPr>
+        <p:cNvPr id="1" name=""/>
+        <p:cNvGrpSpPr/>
+        <p:nvPr/>
+      </p:nvGrpSpPr>
+      <p:grpSpPr>
+        <a:xfrm>
+          <a:off x="0" y="0"/>
+          <a:ext cx="0" cy="0"/>
+          <a:chOff x="0" y="0"/>
+          <a:chExt cx="0" cy="0"/>
+        </a:xfrm>
+      </p:grpSpPr>
+      <p:sp>
+        <p:nvSpPr>
+          <p:cNvPr id="2" name="Folienbildplatzhalter 1"/>
+          <p:cNvSpPr>
+            <a:spLocks noGrp="1" noRot="1" noChangeAspect="1"/>
+          </p:cNvSpPr>
+          <p:nvPr>
+            <p:ph type="sldImg"/>
+          </p:nvPr>
+        </p:nvSpPr>
+        <p:spPr/>
+      </p:sp>
+      <p:sp>
+        <p:nvSpPr>
+          <p:cNvPr id="3" name="Notizenplatzhalter 2"/>
+          <p:cNvSpPr>
+            <a:spLocks noGrp="1"/>
+          </p:cNvSpPr>
+          <p:nvPr>
+            <p:ph type="body" idx="1"/>
+          </p:nvPr>
+        </p:nvSpPr>
+        <p:spPr/>
+        <p:txBody>
+          <a:bodyPr/>
+          <a:lstStyle/>
+          <a:p>
+            <a:endParaRPr lang="de-DE" dirty="0"/>
+          </a:p>
+        </p:txBody>
+      </p:sp>
+      <p:sp>
+        <p:nvSpPr>
+          <p:cNvPr id="4" name="Foliennummernplatzhalter 3"/>
+          <p:cNvSpPr>
+            <a:spLocks noGrp="1"/>
+          </p:cNvSpPr>
+          <p:nvPr>
+            <p:ph type="sldNum" sz="quarter" idx="5"/>
+          </p:nvPr>
+        </p:nvSpPr>
+        <p:spPr/>
+        <p:txBody>
+          <a:bodyPr/>
+          <a:lstStyle/>
+          <a:p>
+            <a:fld id="{18182567-388C-4D33-8B7B-A651F195F118}" type="slidenum">
+              <a:rPr lang="de-DE" altLang="de-DE" smtClean="0"/>
+              <a:pPr/>
+              <a:t>7</a:t>
+            </a:fld>
+            <a:endParaRPr lang="de-DE" altLang="de-DE"/>
+          </a:p>
+        </p:txBody>
+      </p:sp>
+    </p:spTree>
+    <p:extLst>
+      <p:ext uri="{BB962C8B-B14F-4D97-AF65-F5344CB8AC3E}">
+        <p14:creationId xmlns:p14="http://schemas.microsoft.com/office/powerpoint/2010/main" val="3711379124"/>
+      </p:ext>
+    </p:extLst>
+  </p:cSld>
+  <p:clrMapOvr>
+    <a:masterClrMapping/>
+  </p:clrMapOvr>
+</p:notes>
+</file>
+
+<file path=ppt/notesSlides/notesSlide2.xml><?xml version="1.0" encoding="utf-8"?>
+<p:notes xmlns:a="http://schemas.openxmlformats.org/drawingml/2006/main" xmlns:r="http://schemas.openxmlformats.org/officeDocument/2006/relationships" xmlns:p="http://schemas.openxmlformats.org/presentationml/2006/main">
+  <p:cSld>
+    <p:spTree>
+      <p:nvGrpSpPr>
+        <p:cNvPr id="1" name=""/>
+        <p:cNvGrpSpPr/>
+        <p:nvPr/>
+      </p:nvGrpSpPr>
+      <p:grpSpPr>
+        <a:xfrm>
+          <a:off x="0" y="0"/>
+          <a:ext cx="0" cy="0"/>
+          <a:chOff x="0" y="0"/>
+          <a:chExt cx="0" cy="0"/>
+        </a:xfrm>
+      </p:grpSpPr>
+      <p:sp>
+        <p:nvSpPr>
+          <p:cNvPr id="2" name="Folienbildplatzhalter 1"/>
+          <p:cNvSpPr>
+            <a:spLocks noGrp="1" noRot="1" noChangeAspect="1"/>
+          </p:cNvSpPr>
+          <p:nvPr>
+            <p:ph type="sldImg"/>
+          </p:nvPr>
+        </p:nvSpPr>
+        <p:spPr/>
+      </p:sp>
+      <p:sp>
+        <p:nvSpPr>
+          <p:cNvPr id="3" name="Notizenplatzhalter 2"/>
+          <p:cNvSpPr>
+            <a:spLocks noGrp="1"/>
+          </p:cNvSpPr>
+          <p:nvPr>
+            <p:ph type="body" idx="1"/>
+          </p:nvPr>
+        </p:nvSpPr>
+        <p:spPr/>
+        <p:txBody>
+          <a:bodyPr/>
+          <a:lstStyle/>
+          <a:p>
+            <a:endParaRPr lang="de-DE" dirty="0"/>
+          </a:p>
+        </p:txBody>
+      </p:sp>
+      <p:sp>
+        <p:nvSpPr>
+          <p:cNvPr id="4" name="Foliennummernplatzhalter 3"/>
+          <p:cNvSpPr>
+            <a:spLocks noGrp="1"/>
+          </p:cNvSpPr>
+          <p:nvPr>
+            <p:ph type="sldNum" sz="quarter" idx="5"/>
+          </p:nvPr>
+        </p:nvSpPr>
+        <p:spPr/>
+        <p:txBody>
+          <a:bodyPr/>
+          <a:lstStyle/>
+          <a:p>
+            <a:fld id="{18182567-388C-4D33-8B7B-A651F195F118}" type="slidenum">
+              <a:rPr lang="de-DE" altLang="de-DE" smtClean="0"/>
+              <a:pPr/>
+              <a:t>13</a:t>
+            </a:fld>
+            <a:endParaRPr lang="de-DE" altLang="de-DE"/>
+          </a:p>
+        </p:txBody>
+      </p:sp>
+    </p:spTree>
+    <p:extLst>
+      <p:ext uri="{BB962C8B-B14F-4D97-AF65-F5344CB8AC3E}">
+        <p14:creationId xmlns:p14="http://schemas.microsoft.com/office/powerpoint/2010/main" val="1015434146"/>
+      </p:ext>
+    </p:extLst>
+  </p:cSld>
+  <p:clrMapOvr>
+    <a:masterClrMapping/>
+  </p:clrMapOvr>
+</p:notes>
 </file>
 
 <file path=ppt/slideLayouts/slideLayout1.xml><?xml version="1.0" encoding="utf-8"?>
@@ -3649,6 +3828,776 @@
 </p:sld>
 </file>
 
+<file path=ppt/slides/slide10.xml><?xml version="1.0" encoding="utf-8"?>
+<p:sld xmlns:a="http://schemas.openxmlformats.org/drawingml/2006/main" xmlns:r="http://schemas.openxmlformats.org/officeDocument/2006/relationships" xmlns:p="http://schemas.openxmlformats.org/presentationml/2006/main">
+  <p:cSld>
+    <p:spTree>
+      <p:nvGrpSpPr>
+        <p:cNvPr id="1" name=""/>
+        <p:cNvGrpSpPr/>
+        <p:nvPr/>
+      </p:nvGrpSpPr>
+      <p:grpSpPr>
+        <a:xfrm>
+          <a:off x="0" y="0"/>
+          <a:ext cx="0" cy="0"/>
+          <a:chOff x="0" y="0"/>
+          <a:chExt cx="0" cy="0"/>
+        </a:xfrm>
+      </p:grpSpPr>
+      <p:sp>
+        <p:nvSpPr>
+          <p:cNvPr id="2" name="Titel 1">
+            <a:extLst>
+              <a:ext uri="{FF2B5EF4-FFF2-40B4-BE49-F238E27FC236}">
+                <a16:creationId xmlns:a16="http://schemas.microsoft.com/office/drawing/2014/main" id="{5874EA8E-7A71-3505-B01E-D0E8A26AAC59}"/>
+              </a:ext>
+            </a:extLst>
+          </p:cNvPr>
+          <p:cNvSpPr>
+            <a:spLocks noGrp="1"/>
+          </p:cNvSpPr>
+          <p:nvPr>
+            <p:ph type="title"/>
+          </p:nvPr>
+        </p:nvSpPr>
+        <p:spPr/>
+        <p:txBody>
+          <a:bodyPr/>
+          <a:lstStyle/>
+          <a:p>
+            <a:r>
+              <a:rPr lang="de-DE" cap="none" dirty="0"/>
+              <a:t>Release- und </a:t>
+            </a:r>
+            <a:r>
+              <a:rPr lang="de-DE" cap="none" dirty="0" err="1"/>
+              <a:t>Tagged</a:t>
+            </a:r>
+            <a:r>
+              <a:rPr lang="de-DE" cap="none" dirty="0"/>
+              <a:t>-Images</a:t>
+            </a:r>
+            <a:endParaRPr lang="de-DE" dirty="0"/>
+          </a:p>
+        </p:txBody>
+      </p:sp>
+      <p:sp>
+        <p:nvSpPr>
+          <p:cNvPr id="3" name="Inhaltsplatzhalter 2">
+            <a:extLst>
+              <a:ext uri="{FF2B5EF4-FFF2-40B4-BE49-F238E27FC236}">
+                <a16:creationId xmlns:a16="http://schemas.microsoft.com/office/drawing/2014/main" id="{D4DA2B4E-C5FB-6595-34A6-E18A9AA0157D}"/>
+              </a:ext>
+            </a:extLst>
+          </p:cNvPr>
+          <p:cNvSpPr>
+            <a:spLocks noGrp="1"/>
+          </p:cNvSpPr>
+          <p:nvPr>
+            <p:ph idx="1"/>
+          </p:nvPr>
+        </p:nvSpPr>
+        <p:spPr/>
+        <p:txBody>
+          <a:bodyPr/>
+          <a:lstStyle/>
+          <a:p>
+            <a:pPr marL="0" indent="0">
+              <a:buNone/>
+            </a:pPr>
+            <a:r>
+              <a:rPr lang="de-DE" b="1" dirty="0"/>
+              <a:t>Tagging nach dem </a:t>
+            </a:r>
+            <a:r>
+              <a:rPr lang="de-DE" b="1" dirty="0" err="1"/>
+              <a:t>Build</a:t>
+            </a:r>
+            <a:endParaRPr lang="de-DE" b="1" dirty="0"/>
+          </a:p>
+          <a:p>
+            <a:pPr>
+              <a:buFont typeface="Arial" panose="020B0604020202020204" pitchFamily="34" charset="0"/>
+              <a:buChar char="•"/>
+            </a:pPr>
+            <a:r>
+              <a:rPr lang="de-DE" dirty="0"/>
+              <a:t>Vorhandene Images mit </a:t>
+            </a:r>
+            <a:r>
+              <a:rPr lang="de-DE" dirty="0" err="1">
+                <a:latin typeface="Consolas" panose="020B0609020204030204" pitchFamily="49" charset="0"/>
+              </a:rPr>
+              <a:t>docker</a:t>
+            </a:r>
+            <a:r>
+              <a:rPr lang="de-DE" dirty="0">
+                <a:latin typeface="Consolas" panose="020B0609020204030204" pitchFamily="49" charset="0"/>
+              </a:rPr>
+              <a:t> tag </a:t>
+            </a:r>
+            <a:r>
+              <a:rPr lang="de-DE" dirty="0"/>
+              <a:t>Befehl taggen</a:t>
+            </a:r>
+          </a:p>
+          <a:p>
+            <a:pPr>
+              <a:buFont typeface="Arial" panose="020B0604020202020204" pitchFamily="34" charset="0"/>
+              <a:buChar char="•"/>
+            </a:pPr>
+            <a:endParaRPr lang="de-DE" dirty="0"/>
+          </a:p>
+          <a:p>
+            <a:pPr marL="0" indent="0">
+              <a:buNone/>
+            </a:pPr>
+            <a:r>
+              <a:rPr lang="de-DE" dirty="0" err="1">
+                <a:latin typeface="Consolas" panose="020B0609020204030204" pitchFamily="49" charset="0"/>
+              </a:rPr>
+              <a:t>docker</a:t>
+            </a:r>
+            <a:r>
+              <a:rPr lang="de-DE" dirty="0">
+                <a:latin typeface="Consolas" panose="020B0609020204030204" pitchFamily="49" charset="0"/>
+              </a:rPr>
+              <a:t> tag [IMAGE_ID] [</a:t>
+            </a:r>
+            <a:r>
+              <a:rPr lang="de-DE" dirty="0" err="1">
+                <a:latin typeface="Consolas" panose="020B0609020204030204" pitchFamily="49" charset="0"/>
+              </a:rPr>
+              <a:t>repository</a:t>
+            </a:r>
+            <a:r>
+              <a:rPr lang="de-DE" dirty="0">
+                <a:latin typeface="Consolas" panose="020B0609020204030204" pitchFamily="49" charset="0"/>
+              </a:rPr>
+              <a:t>]:[TAG] </a:t>
+            </a:r>
+          </a:p>
+        </p:txBody>
+      </p:sp>
+    </p:spTree>
+    <p:extLst>
+      <p:ext uri="{BB962C8B-B14F-4D97-AF65-F5344CB8AC3E}">
+        <p14:creationId xmlns:p14="http://schemas.microsoft.com/office/powerpoint/2010/main" val="3788244119"/>
+      </p:ext>
+    </p:extLst>
+  </p:cSld>
+  <p:clrMapOvr>
+    <a:masterClrMapping/>
+  </p:clrMapOvr>
+</p:sld>
+</file>
+
+<file path=ppt/slides/slide11.xml><?xml version="1.0" encoding="utf-8"?>
+<p:sld xmlns:a="http://schemas.openxmlformats.org/drawingml/2006/main" xmlns:r="http://schemas.openxmlformats.org/officeDocument/2006/relationships" xmlns:p="http://schemas.openxmlformats.org/presentationml/2006/main">
+  <p:cSld>
+    <p:spTree>
+      <p:nvGrpSpPr>
+        <p:cNvPr id="1" name=""/>
+        <p:cNvGrpSpPr/>
+        <p:nvPr/>
+      </p:nvGrpSpPr>
+      <p:grpSpPr>
+        <a:xfrm>
+          <a:off x="0" y="0"/>
+          <a:ext cx="0" cy="0"/>
+          <a:chOff x="0" y="0"/>
+          <a:chExt cx="0" cy="0"/>
+        </a:xfrm>
+      </p:grpSpPr>
+      <p:sp>
+        <p:nvSpPr>
+          <p:cNvPr id="2" name="Titel 1">
+            <a:extLst>
+              <a:ext uri="{FF2B5EF4-FFF2-40B4-BE49-F238E27FC236}">
+                <a16:creationId xmlns:a16="http://schemas.microsoft.com/office/drawing/2014/main" id="{5874EA8E-7A71-3505-B01E-D0E8A26AAC59}"/>
+              </a:ext>
+            </a:extLst>
+          </p:cNvPr>
+          <p:cNvSpPr>
+            <a:spLocks noGrp="1"/>
+          </p:cNvSpPr>
+          <p:nvPr>
+            <p:ph type="title"/>
+          </p:nvPr>
+        </p:nvSpPr>
+        <p:spPr/>
+        <p:txBody>
+          <a:bodyPr/>
+          <a:lstStyle/>
+          <a:p>
+            <a:r>
+              <a:rPr lang="de-DE" cap="none" dirty="0"/>
+              <a:t>Release- und </a:t>
+            </a:r>
+            <a:r>
+              <a:rPr lang="de-DE" cap="none" dirty="0" err="1"/>
+              <a:t>Tagged</a:t>
+            </a:r>
+            <a:r>
+              <a:rPr lang="de-DE" cap="none" dirty="0"/>
+              <a:t>-Images</a:t>
+            </a:r>
+            <a:endParaRPr lang="de-DE" dirty="0"/>
+          </a:p>
+        </p:txBody>
+      </p:sp>
+      <p:sp>
+        <p:nvSpPr>
+          <p:cNvPr id="3" name="Inhaltsplatzhalter 2">
+            <a:extLst>
+              <a:ext uri="{FF2B5EF4-FFF2-40B4-BE49-F238E27FC236}">
+                <a16:creationId xmlns:a16="http://schemas.microsoft.com/office/drawing/2014/main" id="{D4DA2B4E-C5FB-6595-34A6-E18A9AA0157D}"/>
+              </a:ext>
+            </a:extLst>
+          </p:cNvPr>
+          <p:cNvSpPr>
+            <a:spLocks noGrp="1"/>
+          </p:cNvSpPr>
+          <p:nvPr>
+            <p:ph idx="1"/>
+          </p:nvPr>
+        </p:nvSpPr>
+        <p:spPr/>
+        <p:txBody>
+          <a:bodyPr/>
+          <a:lstStyle/>
+          <a:p>
+            <a:pPr marL="0" indent="0">
+              <a:buNone/>
+            </a:pPr>
+            <a:r>
+              <a:rPr lang="de-DE" b="1" dirty="0"/>
+              <a:t>Best </a:t>
+            </a:r>
+            <a:r>
+              <a:rPr lang="de-DE" b="1" dirty="0" err="1"/>
+              <a:t>Practises</a:t>
+            </a:r>
+            <a:endParaRPr lang="de-DE" b="1" dirty="0"/>
+          </a:p>
+          <a:p>
+            <a:pPr>
+              <a:buFont typeface="Arial" panose="020B0604020202020204" pitchFamily="34" charset="0"/>
+              <a:buChar char="•"/>
+            </a:pPr>
+            <a:r>
+              <a:rPr lang="de-DE" dirty="0"/>
+              <a:t>Aussagekräftige Tags</a:t>
+            </a:r>
+          </a:p>
+          <a:p>
+            <a:pPr lvl="1">
+              <a:buFont typeface="Arial" panose="020B0604020202020204" pitchFamily="34" charset="0"/>
+              <a:buChar char="•"/>
+            </a:pPr>
+            <a:r>
+              <a:rPr lang="de-DE" dirty="0"/>
+              <a:t>Tags sollten beschreibend (deskriptive) sein</a:t>
+            </a:r>
+          </a:p>
+          <a:p>
+            <a:pPr lvl="1">
+              <a:buFont typeface="Arial" panose="020B0604020202020204" pitchFamily="34" charset="0"/>
+              <a:buChar char="•"/>
+            </a:pPr>
+            <a:r>
+              <a:rPr lang="de-DE" dirty="0"/>
+              <a:t>Die Image Version oder Zustand wiedergeben</a:t>
+            </a:r>
+          </a:p>
+          <a:p>
+            <a:pPr>
+              <a:buFont typeface="Arial" panose="020B0604020202020204" pitchFamily="34" charset="0"/>
+              <a:buChar char="•"/>
+            </a:pPr>
+            <a:r>
+              <a:rPr lang="de-DE" dirty="0"/>
+              <a:t>Konsistenz</a:t>
+            </a:r>
+          </a:p>
+          <a:p>
+            <a:pPr lvl="1">
+              <a:buFont typeface="Arial" panose="020B0604020202020204" pitchFamily="34" charset="0"/>
+              <a:buChar char="•"/>
+            </a:pPr>
+            <a:r>
+              <a:rPr lang="de-DE" dirty="0"/>
+              <a:t>Einheitliches Tagging-Schema für verschiedene Images und Versionen</a:t>
+            </a:r>
+          </a:p>
+          <a:p>
+            <a:pPr>
+              <a:buFont typeface="Arial" panose="020B0604020202020204" pitchFamily="34" charset="0"/>
+              <a:buChar char="•"/>
+            </a:pPr>
+            <a:r>
+              <a:rPr lang="de-DE" dirty="0"/>
+              <a:t>Regelmäßige Updates</a:t>
+            </a:r>
+          </a:p>
+          <a:p>
+            <a:pPr lvl="1">
+              <a:buFont typeface="Arial" panose="020B0604020202020204" pitchFamily="34" charset="0"/>
+              <a:buChar char="•"/>
+            </a:pPr>
+            <a:r>
+              <a:rPr lang="de-DE" dirty="0"/>
+              <a:t>Tags immer aktualisieren, gerade bei einer neuen </a:t>
+            </a:r>
+            <a:r>
+              <a:rPr lang="de-DE" dirty="0" err="1"/>
+              <a:t>Verison</a:t>
+            </a:r>
+            <a:endParaRPr lang="de-DE" dirty="0"/>
+          </a:p>
+          <a:p>
+            <a:pPr lvl="1">
+              <a:buFont typeface="Arial" panose="020B0604020202020204" pitchFamily="34" charset="0"/>
+              <a:buChar char="•"/>
+            </a:pPr>
+            <a:r>
+              <a:rPr lang="de-DE">
+                <a:sym typeface="Wingdings" panose="05000000000000000000" pitchFamily="2" charset="2"/>
+              </a:rPr>
+              <a:t> Strategien zum Image Tagging</a:t>
+            </a:r>
+            <a:endParaRPr lang="de-DE" dirty="0"/>
+          </a:p>
+        </p:txBody>
+      </p:sp>
+    </p:spTree>
+    <p:extLst>
+      <p:ext uri="{BB962C8B-B14F-4D97-AF65-F5344CB8AC3E}">
+        <p14:creationId xmlns:p14="http://schemas.microsoft.com/office/powerpoint/2010/main" val="1854948885"/>
+      </p:ext>
+    </p:extLst>
+  </p:cSld>
+  <p:clrMapOvr>
+    <a:masterClrMapping/>
+  </p:clrMapOvr>
+</p:sld>
+</file>
+
+<file path=ppt/slides/slide12.xml><?xml version="1.0" encoding="utf-8"?>
+<p:sld xmlns:a="http://schemas.openxmlformats.org/drawingml/2006/main" xmlns:r="http://schemas.openxmlformats.org/officeDocument/2006/relationships" xmlns:p="http://schemas.openxmlformats.org/presentationml/2006/main">
+  <p:cSld>
+    <p:spTree>
+      <p:nvGrpSpPr>
+        <p:cNvPr id="1" name=""/>
+        <p:cNvGrpSpPr/>
+        <p:nvPr/>
+      </p:nvGrpSpPr>
+      <p:grpSpPr>
+        <a:xfrm>
+          <a:off x="0" y="0"/>
+          <a:ext cx="0" cy="0"/>
+          <a:chOff x="0" y="0"/>
+          <a:chExt cx="0" cy="0"/>
+        </a:xfrm>
+      </p:grpSpPr>
+      <p:sp>
+        <p:nvSpPr>
+          <p:cNvPr id="2" name="Titel 1">
+            <a:extLst>
+              <a:ext uri="{FF2B5EF4-FFF2-40B4-BE49-F238E27FC236}">
+                <a16:creationId xmlns:a16="http://schemas.microsoft.com/office/drawing/2014/main" id="{5874EA8E-7A71-3505-B01E-D0E8A26AAC59}"/>
+              </a:ext>
+            </a:extLst>
+          </p:cNvPr>
+          <p:cNvSpPr>
+            <a:spLocks noGrp="1"/>
+          </p:cNvSpPr>
+          <p:nvPr>
+            <p:ph type="title"/>
+          </p:nvPr>
+        </p:nvSpPr>
+        <p:spPr/>
+        <p:txBody>
+          <a:bodyPr/>
+          <a:lstStyle/>
+          <a:p>
+            <a:r>
+              <a:rPr lang="de-DE" cap="none" dirty="0"/>
+              <a:t>Release- und </a:t>
+            </a:r>
+            <a:r>
+              <a:rPr lang="de-DE" cap="none" dirty="0" err="1"/>
+              <a:t>Tagged</a:t>
+            </a:r>
+            <a:r>
+              <a:rPr lang="de-DE" cap="none" dirty="0"/>
+              <a:t>-Images</a:t>
+            </a:r>
+            <a:endParaRPr lang="de-DE" dirty="0"/>
+          </a:p>
+        </p:txBody>
+      </p:sp>
+      <p:sp>
+        <p:nvSpPr>
+          <p:cNvPr id="3" name="Inhaltsplatzhalter 2">
+            <a:extLst>
+              <a:ext uri="{FF2B5EF4-FFF2-40B4-BE49-F238E27FC236}">
+                <a16:creationId xmlns:a16="http://schemas.microsoft.com/office/drawing/2014/main" id="{D4DA2B4E-C5FB-6595-34A6-E18A9AA0157D}"/>
+              </a:ext>
+            </a:extLst>
+          </p:cNvPr>
+          <p:cNvSpPr>
+            <a:spLocks noGrp="1"/>
+          </p:cNvSpPr>
+          <p:nvPr>
+            <p:ph idx="1"/>
+          </p:nvPr>
+        </p:nvSpPr>
+        <p:spPr/>
+        <p:txBody>
+          <a:bodyPr/>
+          <a:lstStyle/>
+          <a:p>
+            <a:pPr marL="0" indent="0">
+              <a:buNone/>
+            </a:pPr>
+            <a:r>
+              <a:rPr lang="de-DE" b="1" dirty="0"/>
+              <a:t>Strategien zum Image Tagging</a:t>
+            </a:r>
+          </a:p>
+          <a:p>
+            <a:pPr>
+              <a:buFont typeface="Arial" panose="020B0604020202020204" pitchFamily="34" charset="0"/>
+              <a:buChar char="•"/>
+            </a:pPr>
+            <a:r>
+              <a:rPr lang="de-DE" dirty="0"/>
+              <a:t>Image ID (</a:t>
+            </a:r>
+            <a:r>
+              <a:rPr lang="de-DE" dirty="0" err="1"/>
+              <a:t>digest</a:t>
+            </a:r>
+            <a:r>
+              <a:rPr lang="de-DE" dirty="0"/>
+              <a:t>)</a:t>
+            </a:r>
+          </a:p>
+          <a:p>
+            <a:pPr>
+              <a:buFont typeface="Arial" panose="020B0604020202020204" pitchFamily="34" charset="0"/>
+              <a:buChar char="•"/>
+            </a:pPr>
+            <a:r>
+              <a:rPr lang="de-DE" dirty="0"/>
+              <a:t>Image tags:</a:t>
+            </a:r>
+          </a:p>
+          <a:p>
+            <a:pPr lvl="1">
+              <a:buFont typeface="Arial" panose="020B0604020202020204" pitchFamily="34" charset="0"/>
+              <a:buChar char="•"/>
+            </a:pPr>
+            <a:r>
+              <a:rPr lang="de-DE" dirty="0"/>
+              <a:t>Rolling tags</a:t>
+            </a:r>
+          </a:p>
+          <a:p>
+            <a:pPr lvl="1">
+              <a:buFont typeface="Arial" panose="020B0604020202020204" pitchFamily="34" charset="0"/>
+              <a:buChar char="•"/>
+            </a:pPr>
+            <a:r>
+              <a:rPr lang="de-DE" dirty="0" err="1"/>
+              <a:t>SemVer</a:t>
+            </a:r>
+            <a:r>
+              <a:rPr lang="de-DE" dirty="0"/>
+              <a:t> tags</a:t>
+            </a:r>
+          </a:p>
+          <a:p>
+            <a:pPr lvl="1">
+              <a:buFont typeface="Arial" panose="020B0604020202020204" pitchFamily="34" charset="0"/>
+              <a:buChar char="•"/>
+            </a:pPr>
+            <a:r>
+              <a:rPr lang="de-DE" dirty="0" err="1"/>
+              <a:t>GitCommit</a:t>
+            </a:r>
+            <a:endParaRPr lang="de-DE" dirty="0"/>
+          </a:p>
+          <a:p>
+            <a:pPr lvl="1">
+              <a:buFont typeface="Arial" panose="020B0604020202020204" pitchFamily="34" charset="0"/>
+              <a:buChar char="•"/>
+            </a:pPr>
+            <a:r>
+              <a:rPr lang="de-DE" dirty="0" err="1"/>
+              <a:t>Timestamp</a:t>
+            </a:r>
+            <a:endParaRPr lang="de-DE" dirty="0"/>
+          </a:p>
+          <a:p>
+            <a:pPr lvl="1">
+              <a:buFont typeface="Arial" panose="020B0604020202020204" pitchFamily="34" charset="0"/>
+              <a:buChar char="•"/>
+            </a:pPr>
+            <a:r>
+              <a:rPr lang="de-DE" dirty="0" err="1"/>
+              <a:t>Build</a:t>
+            </a:r>
+            <a:r>
+              <a:rPr lang="de-DE" dirty="0"/>
+              <a:t> ID</a:t>
+            </a:r>
+          </a:p>
+        </p:txBody>
+      </p:sp>
+    </p:spTree>
+    <p:extLst>
+      <p:ext uri="{BB962C8B-B14F-4D97-AF65-F5344CB8AC3E}">
+        <p14:creationId xmlns:p14="http://schemas.microsoft.com/office/powerpoint/2010/main" val="1996689965"/>
+      </p:ext>
+    </p:extLst>
+  </p:cSld>
+  <p:clrMapOvr>
+    <a:masterClrMapping/>
+  </p:clrMapOvr>
+</p:sld>
+</file>
+
+<file path=ppt/slides/slide13.xml><?xml version="1.0" encoding="utf-8"?>
+<p:sld xmlns:a="http://schemas.openxmlformats.org/drawingml/2006/main" xmlns:r="http://schemas.openxmlformats.org/officeDocument/2006/relationships" xmlns:p="http://schemas.openxmlformats.org/presentationml/2006/main">
+  <p:cSld>
+    <p:spTree>
+      <p:nvGrpSpPr>
+        <p:cNvPr id="1" name=""/>
+        <p:cNvGrpSpPr/>
+        <p:nvPr/>
+      </p:nvGrpSpPr>
+      <p:grpSpPr>
+        <a:xfrm>
+          <a:off x="0" y="0"/>
+          <a:ext cx="0" cy="0"/>
+          <a:chOff x="0" y="0"/>
+          <a:chExt cx="0" cy="0"/>
+        </a:xfrm>
+      </p:grpSpPr>
+      <p:sp>
+        <p:nvSpPr>
+          <p:cNvPr id="2" name="Titel 1">
+            <a:extLst>
+              <a:ext uri="{FF2B5EF4-FFF2-40B4-BE49-F238E27FC236}">
+                <a16:creationId xmlns:a16="http://schemas.microsoft.com/office/drawing/2014/main" id="{184AFD09-5210-6F86-C2FD-BBC016D382A6}"/>
+              </a:ext>
+            </a:extLst>
+          </p:cNvPr>
+          <p:cNvSpPr>
+            <a:spLocks noGrp="1"/>
+          </p:cNvSpPr>
+          <p:nvPr>
+            <p:ph type="title"/>
+          </p:nvPr>
+        </p:nvSpPr>
+        <p:spPr/>
+        <p:txBody>
+          <a:bodyPr/>
+          <a:lstStyle/>
+          <a:p>
+            <a:r>
+              <a:rPr lang="de-DE" cap="none" dirty="0"/>
+              <a:t>Release- und </a:t>
+            </a:r>
+            <a:r>
+              <a:rPr lang="de-DE" cap="none" dirty="0" err="1"/>
+              <a:t>Tagged</a:t>
+            </a:r>
+            <a:r>
+              <a:rPr lang="de-DE" cap="none" dirty="0"/>
+              <a:t>-Images</a:t>
+            </a:r>
+            <a:endParaRPr lang="de-DE" dirty="0"/>
+          </a:p>
+        </p:txBody>
+      </p:sp>
+      <p:sp>
+        <p:nvSpPr>
+          <p:cNvPr id="6" name="Inhaltsplatzhalter 5">
+            <a:extLst>
+              <a:ext uri="{FF2B5EF4-FFF2-40B4-BE49-F238E27FC236}">
+                <a16:creationId xmlns:a16="http://schemas.microsoft.com/office/drawing/2014/main" id="{D2412707-84D3-F572-4709-FD9A95F28E5B}"/>
+              </a:ext>
+            </a:extLst>
+          </p:cNvPr>
+          <p:cNvSpPr>
+            <a:spLocks noGrp="1"/>
+          </p:cNvSpPr>
+          <p:nvPr>
+            <p:ph idx="1"/>
+          </p:nvPr>
+        </p:nvSpPr>
+        <p:spPr/>
+        <p:txBody>
+          <a:bodyPr/>
+          <a:lstStyle/>
+          <a:p>
+            <a:pPr marL="0" indent="0">
+              <a:buNone/>
+            </a:pPr>
+            <a:r>
+              <a:rPr lang="de-DE" b="1" dirty="0"/>
+              <a:t>Verwendung mit </a:t>
+            </a:r>
+            <a:r>
+              <a:rPr lang="de-DE" b="1" dirty="0" err="1"/>
+              <a:t>GitLab</a:t>
+            </a:r>
+            <a:endParaRPr lang="de-DE" b="1" dirty="0"/>
+          </a:p>
+          <a:p>
+            <a:pPr>
+              <a:buFont typeface="Arial" panose="020B0604020202020204" pitchFamily="34" charset="0"/>
+              <a:buChar char="•"/>
+            </a:pPr>
+            <a:r>
+              <a:rPr lang="de-DE" dirty="0"/>
+              <a:t>Authentifizierung mit der Container Registry</a:t>
+            </a:r>
+          </a:p>
+          <a:p>
+            <a:pPr>
+              <a:buFont typeface="Arial" panose="020B0604020202020204" pitchFamily="34" charset="0"/>
+              <a:buChar char="•"/>
+            </a:pPr>
+            <a:r>
+              <a:rPr lang="de-DE" dirty="0" err="1"/>
+              <a:t>GitLab</a:t>
+            </a:r>
+            <a:r>
+              <a:rPr lang="de-DE" dirty="0"/>
+              <a:t> CI/CD zum authentifizieren</a:t>
+            </a:r>
+          </a:p>
+          <a:p>
+            <a:pPr>
+              <a:buFont typeface="Arial" panose="020B0604020202020204" pitchFamily="34" charset="0"/>
+              <a:buChar char="•"/>
+            </a:pPr>
+            <a:r>
+              <a:rPr lang="de-DE" dirty="0"/>
+              <a:t>Images bauen und pushen</a:t>
+            </a:r>
+          </a:p>
+          <a:p>
+            <a:pPr lvl="1">
+              <a:buFont typeface="Arial" panose="020B0604020202020204" pitchFamily="34" charset="0"/>
+              <a:buChar char="•"/>
+            </a:pPr>
+            <a:r>
+              <a:rPr lang="de-DE" dirty="0"/>
+              <a:t>Docker</a:t>
+            </a:r>
+          </a:p>
+          <a:p>
+            <a:pPr lvl="1">
+              <a:buFont typeface="Arial" panose="020B0604020202020204" pitchFamily="34" charset="0"/>
+              <a:buChar char="•"/>
+            </a:pPr>
+            <a:r>
+              <a:rPr lang="de-DE" dirty="0" err="1"/>
+              <a:t>GitLab</a:t>
+            </a:r>
+            <a:r>
+              <a:rPr lang="de-DE" dirty="0"/>
+              <a:t> CI/CD</a:t>
+            </a:r>
+          </a:p>
+          <a:p>
+            <a:pPr lvl="2">
+              <a:buFont typeface="Arial" panose="020B0604020202020204" pitchFamily="34" charset="0"/>
+              <a:buChar char="•"/>
+            </a:pPr>
+            <a:r>
+              <a:rPr lang="de-DE" sz="1800" dirty="0"/>
+              <a:t>Docker-in-Docker Container Image (Container Registry)</a:t>
+            </a:r>
+          </a:p>
+          <a:p>
+            <a:pPr lvl="2">
+              <a:buFont typeface="Arial" panose="020B0604020202020204" pitchFamily="34" charset="0"/>
+              <a:buChar char="•"/>
+            </a:pPr>
+            <a:r>
+              <a:rPr lang="de-DE" sz="1800" dirty="0"/>
+              <a:t>Docker-in-Docker Container Image (</a:t>
+            </a:r>
+            <a:r>
+              <a:rPr lang="de-DE" sz="1800" dirty="0" err="1"/>
+              <a:t>Dependency</a:t>
+            </a:r>
+            <a:r>
+              <a:rPr lang="de-DE" sz="1800" dirty="0"/>
+              <a:t> Proxy)</a:t>
+            </a:r>
+          </a:p>
+          <a:p>
+            <a:pPr>
+              <a:buFont typeface="Arial" panose="020B0604020202020204" pitchFamily="34" charset="0"/>
+              <a:buChar char="•"/>
+            </a:pPr>
+            <a:r>
+              <a:rPr lang="de-DE" dirty="0"/>
+              <a:t>Container Registry Beispiele mit </a:t>
+            </a:r>
+            <a:r>
+              <a:rPr lang="de-DE" dirty="0" err="1"/>
+              <a:t>GitLab</a:t>
+            </a:r>
+            <a:r>
+              <a:rPr lang="de-DE" dirty="0"/>
+              <a:t> CI/CD</a:t>
+            </a:r>
+          </a:p>
+          <a:p>
+            <a:pPr lvl="2">
+              <a:buFont typeface="Arial" panose="020B0604020202020204" pitchFamily="34" charset="0"/>
+              <a:buChar char="•"/>
+            </a:pPr>
+            <a:endParaRPr lang="de-DE" dirty="0"/>
+          </a:p>
+          <a:p>
+            <a:pPr lvl="2">
+              <a:buFont typeface="Arial" panose="020B0604020202020204" pitchFamily="34" charset="0"/>
+              <a:buChar char="•"/>
+            </a:pPr>
+            <a:endParaRPr lang="de-DE" dirty="0"/>
+          </a:p>
+          <a:p>
+            <a:pPr lvl="1">
+              <a:buFont typeface="Arial" panose="020B0604020202020204" pitchFamily="34" charset="0"/>
+              <a:buChar char="•"/>
+            </a:pPr>
+            <a:endParaRPr lang="de-DE" dirty="0"/>
+          </a:p>
+        </p:txBody>
+      </p:sp>
+    </p:spTree>
+    <p:extLst>
+      <p:ext uri="{BB962C8B-B14F-4D97-AF65-F5344CB8AC3E}">
+        <p14:creationId xmlns:p14="http://schemas.microsoft.com/office/powerpoint/2010/main" val="1944366019"/>
+      </p:ext>
+    </p:extLst>
+  </p:cSld>
+  <p:clrMapOvr>
+    <a:masterClrMapping/>
+  </p:clrMapOvr>
+</p:sld>
+</file>
+
 <file path=ppt/slides/slide2.xml><?xml version="1.0" encoding="utf-8"?>
 <p:sld xmlns:a="http://schemas.openxmlformats.org/drawingml/2006/main" xmlns:r="http://schemas.openxmlformats.org/officeDocument/2006/relationships" xmlns:p="http://schemas.openxmlformats.org/presentationml/2006/main">
   <p:cSld>
@@ -4511,6 +5460,830 @@
     <p:extLst>
       <p:ext uri="{BB962C8B-B14F-4D97-AF65-F5344CB8AC3E}">
         <p14:creationId xmlns:p14="http://schemas.microsoft.com/office/powerpoint/2010/main" val="614702079"/>
+      </p:ext>
+    </p:extLst>
+  </p:cSld>
+  <p:clrMapOvr>
+    <a:masterClrMapping/>
+  </p:clrMapOvr>
+</p:sld>
+</file>
+
+<file path=ppt/slides/slide5.xml><?xml version="1.0" encoding="utf-8"?>
+<p:sld xmlns:a="http://schemas.openxmlformats.org/drawingml/2006/main" xmlns:r="http://schemas.openxmlformats.org/officeDocument/2006/relationships" xmlns:p="http://schemas.openxmlformats.org/presentationml/2006/main">
+  <p:cSld>
+    <p:spTree>
+      <p:nvGrpSpPr>
+        <p:cNvPr id="1" name=""/>
+        <p:cNvGrpSpPr/>
+        <p:nvPr/>
+      </p:nvGrpSpPr>
+      <p:grpSpPr>
+        <a:xfrm>
+          <a:off x="0" y="0"/>
+          <a:ext cx="0" cy="0"/>
+          <a:chOff x="0" y="0"/>
+          <a:chExt cx="0" cy="0"/>
+        </a:xfrm>
+      </p:grpSpPr>
+      <p:sp>
+        <p:nvSpPr>
+          <p:cNvPr id="2" name="Titel 1">
+            <a:extLst>
+              <a:ext uri="{FF2B5EF4-FFF2-40B4-BE49-F238E27FC236}">
+                <a16:creationId xmlns:a16="http://schemas.microsoft.com/office/drawing/2014/main" id="{5874EA8E-7A71-3505-B01E-D0E8A26AAC59}"/>
+              </a:ext>
+            </a:extLst>
+          </p:cNvPr>
+          <p:cNvSpPr>
+            <a:spLocks noGrp="1"/>
+          </p:cNvSpPr>
+          <p:nvPr>
+            <p:ph type="title"/>
+          </p:nvPr>
+        </p:nvSpPr>
+        <p:spPr/>
+        <p:txBody>
+          <a:bodyPr/>
+          <a:lstStyle/>
+          <a:p>
+            <a:r>
+              <a:rPr lang="de-DE" cap="none" dirty="0"/>
+              <a:t>Release- und </a:t>
+            </a:r>
+            <a:r>
+              <a:rPr lang="de-DE" cap="none" dirty="0" err="1"/>
+              <a:t>Tagged</a:t>
+            </a:r>
+            <a:r>
+              <a:rPr lang="de-DE" cap="none" dirty="0"/>
+              <a:t>-Images</a:t>
+            </a:r>
+            <a:endParaRPr lang="de-DE" dirty="0"/>
+          </a:p>
+        </p:txBody>
+      </p:sp>
+      <p:sp>
+        <p:nvSpPr>
+          <p:cNvPr id="3" name="Inhaltsplatzhalter 2">
+            <a:extLst>
+              <a:ext uri="{FF2B5EF4-FFF2-40B4-BE49-F238E27FC236}">
+                <a16:creationId xmlns:a16="http://schemas.microsoft.com/office/drawing/2014/main" id="{D4DA2B4E-C5FB-6595-34A6-E18A9AA0157D}"/>
+              </a:ext>
+            </a:extLst>
+          </p:cNvPr>
+          <p:cNvSpPr>
+            <a:spLocks noGrp="1"/>
+          </p:cNvSpPr>
+          <p:nvPr>
+            <p:ph idx="1"/>
+          </p:nvPr>
+        </p:nvSpPr>
+        <p:spPr/>
+        <p:txBody>
+          <a:bodyPr/>
+          <a:lstStyle/>
+          <a:p>
+            <a:pPr marL="0" indent="0">
+              <a:buNone/>
+            </a:pPr>
+            <a:r>
+              <a:rPr lang="de-DE" b="1" dirty="0"/>
+              <a:t>Agenda</a:t>
+            </a:r>
+          </a:p>
+          <a:p>
+            <a:pPr>
+              <a:buFont typeface="Arial" panose="020B0604020202020204" pitchFamily="34" charset="0"/>
+              <a:buChar char="•"/>
+            </a:pPr>
+            <a:r>
+              <a:rPr lang="de-DE" dirty="0"/>
+              <a:t>Tagging von Docker Images</a:t>
+            </a:r>
+          </a:p>
+          <a:p>
+            <a:pPr>
+              <a:buFont typeface="Arial" panose="020B0604020202020204" pitchFamily="34" charset="0"/>
+              <a:buChar char="•"/>
+            </a:pPr>
+            <a:r>
+              <a:rPr lang="de-DE" dirty="0"/>
+              <a:t>Strategien zum Image Tagging</a:t>
+            </a:r>
+          </a:p>
+          <a:p>
+            <a:pPr>
+              <a:buFont typeface="Arial" panose="020B0604020202020204" pitchFamily="34" charset="0"/>
+              <a:buChar char="•"/>
+            </a:pPr>
+            <a:r>
+              <a:rPr lang="de-DE" dirty="0"/>
+              <a:t>Verwendung mit </a:t>
+            </a:r>
+            <a:r>
+              <a:rPr lang="de-DE" dirty="0" err="1"/>
+              <a:t>GitLab</a:t>
+            </a:r>
+            <a:endParaRPr lang="de-DE" dirty="0"/>
+          </a:p>
+        </p:txBody>
+      </p:sp>
+    </p:spTree>
+    <p:extLst>
+      <p:ext uri="{BB962C8B-B14F-4D97-AF65-F5344CB8AC3E}">
+        <p14:creationId xmlns:p14="http://schemas.microsoft.com/office/powerpoint/2010/main" val="2341426077"/>
+      </p:ext>
+    </p:extLst>
+  </p:cSld>
+  <p:clrMapOvr>
+    <a:masterClrMapping/>
+  </p:clrMapOvr>
+</p:sld>
+</file>
+
+<file path=ppt/slides/slide6.xml><?xml version="1.0" encoding="utf-8"?>
+<p:sld xmlns:a="http://schemas.openxmlformats.org/drawingml/2006/main" xmlns:r="http://schemas.openxmlformats.org/officeDocument/2006/relationships" xmlns:p="http://schemas.openxmlformats.org/presentationml/2006/main">
+  <p:cSld>
+    <p:spTree>
+      <p:nvGrpSpPr>
+        <p:cNvPr id="1" name=""/>
+        <p:cNvGrpSpPr/>
+        <p:nvPr/>
+      </p:nvGrpSpPr>
+      <p:grpSpPr>
+        <a:xfrm>
+          <a:off x="0" y="0"/>
+          <a:ext cx="0" cy="0"/>
+          <a:chOff x="0" y="0"/>
+          <a:chExt cx="0" cy="0"/>
+        </a:xfrm>
+      </p:grpSpPr>
+      <p:sp>
+        <p:nvSpPr>
+          <p:cNvPr id="2" name="Titel 1">
+            <a:extLst>
+              <a:ext uri="{FF2B5EF4-FFF2-40B4-BE49-F238E27FC236}">
+                <a16:creationId xmlns:a16="http://schemas.microsoft.com/office/drawing/2014/main" id="{5874EA8E-7A71-3505-B01E-D0E8A26AAC59}"/>
+              </a:ext>
+            </a:extLst>
+          </p:cNvPr>
+          <p:cNvSpPr>
+            <a:spLocks noGrp="1"/>
+          </p:cNvSpPr>
+          <p:nvPr>
+            <p:ph type="title"/>
+          </p:nvPr>
+        </p:nvSpPr>
+        <p:spPr/>
+        <p:txBody>
+          <a:bodyPr/>
+          <a:lstStyle/>
+          <a:p>
+            <a:r>
+              <a:rPr lang="de-DE" cap="none" dirty="0"/>
+              <a:t>Release- und </a:t>
+            </a:r>
+            <a:r>
+              <a:rPr lang="de-DE" cap="none" dirty="0" err="1"/>
+              <a:t>Tagged</a:t>
+            </a:r>
+            <a:r>
+              <a:rPr lang="de-DE" cap="none" dirty="0"/>
+              <a:t>-Images</a:t>
+            </a:r>
+            <a:endParaRPr lang="de-DE" dirty="0"/>
+          </a:p>
+        </p:txBody>
+      </p:sp>
+      <p:sp>
+        <p:nvSpPr>
+          <p:cNvPr id="3" name="Inhaltsplatzhalter 2">
+            <a:extLst>
+              <a:ext uri="{FF2B5EF4-FFF2-40B4-BE49-F238E27FC236}">
+                <a16:creationId xmlns:a16="http://schemas.microsoft.com/office/drawing/2014/main" id="{D4DA2B4E-C5FB-6595-34A6-E18A9AA0157D}"/>
+              </a:ext>
+            </a:extLst>
+          </p:cNvPr>
+          <p:cNvSpPr>
+            <a:spLocks noGrp="1"/>
+          </p:cNvSpPr>
+          <p:nvPr>
+            <p:ph idx="1"/>
+          </p:nvPr>
+        </p:nvSpPr>
+        <p:spPr/>
+        <p:txBody>
+          <a:bodyPr/>
+          <a:lstStyle/>
+          <a:p>
+            <a:pPr marL="0" indent="0">
+              <a:buNone/>
+            </a:pPr>
+            <a:r>
+              <a:rPr lang="de-DE" b="1" dirty="0"/>
+              <a:t>Tagging von Docker Images</a:t>
+            </a:r>
+          </a:p>
+          <a:p>
+            <a:pPr>
+              <a:buFont typeface="Arial" panose="020B0604020202020204" pitchFamily="34" charset="0"/>
+              <a:buChar char="•"/>
+            </a:pPr>
+            <a:r>
+              <a:rPr lang="de-DE" dirty="0"/>
+              <a:t>Was ist Tagging?</a:t>
+            </a:r>
+          </a:p>
+          <a:p>
+            <a:pPr>
+              <a:buFont typeface="Arial" panose="020B0604020202020204" pitchFamily="34" charset="0"/>
+              <a:buChar char="•"/>
+            </a:pPr>
+            <a:r>
+              <a:rPr lang="de-DE" dirty="0"/>
+              <a:t>Warum Tagging?</a:t>
+            </a:r>
+          </a:p>
+          <a:p>
+            <a:pPr>
+              <a:buFont typeface="Arial" panose="020B0604020202020204" pitchFamily="34" charset="0"/>
+              <a:buChar char="•"/>
+            </a:pPr>
+            <a:r>
+              <a:rPr lang="de-DE" dirty="0"/>
+              <a:t>Tagging während des </a:t>
+            </a:r>
+            <a:r>
+              <a:rPr lang="de-DE" dirty="0" err="1"/>
+              <a:t>Builds</a:t>
+            </a:r>
+            <a:endParaRPr lang="de-DE" dirty="0"/>
+          </a:p>
+          <a:p>
+            <a:pPr>
+              <a:buFont typeface="Arial" panose="020B0604020202020204" pitchFamily="34" charset="0"/>
+              <a:buChar char="•"/>
+            </a:pPr>
+            <a:r>
+              <a:rPr lang="de-DE" dirty="0"/>
+              <a:t>Tagging nach dem </a:t>
+            </a:r>
+            <a:r>
+              <a:rPr lang="de-DE" dirty="0" err="1"/>
+              <a:t>Build</a:t>
+            </a:r>
+            <a:endParaRPr lang="de-DE" dirty="0"/>
+          </a:p>
+          <a:p>
+            <a:pPr>
+              <a:buFont typeface="Arial" panose="020B0604020202020204" pitchFamily="34" charset="0"/>
+              <a:buChar char="•"/>
+            </a:pPr>
+            <a:r>
+              <a:rPr lang="de-DE" dirty="0"/>
+              <a:t>Best </a:t>
+            </a:r>
+            <a:r>
+              <a:rPr lang="de-DE" dirty="0" err="1"/>
+              <a:t>Practises</a:t>
+            </a:r>
+            <a:endParaRPr lang="de-DE" dirty="0"/>
+          </a:p>
+        </p:txBody>
+      </p:sp>
+    </p:spTree>
+    <p:extLst>
+      <p:ext uri="{BB962C8B-B14F-4D97-AF65-F5344CB8AC3E}">
+        <p14:creationId xmlns:p14="http://schemas.microsoft.com/office/powerpoint/2010/main" val="842267129"/>
+      </p:ext>
+    </p:extLst>
+  </p:cSld>
+  <p:clrMapOvr>
+    <a:masterClrMapping/>
+  </p:clrMapOvr>
+</p:sld>
+</file>
+
+<file path=ppt/slides/slide7.xml><?xml version="1.0" encoding="utf-8"?>
+<p:sld xmlns:a="http://schemas.openxmlformats.org/drawingml/2006/main" xmlns:r="http://schemas.openxmlformats.org/officeDocument/2006/relationships" xmlns:p="http://schemas.openxmlformats.org/presentationml/2006/main">
+  <p:cSld>
+    <p:spTree>
+      <p:nvGrpSpPr>
+        <p:cNvPr id="1" name=""/>
+        <p:cNvGrpSpPr/>
+        <p:nvPr/>
+      </p:nvGrpSpPr>
+      <p:grpSpPr>
+        <a:xfrm>
+          <a:off x="0" y="0"/>
+          <a:ext cx="0" cy="0"/>
+          <a:chOff x="0" y="0"/>
+          <a:chExt cx="0" cy="0"/>
+        </a:xfrm>
+      </p:grpSpPr>
+      <p:sp>
+        <p:nvSpPr>
+          <p:cNvPr id="2" name="Titel 1">
+            <a:extLst>
+              <a:ext uri="{FF2B5EF4-FFF2-40B4-BE49-F238E27FC236}">
+                <a16:creationId xmlns:a16="http://schemas.microsoft.com/office/drawing/2014/main" id="{5874EA8E-7A71-3505-B01E-D0E8A26AAC59}"/>
+              </a:ext>
+            </a:extLst>
+          </p:cNvPr>
+          <p:cNvSpPr>
+            <a:spLocks noGrp="1"/>
+          </p:cNvSpPr>
+          <p:nvPr>
+            <p:ph type="title"/>
+          </p:nvPr>
+        </p:nvSpPr>
+        <p:spPr/>
+        <p:txBody>
+          <a:bodyPr/>
+          <a:lstStyle/>
+          <a:p>
+            <a:r>
+              <a:rPr lang="de-DE" cap="none" dirty="0"/>
+              <a:t>Release- und </a:t>
+            </a:r>
+            <a:r>
+              <a:rPr lang="de-DE" cap="none" dirty="0" err="1"/>
+              <a:t>Tagged</a:t>
+            </a:r>
+            <a:r>
+              <a:rPr lang="de-DE" cap="none" dirty="0"/>
+              <a:t>-Images</a:t>
+            </a:r>
+            <a:endParaRPr lang="de-DE" dirty="0"/>
+          </a:p>
+        </p:txBody>
+      </p:sp>
+      <p:sp>
+        <p:nvSpPr>
+          <p:cNvPr id="3" name="Inhaltsplatzhalter 2">
+            <a:extLst>
+              <a:ext uri="{FF2B5EF4-FFF2-40B4-BE49-F238E27FC236}">
+                <a16:creationId xmlns:a16="http://schemas.microsoft.com/office/drawing/2014/main" id="{D4DA2B4E-C5FB-6595-34A6-E18A9AA0157D}"/>
+              </a:ext>
+            </a:extLst>
+          </p:cNvPr>
+          <p:cNvSpPr>
+            <a:spLocks noGrp="1"/>
+          </p:cNvSpPr>
+          <p:nvPr>
+            <p:ph idx="1"/>
+          </p:nvPr>
+        </p:nvSpPr>
+        <p:spPr/>
+        <p:txBody>
+          <a:bodyPr/>
+          <a:lstStyle/>
+          <a:p>
+            <a:pPr marL="0" indent="0">
+              <a:buNone/>
+            </a:pPr>
+            <a:r>
+              <a:rPr lang="de-DE" b="1" dirty="0"/>
+              <a:t>Was ist Tagging?</a:t>
+            </a:r>
+          </a:p>
+          <a:p>
+            <a:pPr>
+              <a:buFont typeface="Arial" panose="020B0604020202020204" pitchFamily="34" charset="0"/>
+              <a:buChar char="•"/>
+            </a:pPr>
+            <a:r>
+              <a:rPr lang="de-DE" dirty="0"/>
+              <a:t>Jedes Docker Image hat eine </a:t>
+            </a:r>
+            <a:r>
+              <a:rPr lang="de-DE" dirty="0" err="1"/>
+              <a:t>unique</a:t>
+            </a:r>
+            <a:r>
+              <a:rPr lang="de-DE" dirty="0"/>
+              <a:t> ID</a:t>
+            </a:r>
+          </a:p>
+          <a:p>
+            <a:pPr lvl="1">
+              <a:buFont typeface="Arial" panose="020B0604020202020204" pitchFamily="34" charset="0"/>
+              <a:buChar char="•"/>
+            </a:pPr>
+            <a:r>
+              <a:rPr lang="de-DE" dirty="0"/>
+              <a:t>Mit IDs zu arbeiten kann umständlich sein</a:t>
+            </a:r>
+          </a:p>
+          <a:p>
+            <a:pPr>
+              <a:buFont typeface="Arial" panose="020B0604020202020204" pitchFamily="34" charset="0"/>
+              <a:buChar char="•"/>
+            </a:pPr>
+            <a:r>
+              <a:rPr lang="de-DE" dirty="0"/>
+              <a:t>Lesbare Alternative… Image Tagging!</a:t>
+            </a:r>
+          </a:p>
+          <a:p>
+            <a:pPr>
+              <a:buFont typeface="Arial" panose="020B0604020202020204" pitchFamily="34" charset="0"/>
+              <a:buChar char="•"/>
+            </a:pPr>
+            <a:r>
+              <a:rPr lang="de-DE" dirty="0"/>
+              <a:t>Tagging vergleichbar mit </a:t>
+            </a:r>
+            <a:r>
+              <a:rPr lang="de-DE" dirty="0" err="1"/>
+              <a:t>Labeling</a:t>
+            </a:r>
+            <a:r>
+              <a:rPr lang="de-DE" dirty="0"/>
+              <a:t> (Beschriftung)</a:t>
+            </a:r>
+            <a:endParaRPr lang="de-DE" b="1" dirty="0"/>
+          </a:p>
+          <a:p>
+            <a:pPr>
+              <a:buFont typeface="Arial" panose="020B0604020202020204" pitchFamily="34" charset="0"/>
+              <a:buChar char="•"/>
+            </a:pPr>
+            <a:r>
+              <a:rPr lang="de-DE" dirty="0"/>
+              <a:t>Tags erlauben aussagekräftige Namen</a:t>
+            </a:r>
+          </a:p>
+          <a:p>
+            <a:pPr lvl="1">
+              <a:buFont typeface="Arial" panose="020B0604020202020204" pitchFamily="34" charset="0"/>
+              <a:buChar char="•"/>
+            </a:pPr>
+            <a:r>
+              <a:rPr lang="de-DE" dirty="0"/>
+              <a:t>Leichter zu identifizieren</a:t>
+            </a:r>
+          </a:p>
+          <a:p>
+            <a:pPr lvl="1">
+              <a:buFont typeface="Arial" panose="020B0604020202020204" pitchFamily="34" charset="0"/>
+              <a:buChar char="•"/>
+            </a:pPr>
+            <a:r>
+              <a:rPr lang="de-DE" dirty="0"/>
+              <a:t>Einfacher zu benutzen</a:t>
+            </a:r>
+          </a:p>
+        </p:txBody>
+      </p:sp>
+    </p:spTree>
+    <p:extLst>
+      <p:ext uri="{BB962C8B-B14F-4D97-AF65-F5344CB8AC3E}">
+        <p14:creationId xmlns:p14="http://schemas.microsoft.com/office/powerpoint/2010/main" val="3049989104"/>
+      </p:ext>
+    </p:extLst>
+  </p:cSld>
+  <p:clrMapOvr>
+    <a:masterClrMapping/>
+  </p:clrMapOvr>
+</p:sld>
+</file>
+
+<file path=ppt/slides/slide8.xml><?xml version="1.0" encoding="utf-8"?>
+<p:sld xmlns:a="http://schemas.openxmlformats.org/drawingml/2006/main" xmlns:r="http://schemas.openxmlformats.org/officeDocument/2006/relationships" xmlns:p="http://schemas.openxmlformats.org/presentationml/2006/main">
+  <p:cSld>
+    <p:spTree>
+      <p:nvGrpSpPr>
+        <p:cNvPr id="1" name=""/>
+        <p:cNvGrpSpPr/>
+        <p:nvPr/>
+      </p:nvGrpSpPr>
+      <p:grpSpPr>
+        <a:xfrm>
+          <a:off x="0" y="0"/>
+          <a:ext cx="0" cy="0"/>
+          <a:chOff x="0" y="0"/>
+          <a:chExt cx="0" cy="0"/>
+        </a:xfrm>
+      </p:grpSpPr>
+      <p:sp>
+        <p:nvSpPr>
+          <p:cNvPr id="2" name="Titel 1">
+            <a:extLst>
+              <a:ext uri="{FF2B5EF4-FFF2-40B4-BE49-F238E27FC236}">
+                <a16:creationId xmlns:a16="http://schemas.microsoft.com/office/drawing/2014/main" id="{5874EA8E-7A71-3505-B01E-D0E8A26AAC59}"/>
+              </a:ext>
+            </a:extLst>
+          </p:cNvPr>
+          <p:cNvSpPr>
+            <a:spLocks noGrp="1"/>
+          </p:cNvSpPr>
+          <p:nvPr>
+            <p:ph type="title"/>
+          </p:nvPr>
+        </p:nvSpPr>
+        <p:spPr/>
+        <p:txBody>
+          <a:bodyPr/>
+          <a:lstStyle/>
+          <a:p>
+            <a:r>
+              <a:rPr lang="de-DE" cap="none" dirty="0"/>
+              <a:t>Release- und </a:t>
+            </a:r>
+            <a:r>
+              <a:rPr lang="de-DE" cap="none" dirty="0" err="1"/>
+              <a:t>Tagged</a:t>
+            </a:r>
+            <a:r>
+              <a:rPr lang="de-DE" cap="none" dirty="0"/>
+              <a:t>-Images</a:t>
+            </a:r>
+            <a:endParaRPr lang="de-DE" dirty="0"/>
+          </a:p>
+        </p:txBody>
+      </p:sp>
+      <p:sp>
+        <p:nvSpPr>
+          <p:cNvPr id="3" name="Inhaltsplatzhalter 2">
+            <a:extLst>
+              <a:ext uri="{FF2B5EF4-FFF2-40B4-BE49-F238E27FC236}">
+                <a16:creationId xmlns:a16="http://schemas.microsoft.com/office/drawing/2014/main" id="{D4DA2B4E-C5FB-6595-34A6-E18A9AA0157D}"/>
+              </a:ext>
+            </a:extLst>
+          </p:cNvPr>
+          <p:cNvSpPr>
+            <a:spLocks noGrp="1"/>
+          </p:cNvSpPr>
+          <p:nvPr>
+            <p:ph idx="1"/>
+          </p:nvPr>
+        </p:nvSpPr>
+        <p:spPr/>
+        <p:txBody>
+          <a:bodyPr/>
+          <a:lstStyle/>
+          <a:p>
+            <a:pPr marL="0" indent="0">
+              <a:buNone/>
+            </a:pPr>
+            <a:r>
+              <a:rPr lang="de-DE" b="1" dirty="0"/>
+              <a:t>Warum Tagging?</a:t>
+            </a:r>
+          </a:p>
+          <a:p>
+            <a:pPr>
+              <a:buFont typeface="Arial" panose="020B0604020202020204" pitchFamily="34" charset="0"/>
+              <a:buChar char="•"/>
+            </a:pPr>
+            <a:r>
+              <a:rPr lang="de-DE" dirty="0"/>
+              <a:t>Lesbarkeit</a:t>
+            </a:r>
+          </a:p>
+          <a:p>
+            <a:pPr lvl="1">
+              <a:buFont typeface="Arial" panose="020B0604020202020204" pitchFamily="34" charset="0"/>
+              <a:buChar char="•"/>
+            </a:pPr>
+            <a:r>
+              <a:rPr lang="de-DE" dirty="0"/>
+              <a:t>Im Vergleich zu IDs besser lesbar und benutzerfreundlicher</a:t>
+            </a:r>
+          </a:p>
+          <a:p>
+            <a:pPr>
+              <a:buFont typeface="Arial" panose="020B0604020202020204" pitchFamily="34" charset="0"/>
+              <a:buChar char="•"/>
+            </a:pPr>
+            <a:r>
+              <a:rPr lang="de-DE" dirty="0"/>
+              <a:t>Versionskontrolle</a:t>
+            </a:r>
+          </a:p>
+          <a:p>
+            <a:pPr lvl="1">
+              <a:buFont typeface="Arial" panose="020B0604020202020204" pitchFamily="34" charset="0"/>
+              <a:buChar char="•"/>
+            </a:pPr>
+            <a:r>
+              <a:rPr lang="de-DE" dirty="0"/>
+              <a:t>Helfen beim </a:t>
+            </a:r>
+            <a:r>
+              <a:rPr lang="de-DE" dirty="0" err="1"/>
+              <a:t>Maintaining</a:t>
+            </a:r>
+            <a:r>
+              <a:rPr lang="de-DE" dirty="0"/>
+              <a:t> von verschiedenen Versionen des Images</a:t>
+            </a:r>
+          </a:p>
+          <a:p>
+            <a:pPr>
+              <a:buFont typeface="Arial" panose="020B0604020202020204" pitchFamily="34" charset="0"/>
+              <a:buChar char="•"/>
+            </a:pPr>
+            <a:r>
+              <a:rPr lang="de-DE" dirty="0"/>
+              <a:t>Convenience</a:t>
+            </a:r>
+          </a:p>
+          <a:p>
+            <a:pPr lvl="1">
+              <a:buFont typeface="Arial" panose="020B0604020202020204" pitchFamily="34" charset="0"/>
+              <a:buChar char="•"/>
+            </a:pPr>
+            <a:r>
+              <a:rPr lang="de-DE" dirty="0"/>
+              <a:t>In Befehlen und Skripten leichter zu verwenden</a:t>
+            </a:r>
+          </a:p>
+        </p:txBody>
+      </p:sp>
+    </p:spTree>
+    <p:extLst>
+      <p:ext uri="{BB962C8B-B14F-4D97-AF65-F5344CB8AC3E}">
+        <p14:creationId xmlns:p14="http://schemas.microsoft.com/office/powerpoint/2010/main" val="2151935054"/>
+      </p:ext>
+    </p:extLst>
+  </p:cSld>
+  <p:clrMapOvr>
+    <a:masterClrMapping/>
+  </p:clrMapOvr>
+</p:sld>
+</file>
+
+<file path=ppt/slides/slide9.xml><?xml version="1.0" encoding="utf-8"?>
+<p:sld xmlns:a="http://schemas.openxmlformats.org/drawingml/2006/main" xmlns:r="http://schemas.openxmlformats.org/officeDocument/2006/relationships" xmlns:p="http://schemas.openxmlformats.org/presentationml/2006/main">
+  <p:cSld>
+    <p:spTree>
+      <p:nvGrpSpPr>
+        <p:cNvPr id="1" name=""/>
+        <p:cNvGrpSpPr/>
+        <p:nvPr/>
+      </p:nvGrpSpPr>
+      <p:grpSpPr>
+        <a:xfrm>
+          <a:off x="0" y="0"/>
+          <a:ext cx="0" cy="0"/>
+          <a:chOff x="0" y="0"/>
+          <a:chExt cx="0" cy="0"/>
+        </a:xfrm>
+      </p:grpSpPr>
+      <p:sp>
+        <p:nvSpPr>
+          <p:cNvPr id="2" name="Titel 1">
+            <a:extLst>
+              <a:ext uri="{FF2B5EF4-FFF2-40B4-BE49-F238E27FC236}">
+                <a16:creationId xmlns:a16="http://schemas.microsoft.com/office/drawing/2014/main" id="{5874EA8E-7A71-3505-B01E-D0E8A26AAC59}"/>
+              </a:ext>
+            </a:extLst>
+          </p:cNvPr>
+          <p:cNvSpPr>
+            <a:spLocks noGrp="1"/>
+          </p:cNvSpPr>
+          <p:nvPr>
+            <p:ph type="title"/>
+          </p:nvPr>
+        </p:nvSpPr>
+        <p:spPr/>
+        <p:txBody>
+          <a:bodyPr/>
+          <a:lstStyle/>
+          <a:p>
+            <a:r>
+              <a:rPr lang="de-DE" cap="none" dirty="0"/>
+              <a:t>Release- und </a:t>
+            </a:r>
+            <a:r>
+              <a:rPr lang="de-DE" cap="none" dirty="0" err="1"/>
+              <a:t>Tagged</a:t>
+            </a:r>
+            <a:r>
+              <a:rPr lang="de-DE" cap="none" dirty="0"/>
+              <a:t>-Images</a:t>
+            </a:r>
+            <a:endParaRPr lang="de-DE" dirty="0"/>
+          </a:p>
+        </p:txBody>
+      </p:sp>
+      <p:sp>
+        <p:nvSpPr>
+          <p:cNvPr id="3" name="Inhaltsplatzhalter 2">
+            <a:extLst>
+              <a:ext uri="{FF2B5EF4-FFF2-40B4-BE49-F238E27FC236}">
+                <a16:creationId xmlns:a16="http://schemas.microsoft.com/office/drawing/2014/main" id="{D4DA2B4E-C5FB-6595-34A6-E18A9AA0157D}"/>
+              </a:ext>
+            </a:extLst>
+          </p:cNvPr>
+          <p:cNvSpPr>
+            <a:spLocks noGrp="1"/>
+          </p:cNvSpPr>
+          <p:nvPr>
+            <p:ph idx="1"/>
+          </p:nvPr>
+        </p:nvSpPr>
+        <p:spPr/>
+        <p:txBody>
+          <a:bodyPr/>
+          <a:lstStyle/>
+          <a:p>
+            <a:pPr marL="0" indent="0">
+              <a:buNone/>
+            </a:pPr>
+            <a:r>
+              <a:rPr lang="de-DE" b="1" dirty="0"/>
+              <a:t>Tagging während des </a:t>
+            </a:r>
+            <a:r>
+              <a:rPr lang="de-DE" b="1" dirty="0" err="1"/>
+              <a:t>Builds</a:t>
+            </a:r>
+            <a:endParaRPr lang="de-DE" b="1" dirty="0"/>
+          </a:p>
+          <a:p>
+            <a:pPr>
+              <a:buFont typeface="Arial" panose="020B0604020202020204" pitchFamily="34" charset="0"/>
+              <a:buChar char="•"/>
+            </a:pPr>
+            <a:r>
+              <a:rPr lang="de-DE" dirty="0"/>
+              <a:t>Mit dem –t </a:t>
+            </a:r>
+            <a:r>
+              <a:rPr lang="de-DE" dirty="0" err="1"/>
+              <a:t>Flag</a:t>
+            </a:r>
+            <a:r>
+              <a:rPr lang="de-DE" dirty="0"/>
+              <a:t> während des </a:t>
+            </a:r>
+            <a:r>
+              <a:rPr lang="de-DE" dirty="0" err="1"/>
+              <a:t>Build</a:t>
+            </a:r>
+            <a:r>
+              <a:rPr lang="de-DE" dirty="0"/>
+              <a:t>-Prozesses</a:t>
+            </a:r>
+          </a:p>
+          <a:p>
+            <a:pPr>
+              <a:buFont typeface="Arial" panose="020B0604020202020204" pitchFamily="34" charset="0"/>
+              <a:buChar char="•"/>
+            </a:pPr>
+            <a:endParaRPr lang="de-DE" dirty="0"/>
+          </a:p>
+          <a:p>
+            <a:pPr marL="0" indent="0">
+              <a:buNone/>
+            </a:pPr>
+            <a:r>
+              <a:rPr lang="de-DE" dirty="0" err="1">
+                <a:latin typeface="Consolas" panose="020B0609020204030204" pitchFamily="49" charset="0"/>
+              </a:rPr>
+              <a:t>docker</a:t>
+            </a:r>
+            <a:r>
+              <a:rPr lang="de-DE" dirty="0">
+                <a:latin typeface="Consolas" panose="020B0609020204030204" pitchFamily="49" charset="0"/>
+              </a:rPr>
+              <a:t> </a:t>
+            </a:r>
+            <a:r>
+              <a:rPr lang="de-DE" dirty="0" err="1">
+                <a:latin typeface="Consolas" panose="020B0609020204030204" pitchFamily="49" charset="0"/>
+              </a:rPr>
+              <a:t>build</a:t>
+            </a:r>
+            <a:r>
+              <a:rPr lang="de-DE" dirty="0">
+                <a:latin typeface="Consolas" panose="020B0609020204030204" pitchFamily="49" charset="0"/>
+              </a:rPr>
+              <a:t> –t [</a:t>
+            </a:r>
+            <a:r>
+              <a:rPr lang="de-DE" dirty="0" err="1">
+                <a:latin typeface="Consolas" panose="020B0609020204030204" pitchFamily="49" charset="0"/>
+              </a:rPr>
+              <a:t>repository</a:t>
+            </a:r>
+            <a:r>
+              <a:rPr lang="de-DE" dirty="0">
+                <a:latin typeface="Consolas" panose="020B0609020204030204" pitchFamily="49" charset="0"/>
+              </a:rPr>
+              <a:t>]:[TAG] .</a:t>
+            </a:r>
+          </a:p>
+        </p:txBody>
+      </p:sp>
+    </p:spTree>
+    <p:extLst>
+      <p:ext uri="{BB962C8B-B14F-4D97-AF65-F5344CB8AC3E}">
+        <p14:creationId xmlns:p14="http://schemas.microsoft.com/office/powerpoint/2010/main" val="1486928609"/>
       </p:ext>
     </p:extLst>
   </p:cSld>

</xml_diff>

<commit_message>
Tag-3_3: Tagging Strategien für Images
</commit_message>
<xml_diff>
--- a/slides/Tag-3_3-Release-und-Tagged-Images.pptx
+++ b/slides/Tag-3_3-Release-und-Tagged-Images.pptx
@@ -6,10 +6,10 @@
     <p:sldMasterId id="2147483649" r:id="rId2"/>
   </p:sldMasterIdLst>
   <p:notesMasterIdLst>
-    <p:notesMasterId r:id="rId16"/>
+    <p:notesMasterId r:id="rId24"/>
   </p:notesMasterIdLst>
   <p:handoutMasterIdLst>
-    <p:handoutMasterId r:id="rId17"/>
+    <p:handoutMasterId r:id="rId25"/>
   </p:handoutMasterIdLst>
   <p:sldIdLst>
     <p:sldId id="288" r:id="rId3"/>
@@ -23,8 +23,16 @@
     <p:sldId id="594" r:id="rId11"/>
     <p:sldId id="595" r:id="rId12"/>
     <p:sldId id="596" r:id="rId13"/>
-    <p:sldId id="591" r:id="rId14"/>
-    <p:sldId id="588" r:id="rId15"/>
+    <p:sldId id="599" r:id="rId14"/>
+    <p:sldId id="600" r:id="rId15"/>
+    <p:sldId id="602" r:id="rId16"/>
+    <p:sldId id="603" r:id="rId17"/>
+    <p:sldId id="591" r:id="rId18"/>
+    <p:sldId id="601" r:id="rId19"/>
+    <p:sldId id="604" r:id="rId20"/>
+    <p:sldId id="605" r:id="rId21"/>
+    <p:sldId id="606" r:id="rId22"/>
+    <p:sldId id="588" r:id="rId23"/>
   </p:sldIdLst>
   <p:sldSz cx="9144000" cy="6858000" type="screen4x3"/>
   <p:notesSz cx="6784975" cy="9921875"/>
@@ -1061,7 +1069,10 @@
           <a:bodyPr/>
           <a:lstStyle/>
           <a:p>
-            <a:endParaRPr lang="de-DE" dirty="0"/>
+            <a:r>
+              <a:rPr lang="de-DE" dirty="0"/>
+              <a:t>https://semver.org/lang/de/</a:t>
+            </a:r>
           </a:p>
         </p:txBody>
       </p:sp>
@@ -1083,7 +1094,444 @@
             <a:fld id="{18182567-388C-4D33-8B7B-A651F195F118}" type="slidenum">
               <a:rPr lang="de-DE" altLang="de-DE" smtClean="0"/>
               <a:pPr/>
+              <a:t>12</a:t>
+            </a:fld>
+            <a:endParaRPr lang="de-DE" altLang="de-DE"/>
+          </a:p>
+        </p:txBody>
+      </p:sp>
+    </p:spTree>
+    <p:extLst>
+      <p:ext uri="{BB962C8B-B14F-4D97-AF65-F5344CB8AC3E}">
+        <p14:creationId xmlns:p14="http://schemas.microsoft.com/office/powerpoint/2010/main" val="3489991838"/>
+      </p:ext>
+    </p:extLst>
+  </p:cSld>
+  <p:clrMapOvr>
+    <a:masterClrMapping/>
+  </p:clrMapOvr>
+</p:notes>
+</file>
+
+<file path=ppt/notesSlides/notesSlide3.xml><?xml version="1.0" encoding="utf-8"?>
+<p:notes xmlns:a="http://schemas.openxmlformats.org/drawingml/2006/main" xmlns:r="http://schemas.openxmlformats.org/officeDocument/2006/relationships" xmlns:p="http://schemas.openxmlformats.org/presentationml/2006/main">
+  <p:cSld>
+    <p:spTree>
+      <p:nvGrpSpPr>
+        <p:cNvPr id="1" name=""/>
+        <p:cNvGrpSpPr/>
+        <p:nvPr/>
+      </p:nvGrpSpPr>
+      <p:grpSpPr>
+        <a:xfrm>
+          <a:off x="0" y="0"/>
+          <a:ext cx="0" cy="0"/>
+          <a:chOff x="0" y="0"/>
+          <a:chExt cx="0" cy="0"/>
+        </a:xfrm>
+      </p:grpSpPr>
+      <p:sp>
+        <p:nvSpPr>
+          <p:cNvPr id="2" name="Folienbildplatzhalter 1"/>
+          <p:cNvSpPr>
+            <a:spLocks noGrp="1" noRot="1" noChangeAspect="1"/>
+          </p:cNvSpPr>
+          <p:nvPr>
+            <p:ph type="sldImg"/>
+          </p:nvPr>
+        </p:nvSpPr>
+        <p:spPr/>
+      </p:sp>
+      <p:sp>
+        <p:nvSpPr>
+          <p:cNvPr id="3" name="Notizenplatzhalter 2"/>
+          <p:cNvSpPr>
+            <a:spLocks noGrp="1"/>
+          </p:cNvSpPr>
+          <p:nvPr>
+            <p:ph type="body" idx="1"/>
+          </p:nvPr>
+        </p:nvSpPr>
+        <p:spPr/>
+        <p:txBody>
+          <a:bodyPr/>
+          <a:lstStyle/>
+          <a:p>
+            <a:r>
+              <a:rPr lang="de-DE" dirty="0"/>
+              <a:t>https://semver.org/lang/de/</a:t>
+            </a:r>
+          </a:p>
+        </p:txBody>
+      </p:sp>
+      <p:sp>
+        <p:nvSpPr>
+          <p:cNvPr id="4" name="Foliennummernplatzhalter 3"/>
+          <p:cNvSpPr>
+            <a:spLocks noGrp="1"/>
+          </p:cNvSpPr>
+          <p:nvPr>
+            <p:ph type="sldNum" sz="quarter" idx="5"/>
+          </p:nvPr>
+        </p:nvSpPr>
+        <p:spPr/>
+        <p:txBody>
+          <a:bodyPr/>
+          <a:lstStyle/>
+          <a:p>
+            <a:fld id="{18182567-388C-4D33-8B7B-A651F195F118}" type="slidenum">
+              <a:rPr lang="de-DE" altLang="de-DE" smtClean="0"/>
+              <a:pPr/>
               <a:t>13</a:t>
+            </a:fld>
+            <a:endParaRPr lang="de-DE" altLang="de-DE"/>
+          </a:p>
+        </p:txBody>
+      </p:sp>
+    </p:spTree>
+    <p:extLst>
+      <p:ext uri="{BB962C8B-B14F-4D97-AF65-F5344CB8AC3E}">
+        <p14:creationId xmlns:p14="http://schemas.microsoft.com/office/powerpoint/2010/main" val="3085793975"/>
+      </p:ext>
+    </p:extLst>
+  </p:cSld>
+  <p:clrMapOvr>
+    <a:masterClrMapping/>
+  </p:clrMapOvr>
+</p:notes>
+</file>
+
+<file path=ppt/notesSlides/notesSlide4.xml><?xml version="1.0" encoding="utf-8"?>
+<p:notes xmlns:a="http://schemas.openxmlformats.org/drawingml/2006/main" xmlns:r="http://schemas.openxmlformats.org/officeDocument/2006/relationships" xmlns:p="http://schemas.openxmlformats.org/presentationml/2006/main">
+  <p:cSld>
+    <p:spTree>
+      <p:nvGrpSpPr>
+        <p:cNvPr id="1" name=""/>
+        <p:cNvGrpSpPr/>
+        <p:nvPr/>
+      </p:nvGrpSpPr>
+      <p:grpSpPr>
+        <a:xfrm>
+          <a:off x="0" y="0"/>
+          <a:ext cx="0" cy="0"/>
+          <a:chOff x="0" y="0"/>
+          <a:chExt cx="0" cy="0"/>
+        </a:xfrm>
+      </p:grpSpPr>
+      <p:sp>
+        <p:nvSpPr>
+          <p:cNvPr id="2" name="Folienbildplatzhalter 1"/>
+          <p:cNvSpPr>
+            <a:spLocks noGrp="1" noRot="1" noChangeAspect="1"/>
+          </p:cNvSpPr>
+          <p:nvPr>
+            <p:ph type="sldImg"/>
+          </p:nvPr>
+        </p:nvSpPr>
+        <p:spPr/>
+      </p:sp>
+      <p:sp>
+        <p:nvSpPr>
+          <p:cNvPr id="3" name="Notizenplatzhalter 2"/>
+          <p:cNvSpPr>
+            <a:spLocks noGrp="1"/>
+          </p:cNvSpPr>
+          <p:nvPr>
+            <p:ph type="body" idx="1"/>
+          </p:nvPr>
+        </p:nvSpPr>
+        <p:spPr/>
+        <p:txBody>
+          <a:bodyPr/>
+          <a:lstStyle/>
+          <a:p>
+            <a:r>
+              <a:rPr lang="de-DE" dirty="0"/>
+              <a:t>https://semver.org/lang/de/</a:t>
+            </a:r>
+          </a:p>
+        </p:txBody>
+      </p:sp>
+      <p:sp>
+        <p:nvSpPr>
+          <p:cNvPr id="4" name="Foliennummernplatzhalter 3"/>
+          <p:cNvSpPr>
+            <a:spLocks noGrp="1"/>
+          </p:cNvSpPr>
+          <p:nvPr>
+            <p:ph type="sldNum" sz="quarter" idx="5"/>
+          </p:nvPr>
+        </p:nvSpPr>
+        <p:spPr/>
+        <p:txBody>
+          <a:bodyPr/>
+          <a:lstStyle/>
+          <a:p>
+            <a:fld id="{18182567-388C-4D33-8B7B-A651F195F118}" type="slidenum">
+              <a:rPr lang="de-DE" altLang="de-DE" smtClean="0"/>
+              <a:pPr/>
+              <a:t>17</a:t>
+            </a:fld>
+            <a:endParaRPr lang="de-DE" altLang="de-DE"/>
+          </a:p>
+        </p:txBody>
+      </p:sp>
+    </p:spTree>
+    <p:extLst>
+      <p:ext uri="{BB962C8B-B14F-4D97-AF65-F5344CB8AC3E}">
+        <p14:creationId xmlns:p14="http://schemas.microsoft.com/office/powerpoint/2010/main" val="8064563"/>
+      </p:ext>
+    </p:extLst>
+  </p:cSld>
+  <p:clrMapOvr>
+    <a:masterClrMapping/>
+  </p:clrMapOvr>
+</p:notes>
+</file>
+
+<file path=ppt/notesSlides/notesSlide5.xml><?xml version="1.0" encoding="utf-8"?>
+<p:notes xmlns:a="http://schemas.openxmlformats.org/drawingml/2006/main" xmlns:r="http://schemas.openxmlformats.org/officeDocument/2006/relationships" xmlns:p="http://schemas.openxmlformats.org/presentationml/2006/main">
+  <p:cSld>
+    <p:spTree>
+      <p:nvGrpSpPr>
+        <p:cNvPr id="1" name=""/>
+        <p:cNvGrpSpPr/>
+        <p:nvPr/>
+      </p:nvGrpSpPr>
+      <p:grpSpPr>
+        <a:xfrm>
+          <a:off x="0" y="0"/>
+          <a:ext cx="0" cy="0"/>
+          <a:chOff x="0" y="0"/>
+          <a:chExt cx="0" cy="0"/>
+        </a:xfrm>
+      </p:grpSpPr>
+      <p:sp>
+        <p:nvSpPr>
+          <p:cNvPr id="2" name="Folienbildplatzhalter 1"/>
+          <p:cNvSpPr>
+            <a:spLocks noGrp="1" noRot="1" noChangeAspect="1"/>
+          </p:cNvSpPr>
+          <p:nvPr>
+            <p:ph type="sldImg"/>
+          </p:nvPr>
+        </p:nvSpPr>
+        <p:spPr/>
+      </p:sp>
+      <p:sp>
+        <p:nvSpPr>
+          <p:cNvPr id="3" name="Notizenplatzhalter 2"/>
+          <p:cNvSpPr>
+            <a:spLocks noGrp="1"/>
+          </p:cNvSpPr>
+          <p:nvPr>
+            <p:ph type="body" idx="1"/>
+          </p:nvPr>
+        </p:nvSpPr>
+        <p:spPr/>
+        <p:txBody>
+          <a:bodyPr/>
+          <a:lstStyle/>
+          <a:p>
+            <a:r>
+              <a:rPr lang="de-DE" dirty="0"/>
+              <a:t>https://semver.org/lang/de/</a:t>
+            </a:r>
+          </a:p>
+        </p:txBody>
+      </p:sp>
+      <p:sp>
+        <p:nvSpPr>
+          <p:cNvPr id="4" name="Foliennummernplatzhalter 3"/>
+          <p:cNvSpPr>
+            <a:spLocks noGrp="1"/>
+          </p:cNvSpPr>
+          <p:nvPr>
+            <p:ph type="sldNum" sz="quarter" idx="5"/>
+          </p:nvPr>
+        </p:nvSpPr>
+        <p:spPr/>
+        <p:txBody>
+          <a:bodyPr/>
+          <a:lstStyle/>
+          <a:p>
+            <a:fld id="{18182567-388C-4D33-8B7B-A651F195F118}" type="slidenum">
+              <a:rPr lang="de-DE" altLang="de-DE" smtClean="0"/>
+              <a:pPr/>
+              <a:t>18</a:t>
+            </a:fld>
+            <a:endParaRPr lang="de-DE" altLang="de-DE"/>
+          </a:p>
+        </p:txBody>
+      </p:sp>
+    </p:spTree>
+    <p:extLst>
+      <p:ext uri="{BB962C8B-B14F-4D97-AF65-F5344CB8AC3E}">
+        <p14:creationId xmlns:p14="http://schemas.microsoft.com/office/powerpoint/2010/main" val="3532218253"/>
+      </p:ext>
+    </p:extLst>
+  </p:cSld>
+  <p:clrMapOvr>
+    <a:masterClrMapping/>
+  </p:clrMapOvr>
+</p:notes>
+</file>
+
+<file path=ppt/notesSlides/notesSlide6.xml><?xml version="1.0" encoding="utf-8"?>
+<p:notes xmlns:a="http://schemas.openxmlformats.org/drawingml/2006/main" xmlns:r="http://schemas.openxmlformats.org/officeDocument/2006/relationships" xmlns:p="http://schemas.openxmlformats.org/presentationml/2006/main">
+  <p:cSld>
+    <p:spTree>
+      <p:nvGrpSpPr>
+        <p:cNvPr id="1" name=""/>
+        <p:cNvGrpSpPr/>
+        <p:nvPr/>
+      </p:nvGrpSpPr>
+      <p:grpSpPr>
+        <a:xfrm>
+          <a:off x="0" y="0"/>
+          <a:ext cx="0" cy="0"/>
+          <a:chOff x="0" y="0"/>
+          <a:chExt cx="0" cy="0"/>
+        </a:xfrm>
+      </p:grpSpPr>
+      <p:sp>
+        <p:nvSpPr>
+          <p:cNvPr id="2" name="Folienbildplatzhalter 1"/>
+          <p:cNvSpPr>
+            <a:spLocks noGrp="1" noRot="1" noChangeAspect="1"/>
+          </p:cNvSpPr>
+          <p:nvPr>
+            <p:ph type="sldImg"/>
+          </p:nvPr>
+        </p:nvSpPr>
+        <p:spPr/>
+      </p:sp>
+      <p:sp>
+        <p:nvSpPr>
+          <p:cNvPr id="3" name="Notizenplatzhalter 2"/>
+          <p:cNvSpPr>
+            <a:spLocks noGrp="1"/>
+          </p:cNvSpPr>
+          <p:nvPr>
+            <p:ph type="body" idx="1"/>
+          </p:nvPr>
+        </p:nvSpPr>
+        <p:spPr/>
+        <p:txBody>
+          <a:bodyPr/>
+          <a:lstStyle/>
+          <a:p>
+            <a:r>
+              <a:rPr lang="de-DE" dirty="0"/>
+              <a:t>https://semver.org/lang/de/</a:t>
+            </a:r>
+          </a:p>
+        </p:txBody>
+      </p:sp>
+      <p:sp>
+        <p:nvSpPr>
+          <p:cNvPr id="4" name="Foliennummernplatzhalter 3"/>
+          <p:cNvSpPr>
+            <a:spLocks noGrp="1"/>
+          </p:cNvSpPr>
+          <p:nvPr>
+            <p:ph type="sldNum" sz="quarter" idx="5"/>
+          </p:nvPr>
+        </p:nvSpPr>
+        <p:spPr/>
+        <p:txBody>
+          <a:bodyPr/>
+          <a:lstStyle/>
+          <a:p>
+            <a:fld id="{18182567-388C-4D33-8B7B-A651F195F118}" type="slidenum">
+              <a:rPr lang="de-DE" altLang="de-DE" smtClean="0"/>
+              <a:pPr/>
+              <a:t>19</a:t>
+            </a:fld>
+            <a:endParaRPr lang="de-DE" altLang="de-DE"/>
+          </a:p>
+        </p:txBody>
+      </p:sp>
+    </p:spTree>
+    <p:extLst>
+      <p:ext uri="{BB962C8B-B14F-4D97-AF65-F5344CB8AC3E}">
+        <p14:creationId xmlns:p14="http://schemas.microsoft.com/office/powerpoint/2010/main" val="624751404"/>
+      </p:ext>
+    </p:extLst>
+  </p:cSld>
+  <p:clrMapOvr>
+    <a:masterClrMapping/>
+  </p:clrMapOvr>
+</p:notes>
+</file>
+
+<file path=ppt/notesSlides/notesSlide7.xml><?xml version="1.0" encoding="utf-8"?>
+<p:notes xmlns:a="http://schemas.openxmlformats.org/drawingml/2006/main" xmlns:r="http://schemas.openxmlformats.org/officeDocument/2006/relationships" xmlns:p="http://schemas.openxmlformats.org/presentationml/2006/main">
+  <p:cSld>
+    <p:spTree>
+      <p:nvGrpSpPr>
+        <p:cNvPr id="1" name=""/>
+        <p:cNvGrpSpPr/>
+        <p:nvPr/>
+      </p:nvGrpSpPr>
+      <p:grpSpPr>
+        <a:xfrm>
+          <a:off x="0" y="0"/>
+          <a:ext cx="0" cy="0"/>
+          <a:chOff x="0" y="0"/>
+          <a:chExt cx="0" cy="0"/>
+        </a:xfrm>
+      </p:grpSpPr>
+      <p:sp>
+        <p:nvSpPr>
+          <p:cNvPr id="2" name="Folienbildplatzhalter 1"/>
+          <p:cNvSpPr>
+            <a:spLocks noGrp="1" noRot="1" noChangeAspect="1"/>
+          </p:cNvSpPr>
+          <p:nvPr>
+            <p:ph type="sldImg"/>
+          </p:nvPr>
+        </p:nvSpPr>
+        <p:spPr/>
+      </p:sp>
+      <p:sp>
+        <p:nvSpPr>
+          <p:cNvPr id="3" name="Notizenplatzhalter 2"/>
+          <p:cNvSpPr>
+            <a:spLocks noGrp="1"/>
+          </p:cNvSpPr>
+          <p:nvPr>
+            <p:ph type="body" idx="1"/>
+          </p:nvPr>
+        </p:nvSpPr>
+        <p:spPr/>
+        <p:txBody>
+          <a:bodyPr/>
+          <a:lstStyle/>
+          <a:p>
+            <a:endParaRPr lang="de-DE" dirty="0"/>
+          </a:p>
+        </p:txBody>
+      </p:sp>
+      <p:sp>
+        <p:nvSpPr>
+          <p:cNvPr id="4" name="Foliennummernplatzhalter 3"/>
+          <p:cNvSpPr>
+            <a:spLocks noGrp="1"/>
+          </p:cNvSpPr>
+          <p:nvPr>
+            <p:ph type="sldNum" sz="quarter" idx="5"/>
+          </p:nvPr>
+        </p:nvSpPr>
+        <p:spPr/>
+        <p:txBody>
+          <a:bodyPr/>
+          <a:lstStyle/>
+          <a:p>
+            <a:fld id="{18182567-388C-4D33-8B7B-A651F195F118}" type="slidenum">
+              <a:rPr lang="de-DE" altLang="de-DE" smtClean="0"/>
+              <a:pPr/>
+              <a:t>21</a:t>
             </a:fld>
             <a:endParaRPr lang="de-DE" altLang="de-DE"/>
           </a:p>
@@ -4162,7 +4610,7 @@
               <a:buChar char="•"/>
             </a:pPr>
             <a:r>
-              <a:rPr lang="de-DE">
+              <a:rPr lang="de-DE" dirty="0">
                 <a:sym typeface="Wingdings" panose="05000000000000000000" pitchFamily="2" charset="2"/>
               </a:rPr>
               <a:t> Strategien zum Image Tagging</a:t>
@@ -4302,8 +4750,37 @@
             </a:pPr>
             <a:r>
               <a:rPr lang="de-DE" dirty="0"/>
-              <a:t>Rolling tags</a:t>
-            </a:r>
+              <a:t>Rolling Tags</a:t>
+            </a:r>
+          </a:p>
+          <a:p>
+            <a:pPr lvl="1">
+              <a:buFont typeface="Arial" panose="020B0604020202020204" pitchFamily="34" charset="0"/>
+              <a:buChar char="•"/>
+            </a:pPr>
+            <a:r>
+              <a:rPr lang="de-DE" dirty="0" err="1"/>
+              <a:t>Git</a:t>
+            </a:r>
+            <a:r>
+              <a:rPr lang="de-DE" dirty="0"/>
+              <a:t> Tags</a:t>
+            </a:r>
+          </a:p>
+          <a:p>
+            <a:pPr lvl="1">
+              <a:buFont typeface="Arial" panose="020B0604020202020204" pitchFamily="34" charset="0"/>
+              <a:buChar char="•"/>
+            </a:pPr>
+            <a:r>
+              <a:rPr lang="de-DE" dirty="0"/>
+              <a:t>Branch </a:t>
+            </a:r>
+            <a:r>
+              <a:rPr lang="de-DE" dirty="0" err="1"/>
+              <a:t>Names</a:t>
+            </a:r>
+            <a:endParaRPr lang="de-DE" dirty="0"/>
           </a:p>
           <a:p>
             <a:pPr lvl="1">
@@ -4316,7 +4793,23 @@
             </a:r>
             <a:r>
               <a:rPr lang="de-DE" dirty="0"/>
-              <a:t> tags</a:t>
+              <a:t> Tags (</a:t>
+            </a:r>
+            <a:r>
+              <a:rPr lang="de-DE" dirty="0" err="1"/>
+              <a:t>Semantic</a:t>
+            </a:r>
+            <a:r>
+              <a:rPr lang="de-DE" dirty="0"/>
+              <a:t> </a:t>
+            </a:r>
+            <a:r>
+              <a:rPr lang="de-DE" dirty="0" err="1"/>
+              <a:t>Versioning</a:t>
+            </a:r>
+            <a:r>
+              <a:rPr lang="de-DE" dirty="0"/>
+              <a:t>)</a:t>
             </a:r>
           </a:p>
           <a:p>
@@ -4326,9 +4819,12 @@
             </a:pPr>
             <a:r>
               <a:rPr lang="de-DE" dirty="0" err="1"/>
-              <a:t>GitCommit</a:t>
-            </a:r>
-            <a:endParaRPr lang="de-DE" dirty="0"/>
+              <a:t>Git</a:t>
+            </a:r>
+            <a:r>
+              <a:rPr lang="de-DE" dirty="0"/>
+              <a:t> Commit Hash</a:t>
+            </a:r>
           </a:p>
           <a:p>
             <a:pPr lvl="1">
@@ -4339,7 +4835,18 @@
               <a:rPr lang="de-DE" dirty="0" err="1"/>
               <a:t>Timestamp</a:t>
             </a:r>
-            <a:endParaRPr lang="de-DE" dirty="0"/>
+            <a:r>
+              <a:rPr lang="de-DE" dirty="0"/>
+              <a:t> / Date-</a:t>
+            </a:r>
+            <a:r>
+              <a:rPr lang="de-DE" dirty="0" err="1"/>
+              <a:t>Based</a:t>
+            </a:r>
+            <a:r>
+              <a:rPr lang="de-DE" dirty="0"/>
+              <a:t> Tags</a:t>
+            </a:r>
           </a:p>
           <a:p>
             <a:pPr lvl="1">
@@ -4360,7 +4867,7 @@
     </p:spTree>
     <p:extLst>
       <p:ext uri="{BB962C8B-B14F-4D97-AF65-F5344CB8AC3E}">
-        <p14:creationId xmlns:p14="http://schemas.microsoft.com/office/powerpoint/2010/main" val="1996689965"/>
+        <p14:creationId xmlns:p14="http://schemas.microsoft.com/office/powerpoint/2010/main" val="1799660318"/>
       </p:ext>
     </p:extLst>
   </p:cSld>
@@ -4392,7 +4899,7 @@
           <p:cNvPr id="2" name="Titel 1">
             <a:extLst>
               <a:ext uri="{FF2B5EF4-FFF2-40B4-BE49-F238E27FC236}">
-                <a16:creationId xmlns:a16="http://schemas.microsoft.com/office/drawing/2014/main" id="{184AFD09-5210-6F86-C2FD-BBC016D382A6}"/>
+                <a16:creationId xmlns:a16="http://schemas.microsoft.com/office/drawing/2014/main" id="{5874EA8E-7A71-3505-B01E-D0E8A26AAC59}"/>
               </a:ext>
             </a:extLst>
           </p:cNvPr>
@@ -4426,10 +4933,10 @@
       </p:sp>
       <p:sp>
         <p:nvSpPr>
-          <p:cNvPr id="6" name="Inhaltsplatzhalter 5">
+          <p:cNvPr id="3" name="Inhaltsplatzhalter 2">
             <a:extLst>
               <a:ext uri="{FF2B5EF4-FFF2-40B4-BE49-F238E27FC236}">
-                <a16:creationId xmlns:a16="http://schemas.microsoft.com/office/drawing/2014/main" id="{D2412707-84D3-F572-4709-FD9A95F28E5B}"/>
+                <a16:creationId xmlns:a16="http://schemas.microsoft.com/office/drawing/2014/main" id="{D4DA2B4E-C5FB-6595-34A6-E18A9AA0157D}"/>
               </a:ext>
             </a:extLst>
           </p:cNvPr>
@@ -4450,13 +4957,8 @@
             </a:pPr>
             <a:r>
               <a:rPr lang="de-DE" b="1" dirty="0"/>
-              <a:t>Verwendung mit </a:t>
-            </a:r>
-            <a:r>
-              <a:rPr lang="de-DE" b="1" dirty="0" err="1"/>
-              <a:t>GitLab</a:t>
-            </a:r>
-            <a:endParaRPr lang="de-DE" b="1" dirty="0"/>
+              <a:t>Rolling tags</a:t>
+            </a:r>
           </a:p>
           <a:p>
             <a:pPr>
@@ -4465,8 +4967,51 @@
             </a:pPr>
             <a:r>
               <a:rPr lang="de-DE" dirty="0"/>
-              <a:t>Authentifizierung mit der Container Registry</a:t>
-            </a:r>
+              <a:t>Zwei weit verbreitete</a:t>
+            </a:r>
+            <a:r>
+              <a:rPr lang="de-DE" dirty="0">
+                <a:sym typeface="Wingdings" panose="05000000000000000000" pitchFamily="2" charset="2"/>
+              </a:rPr>
+              <a:t></a:t>
+            </a:r>
+            <a:r>
+              <a:rPr lang="de-DE" dirty="0">
+                <a:latin typeface="Consolas" panose="020B0609020204030204" pitchFamily="49" charset="0"/>
+              </a:rPr>
+              <a:t>:</a:t>
+            </a:r>
+            <a:r>
+              <a:rPr lang="de-DE" dirty="0" err="1">
+                <a:latin typeface="Consolas" panose="020B0609020204030204" pitchFamily="49" charset="0"/>
+              </a:rPr>
+              <a:t>latest</a:t>
+            </a:r>
+            <a:r>
+              <a:rPr lang="de-DE" dirty="0">
+                <a:latin typeface="Consolas" panose="020B0609020204030204" pitchFamily="49" charset="0"/>
+              </a:rPr>
+              <a:t> </a:t>
+            </a:r>
+            <a:r>
+              <a:rPr lang="de-DE" dirty="0"/>
+              <a:t>und </a:t>
+            </a:r>
+            <a:r>
+              <a:rPr lang="de-DE" dirty="0">
+                <a:latin typeface="Consolas" panose="020B0609020204030204" pitchFamily="49" charset="0"/>
+              </a:rPr>
+              <a:t>:</a:t>
+            </a:r>
+            <a:r>
+              <a:rPr lang="de-DE" dirty="0" err="1">
+                <a:latin typeface="Consolas" panose="020B0609020204030204" pitchFamily="49" charset="0"/>
+              </a:rPr>
+              <a:t>stable</a:t>
+            </a:r>
+            <a:endParaRPr lang="de-DE" dirty="0">
+              <a:latin typeface="Consolas" panose="020B0609020204030204" pitchFamily="49" charset="0"/>
+            </a:endParaRPr>
           </a:p>
           <a:p>
             <a:pPr>
@@ -4474,12 +5019,16 @@
               <a:buChar char="•"/>
             </a:pPr>
             <a:r>
+              <a:rPr lang="de-DE" dirty="0"/>
+              <a:t>Relevanteste und neuste </a:t>
+            </a:r>
+            <a:r>
               <a:rPr lang="de-DE" dirty="0" err="1"/>
-              <a:t>GitLab</a:t>
-            </a:r>
-            <a:r>
-              <a:rPr lang="de-DE" dirty="0"/>
-              <a:t> CI/CD zum authentifizieren</a:t>
+              <a:t>Build</a:t>
+            </a:r>
+            <a:r>
+              <a:rPr lang="de-DE" dirty="0"/>
+              <a:t>-Tag</a:t>
             </a:r>
           </a:p>
           <a:p>
@@ -4489,7 +5038,7 @@
             </a:pPr>
             <a:r>
               <a:rPr lang="de-DE" dirty="0"/>
-              <a:t>Images bauen und pushen</a:t>
+              <a:t>Vorsicht: Inkompatibles Image!</a:t>
             </a:r>
           </a:p>
           <a:p>
@@ -4499,7 +5048,15 @@
             </a:pPr>
             <a:r>
               <a:rPr lang="de-DE" dirty="0"/>
-              <a:t>Docker</a:t>
+              <a:t>Für Test-Stage OK, </a:t>
+            </a:r>
+            <a:r>
+              <a:rPr lang="de-DE" dirty="0" err="1"/>
+              <a:t>Production</a:t>
+            </a:r>
+            <a:r>
+              <a:rPr lang="de-DE" dirty="0"/>
+              <a:t> No-Go</a:t>
             </a:r>
           </a:p>
           <a:p>
@@ -4509,39 +5066,19 @@
             </a:pPr>
             <a:r>
               <a:rPr lang="de-DE" dirty="0" err="1"/>
-              <a:t>GitLab</a:t>
-            </a:r>
-            <a:r>
-              <a:rPr lang="de-DE" dirty="0"/>
-              <a:t> CI/CD</a:t>
-            </a:r>
-          </a:p>
-          <a:p>
-            <a:pPr lvl="2">
-              <a:buFont typeface="Arial" panose="020B0604020202020204" pitchFamily="34" charset="0"/>
-              <a:buChar char="•"/>
-            </a:pPr>
-            <a:r>
-              <a:rPr lang="de-DE" sz="1800" dirty="0"/>
-              <a:t>Docker-in-Docker Container Image (Container Registry)</a:t>
-            </a:r>
-          </a:p>
-          <a:p>
-            <a:pPr lvl="2">
-              <a:buFont typeface="Arial" panose="020B0604020202020204" pitchFamily="34" charset="0"/>
-              <a:buChar char="•"/>
-            </a:pPr>
-            <a:r>
-              <a:rPr lang="de-DE" sz="1800" dirty="0"/>
-              <a:t>Docker-in-Docker Container Image (</a:t>
-            </a:r>
-            <a:r>
-              <a:rPr lang="de-DE" sz="1800" dirty="0" err="1"/>
-              <a:t>Dependency</a:t>
-            </a:r>
-            <a:r>
-              <a:rPr lang="de-DE" sz="1800" dirty="0"/>
-              <a:t> Proxy)</a:t>
+              <a:t>Production</a:t>
+            </a:r>
+            <a:r>
+              <a:rPr lang="de-DE" dirty="0"/>
+              <a:t> besser: </a:t>
+            </a:r>
+            <a:r>
+              <a:rPr lang="de-DE" dirty="0" err="1"/>
+              <a:t>unique</a:t>
+            </a:r>
+            <a:r>
+              <a:rPr lang="de-DE" dirty="0"/>
+              <a:t> Tags</a:t>
             </a:r>
           </a:p>
           <a:p>
@@ -4551,33 +5088,54 @@
             </a:pPr>
             <a:r>
               <a:rPr lang="de-DE" dirty="0"/>
-              <a:t>Container Registry Beispiele mit </a:t>
+              <a:t>Schwierig zu einer früheren Version zurückzukehren</a:t>
+            </a:r>
+          </a:p>
+          <a:p>
+            <a:pPr>
+              <a:buFont typeface="Arial" panose="020B0604020202020204" pitchFamily="34" charset="0"/>
+              <a:buChar char="•"/>
+            </a:pPr>
+            <a:r>
+              <a:rPr lang="de-DE" dirty="0"/>
+              <a:t>Herausforderung</a:t>
+            </a:r>
+          </a:p>
+          <a:p>
+            <a:pPr lvl="1">
+              <a:buFont typeface="Arial" panose="020B0604020202020204" pitchFamily="34" charset="0"/>
+              <a:buChar char="•"/>
+            </a:pPr>
+            <a:r>
+              <a:rPr lang="de-DE" dirty="0"/>
+              <a:t>Image IDs (</a:t>
             </a:r>
             <a:r>
               <a:rPr lang="de-DE" dirty="0" err="1"/>
-              <a:t>GitLab</a:t>
-            </a:r>
-            <a:r>
-              <a:rPr lang="de-DE" dirty="0"/>
-              <a:t> CI/CD</a:t>
-            </a:r>
-          </a:p>
-          <a:p>
-            <a:pPr lvl="2">
-              <a:buFont typeface="Arial" panose="020B0604020202020204" pitchFamily="34" charset="0"/>
-              <a:buChar char="•"/>
-            </a:pPr>
+              <a:t>digest</a:t>
+            </a:r>
+            <a:r>
+              <a:rPr lang="de-DE" dirty="0"/>
+              <a:t>): not human-</a:t>
+            </a:r>
+            <a:r>
+              <a:rPr lang="de-DE" dirty="0" err="1"/>
+              <a:t>readable</a:t>
+            </a:r>
             <a:endParaRPr lang="de-DE" dirty="0"/>
           </a:p>
           <a:p>
-            <a:pPr lvl="2">
-              <a:buFont typeface="Arial" panose="020B0604020202020204" pitchFamily="34" charset="0"/>
-              <a:buChar char="•"/>
-            </a:pPr>
-            <a:endParaRPr lang="de-DE" dirty="0"/>
-          </a:p>
-          <a:p>
             <a:pPr lvl="1">
+              <a:buFont typeface="Arial" panose="020B0604020202020204" pitchFamily="34" charset="0"/>
+              <a:buChar char="•"/>
+            </a:pPr>
+            <a:r>
+              <a:rPr lang="de-DE" dirty="0"/>
+              <a:t>Image tags: mutable</a:t>
+            </a:r>
+          </a:p>
+          <a:p>
+            <a:pPr>
               <a:buFont typeface="Arial" panose="020B0604020202020204" pitchFamily="34" charset="0"/>
               <a:buChar char="•"/>
             </a:pPr>
@@ -4588,7 +5146,1284 @@
     </p:spTree>
     <p:extLst>
       <p:ext uri="{BB962C8B-B14F-4D97-AF65-F5344CB8AC3E}">
-        <p14:creationId xmlns:p14="http://schemas.microsoft.com/office/powerpoint/2010/main" val="1944366019"/>
+        <p14:creationId xmlns:p14="http://schemas.microsoft.com/office/powerpoint/2010/main" val="3526740333"/>
+      </p:ext>
+    </p:extLst>
+  </p:cSld>
+  <p:clrMapOvr>
+    <a:masterClrMapping/>
+  </p:clrMapOvr>
+</p:sld>
+</file>
+
+<file path=ppt/slides/slide14.xml><?xml version="1.0" encoding="utf-8"?>
+<p:sld xmlns:a="http://schemas.openxmlformats.org/drawingml/2006/main" xmlns:r="http://schemas.openxmlformats.org/officeDocument/2006/relationships" xmlns:p="http://schemas.openxmlformats.org/presentationml/2006/main">
+  <p:cSld>
+    <p:spTree>
+      <p:nvGrpSpPr>
+        <p:cNvPr id="1" name=""/>
+        <p:cNvGrpSpPr/>
+        <p:nvPr/>
+      </p:nvGrpSpPr>
+      <p:grpSpPr>
+        <a:xfrm>
+          <a:off x="0" y="0"/>
+          <a:ext cx="0" cy="0"/>
+          <a:chOff x="0" y="0"/>
+          <a:chExt cx="0" cy="0"/>
+        </a:xfrm>
+      </p:grpSpPr>
+      <p:sp>
+        <p:nvSpPr>
+          <p:cNvPr id="2" name="Titel 1">
+            <a:extLst>
+              <a:ext uri="{FF2B5EF4-FFF2-40B4-BE49-F238E27FC236}">
+                <a16:creationId xmlns:a16="http://schemas.microsoft.com/office/drawing/2014/main" id="{830D42F4-3DE1-E484-4E37-7A350B7E9347}"/>
+              </a:ext>
+            </a:extLst>
+          </p:cNvPr>
+          <p:cNvSpPr>
+            <a:spLocks noGrp="1"/>
+          </p:cNvSpPr>
+          <p:nvPr>
+            <p:ph type="title"/>
+          </p:nvPr>
+        </p:nvSpPr>
+        <p:spPr/>
+        <p:txBody>
+          <a:bodyPr/>
+          <a:lstStyle/>
+          <a:p>
+            <a:r>
+              <a:rPr lang="de-DE" cap="none" dirty="0"/>
+              <a:t>Release- und </a:t>
+            </a:r>
+            <a:r>
+              <a:rPr lang="de-DE" cap="none" dirty="0" err="1"/>
+              <a:t>Tagged</a:t>
+            </a:r>
+            <a:r>
+              <a:rPr lang="de-DE" cap="none" dirty="0"/>
+              <a:t>-Images</a:t>
+            </a:r>
+            <a:endParaRPr lang="de-DE" dirty="0"/>
+          </a:p>
+        </p:txBody>
+      </p:sp>
+      <p:sp>
+        <p:nvSpPr>
+          <p:cNvPr id="3" name="Inhaltsplatzhalter 2">
+            <a:extLst>
+              <a:ext uri="{FF2B5EF4-FFF2-40B4-BE49-F238E27FC236}">
+                <a16:creationId xmlns:a16="http://schemas.microsoft.com/office/drawing/2014/main" id="{3AD45E9F-BF6F-3159-A6E8-E786B8D66377}"/>
+              </a:ext>
+            </a:extLst>
+          </p:cNvPr>
+          <p:cNvSpPr>
+            <a:spLocks noGrp="1"/>
+          </p:cNvSpPr>
+          <p:nvPr>
+            <p:ph idx="1"/>
+          </p:nvPr>
+        </p:nvSpPr>
+        <p:spPr/>
+        <p:txBody>
+          <a:bodyPr/>
+          <a:lstStyle/>
+          <a:p>
+            <a:pPr marL="0" indent="0">
+              <a:buNone/>
+            </a:pPr>
+            <a:r>
+              <a:rPr lang="de-DE" b="1" dirty="0" err="1"/>
+              <a:t>Git</a:t>
+            </a:r>
+            <a:r>
+              <a:rPr lang="de-DE" b="1" dirty="0"/>
+              <a:t> Tags</a:t>
+            </a:r>
+          </a:p>
+          <a:p>
+            <a:pPr>
+              <a:buFont typeface="Arial" panose="020B0604020202020204" pitchFamily="34" charset="0"/>
+              <a:buChar char="•"/>
+            </a:pPr>
+            <a:r>
+              <a:rPr lang="de-DE" dirty="0"/>
+              <a:t>Nützlich, wenn man bereits </a:t>
+            </a:r>
+            <a:r>
+              <a:rPr lang="de-DE" dirty="0" err="1"/>
+              <a:t>Git</a:t>
+            </a:r>
+            <a:r>
+              <a:rPr lang="de-DE" dirty="0"/>
+              <a:t> Tags für Releases nutzt</a:t>
+            </a:r>
+          </a:p>
+          <a:p>
+            <a:pPr>
+              <a:buFont typeface="Arial" panose="020B0604020202020204" pitchFamily="34" charset="0"/>
+              <a:buChar char="•"/>
+            </a:pPr>
+            <a:r>
+              <a:rPr lang="de-DE" dirty="0"/>
+              <a:t>Diese Tags können direkt als Docker Image Tags genutzt werden</a:t>
+            </a:r>
+          </a:p>
+          <a:p>
+            <a:pPr>
+              <a:buFont typeface="Arial" panose="020B0604020202020204" pitchFamily="34" charset="0"/>
+              <a:buChar char="•"/>
+            </a:pPr>
+            <a:r>
+              <a:rPr lang="de-DE" dirty="0" err="1"/>
+              <a:t>Git</a:t>
+            </a:r>
+            <a:r>
+              <a:rPr lang="de-DE" dirty="0"/>
+              <a:t> Tag „v2.5.1“</a:t>
+            </a:r>
+          </a:p>
+          <a:p>
+            <a:pPr lvl="1">
+              <a:buFont typeface="Arial" panose="020B0604020202020204" pitchFamily="34" charset="0"/>
+              <a:buChar char="•"/>
+            </a:pPr>
+            <a:r>
+              <a:rPr lang="de-DE" dirty="0">
+                <a:sym typeface="Wingdings" panose="05000000000000000000" pitchFamily="2" charset="2"/>
+              </a:rPr>
+              <a:t> Gleichen Tag als Docker Image Tag verwenden</a:t>
+            </a:r>
+            <a:endParaRPr lang="de-DE" dirty="0"/>
+          </a:p>
+        </p:txBody>
+      </p:sp>
+    </p:spTree>
+    <p:extLst>
+      <p:ext uri="{BB962C8B-B14F-4D97-AF65-F5344CB8AC3E}">
+        <p14:creationId xmlns:p14="http://schemas.microsoft.com/office/powerpoint/2010/main" val="1652775311"/>
+      </p:ext>
+    </p:extLst>
+  </p:cSld>
+  <p:clrMapOvr>
+    <a:masterClrMapping/>
+  </p:clrMapOvr>
+</p:sld>
+</file>
+
+<file path=ppt/slides/slide15.xml><?xml version="1.0" encoding="utf-8"?>
+<p:sld xmlns:a="http://schemas.openxmlformats.org/drawingml/2006/main" xmlns:r="http://schemas.openxmlformats.org/officeDocument/2006/relationships" xmlns:p="http://schemas.openxmlformats.org/presentationml/2006/main">
+  <p:cSld>
+    <p:spTree>
+      <p:nvGrpSpPr>
+        <p:cNvPr id="1" name=""/>
+        <p:cNvGrpSpPr/>
+        <p:nvPr/>
+      </p:nvGrpSpPr>
+      <p:grpSpPr>
+        <a:xfrm>
+          <a:off x="0" y="0"/>
+          <a:ext cx="0" cy="0"/>
+          <a:chOff x="0" y="0"/>
+          <a:chExt cx="0" cy="0"/>
+        </a:xfrm>
+      </p:grpSpPr>
+      <p:sp>
+        <p:nvSpPr>
+          <p:cNvPr id="2" name="Titel 1">
+            <a:extLst>
+              <a:ext uri="{FF2B5EF4-FFF2-40B4-BE49-F238E27FC236}">
+                <a16:creationId xmlns:a16="http://schemas.microsoft.com/office/drawing/2014/main" id="{2C9E82B3-AD82-0F0E-4966-26D367100225}"/>
+              </a:ext>
+            </a:extLst>
+          </p:cNvPr>
+          <p:cNvSpPr>
+            <a:spLocks noGrp="1"/>
+          </p:cNvSpPr>
+          <p:nvPr>
+            <p:ph type="title"/>
+          </p:nvPr>
+        </p:nvSpPr>
+        <p:spPr/>
+        <p:txBody>
+          <a:bodyPr/>
+          <a:lstStyle/>
+          <a:p>
+            <a:r>
+              <a:rPr lang="de-DE" cap="none" dirty="0"/>
+              <a:t>Release- und </a:t>
+            </a:r>
+            <a:r>
+              <a:rPr lang="de-DE" cap="none" dirty="0" err="1"/>
+              <a:t>Tagged</a:t>
+            </a:r>
+            <a:r>
+              <a:rPr lang="de-DE" cap="none" dirty="0"/>
+              <a:t>-Images</a:t>
+            </a:r>
+            <a:endParaRPr lang="de-DE" dirty="0"/>
+          </a:p>
+        </p:txBody>
+      </p:sp>
+      <p:sp>
+        <p:nvSpPr>
+          <p:cNvPr id="3" name="Inhaltsplatzhalter 2">
+            <a:extLst>
+              <a:ext uri="{FF2B5EF4-FFF2-40B4-BE49-F238E27FC236}">
+                <a16:creationId xmlns:a16="http://schemas.microsoft.com/office/drawing/2014/main" id="{659CA9F6-54B4-1531-E83B-0D1A49C9D6FB}"/>
+              </a:ext>
+            </a:extLst>
+          </p:cNvPr>
+          <p:cNvSpPr>
+            <a:spLocks noGrp="1"/>
+          </p:cNvSpPr>
+          <p:nvPr>
+            <p:ph idx="1"/>
+          </p:nvPr>
+        </p:nvSpPr>
+        <p:spPr/>
+        <p:txBody>
+          <a:bodyPr/>
+          <a:lstStyle/>
+          <a:p>
+            <a:pPr marL="0" indent="0">
+              <a:buNone/>
+            </a:pPr>
+            <a:r>
+              <a:rPr lang="de-DE" b="1" dirty="0"/>
+              <a:t>Branch </a:t>
+            </a:r>
+            <a:r>
+              <a:rPr lang="de-DE" b="1" dirty="0" err="1"/>
+              <a:t>Names</a:t>
+            </a:r>
+            <a:endParaRPr lang="de-DE" b="1" dirty="0"/>
+          </a:p>
+          <a:p>
+            <a:pPr>
+              <a:buFont typeface="Arial" panose="020B0604020202020204" pitchFamily="34" charset="0"/>
+              <a:buChar char="•"/>
+            </a:pPr>
+            <a:r>
+              <a:rPr lang="de-DE" dirty="0"/>
+              <a:t>Bei vorhandener </a:t>
+            </a:r>
+            <a:r>
+              <a:rPr lang="de-DE" dirty="0" err="1"/>
+              <a:t>Branching</a:t>
+            </a:r>
+            <a:r>
+              <a:rPr lang="de-DE" dirty="0"/>
+              <a:t> Strategie</a:t>
+            </a:r>
+          </a:p>
+          <a:p>
+            <a:pPr lvl="1">
+              <a:buFont typeface="Arial" panose="020B0604020202020204" pitchFamily="34" charset="0"/>
+              <a:buChar char="•"/>
+            </a:pPr>
+            <a:r>
+              <a:rPr lang="de-DE" dirty="0" err="1"/>
+              <a:t>Branchnamen</a:t>
+            </a:r>
+            <a:r>
+              <a:rPr lang="de-DE" dirty="0"/>
+              <a:t> verwenden, um Tags zu managen</a:t>
+            </a:r>
+          </a:p>
+          <a:p>
+            <a:pPr>
+              <a:buFont typeface="Arial" panose="020B0604020202020204" pitchFamily="34" charset="0"/>
+              <a:buChar char="•"/>
+            </a:pPr>
+            <a:r>
+              <a:rPr lang="de-DE" dirty="0"/>
+              <a:t>Beispiel</a:t>
+            </a:r>
+          </a:p>
+          <a:p>
+            <a:pPr lvl="1">
+              <a:buFont typeface="Arial" panose="020B0604020202020204" pitchFamily="34" charset="0"/>
+              <a:buChar char="•"/>
+            </a:pPr>
+            <a:r>
+              <a:rPr lang="de-DE" dirty="0"/>
+              <a:t>Branch: </a:t>
+            </a:r>
+            <a:r>
+              <a:rPr lang="de-DE" dirty="0">
+                <a:latin typeface="Consolas" panose="020B0609020204030204" pitchFamily="49" charset="0"/>
+              </a:rPr>
+              <a:t>release/2.5.1 für ein spezifisches Release</a:t>
+            </a:r>
+          </a:p>
+          <a:p>
+            <a:pPr lvl="1">
+              <a:buFont typeface="Arial" panose="020B0604020202020204" pitchFamily="34" charset="0"/>
+              <a:buChar char="•"/>
+            </a:pPr>
+            <a:r>
+              <a:rPr lang="de-DE" dirty="0"/>
+              <a:t>Entsprechendes Docker Image mit </a:t>
+            </a:r>
+            <a:r>
+              <a:rPr lang="de-DE" dirty="0">
+                <a:latin typeface="Consolas" panose="020B0609020204030204" pitchFamily="49" charset="0"/>
+              </a:rPr>
+              <a:t>2.5.1</a:t>
+            </a:r>
+            <a:r>
+              <a:rPr lang="de-DE" dirty="0"/>
+              <a:t> taggen</a:t>
+            </a:r>
+          </a:p>
+        </p:txBody>
+      </p:sp>
+    </p:spTree>
+    <p:extLst>
+      <p:ext uri="{BB962C8B-B14F-4D97-AF65-F5344CB8AC3E}">
+        <p14:creationId xmlns:p14="http://schemas.microsoft.com/office/powerpoint/2010/main" val="2883953203"/>
+      </p:ext>
+    </p:extLst>
+  </p:cSld>
+  <p:clrMapOvr>
+    <a:masterClrMapping/>
+  </p:clrMapOvr>
+</p:sld>
+</file>
+
+<file path=ppt/slides/slide16.xml><?xml version="1.0" encoding="utf-8"?>
+<p:sld xmlns:a="http://schemas.openxmlformats.org/drawingml/2006/main" xmlns:r="http://schemas.openxmlformats.org/officeDocument/2006/relationships" xmlns:p="http://schemas.openxmlformats.org/presentationml/2006/main">
+  <p:cSld>
+    <p:spTree>
+      <p:nvGrpSpPr>
+        <p:cNvPr id="1" name=""/>
+        <p:cNvGrpSpPr/>
+        <p:nvPr/>
+      </p:nvGrpSpPr>
+      <p:grpSpPr>
+        <a:xfrm>
+          <a:off x="0" y="0"/>
+          <a:ext cx="0" cy="0"/>
+          <a:chOff x="0" y="0"/>
+          <a:chExt cx="0" cy="0"/>
+        </a:xfrm>
+      </p:grpSpPr>
+      <p:sp>
+        <p:nvSpPr>
+          <p:cNvPr id="2" name="Titel 1">
+            <a:extLst>
+              <a:ext uri="{FF2B5EF4-FFF2-40B4-BE49-F238E27FC236}">
+                <a16:creationId xmlns:a16="http://schemas.microsoft.com/office/drawing/2014/main" id="{5874EA8E-7A71-3505-B01E-D0E8A26AAC59}"/>
+              </a:ext>
+            </a:extLst>
+          </p:cNvPr>
+          <p:cNvSpPr>
+            <a:spLocks noGrp="1"/>
+          </p:cNvSpPr>
+          <p:nvPr>
+            <p:ph type="title"/>
+          </p:nvPr>
+        </p:nvSpPr>
+        <p:spPr/>
+        <p:txBody>
+          <a:bodyPr/>
+          <a:lstStyle/>
+          <a:p>
+            <a:r>
+              <a:rPr lang="de-DE" cap="none" dirty="0"/>
+              <a:t>Release- und </a:t>
+            </a:r>
+            <a:r>
+              <a:rPr lang="de-DE" cap="none" dirty="0" err="1"/>
+              <a:t>Tagged</a:t>
+            </a:r>
+            <a:r>
+              <a:rPr lang="de-DE" cap="none" dirty="0"/>
+              <a:t>-Images</a:t>
+            </a:r>
+            <a:endParaRPr lang="de-DE" dirty="0"/>
+          </a:p>
+        </p:txBody>
+      </p:sp>
+      <p:sp>
+        <p:nvSpPr>
+          <p:cNvPr id="3" name="Inhaltsplatzhalter 2">
+            <a:extLst>
+              <a:ext uri="{FF2B5EF4-FFF2-40B4-BE49-F238E27FC236}">
+                <a16:creationId xmlns:a16="http://schemas.microsoft.com/office/drawing/2014/main" id="{D4DA2B4E-C5FB-6595-34A6-E18A9AA0157D}"/>
+              </a:ext>
+            </a:extLst>
+          </p:cNvPr>
+          <p:cNvSpPr>
+            <a:spLocks noGrp="1"/>
+          </p:cNvSpPr>
+          <p:nvPr>
+            <p:ph idx="1"/>
+          </p:nvPr>
+        </p:nvSpPr>
+        <p:spPr/>
+        <p:txBody>
+          <a:bodyPr/>
+          <a:lstStyle/>
+          <a:p>
+            <a:pPr marL="0" indent="0">
+              <a:buNone/>
+            </a:pPr>
+            <a:r>
+              <a:rPr lang="de-DE" b="1" dirty="0" err="1"/>
+              <a:t>SemVer</a:t>
+            </a:r>
+            <a:r>
+              <a:rPr lang="de-DE" b="1" dirty="0"/>
+              <a:t> tags (</a:t>
+            </a:r>
+            <a:r>
+              <a:rPr lang="de-DE" b="1" dirty="0" err="1"/>
+              <a:t>Semantic</a:t>
+            </a:r>
+            <a:r>
+              <a:rPr lang="de-DE" b="1" dirty="0"/>
+              <a:t> </a:t>
+            </a:r>
+            <a:r>
+              <a:rPr lang="de-DE" b="1" dirty="0" err="1"/>
+              <a:t>Versioning</a:t>
+            </a:r>
+            <a:r>
+              <a:rPr lang="de-DE" b="1" dirty="0"/>
+              <a:t>)</a:t>
+            </a:r>
+          </a:p>
+          <a:p>
+            <a:pPr>
+              <a:buFont typeface="Arial" panose="020B0604020202020204" pitchFamily="34" charset="0"/>
+              <a:buChar char="•"/>
+            </a:pPr>
+            <a:r>
+              <a:rPr lang="de-DE" dirty="0"/>
+              <a:t>Anstatt zufällige Namen direkt Nummerierung</a:t>
+            </a:r>
+          </a:p>
+          <a:p>
+            <a:pPr>
+              <a:buFont typeface="Arial" panose="020B0604020202020204" pitchFamily="34" charset="0"/>
+              <a:buChar char="•"/>
+            </a:pPr>
+            <a:r>
+              <a:rPr lang="de-DE" dirty="0"/>
+              <a:t>„Spezialfall“ des </a:t>
+            </a:r>
+            <a:r>
+              <a:rPr lang="de-DE" dirty="0">
+                <a:latin typeface="Consolas" panose="020B0609020204030204" pitchFamily="49" charset="0"/>
+              </a:rPr>
+              <a:t>:</a:t>
+            </a:r>
+            <a:r>
+              <a:rPr lang="de-DE" dirty="0" err="1">
+                <a:latin typeface="Consolas" panose="020B0609020204030204" pitchFamily="49" charset="0"/>
+              </a:rPr>
+              <a:t>stable</a:t>
+            </a:r>
+            <a:r>
+              <a:rPr lang="de-DE" dirty="0">
+                <a:latin typeface="Consolas" panose="020B0609020204030204" pitchFamily="49" charset="0"/>
+              </a:rPr>
+              <a:t> </a:t>
+            </a:r>
+            <a:r>
+              <a:rPr lang="de-DE" dirty="0"/>
+              <a:t>Tag (Grundidee)</a:t>
+            </a:r>
+          </a:p>
+          <a:p>
+            <a:pPr>
+              <a:buFont typeface="Arial" panose="020B0604020202020204" pitchFamily="34" charset="0"/>
+              <a:buChar char="•"/>
+            </a:pPr>
+            <a:r>
+              <a:rPr lang="de-DE" dirty="0"/>
+              <a:t>Notation </a:t>
+            </a:r>
+            <a:r>
+              <a:rPr lang="de-DE" dirty="0">
+                <a:latin typeface="Consolas" panose="020B0609020204030204" pitchFamily="49" charset="0"/>
+              </a:rPr>
+              <a:t>MAJOR.MINOR.PATCH</a:t>
+            </a:r>
+          </a:p>
+          <a:p>
+            <a:pPr lvl="1">
+              <a:buFont typeface="Arial" panose="020B0604020202020204" pitchFamily="34" charset="0"/>
+              <a:buChar char="•"/>
+            </a:pPr>
+            <a:r>
+              <a:rPr lang="de-DE" dirty="0"/>
+              <a:t>Beispiel: 2.5.1</a:t>
+            </a:r>
+          </a:p>
+          <a:p>
+            <a:pPr lvl="1">
+              <a:buFont typeface="Arial" panose="020B0604020202020204" pitchFamily="34" charset="0"/>
+              <a:buChar char="•"/>
+            </a:pPr>
+            <a:r>
+              <a:rPr lang="de-DE" dirty="0"/>
+              <a:t>MAJOR = Inkompatible Änderungen</a:t>
+            </a:r>
+          </a:p>
+          <a:p>
+            <a:pPr lvl="1">
+              <a:buFont typeface="Arial" panose="020B0604020202020204" pitchFamily="34" charset="0"/>
+              <a:buChar char="•"/>
+            </a:pPr>
+            <a:r>
+              <a:rPr lang="de-DE" dirty="0"/>
+              <a:t>MINOR = Kompatible Änderungen</a:t>
+            </a:r>
+          </a:p>
+          <a:p>
+            <a:pPr lvl="1">
+              <a:buFont typeface="Arial" panose="020B0604020202020204" pitchFamily="34" charset="0"/>
+              <a:buChar char="•"/>
+            </a:pPr>
+            <a:r>
+              <a:rPr lang="de-DE" dirty="0"/>
+              <a:t>PATCH = Patches</a:t>
+            </a:r>
+          </a:p>
+          <a:p>
+            <a:pPr>
+              <a:buFont typeface="Arial" panose="020B0604020202020204" pitchFamily="34" charset="0"/>
+              <a:buChar char="•"/>
+            </a:pPr>
+            <a:r>
+              <a:rPr lang="de-DE" dirty="0"/>
+              <a:t>Neuer </a:t>
+            </a:r>
+            <a:r>
+              <a:rPr lang="de-DE" dirty="0" err="1"/>
+              <a:t>Build</a:t>
+            </a:r>
+            <a:r>
+              <a:rPr lang="de-DE" dirty="0"/>
+              <a:t> mit kleinsten Änderungen = </a:t>
+            </a:r>
+            <a:r>
+              <a:rPr lang="de-DE" dirty="0" err="1"/>
+              <a:t>Patchnummer</a:t>
+            </a:r>
+            <a:r>
+              <a:rPr lang="de-DE" dirty="0"/>
+              <a:t> hochzählen</a:t>
+            </a:r>
+          </a:p>
+          <a:p>
+            <a:pPr lvl="1">
+              <a:buFont typeface="Arial" panose="020B0604020202020204" pitchFamily="34" charset="0"/>
+              <a:buChar char="•"/>
+            </a:pPr>
+            <a:r>
+              <a:rPr lang="de-DE" dirty="0">
+                <a:sym typeface="Wingdings" panose="05000000000000000000" pitchFamily="2" charset="2"/>
+              </a:rPr>
+              <a:t> aus 2.5.1 wird 2.5.2</a:t>
+            </a:r>
+            <a:endParaRPr lang="de-DE" dirty="0"/>
+          </a:p>
+          <a:p>
+            <a:pPr>
+              <a:buFont typeface="Arial" panose="020B0604020202020204" pitchFamily="34" charset="0"/>
+              <a:buChar char="•"/>
+            </a:pPr>
+            <a:r>
+              <a:rPr lang="de-DE" dirty="0"/>
+              <a:t>Tags weiterhin mutable</a:t>
+            </a:r>
+          </a:p>
+          <a:p>
+            <a:pPr marL="0" indent="0">
+              <a:buNone/>
+            </a:pPr>
+            <a:endParaRPr lang="de-DE" b="1" dirty="0"/>
+          </a:p>
+        </p:txBody>
+      </p:sp>
+    </p:spTree>
+    <p:extLst>
+      <p:ext uri="{BB962C8B-B14F-4D97-AF65-F5344CB8AC3E}">
+        <p14:creationId xmlns:p14="http://schemas.microsoft.com/office/powerpoint/2010/main" val="1996689965"/>
+      </p:ext>
+    </p:extLst>
+  </p:cSld>
+  <p:clrMapOvr>
+    <a:masterClrMapping/>
+  </p:clrMapOvr>
+</p:sld>
+</file>
+
+<file path=ppt/slides/slide17.xml><?xml version="1.0" encoding="utf-8"?>
+<p:sld xmlns:a="http://schemas.openxmlformats.org/drawingml/2006/main" xmlns:r="http://schemas.openxmlformats.org/officeDocument/2006/relationships" xmlns:p="http://schemas.openxmlformats.org/presentationml/2006/main">
+  <p:cSld>
+    <p:spTree>
+      <p:nvGrpSpPr>
+        <p:cNvPr id="1" name=""/>
+        <p:cNvGrpSpPr/>
+        <p:nvPr/>
+      </p:nvGrpSpPr>
+      <p:grpSpPr>
+        <a:xfrm>
+          <a:off x="0" y="0"/>
+          <a:ext cx="0" cy="0"/>
+          <a:chOff x="0" y="0"/>
+          <a:chExt cx="0" cy="0"/>
+        </a:xfrm>
+      </p:grpSpPr>
+      <p:sp>
+        <p:nvSpPr>
+          <p:cNvPr id="2" name="Titel 1">
+            <a:extLst>
+              <a:ext uri="{FF2B5EF4-FFF2-40B4-BE49-F238E27FC236}">
+                <a16:creationId xmlns:a16="http://schemas.microsoft.com/office/drawing/2014/main" id="{5874EA8E-7A71-3505-B01E-D0E8A26AAC59}"/>
+              </a:ext>
+            </a:extLst>
+          </p:cNvPr>
+          <p:cNvSpPr>
+            <a:spLocks noGrp="1"/>
+          </p:cNvSpPr>
+          <p:nvPr>
+            <p:ph type="title"/>
+          </p:nvPr>
+        </p:nvSpPr>
+        <p:spPr/>
+        <p:txBody>
+          <a:bodyPr/>
+          <a:lstStyle/>
+          <a:p>
+            <a:r>
+              <a:rPr lang="de-DE" cap="none" dirty="0"/>
+              <a:t>Release- und </a:t>
+            </a:r>
+            <a:r>
+              <a:rPr lang="de-DE" cap="none" dirty="0" err="1"/>
+              <a:t>Tagged</a:t>
+            </a:r>
+            <a:r>
+              <a:rPr lang="de-DE" cap="none" dirty="0"/>
+              <a:t>-Images</a:t>
+            </a:r>
+            <a:endParaRPr lang="de-DE" dirty="0"/>
+          </a:p>
+        </p:txBody>
+      </p:sp>
+      <p:sp>
+        <p:nvSpPr>
+          <p:cNvPr id="3" name="Inhaltsplatzhalter 2">
+            <a:extLst>
+              <a:ext uri="{FF2B5EF4-FFF2-40B4-BE49-F238E27FC236}">
+                <a16:creationId xmlns:a16="http://schemas.microsoft.com/office/drawing/2014/main" id="{D4DA2B4E-C5FB-6595-34A6-E18A9AA0157D}"/>
+              </a:ext>
+            </a:extLst>
+          </p:cNvPr>
+          <p:cNvSpPr>
+            <a:spLocks noGrp="1"/>
+          </p:cNvSpPr>
+          <p:nvPr>
+            <p:ph idx="1"/>
+          </p:nvPr>
+        </p:nvSpPr>
+        <p:spPr/>
+        <p:txBody>
+          <a:bodyPr/>
+          <a:lstStyle/>
+          <a:p>
+            <a:pPr marL="0" indent="0">
+              <a:buNone/>
+            </a:pPr>
+            <a:r>
+              <a:rPr lang="de-DE" b="1" dirty="0" err="1"/>
+              <a:t>Git</a:t>
+            </a:r>
+            <a:r>
+              <a:rPr lang="de-DE" b="1" dirty="0"/>
+              <a:t> Commit Hash</a:t>
+            </a:r>
+          </a:p>
+          <a:p>
+            <a:pPr>
+              <a:buFont typeface="Arial" panose="020B0604020202020204" pitchFamily="34" charset="0"/>
+              <a:buChar char="•"/>
+            </a:pPr>
+            <a:r>
+              <a:rPr lang="de-DE" dirty="0"/>
+              <a:t>Mit jedem Commit ein neues Docker Image</a:t>
+            </a:r>
+          </a:p>
+          <a:p>
+            <a:pPr>
+              <a:buFont typeface="Arial" panose="020B0604020202020204" pitchFamily="34" charset="0"/>
+              <a:buChar char="•"/>
+            </a:pPr>
+            <a:r>
+              <a:rPr lang="de-DE" dirty="0"/>
+              <a:t>Kurzen </a:t>
+            </a:r>
+            <a:r>
+              <a:rPr lang="de-DE" dirty="0" err="1"/>
+              <a:t>Git</a:t>
+            </a:r>
+            <a:r>
+              <a:rPr lang="de-DE" dirty="0"/>
+              <a:t> Hash zum Tagging nutzen</a:t>
+            </a:r>
+          </a:p>
+          <a:p>
+            <a:pPr lvl="1">
+              <a:buFont typeface="Arial" panose="020B0604020202020204" pitchFamily="34" charset="0"/>
+              <a:buChar char="•"/>
+            </a:pPr>
+            <a:r>
+              <a:rPr lang="de-DE" dirty="0"/>
+              <a:t>Sind kürzer als Image Digests</a:t>
+            </a:r>
+          </a:p>
+          <a:p>
+            <a:pPr>
+              <a:buFont typeface="Arial" panose="020B0604020202020204" pitchFamily="34" charset="0"/>
+              <a:buChar char="•"/>
+            </a:pPr>
+            <a:r>
+              <a:rPr lang="de-DE" dirty="0" err="1"/>
+              <a:t>Traceability</a:t>
+            </a:r>
+            <a:r>
+              <a:rPr lang="de-DE" dirty="0"/>
+              <a:t> (Rückverfolgbarkeit) sehr hoch!</a:t>
+            </a:r>
+          </a:p>
+          <a:p>
+            <a:pPr>
+              <a:buFont typeface="Arial" panose="020B0604020202020204" pitchFamily="34" charset="0"/>
+              <a:buChar char="•"/>
+            </a:pPr>
+            <a:r>
+              <a:rPr lang="de-DE" dirty="0"/>
+              <a:t>Tags allerdings nicht selbsterklärend</a:t>
+            </a:r>
+          </a:p>
+          <a:p>
+            <a:pPr>
+              <a:buFont typeface="Arial" panose="020B0604020202020204" pitchFamily="34" charset="0"/>
+              <a:buChar char="•"/>
+            </a:pPr>
+            <a:r>
+              <a:rPr lang="de-DE" dirty="0"/>
+              <a:t>Beispiel</a:t>
+            </a:r>
+          </a:p>
+          <a:p>
+            <a:pPr lvl="1">
+              <a:buFont typeface="Arial" panose="020B0604020202020204" pitchFamily="34" charset="0"/>
+              <a:buChar char="•"/>
+            </a:pPr>
+            <a:r>
+              <a:rPr lang="de-DE" dirty="0"/>
+              <a:t>2.5.1-sha1abcde</a:t>
+            </a:r>
+          </a:p>
+          <a:p>
+            <a:pPr>
+              <a:buFont typeface="Arial" panose="020B0604020202020204" pitchFamily="34" charset="0"/>
+              <a:buChar char="•"/>
+            </a:pPr>
+            <a:endParaRPr lang="de-DE" dirty="0"/>
+          </a:p>
+        </p:txBody>
+      </p:sp>
+    </p:spTree>
+    <p:extLst>
+      <p:ext uri="{BB962C8B-B14F-4D97-AF65-F5344CB8AC3E}">
+        <p14:creationId xmlns:p14="http://schemas.microsoft.com/office/powerpoint/2010/main" val="2072298106"/>
+      </p:ext>
+    </p:extLst>
+  </p:cSld>
+  <p:clrMapOvr>
+    <a:masterClrMapping/>
+  </p:clrMapOvr>
+</p:sld>
+</file>
+
+<file path=ppt/slides/slide18.xml><?xml version="1.0" encoding="utf-8"?>
+<p:sld xmlns:a="http://schemas.openxmlformats.org/drawingml/2006/main" xmlns:r="http://schemas.openxmlformats.org/officeDocument/2006/relationships" xmlns:p="http://schemas.openxmlformats.org/presentationml/2006/main">
+  <p:cSld>
+    <p:spTree>
+      <p:nvGrpSpPr>
+        <p:cNvPr id="1" name=""/>
+        <p:cNvGrpSpPr/>
+        <p:nvPr/>
+      </p:nvGrpSpPr>
+      <p:grpSpPr>
+        <a:xfrm>
+          <a:off x="0" y="0"/>
+          <a:ext cx="0" cy="0"/>
+          <a:chOff x="0" y="0"/>
+          <a:chExt cx="0" cy="0"/>
+        </a:xfrm>
+      </p:grpSpPr>
+      <p:sp>
+        <p:nvSpPr>
+          <p:cNvPr id="2" name="Titel 1">
+            <a:extLst>
+              <a:ext uri="{FF2B5EF4-FFF2-40B4-BE49-F238E27FC236}">
+                <a16:creationId xmlns:a16="http://schemas.microsoft.com/office/drawing/2014/main" id="{5874EA8E-7A71-3505-B01E-D0E8A26AAC59}"/>
+              </a:ext>
+            </a:extLst>
+          </p:cNvPr>
+          <p:cNvSpPr>
+            <a:spLocks noGrp="1"/>
+          </p:cNvSpPr>
+          <p:nvPr>
+            <p:ph type="title"/>
+          </p:nvPr>
+        </p:nvSpPr>
+        <p:spPr/>
+        <p:txBody>
+          <a:bodyPr/>
+          <a:lstStyle/>
+          <a:p>
+            <a:r>
+              <a:rPr lang="de-DE" cap="none" dirty="0"/>
+              <a:t>Release- und </a:t>
+            </a:r>
+            <a:r>
+              <a:rPr lang="de-DE" cap="none" dirty="0" err="1"/>
+              <a:t>Tagged</a:t>
+            </a:r>
+            <a:r>
+              <a:rPr lang="de-DE" cap="none" dirty="0"/>
+              <a:t>-Images</a:t>
+            </a:r>
+            <a:endParaRPr lang="de-DE" dirty="0"/>
+          </a:p>
+        </p:txBody>
+      </p:sp>
+      <p:sp>
+        <p:nvSpPr>
+          <p:cNvPr id="3" name="Inhaltsplatzhalter 2">
+            <a:extLst>
+              <a:ext uri="{FF2B5EF4-FFF2-40B4-BE49-F238E27FC236}">
+                <a16:creationId xmlns:a16="http://schemas.microsoft.com/office/drawing/2014/main" id="{D4DA2B4E-C5FB-6595-34A6-E18A9AA0157D}"/>
+              </a:ext>
+            </a:extLst>
+          </p:cNvPr>
+          <p:cNvSpPr>
+            <a:spLocks noGrp="1"/>
+          </p:cNvSpPr>
+          <p:nvPr>
+            <p:ph idx="1"/>
+          </p:nvPr>
+        </p:nvSpPr>
+        <p:spPr/>
+        <p:txBody>
+          <a:bodyPr/>
+          <a:lstStyle/>
+          <a:p>
+            <a:pPr marL="0" indent="0">
+              <a:buNone/>
+            </a:pPr>
+            <a:r>
+              <a:rPr lang="de-DE" b="1" dirty="0" err="1"/>
+              <a:t>Timestamp</a:t>
+            </a:r>
+            <a:r>
+              <a:rPr lang="de-DE" b="1" dirty="0"/>
+              <a:t> / Date-</a:t>
+            </a:r>
+            <a:r>
+              <a:rPr lang="de-DE" b="1" dirty="0" err="1"/>
+              <a:t>Based</a:t>
+            </a:r>
+            <a:r>
+              <a:rPr lang="de-DE" b="1" dirty="0"/>
+              <a:t> Tags</a:t>
+            </a:r>
+          </a:p>
+          <a:p>
+            <a:pPr>
+              <a:buFont typeface="Arial" panose="020B0604020202020204" pitchFamily="34" charset="0"/>
+              <a:buChar char="•"/>
+            </a:pPr>
+            <a:r>
+              <a:rPr lang="de-DE" dirty="0"/>
+              <a:t>Unique </a:t>
+            </a:r>
+            <a:r>
+              <a:rPr lang="de-DE" dirty="0" err="1"/>
+              <a:t>identifier</a:t>
+            </a:r>
+            <a:endParaRPr lang="de-DE" dirty="0"/>
+          </a:p>
+          <a:p>
+            <a:pPr lvl="1">
+              <a:buFont typeface="Arial" panose="020B0604020202020204" pitchFamily="34" charset="0"/>
+              <a:buChar char="•"/>
+            </a:pPr>
+            <a:r>
+              <a:rPr lang="de-DE" dirty="0">
+                <a:sym typeface="Wingdings" panose="05000000000000000000" pitchFamily="2" charset="2"/>
+              </a:rPr>
+              <a:t> „Semi-</a:t>
+            </a:r>
+            <a:r>
+              <a:rPr lang="de-DE" dirty="0" err="1">
+                <a:sym typeface="Wingdings" panose="05000000000000000000" pitchFamily="2" charset="2"/>
+              </a:rPr>
+              <a:t>immutable</a:t>
+            </a:r>
+            <a:r>
+              <a:rPr lang="de-DE" dirty="0">
+                <a:sym typeface="Wingdings" panose="05000000000000000000" pitchFamily="2" charset="2"/>
+              </a:rPr>
+              <a:t>“ Referenz</a:t>
+            </a:r>
+          </a:p>
+          <a:p>
+            <a:pPr>
+              <a:buFont typeface="Arial" panose="020B0604020202020204" pitchFamily="34" charset="0"/>
+              <a:buChar char="•"/>
+            </a:pPr>
+            <a:r>
+              <a:rPr lang="de-DE" dirty="0">
+                <a:sym typeface="Wingdings" panose="05000000000000000000" pitchFamily="2" charset="2"/>
+              </a:rPr>
+              <a:t>Automatisch generiert  einzigartig</a:t>
+            </a:r>
+          </a:p>
+          <a:p>
+            <a:pPr>
+              <a:buFont typeface="Arial" panose="020B0604020202020204" pitchFamily="34" charset="0"/>
+              <a:buChar char="•"/>
+            </a:pPr>
+            <a:r>
+              <a:rPr lang="de-DE" dirty="0">
+                <a:sym typeface="Wingdings" panose="05000000000000000000" pitchFamily="2" charset="2"/>
+              </a:rPr>
+              <a:t>Einfache Lösung mit vielen Nachteilen</a:t>
+            </a:r>
+          </a:p>
+          <a:p>
+            <a:pPr lvl="1">
+              <a:buFont typeface="Arial" panose="020B0604020202020204" pitchFamily="34" charset="0"/>
+              <a:buChar char="•"/>
+            </a:pPr>
+            <a:r>
+              <a:rPr lang="de-DE" dirty="0" err="1">
+                <a:sym typeface="Wingdings" panose="05000000000000000000" pitchFamily="2" charset="2"/>
+              </a:rPr>
+              <a:t>Timezonen</a:t>
+            </a:r>
+            <a:r>
+              <a:rPr lang="de-DE" dirty="0">
+                <a:sym typeface="Wingdings" panose="05000000000000000000" pitchFamily="2" charset="2"/>
+              </a:rPr>
+              <a:t> sind böse!</a:t>
+            </a:r>
+          </a:p>
+          <a:p>
+            <a:pPr lvl="1">
+              <a:buFont typeface="Arial" panose="020B0604020202020204" pitchFamily="34" charset="0"/>
+              <a:buChar char="•"/>
+            </a:pPr>
+            <a:r>
+              <a:rPr lang="de-DE" dirty="0">
+                <a:sym typeface="Wingdings" panose="05000000000000000000" pitchFamily="2" charset="2"/>
+              </a:rPr>
+              <a:t>Korrelation zum enthaltenden </a:t>
+            </a:r>
+            <a:r>
+              <a:rPr lang="de-DE" dirty="0" err="1">
+                <a:sym typeface="Wingdings" panose="05000000000000000000" pitchFamily="2" charset="2"/>
+              </a:rPr>
+              <a:t>Changeset</a:t>
+            </a:r>
+            <a:r>
+              <a:rPr lang="de-DE" dirty="0">
+                <a:sym typeface="Wingdings" panose="05000000000000000000" pitchFamily="2" charset="2"/>
+              </a:rPr>
+              <a:t> fehlt</a:t>
+            </a:r>
+          </a:p>
+          <a:p>
+            <a:pPr lvl="1">
+              <a:buFont typeface="Arial" panose="020B0604020202020204" pitchFamily="34" charset="0"/>
+              <a:buChar char="•"/>
+            </a:pPr>
+            <a:r>
+              <a:rPr lang="de-DE" dirty="0">
+                <a:sym typeface="Wingdings" panose="05000000000000000000" pitchFamily="2" charset="2"/>
+              </a:rPr>
+              <a:t>Image mit demselben Tag manuell pushen</a:t>
+            </a:r>
+          </a:p>
+          <a:p>
+            <a:pPr lvl="1">
+              <a:buFont typeface="Arial" panose="020B0604020202020204" pitchFamily="34" charset="0"/>
+              <a:buChar char="•"/>
+            </a:pPr>
+            <a:endParaRPr lang="de-DE" dirty="0">
+              <a:sym typeface="Wingdings" panose="05000000000000000000" pitchFamily="2" charset="2"/>
+            </a:endParaRPr>
+          </a:p>
+          <a:p>
+            <a:pPr>
+              <a:buFont typeface="Arial" panose="020B0604020202020204" pitchFamily="34" charset="0"/>
+              <a:buChar char="•"/>
+            </a:pPr>
+            <a:endParaRPr lang="de-DE" dirty="0"/>
+          </a:p>
+        </p:txBody>
+      </p:sp>
+    </p:spTree>
+    <p:extLst>
+      <p:ext uri="{BB962C8B-B14F-4D97-AF65-F5344CB8AC3E}">
+        <p14:creationId xmlns:p14="http://schemas.microsoft.com/office/powerpoint/2010/main" val="3288241879"/>
+      </p:ext>
+    </p:extLst>
+  </p:cSld>
+  <p:clrMapOvr>
+    <a:masterClrMapping/>
+  </p:clrMapOvr>
+</p:sld>
+</file>
+
+<file path=ppt/slides/slide19.xml><?xml version="1.0" encoding="utf-8"?>
+<p:sld xmlns:a="http://schemas.openxmlformats.org/drawingml/2006/main" xmlns:r="http://schemas.openxmlformats.org/officeDocument/2006/relationships" xmlns:p="http://schemas.openxmlformats.org/presentationml/2006/main">
+  <p:cSld>
+    <p:spTree>
+      <p:nvGrpSpPr>
+        <p:cNvPr id="1" name=""/>
+        <p:cNvGrpSpPr/>
+        <p:nvPr/>
+      </p:nvGrpSpPr>
+      <p:grpSpPr>
+        <a:xfrm>
+          <a:off x="0" y="0"/>
+          <a:ext cx="0" cy="0"/>
+          <a:chOff x="0" y="0"/>
+          <a:chExt cx="0" cy="0"/>
+        </a:xfrm>
+      </p:grpSpPr>
+      <p:sp>
+        <p:nvSpPr>
+          <p:cNvPr id="2" name="Titel 1">
+            <a:extLst>
+              <a:ext uri="{FF2B5EF4-FFF2-40B4-BE49-F238E27FC236}">
+                <a16:creationId xmlns:a16="http://schemas.microsoft.com/office/drawing/2014/main" id="{5874EA8E-7A71-3505-B01E-D0E8A26AAC59}"/>
+              </a:ext>
+            </a:extLst>
+          </p:cNvPr>
+          <p:cNvSpPr>
+            <a:spLocks noGrp="1"/>
+          </p:cNvSpPr>
+          <p:nvPr>
+            <p:ph type="title"/>
+          </p:nvPr>
+        </p:nvSpPr>
+        <p:spPr/>
+        <p:txBody>
+          <a:bodyPr/>
+          <a:lstStyle/>
+          <a:p>
+            <a:r>
+              <a:rPr lang="de-DE" cap="none" dirty="0"/>
+              <a:t>Release- und </a:t>
+            </a:r>
+            <a:r>
+              <a:rPr lang="de-DE" cap="none" dirty="0" err="1"/>
+              <a:t>Tagged</a:t>
+            </a:r>
+            <a:r>
+              <a:rPr lang="de-DE" cap="none" dirty="0"/>
+              <a:t>-Images</a:t>
+            </a:r>
+            <a:endParaRPr lang="de-DE" dirty="0"/>
+          </a:p>
+        </p:txBody>
+      </p:sp>
+      <p:sp>
+        <p:nvSpPr>
+          <p:cNvPr id="3" name="Inhaltsplatzhalter 2">
+            <a:extLst>
+              <a:ext uri="{FF2B5EF4-FFF2-40B4-BE49-F238E27FC236}">
+                <a16:creationId xmlns:a16="http://schemas.microsoft.com/office/drawing/2014/main" id="{D4DA2B4E-C5FB-6595-34A6-E18A9AA0157D}"/>
+              </a:ext>
+            </a:extLst>
+          </p:cNvPr>
+          <p:cNvSpPr>
+            <a:spLocks noGrp="1"/>
+          </p:cNvSpPr>
+          <p:nvPr>
+            <p:ph idx="1"/>
+          </p:nvPr>
+        </p:nvSpPr>
+        <p:spPr/>
+        <p:txBody>
+          <a:bodyPr/>
+          <a:lstStyle/>
+          <a:p>
+            <a:pPr marL="0" indent="0">
+              <a:buNone/>
+            </a:pPr>
+            <a:r>
+              <a:rPr lang="de-DE" b="1" dirty="0" err="1"/>
+              <a:t>Build</a:t>
+            </a:r>
+            <a:r>
+              <a:rPr lang="de-DE" b="1" dirty="0"/>
+              <a:t> ID</a:t>
+            </a:r>
+          </a:p>
+          <a:p>
+            <a:pPr>
+              <a:buFont typeface="Arial" panose="020B0604020202020204" pitchFamily="34" charset="0"/>
+              <a:buChar char="•"/>
+            </a:pPr>
+            <a:r>
+              <a:rPr lang="de-DE" dirty="0"/>
+              <a:t>Unique </a:t>
+            </a:r>
+            <a:r>
+              <a:rPr lang="de-DE" dirty="0" err="1"/>
+              <a:t>identifier</a:t>
+            </a:r>
+            <a:endParaRPr lang="de-DE" dirty="0"/>
+          </a:p>
+          <a:p>
+            <a:pPr lvl="1">
+              <a:buFont typeface="Arial" panose="020B0604020202020204" pitchFamily="34" charset="0"/>
+              <a:buChar char="•"/>
+            </a:pPr>
+            <a:r>
+              <a:rPr lang="de-DE" dirty="0">
+                <a:sym typeface="Wingdings" panose="05000000000000000000" pitchFamily="2" charset="2"/>
+              </a:rPr>
+              <a:t> „Semi-</a:t>
+            </a:r>
+            <a:r>
+              <a:rPr lang="de-DE" dirty="0" err="1">
+                <a:sym typeface="Wingdings" panose="05000000000000000000" pitchFamily="2" charset="2"/>
+              </a:rPr>
+              <a:t>immutable</a:t>
+            </a:r>
+            <a:r>
+              <a:rPr lang="de-DE" dirty="0">
+                <a:sym typeface="Wingdings" panose="05000000000000000000" pitchFamily="2" charset="2"/>
+              </a:rPr>
+              <a:t>“ Referenz</a:t>
+            </a:r>
+          </a:p>
+          <a:p>
+            <a:pPr>
+              <a:buFont typeface="Arial" panose="020B0604020202020204" pitchFamily="34" charset="0"/>
+              <a:buChar char="•"/>
+            </a:pPr>
+            <a:r>
+              <a:rPr lang="de-DE" dirty="0">
+                <a:sym typeface="Wingdings" panose="05000000000000000000" pitchFamily="2" charset="2"/>
+              </a:rPr>
+              <a:t>Automatisch generiert  einzigartig</a:t>
+            </a:r>
+          </a:p>
+          <a:p>
+            <a:pPr>
+              <a:buFont typeface="Arial" panose="020B0604020202020204" pitchFamily="34" charset="0"/>
+              <a:buChar char="•"/>
+            </a:pPr>
+            <a:r>
+              <a:rPr lang="de-DE" dirty="0">
+                <a:sym typeface="Wingdings" panose="05000000000000000000" pitchFamily="2" charset="2"/>
+              </a:rPr>
+              <a:t>Referenziert einen bestimmten </a:t>
+            </a:r>
+            <a:r>
+              <a:rPr lang="de-DE" dirty="0" err="1">
+                <a:sym typeface="Wingdings" panose="05000000000000000000" pitchFamily="2" charset="2"/>
+              </a:rPr>
+              <a:t>Build</a:t>
+            </a:r>
+            <a:endParaRPr lang="de-DE" dirty="0">
+              <a:sym typeface="Wingdings" panose="05000000000000000000" pitchFamily="2" charset="2"/>
+            </a:endParaRPr>
+          </a:p>
+          <a:p>
+            <a:pPr>
+              <a:buFont typeface="Arial" panose="020B0604020202020204" pitchFamily="34" charset="0"/>
+              <a:buChar char="•"/>
+            </a:pPr>
+            <a:r>
+              <a:rPr lang="de-DE" dirty="0">
+                <a:sym typeface="Wingdings" panose="05000000000000000000" pitchFamily="2" charset="2"/>
+              </a:rPr>
+              <a:t>Kann nicht </a:t>
+            </a:r>
+            <a:r>
+              <a:rPr lang="de-DE" dirty="0" err="1">
+                <a:sym typeface="Wingdings" panose="05000000000000000000" pitchFamily="2" charset="2"/>
+              </a:rPr>
+              <a:t>gefaked</a:t>
+            </a:r>
+            <a:r>
+              <a:rPr lang="de-DE" dirty="0">
+                <a:sym typeface="Wingdings" panose="05000000000000000000" pitchFamily="2" charset="2"/>
+              </a:rPr>
+              <a:t> werden</a:t>
+            </a:r>
+          </a:p>
+          <a:p>
+            <a:pPr>
+              <a:buFont typeface="Arial" panose="020B0604020202020204" pitchFamily="34" charset="0"/>
+              <a:buChar char="•"/>
+            </a:pPr>
+            <a:r>
+              <a:rPr lang="de-DE" dirty="0">
+                <a:sym typeface="Wingdings" panose="05000000000000000000" pitchFamily="2" charset="2"/>
+              </a:rPr>
+              <a:t>Analog zum Image Digest</a:t>
+            </a:r>
+          </a:p>
+          <a:p>
+            <a:pPr lvl="1">
+              <a:buFont typeface="Arial" panose="020B0604020202020204" pitchFamily="34" charset="0"/>
+              <a:buChar char="•"/>
+            </a:pPr>
+            <a:r>
+              <a:rPr lang="de-DE" dirty="0">
+                <a:sym typeface="Wingdings" panose="05000000000000000000" pitchFamily="2" charset="2"/>
+              </a:rPr>
+              <a:t> Keine Hinweise auf Änderungen vom Release</a:t>
+            </a:r>
+          </a:p>
+          <a:p>
+            <a:pPr lvl="1">
+              <a:buFont typeface="Arial" panose="020B0604020202020204" pitchFamily="34" charset="0"/>
+              <a:buChar char="•"/>
+            </a:pPr>
+            <a:r>
+              <a:rPr lang="de-DE" dirty="0">
+                <a:sym typeface="Wingdings" panose="05000000000000000000" pitchFamily="2" charset="2"/>
+              </a:rPr>
+              <a:t>Auch nicht hilfreich beim Suchen nach einem bestimmten Image</a:t>
+            </a:r>
+          </a:p>
+        </p:txBody>
+      </p:sp>
+    </p:spTree>
+    <p:extLst>
+      <p:ext uri="{BB962C8B-B14F-4D97-AF65-F5344CB8AC3E}">
+        <p14:creationId xmlns:p14="http://schemas.microsoft.com/office/powerpoint/2010/main" val="3892196854"/>
       </p:ext>
     </p:extLst>
   </p:cSld>
@@ -4985,6 +6820,343 @@
         </p:txBody>
       </p:sp>
     </p:spTree>
+  </p:cSld>
+  <p:clrMapOvr>
+    <a:masterClrMapping/>
+  </p:clrMapOvr>
+</p:sld>
+</file>
+
+<file path=ppt/slides/slide20.xml><?xml version="1.0" encoding="utf-8"?>
+<p:sld xmlns:a="http://schemas.openxmlformats.org/drawingml/2006/main" xmlns:r="http://schemas.openxmlformats.org/officeDocument/2006/relationships" xmlns:p="http://schemas.openxmlformats.org/presentationml/2006/main">
+  <p:cSld>
+    <p:spTree>
+      <p:nvGrpSpPr>
+        <p:cNvPr id="1" name=""/>
+        <p:cNvGrpSpPr/>
+        <p:nvPr/>
+      </p:nvGrpSpPr>
+      <p:grpSpPr>
+        <a:xfrm>
+          <a:off x="0" y="0"/>
+          <a:ext cx="0" cy="0"/>
+          <a:chOff x="0" y="0"/>
+          <a:chExt cx="0" cy="0"/>
+        </a:xfrm>
+      </p:grpSpPr>
+      <p:sp>
+        <p:nvSpPr>
+          <p:cNvPr id="2" name="Titel 1">
+            <a:extLst>
+              <a:ext uri="{FF2B5EF4-FFF2-40B4-BE49-F238E27FC236}">
+                <a16:creationId xmlns:a16="http://schemas.microsoft.com/office/drawing/2014/main" id="{DB0F3AE3-58DC-3491-F808-4EB383AB2065}"/>
+              </a:ext>
+            </a:extLst>
+          </p:cNvPr>
+          <p:cNvSpPr>
+            <a:spLocks noGrp="1"/>
+          </p:cNvSpPr>
+          <p:nvPr>
+            <p:ph type="title"/>
+          </p:nvPr>
+        </p:nvSpPr>
+        <p:spPr/>
+        <p:txBody>
+          <a:bodyPr/>
+          <a:lstStyle/>
+          <a:p>
+            <a:r>
+              <a:rPr lang="de-DE" cap="none" dirty="0"/>
+              <a:t>Release- und </a:t>
+            </a:r>
+            <a:r>
+              <a:rPr lang="de-DE" cap="none" dirty="0" err="1"/>
+              <a:t>Tagged</a:t>
+            </a:r>
+            <a:r>
+              <a:rPr lang="de-DE" cap="none" dirty="0"/>
+              <a:t>-Images</a:t>
+            </a:r>
+            <a:endParaRPr lang="de-DE" dirty="0"/>
+          </a:p>
+        </p:txBody>
+      </p:sp>
+      <p:sp>
+        <p:nvSpPr>
+          <p:cNvPr id="3" name="Inhaltsplatzhalter 2">
+            <a:extLst>
+              <a:ext uri="{FF2B5EF4-FFF2-40B4-BE49-F238E27FC236}">
+                <a16:creationId xmlns:a16="http://schemas.microsoft.com/office/drawing/2014/main" id="{190FFB39-ECBA-266E-3E67-FF616FE30B00}"/>
+              </a:ext>
+            </a:extLst>
+          </p:cNvPr>
+          <p:cNvSpPr>
+            <a:spLocks noGrp="1"/>
+          </p:cNvSpPr>
+          <p:nvPr>
+            <p:ph idx="1"/>
+          </p:nvPr>
+        </p:nvSpPr>
+        <p:spPr/>
+        <p:txBody>
+          <a:bodyPr/>
+          <a:lstStyle/>
+          <a:p>
+            <a:pPr marL="0" indent="0">
+              <a:buNone/>
+            </a:pPr>
+            <a:r>
+              <a:rPr lang="de-DE" b="1" dirty="0"/>
+              <a:t>Use Cases für </a:t>
+            </a:r>
+            <a:r>
+              <a:rPr lang="de-DE" b="1"/>
+              <a:t>die Strategien</a:t>
+            </a:r>
+          </a:p>
+          <a:p>
+            <a:pPr>
+              <a:buFont typeface="Arial" panose="020B0604020202020204" pitchFamily="34" charset="0"/>
+              <a:buChar char="•"/>
+            </a:pPr>
+            <a:endParaRPr lang="de-DE" b="1"/>
+          </a:p>
+        </p:txBody>
+      </p:sp>
+    </p:spTree>
+    <p:extLst>
+      <p:ext uri="{BB962C8B-B14F-4D97-AF65-F5344CB8AC3E}">
+        <p14:creationId xmlns:p14="http://schemas.microsoft.com/office/powerpoint/2010/main" val="2343330246"/>
+      </p:ext>
+    </p:extLst>
+  </p:cSld>
+  <p:clrMapOvr>
+    <a:masterClrMapping/>
+  </p:clrMapOvr>
+</p:sld>
+</file>
+
+<file path=ppt/slides/slide21.xml><?xml version="1.0" encoding="utf-8"?>
+<p:sld xmlns:a="http://schemas.openxmlformats.org/drawingml/2006/main" xmlns:r="http://schemas.openxmlformats.org/officeDocument/2006/relationships" xmlns:p="http://schemas.openxmlformats.org/presentationml/2006/main">
+  <p:cSld>
+    <p:spTree>
+      <p:nvGrpSpPr>
+        <p:cNvPr id="1" name=""/>
+        <p:cNvGrpSpPr/>
+        <p:nvPr/>
+      </p:nvGrpSpPr>
+      <p:grpSpPr>
+        <a:xfrm>
+          <a:off x="0" y="0"/>
+          <a:ext cx="0" cy="0"/>
+          <a:chOff x="0" y="0"/>
+          <a:chExt cx="0" cy="0"/>
+        </a:xfrm>
+      </p:grpSpPr>
+      <p:sp>
+        <p:nvSpPr>
+          <p:cNvPr id="2" name="Titel 1">
+            <a:extLst>
+              <a:ext uri="{FF2B5EF4-FFF2-40B4-BE49-F238E27FC236}">
+                <a16:creationId xmlns:a16="http://schemas.microsoft.com/office/drawing/2014/main" id="{184AFD09-5210-6F86-C2FD-BBC016D382A6}"/>
+              </a:ext>
+            </a:extLst>
+          </p:cNvPr>
+          <p:cNvSpPr>
+            <a:spLocks noGrp="1"/>
+          </p:cNvSpPr>
+          <p:nvPr>
+            <p:ph type="title"/>
+          </p:nvPr>
+        </p:nvSpPr>
+        <p:spPr/>
+        <p:txBody>
+          <a:bodyPr/>
+          <a:lstStyle/>
+          <a:p>
+            <a:r>
+              <a:rPr lang="de-DE" cap="none" dirty="0"/>
+              <a:t>Release- und </a:t>
+            </a:r>
+            <a:r>
+              <a:rPr lang="de-DE" cap="none" dirty="0" err="1"/>
+              <a:t>Tagged</a:t>
+            </a:r>
+            <a:r>
+              <a:rPr lang="de-DE" cap="none" dirty="0"/>
+              <a:t>-Images</a:t>
+            </a:r>
+            <a:endParaRPr lang="de-DE" dirty="0"/>
+          </a:p>
+        </p:txBody>
+      </p:sp>
+      <p:sp>
+        <p:nvSpPr>
+          <p:cNvPr id="6" name="Inhaltsplatzhalter 5">
+            <a:extLst>
+              <a:ext uri="{FF2B5EF4-FFF2-40B4-BE49-F238E27FC236}">
+                <a16:creationId xmlns:a16="http://schemas.microsoft.com/office/drawing/2014/main" id="{D2412707-84D3-F572-4709-FD9A95F28E5B}"/>
+              </a:ext>
+            </a:extLst>
+          </p:cNvPr>
+          <p:cNvSpPr>
+            <a:spLocks noGrp="1"/>
+          </p:cNvSpPr>
+          <p:nvPr>
+            <p:ph idx="1"/>
+          </p:nvPr>
+        </p:nvSpPr>
+        <p:spPr/>
+        <p:txBody>
+          <a:bodyPr/>
+          <a:lstStyle/>
+          <a:p>
+            <a:pPr marL="0" indent="0">
+              <a:buNone/>
+            </a:pPr>
+            <a:r>
+              <a:rPr lang="de-DE" b="1" dirty="0"/>
+              <a:t>Verwendung mit </a:t>
+            </a:r>
+            <a:r>
+              <a:rPr lang="de-DE" b="1" dirty="0" err="1"/>
+              <a:t>GitLab</a:t>
+            </a:r>
+            <a:endParaRPr lang="de-DE" b="1" dirty="0"/>
+          </a:p>
+          <a:p>
+            <a:pPr>
+              <a:buFont typeface="Arial" panose="020B0604020202020204" pitchFamily="34" charset="0"/>
+              <a:buChar char="•"/>
+            </a:pPr>
+            <a:r>
+              <a:rPr lang="de-DE" dirty="0"/>
+              <a:t>Authentifizierung mit der Container Registry</a:t>
+            </a:r>
+          </a:p>
+          <a:p>
+            <a:pPr>
+              <a:buFont typeface="Arial" panose="020B0604020202020204" pitchFamily="34" charset="0"/>
+              <a:buChar char="•"/>
+            </a:pPr>
+            <a:r>
+              <a:rPr lang="de-DE" dirty="0" err="1"/>
+              <a:t>GitLab</a:t>
+            </a:r>
+            <a:r>
+              <a:rPr lang="de-DE" dirty="0"/>
+              <a:t> CI/CD zum authentifizieren</a:t>
+            </a:r>
+          </a:p>
+          <a:p>
+            <a:pPr>
+              <a:buFont typeface="Arial" panose="020B0604020202020204" pitchFamily="34" charset="0"/>
+              <a:buChar char="•"/>
+            </a:pPr>
+            <a:r>
+              <a:rPr lang="de-DE" dirty="0"/>
+              <a:t>Images bauen und pushen</a:t>
+            </a:r>
+          </a:p>
+          <a:p>
+            <a:pPr lvl="1">
+              <a:buFont typeface="Arial" panose="020B0604020202020204" pitchFamily="34" charset="0"/>
+              <a:buChar char="•"/>
+            </a:pPr>
+            <a:r>
+              <a:rPr lang="de-DE" dirty="0"/>
+              <a:t>Docker</a:t>
+            </a:r>
+          </a:p>
+          <a:p>
+            <a:pPr lvl="1">
+              <a:buFont typeface="Arial" panose="020B0604020202020204" pitchFamily="34" charset="0"/>
+              <a:buChar char="•"/>
+            </a:pPr>
+            <a:r>
+              <a:rPr lang="de-DE" dirty="0" err="1"/>
+              <a:t>GitLab</a:t>
+            </a:r>
+            <a:r>
+              <a:rPr lang="de-DE" dirty="0"/>
+              <a:t> CI/CD</a:t>
+            </a:r>
+          </a:p>
+          <a:p>
+            <a:pPr lvl="2">
+              <a:buFont typeface="Arial" panose="020B0604020202020204" pitchFamily="34" charset="0"/>
+              <a:buChar char="•"/>
+            </a:pPr>
+            <a:r>
+              <a:rPr lang="de-DE" sz="1800" dirty="0"/>
+              <a:t>Docker-in-Docker Container Image (Container Registry)</a:t>
+            </a:r>
+          </a:p>
+          <a:p>
+            <a:pPr lvl="2">
+              <a:buFont typeface="Arial" panose="020B0604020202020204" pitchFamily="34" charset="0"/>
+              <a:buChar char="•"/>
+            </a:pPr>
+            <a:r>
+              <a:rPr lang="de-DE" sz="1800" dirty="0"/>
+              <a:t>Docker-in-Docker Container Image (</a:t>
+            </a:r>
+            <a:r>
+              <a:rPr lang="de-DE" sz="1800" dirty="0" err="1"/>
+              <a:t>Dependency</a:t>
+            </a:r>
+            <a:r>
+              <a:rPr lang="de-DE" sz="1800" dirty="0"/>
+              <a:t> Proxy)</a:t>
+            </a:r>
+          </a:p>
+          <a:p>
+            <a:pPr>
+              <a:buFont typeface="Arial" panose="020B0604020202020204" pitchFamily="34" charset="0"/>
+              <a:buChar char="•"/>
+            </a:pPr>
+            <a:r>
+              <a:rPr lang="de-DE" dirty="0"/>
+              <a:t>Container Registry Beispiele mit </a:t>
+            </a:r>
+            <a:r>
+              <a:rPr lang="de-DE" dirty="0" err="1"/>
+              <a:t>GitLab</a:t>
+            </a:r>
+            <a:r>
+              <a:rPr lang="de-DE" dirty="0"/>
+              <a:t> CI/CD</a:t>
+            </a:r>
+          </a:p>
+          <a:p>
+            <a:pPr lvl="2">
+              <a:buFont typeface="Arial" panose="020B0604020202020204" pitchFamily="34" charset="0"/>
+              <a:buChar char="•"/>
+            </a:pPr>
+            <a:endParaRPr lang="de-DE" dirty="0"/>
+          </a:p>
+          <a:p>
+            <a:pPr lvl="2">
+              <a:buFont typeface="Arial" panose="020B0604020202020204" pitchFamily="34" charset="0"/>
+              <a:buChar char="•"/>
+            </a:pPr>
+            <a:endParaRPr lang="de-DE" dirty="0"/>
+          </a:p>
+          <a:p>
+            <a:pPr lvl="1">
+              <a:buFont typeface="Arial" panose="020B0604020202020204" pitchFamily="34" charset="0"/>
+              <a:buChar char="•"/>
+            </a:pPr>
+            <a:endParaRPr lang="de-DE" dirty="0"/>
+          </a:p>
+        </p:txBody>
+      </p:sp>
+    </p:spTree>
+    <p:extLst>
+      <p:ext uri="{BB962C8B-B14F-4D97-AF65-F5344CB8AC3E}">
+        <p14:creationId xmlns:p14="http://schemas.microsoft.com/office/powerpoint/2010/main" val="1944366019"/>
+      </p:ext>
+    </p:extLst>
   </p:cSld>
   <p:clrMapOvr>
     <a:masterClrMapping/>

</xml_diff>

<commit_message>
Tag-3_3: Use Cases für die jeweiligen Strategien
</commit_message>
<xml_diff>
--- a/slides/Tag-3_3-Release-und-Tagged-Images.pptx
+++ b/slides/Tag-3_3-Release-und-Tagged-Images.pptx
@@ -1074,6 +1074,24 @@
               <a:t>https://semver.org/lang/de/</a:t>
             </a:r>
           </a:p>
+          <a:p>
+            <a:endParaRPr lang="de-DE" dirty="0"/>
+          </a:p>
+          <a:p>
+            <a:r>
+              <a:rPr lang="de-DE" dirty="0"/>
+              <a:t>https://container-registry.com/posts/container-image-versioning/</a:t>
+            </a:r>
+          </a:p>
+          <a:p>
+            <a:endParaRPr lang="de-DE" dirty="0"/>
+          </a:p>
+          <a:p>
+            <a:r>
+              <a:rPr lang="de-DE" dirty="0"/>
+              <a:t>https://medium.com/@nirmalkushwah08/docker-image-tagging-strategy-4aa886fb4fcc</a:t>
+            </a:r>
+          </a:p>
         </p:txBody>
       </p:sp>
       <p:sp>
@@ -1333,10 +1351,73 @@
           <a:bodyPr/>
           <a:lstStyle/>
           <a:p>
-            <a:r>
-              <a:rPr lang="de-DE" dirty="0"/>
-              <a:t>https://semver.org/lang/de/</a:t>
-            </a:r>
+            <a:pPr algn="l"/>
+            <a:r>
+              <a:rPr lang="en-US" b="0" i="0">
+                <a:solidFill>
+                  <a:srgbClr val="3F3F3F"/>
+                </a:solidFill>
+                <a:effectLst/>
+                <a:latin typeface="open sans" panose="020B0606030504020204" pitchFamily="34" charset="0"/>
+              </a:rPr>
+              <a:t>A </a:t>
+            </a:r>
+            <a:r>
+              <a:rPr lang="en-US" b="1" i="0" dirty="0">
+                <a:solidFill>
+                  <a:srgbClr val="3F3F3F"/>
+                </a:solidFill>
+                <a:effectLst/>
+                <a:latin typeface="open sans semibold" panose="020F0502020204030204" pitchFamily="34" charset="0"/>
+              </a:rPr>
+              <a:t>timestamp</a:t>
+            </a:r>
+            <a:r>
+              <a:rPr lang="en-US" b="0" i="0" dirty="0">
+                <a:solidFill>
+                  <a:srgbClr val="3F3F3F"/>
+                </a:solidFill>
+                <a:effectLst/>
+                <a:latin typeface="open sans" panose="020B0606030504020204" pitchFamily="34" charset="0"/>
+              </a:rPr>
+              <a:t> is, indeed, an easy solution. But it has more drawbacks than advantages. It lacks a correlation to the included changeset(s) for the container image release since you cannot match it with the respective build.</a:t>
+            </a:r>
+          </a:p>
+          <a:p>
+            <a:pPr algn="l"/>
+            <a:r>
+              <a:rPr lang="en-US" b="0" i="0" dirty="0">
+                <a:solidFill>
+                  <a:srgbClr val="3F3F3F"/>
+                </a:solidFill>
+                <a:effectLst/>
+                <a:latin typeface="open sans" panose="020B0606030504020204" pitchFamily="34" charset="0"/>
+              </a:rPr>
+              <a:t>Do not forget about the evil </a:t>
+            </a:r>
+            <a:r>
+              <a:rPr lang="en-US" b="0" i="0" dirty="0" err="1">
+                <a:solidFill>
+                  <a:srgbClr val="3F3F3F"/>
+                </a:solidFill>
+                <a:effectLst/>
+                <a:latin typeface="open sans" panose="020B0606030504020204" pitchFamily="34" charset="0"/>
+              </a:rPr>
+              <a:t>timezone</a:t>
+            </a:r>
+            <a:r>
+              <a:rPr lang="en-US" b="0" i="0" dirty="0">
+                <a:solidFill>
+                  <a:srgbClr val="3F3F3F"/>
+                </a:solidFill>
+                <a:effectLst/>
+                <a:latin typeface="open sans" panose="020B0606030504020204" pitchFamily="34" charset="0"/>
+              </a:rPr>
+              <a:t>: which time was it actually in yours? Moreover, what if you created more than one image at exactly the same time? Last but not least, someone can push an image with the same tag just by adding it manually.</a:t>
+            </a:r>
+          </a:p>
+          <a:p>
+            <a:endParaRPr lang="de-DE" dirty="0"/>
           </a:p>
         </p:txBody>
       </p:sp>
@@ -1466,6 +1547,97 @@
 </file>
 
 <file path=ppt/notesSlides/notesSlide7.xml><?xml version="1.0" encoding="utf-8"?>
+<p:notes xmlns:a="http://schemas.openxmlformats.org/drawingml/2006/main" xmlns:r="http://schemas.openxmlformats.org/officeDocument/2006/relationships" xmlns:p="http://schemas.openxmlformats.org/presentationml/2006/main">
+  <p:cSld>
+    <p:spTree>
+      <p:nvGrpSpPr>
+        <p:cNvPr id="1" name=""/>
+        <p:cNvGrpSpPr/>
+        <p:nvPr/>
+      </p:nvGrpSpPr>
+      <p:grpSpPr>
+        <a:xfrm>
+          <a:off x="0" y="0"/>
+          <a:ext cx="0" cy="0"/>
+          <a:chOff x="0" y="0"/>
+          <a:chExt cx="0" cy="0"/>
+        </a:xfrm>
+      </p:grpSpPr>
+      <p:sp>
+        <p:nvSpPr>
+          <p:cNvPr id="2" name="Folienbildplatzhalter 1"/>
+          <p:cNvSpPr>
+            <a:spLocks noGrp="1" noRot="1" noChangeAspect="1"/>
+          </p:cNvSpPr>
+          <p:nvPr>
+            <p:ph type="sldImg"/>
+          </p:nvPr>
+        </p:nvSpPr>
+        <p:spPr/>
+      </p:sp>
+      <p:sp>
+        <p:nvSpPr>
+          <p:cNvPr id="3" name="Notizenplatzhalter 2"/>
+          <p:cNvSpPr>
+            <a:spLocks noGrp="1"/>
+          </p:cNvSpPr>
+          <p:nvPr>
+            <p:ph type="body" idx="1"/>
+          </p:nvPr>
+        </p:nvSpPr>
+        <p:spPr/>
+        <p:txBody>
+          <a:bodyPr/>
+          <a:lstStyle/>
+          <a:p>
+            <a:r>
+              <a:rPr lang="de-DE" dirty="0"/>
+              <a:t>https://container-registry.com/posts/container-image-versioning/</a:t>
+            </a:r>
+          </a:p>
+          <a:p>
+            <a:endParaRPr lang="de-DE" dirty="0"/>
+          </a:p>
+        </p:txBody>
+      </p:sp>
+      <p:sp>
+        <p:nvSpPr>
+          <p:cNvPr id="4" name="Foliennummernplatzhalter 3"/>
+          <p:cNvSpPr>
+            <a:spLocks noGrp="1"/>
+          </p:cNvSpPr>
+          <p:nvPr>
+            <p:ph type="sldNum" sz="quarter" idx="5"/>
+          </p:nvPr>
+        </p:nvSpPr>
+        <p:spPr/>
+        <p:txBody>
+          <a:bodyPr/>
+          <a:lstStyle/>
+          <a:p>
+            <a:fld id="{18182567-388C-4D33-8B7B-A651F195F118}" type="slidenum">
+              <a:rPr lang="de-DE" altLang="de-DE" smtClean="0"/>
+              <a:pPr/>
+              <a:t>20</a:t>
+            </a:fld>
+            <a:endParaRPr lang="de-DE" altLang="de-DE"/>
+          </a:p>
+        </p:txBody>
+      </p:sp>
+    </p:spTree>
+    <p:extLst>
+      <p:ext uri="{BB962C8B-B14F-4D97-AF65-F5344CB8AC3E}">
+        <p14:creationId xmlns:p14="http://schemas.microsoft.com/office/powerpoint/2010/main" val="758847513"/>
+      </p:ext>
+    </p:extLst>
+  </p:cSld>
+  <p:clrMapOvr>
+    <a:masterClrMapping/>
+  </p:clrMapOvr>
+</p:notes>
+</file>
+
+<file path=ppt/notesSlides/notesSlide8.xml><?xml version="1.0" encoding="utf-8"?>
 <p:notes xmlns:a="http://schemas.openxmlformats.org/drawingml/2006/main" xmlns:r="http://schemas.openxmlformats.org/officeDocument/2006/relationships" xmlns:p="http://schemas.openxmlformats.org/presentationml/2006/main">
   <p:cSld>
     <p:spTree>
@@ -6120,6 +6292,25 @@
               <a:buChar char="•"/>
             </a:pPr>
             <a:r>
+              <a:rPr lang="de-DE" dirty="0">
+                <a:sym typeface="Wingdings" panose="05000000000000000000" pitchFamily="2" charset="2"/>
+              </a:rPr>
+              <a:t>Release am 20.05.2024, Tagging  </a:t>
+            </a:r>
+            <a:r>
+              <a:rPr lang="de-DE" dirty="0">
+                <a:latin typeface="Consolas" panose="020B0609020204030204" pitchFamily="49" charset="0"/>
+                <a:sym typeface="Wingdings" panose="05000000000000000000" pitchFamily="2" charset="2"/>
+              </a:rPr>
+              <a:t>2.5.1-20240520</a:t>
+            </a:r>
+          </a:p>
+          <a:p>
+            <a:pPr lvl="1">
+              <a:buFont typeface="Arial" panose="020B0604020202020204" pitchFamily="34" charset="0"/>
+              <a:buChar char="•"/>
+            </a:pPr>
+            <a:r>
               <a:rPr lang="de-DE" dirty="0" err="1">
                 <a:sym typeface="Wingdings" panose="05000000000000000000" pitchFamily="2" charset="2"/>
               </a:rPr>
@@ -6907,11 +7098,7 @@
             </a:pPr>
             <a:r>
               <a:rPr lang="de-DE" b="1" dirty="0"/>
-              <a:t>Use Cases für </a:t>
-            </a:r>
-            <a:r>
-              <a:rPr lang="de-DE" b="1"/>
-              <a:t>die Strategien</a:t>
+              <a:t>Use Cases für die Strategien</a:t>
             </a:r>
           </a:p>
           <a:p>
@@ -6919,7 +7106,189 @@
               <a:buFont typeface="Arial" panose="020B0604020202020204" pitchFamily="34" charset="0"/>
               <a:buChar char="•"/>
             </a:pPr>
-            <a:endParaRPr lang="de-DE" b="1"/>
+            <a:r>
+              <a:rPr lang="de-DE" dirty="0"/>
+              <a:t>Rolling tags</a:t>
+            </a:r>
+          </a:p>
+          <a:p>
+            <a:pPr lvl="1">
+              <a:buFont typeface="Arial" panose="020B0604020202020204" pitchFamily="34" charset="0"/>
+              <a:buChar char="•"/>
+            </a:pPr>
+            <a:r>
+              <a:rPr lang="de-DE" dirty="0"/>
+              <a:t>Für Base Images, welche immer aktuell sein sollen</a:t>
+            </a:r>
+          </a:p>
+          <a:p>
+            <a:pPr>
+              <a:buFont typeface="Arial" panose="020B0604020202020204" pitchFamily="34" charset="0"/>
+              <a:buChar char="•"/>
+            </a:pPr>
+            <a:r>
+              <a:rPr lang="de-DE" dirty="0"/>
+              <a:t>Unique tags</a:t>
+            </a:r>
+          </a:p>
+          <a:p>
+            <a:pPr lvl="1">
+              <a:buFont typeface="Arial" panose="020B0604020202020204" pitchFamily="34" charset="0"/>
+              <a:buChar char="•"/>
+            </a:pPr>
+            <a:r>
+              <a:rPr lang="de-DE" dirty="0"/>
+              <a:t>Wenn Container in die </a:t>
+            </a:r>
+            <a:r>
+              <a:rPr lang="de-DE" dirty="0" err="1"/>
+              <a:t>Production</a:t>
+            </a:r>
+            <a:r>
+              <a:rPr lang="de-DE" dirty="0"/>
+              <a:t> gehen</a:t>
+            </a:r>
+          </a:p>
+          <a:p>
+            <a:pPr lvl="1">
+              <a:buFont typeface="Arial" panose="020B0604020202020204" pitchFamily="34" charset="0"/>
+              <a:buChar char="•"/>
+            </a:pPr>
+            <a:r>
+              <a:rPr lang="de-DE" dirty="0"/>
+              <a:t>Empfehlung: </a:t>
+            </a:r>
+            <a:r>
+              <a:rPr lang="de-DE" dirty="0" err="1"/>
+              <a:t>Build</a:t>
+            </a:r>
+            <a:r>
+              <a:rPr lang="de-DE" dirty="0"/>
+              <a:t> ID Tag</a:t>
+            </a:r>
+          </a:p>
+          <a:p>
+            <a:pPr>
+              <a:buFont typeface="Arial" panose="020B0604020202020204" pitchFamily="34" charset="0"/>
+              <a:buChar char="•"/>
+            </a:pPr>
+            <a:r>
+              <a:rPr lang="de-DE" dirty="0" err="1"/>
+              <a:t>SemVer</a:t>
+            </a:r>
+            <a:endParaRPr lang="de-DE" dirty="0"/>
+          </a:p>
+          <a:p>
+            <a:pPr lvl="1">
+              <a:buFont typeface="Arial" panose="020B0604020202020204" pitchFamily="34" charset="0"/>
+              <a:buChar char="•"/>
+            </a:pPr>
+            <a:r>
+              <a:rPr lang="de-DE" dirty="0"/>
+              <a:t>Koppelt ein Image ans darunterliegende </a:t>
+            </a:r>
+            <a:r>
+              <a:rPr lang="de-DE" dirty="0" err="1"/>
+              <a:t>Changeset</a:t>
+            </a:r>
+            <a:endParaRPr lang="de-DE" dirty="0"/>
+          </a:p>
+          <a:p>
+            <a:pPr lvl="1">
+              <a:buFont typeface="Arial" panose="020B0604020202020204" pitchFamily="34" charset="0"/>
+              <a:buChar char="•"/>
+            </a:pPr>
+            <a:r>
+              <a:rPr lang="de-DE" dirty="0"/>
+              <a:t>Kann automatisiert werden</a:t>
+            </a:r>
+          </a:p>
+          <a:p>
+            <a:pPr lvl="1">
+              <a:buFont typeface="Arial" panose="020B0604020202020204" pitchFamily="34" charset="0"/>
+              <a:buChar char="•"/>
+            </a:pPr>
+            <a:r>
+              <a:rPr lang="de-DE" dirty="0"/>
+              <a:t>Nutzer kriegen kompatibles </a:t>
+            </a:r>
+            <a:r>
+              <a:rPr lang="de-DE" dirty="0" err="1"/>
+              <a:t>Build</a:t>
+            </a:r>
+            <a:r>
+              <a:rPr lang="de-DE" dirty="0"/>
+              <a:t> für ihre Anwendungen</a:t>
+            </a:r>
+          </a:p>
+          <a:p>
+            <a:pPr>
+              <a:buFont typeface="Arial" panose="020B0604020202020204" pitchFamily="34" charset="0"/>
+              <a:buChar char="•"/>
+            </a:pPr>
+            <a:r>
+              <a:rPr lang="de-DE" dirty="0"/>
+              <a:t>Rolling und </a:t>
+            </a:r>
+            <a:r>
+              <a:rPr lang="de-DE" dirty="0" err="1"/>
+              <a:t>SemVer</a:t>
+            </a:r>
+            <a:r>
+              <a:rPr lang="de-DE" dirty="0"/>
+              <a:t> lassen sich gut kombinieren</a:t>
+            </a:r>
+          </a:p>
+          <a:p>
+            <a:pPr>
+              <a:buFont typeface="Arial" panose="020B0604020202020204" pitchFamily="34" charset="0"/>
+              <a:buChar char="•"/>
+            </a:pPr>
+            <a:r>
+              <a:rPr lang="de-DE" dirty="0"/>
+              <a:t>In kleinen Teams mit manuell überschaubaren Umfang</a:t>
+            </a:r>
+          </a:p>
+          <a:p>
+            <a:pPr lvl="1">
+              <a:buFont typeface="Arial" panose="020B0604020202020204" pitchFamily="34" charset="0"/>
+              <a:buChar char="•"/>
+            </a:pPr>
+            <a:r>
+              <a:rPr lang="de-DE" dirty="0"/>
+              <a:t>Digests, </a:t>
+            </a:r>
+            <a:r>
+              <a:rPr lang="de-DE" dirty="0" err="1"/>
+              <a:t>Git</a:t>
+            </a:r>
+            <a:r>
+              <a:rPr lang="de-DE" dirty="0"/>
+              <a:t> Commit Hash, </a:t>
+            </a:r>
+            <a:r>
+              <a:rPr lang="de-DE" dirty="0" err="1"/>
+              <a:t>Timestamps</a:t>
+            </a:r>
+            <a:r>
+              <a:rPr lang="de-DE" dirty="0"/>
+              <a:t> oder </a:t>
+            </a:r>
+            <a:r>
+              <a:rPr lang="de-DE" dirty="0" err="1"/>
+              <a:t>Build</a:t>
+            </a:r>
+            <a:r>
+              <a:rPr lang="de-DE" dirty="0"/>
+              <a:t> IDs nutzbar</a:t>
+            </a:r>
+          </a:p>
+          <a:p>
+            <a:pPr>
+              <a:buFont typeface="Arial" panose="020B0604020202020204" pitchFamily="34" charset="0"/>
+              <a:buChar char="•"/>
+            </a:pPr>
+            <a:endParaRPr lang="de-DE" dirty="0"/>
           </a:p>
         </p:txBody>
       </p:sp>

</xml_diff>

<commit_message>
Tag-3_3: Kleinigkeiten ergänzt, Verwendung mit GitLab angefangen
</commit_message>
<xml_diff>
--- a/slides/Tag-3_3-Release-und-Tagged-Images.pptx
+++ b/slides/Tag-3_3-Release-und-Tagged-Images.pptx
@@ -6,10 +6,10 @@
     <p:sldMasterId id="2147483649" r:id="rId2"/>
   </p:sldMasterIdLst>
   <p:notesMasterIdLst>
-    <p:notesMasterId r:id="rId24"/>
+    <p:notesMasterId r:id="rId28"/>
   </p:notesMasterIdLst>
   <p:handoutMasterIdLst>
-    <p:handoutMasterId r:id="rId25"/>
+    <p:handoutMasterId r:id="rId29"/>
   </p:handoutMasterIdLst>
   <p:sldIdLst>
     <p:sldId id="288" r:id="rId3"/>
@@ -33,6 +33,10 @@
     <p:sldId id="605" r:id="rId21"/>
     <p:sldId id="606" r:id="rId22"/>
     <p:sldId id="588" r:id="rId23"/>
+    <p:sldId id="607" r:id="rId24"/>
+    <p:sldId id="608" r:id="rId25"/>
+    <p:sldId id="609" r:id="rId26"/>
+    <p:sldId id="610" r:id="rId27"/>
   </p:sldIdLst>
   <p:sldSz cx="9144000" cy="6858000" type="screen4x3"/>
   <p:notesSz cx="6784975" cy="9921875"/>
@@ -984,7 +988,10 @@
           <a:bodyPr/>
           <a:lstStyle/>
           <a:p>
-            <a:endParaRPr lang="de-DE" dirty="0"/>
+            <a:r>
+              <a:rPr lang="de-DE" dirty="0"/>
+              <a:t>https://kodekloud.com/blog/docker-image-tag/</a:t>
+            </a:r>
           </a:p>
         </p:txBody>
       </p:sp>
@@ -1016,6 +1023,346 @@
     <p:extLst>
       <p:ext uri="{BB962C8B-B14F-4D97-AF65-F5344CB8AC3E}">
         <p14:creationId xmlns:p14="http://schemas.microsoft.com/office/powerpoint/2010/main" val="3711379124"/>
+      </p:ext>
+    </p:extLst>
+  </p:cSld>
+  <p:clrMapOvr>
+    <a:masterClrMapping/>
+  </p:clrMapOvr>
+</p:notes>
+</file>
+
+<file path=ppt/notesSlides/notesSlide10.xml><?xml version="1.0" encoding="utf-8"?>
+<p:notes xmlns:a="http://schemas.openxmlformats.org/drawingml/2006/main" xmlns:r="http://schemas.openxmlformats.org/officeDocument/2006/relationships" xmlns:p="http://schemas.openxmlformats.org/presentationml/2006/main">
+  <p:cSld>
+    <p:spTree>
+      <p:nvGrpSpPr>
+        <p:cNvPr id="1" name=""/>
+        <p:cNvGrpSpPr/>
+        <p:nvPr/>
+      </p:nvGrpSpPr>
+      <p:grpSpPr>
+        <a:xfrm>
+          <a:off x="0" y="0"/>
+          <a:ext cx="0" cy="0"/>
+          <a:chOff x="0" y="0"/>
+          <a:chExt cx="0" cy="0"/>
+        </a:xfrm>
+      </p:grpSpPr>
+      <p:sp>
+        <p:nvSpPr>
+          <p:cNvPr id="2" name="Folienbildplatzhalter 1"/>
+          <p:cNvSpPr>
+            <a:spLocks noGrp="1" noRot="1" noChangeAspect="1"/>
+          </p:cNvSpPr>
+          <p:nvPr>
+            <p:ph type="sldImg"/>
+          </p:nvPr>
+        </p:nvSpPr>
+        <p:spPr/>
+      </p:sp>
+      <p:sp>
+        <p:nvSpPr>
+          <p:cNvPr id="3" name="Notizenplatzhalter 2"/>
+          <p:cNvSpPr>
+            <a:spLocks noGrp="1"/>
+          </p:cNvSpPr>
+          <p:nvPr>
+            <p:ph type="body" idx="1"/>
+          </p:nvPr>
+        </p:nvSpPr>
+        <p:spPr/>
+        <p:txBody>
+          <a:bodyPr/>
+          <a:lstStyle/>
+          <a:p>
+            <a:endParaRPr lang="de-DE" dirty="0"/>
+          </a:p>
+        </p:txBody>
+      </p:sp>
+      <p:sp>
+        <p:nvSpPr>
+          <p:cNvPr id="4" name="Foliennummernplatzhalter 3"/>
+          <p:cNvSpPr>
+            <a:spLocks noGrp="1"/>
+          </p:cNvSpPr>
+          <p:nvPr>
+            <p:ph type="sldNum" sz="quarter" idx="5"/>
+          </p:nvPr>
+        </p:nvSpPr>
+        <p:spPr/>
+        <p:txBody>
+          <a:bodyPr/>
+          <a:lstStyle/>
+          <a:p>
+            <a:fld id="{18182567-388C-4D33-8B7B-A651F195F118}" type="slidenum">
+              <a:rPr lang="de-DE" altLang="de-DE" smtClean="0"/>
+              <a:pPr/>
+              <a:t>22</a:t>
+            </a:fld>
+            <a:endParaRPr lang="de-DE" altLang="de-DE"/>
+          </a:p>
+        </p:txBody>
+      </p:sp>
+    </p:spTree>
+    <p:extLst>
+      <p:ext uri="{BB962C8B-B14F-4D97-AF65-F5344CB8AC3E}">
+        <p14:creationId xmlns:p14="http://schemas.microsoft.com/office/powerpoint/2010/main" val="3496549736"/>
+      </p:ext>
+    </p:extLst>
+  </p:cSld>
+  <p:clrMapOvr>
+    <a:masterClrMapping/>
+  </p:clrMapOvr>
+</p:notes>
+</file>
+
+<file path=ppt/notesSlides/notesSlide11.xml><?xml version="1.0" encoding="utf-8"?>
+<p:notes xmlns:a="http://schemas.openxmlformats.org/drawingml/2006/main" xmlns:r="http://schemas.openxmlformats.org/officeDocument/2006/relationships" xmlns:p="http://schemas.openxmlformats.org/presentationml/2006/main">
+  <p:cSld>
+    <p:spTree>
+      <p:nvGrpSpPr>
+        <p:cNvPr id="1" name=""/>
+        <p:cNvGrpSpPr/>
+        <p:nvPr/>
+      </p:nvGrpSpPr>
+      <p:grpSpPr>
+        <a:xfrm>
+          <a:off x="0" y="0"/>
+          <a:ext cx="0" cy="0"/>
+          <a:chOff x="0" y="0"/>
+          <a:chExt cx="0" cy="0"/>
+        </a:xfrm>
+      </p:grpSpPr>
+      <p:sp>
+        <p:nvSpPr>
+          <p:cNvPr id="2" name="Folienbildplatzhalter 1"/>
+          <p:cNvSpPr>
+            <a:spLocks noGrp="1" noRot="1" noChangeAspect="1"/>
+          </p:cNvSpPr>
+          <p:nvPr>
+            <p:ph type="sldImg"/>
+          </p:nvPr>
+        </p:nvSpPr>
+        <p:spPr/>
+      </p:sp>
+      <p:sp>
+        <p:nvSpPr>
+          <p:cNvPr id="3" name="Notizenplatzhalter 2"/>
+          <p:cNvSpPr>
+            <a:spLocks noGrp="1"/>
+          </p:cNvSpPr>
+          <p:nvPr>
+            <p:ph type="body" idx="1"/>
+          </p:nvPr>
+        </p:nvSpPr>
+        <p:spPr/>
+        <p:txBody>
+          <a:bodyPr/>
+          <a:lstStyle/>
+          <a:p>
+            <a:endParaRPr lang="de-DE" dirty="0"/>
+          </a:p>
+        </p:txBody>
+      </p:sp>
+      <p:sp>
+        <p:nvSpPr>
+          <p:cNvPr id="4" name="Foliennummernplatzhalter 3"/>
+          <p:cNvSpPr>
+            <a:spLocks noGrp="1"/>
+          </p:cNvSpPr>
+          <p:nvPr>
+            <p:ph type="sldNum" sz="quarter" idx="5"/>
+          </p:nvPr>
+        </p:nvSpPr>
+        <p:spPr/>
+        <p:txBody>
+          <a:bodyPr/>
+          <a:lstStyle/>
+          <a:p>
+            <a:fld id="{18182567-388C-4D33-8B7B-A651F195F118}" type="slidenum">
+              <a:rPr lang="de-DE" altLang="de-DE" smtClean="0"/>
+              <a:pPr/>
+              <a:t>23</a:t>
+            </a:fld>
+            <a:endParaRPr lang="de-DE" altLang="de-DE"/>
+          </a:p>
+        </p:txBody>
+      </p:sp>
+    </p:spTree>
+    <p:extLst>
+      <p:ext uri="{BB962C8B-B14F-4D97-AF65-F5344CB8AC3E}">
+        <p14:creationId xmlns:p14="http://schemas.microsoft.com/office/powerpoint/2010/main" val="1133817201"/>
+      </p:ext>
+    </p:extLst>
+  </p:cSld>
+  <p:clrMapOvr>
+    <a:masterClrMapping/>
+  </p:clrMapOvr>
+</p:notes>
+</file>
+
+<file path=ppt/notesSlides/notesSlide12.xml><?xml version="1.0" encoding="utf-8"?>
+<p:notes xmlns:a="http://schemas.openxmlformats.org/drawingml/2006/main" xmlns:r="http://schemas.openxmlformats.org/officeDocument/2006/relationships" xmlns:p="http://schemas.openxmlformats.org/presentationml/2006/main">
+  <p:cSld>
+    <p:spTree>
+      <p:nvGrpSpPr>
+        <p:cNvPr id="1" name=""/>
+        <p:cNvGrpSpPr/>
+        <p:nvPr/>
+      </p:nvGrpSpPr>
+      <p:grpSpPr>
+        <a:xfrm>
+          <a:off x="0" y="0"/>
+          <a:ext cx="0" cy="0"/>
+          <a:chOff x="0" y="0"/>
+          <a:chExt cx="0" cy="0"/>
+        </a:xfrm>
+      </p:grpSpPr>
+      <p:sp>
+        <p:nvSpPr>
+          <p:cNvPr id="2" name="Folienbildplatzhalter 1"/>
+          <p:cNvSpPr>
+            <a:spLocks noGrp="1" noRot="1" noChangeAspect="1"/>
+          </p:cNvSpPr>
+          <p:nvPr>
+            <p:ph type="sldImg"/>
+          </p:nvPr>
+        </p:nvSpPr>
+        <p:spPr/>
+      </p:sp>
+      <p:sp>
+        <p:nvSpPr>
+          <p:cNvPr id="3" name="Notizenplatzhalter 2"/>
+          <p:cNvSpPr>
+            <a:spLocks noGrp="1"/>
+          </p:cNvSpPr>
+          <p:nvPr>
+            <p:ph type="body" idx="1"/>
+          </p:nvPr>
+        </p:nvSpPr>
+        <p:spPr/>
+        <p:txBody>
+          <a:bodyPr/>
+          <a:lstStyle/>
+          <a:p>
+            <a:endParaRPr lang="de-DE" dirty="0"/>
+          </a:p>
+        </p:txBody>
+      </p:sp>
+      <p:sp>
+        <p:nvSpPr>
+          <p:cNvPr id="4" name="Foliennummernplatzhalter 3"/>
+          <p:cNvSpPr>
+            <a:spLocks noGrp="1"/>
+          </p:cNvSpPr>
+          <p:nvPr>
+            <p:ph type="sldNum" sz="quarter" idx="5"/>
+          </p:nvPr>
+        </p:nvSpPr>
+        <p:spPr/>
+        <p:txBody>
+          <a:bodyPr/>
+          <a:lstStyle/>
+          <a:p>
+            <a:fld id="{18182567-388C-4D33-8B7B-A651F195F118}" type="slidenum">
+              <a:rPr lang="de-DE" altLang="de-DE" smtClean="0"/>
+              <a:pPr/>
+              <a:t>24</a:t>
+            </a:fld>
+            <a:endParaRPr lang="de-DE" altLang="de-DE"/>
+          </a:p>
+        </p:txBody>
+      </p:sp>
+    </p:spTree>
+    <p:extLst>
+      <p:ext uri="{BB962C8B-B14F-4D97-AF65-F5344CB8AC3E}">
+        <p14:creationId xmlns:p14="http://schemas.microsoft.com/office/powerpoint/2010/main" val="3378526490"/>
+      </p:ext>
+    </p:extLst>
+  </p:cSld>
+  <p:clrMapOvr>
+    <a:masterClrMapping/>
+  </p:clrMapOvr>
+</p:notes>
+</file>
+
+<file path=ppt/notesSlides/notesSlide13.xml><?xml version="1.0" encoding="utf-8"?>
+<p:notes xmlns:a="http://schemas.openxmlformats.org/drawingml/2006/main" xmlns:r="http://schemas.openxmlformats.org/officeDocument/2006/relationships" xmlns:p="http://schemas.openxmlformats.org/presentationml/2006/main">
+  <p:cSld>
+    <p:spTree>
+      <p:nvGrpSpPr>
+        <p:cNvPr id="1" name=""/>
+        <p:cNvGrpSpPr/>
+        <p:nvPr/>
+      </p:nvGrpSpPr>
+      <p:grpSpPr>
+        <a:xfrm>
+          <a:off x="0" y="0"/>
+          <a:ext cx="0" cy="0"/>
+          <a:chOff x="0" y="0"/>
+          <a:chExt cx="0" cy="0"/>
+        </a:xfrm>
+      </p:grpSpPr>
+      <p:sp>
+        <p:nvSpPr>
+          <p:cNvPr id="2" name="Folienbildplatzhalter 1"/>
+          <p:cNvSpPr>
+            <a:spLocks noGrp="1" noRot="1" noChangeAspect="1"/>
+          </p:cNvSpPr>
+          <p:nvPr>
+            <p:ph type="sldImg"/>
+          </p:nvPr>
+        </p:nvSpPr>
+        <p:spPr/>
+      </p:sp>
+      <p:sp>
+        <p:nvSpPr>
+          <p:cNvPr id="3" name="Notizenplatzhalter 2"/>
+          <p:cNvSpPr>
+            <a:spLocks noGrp="1"/>
+          </p:cNvSpPr>
+          <p:nvPr>
+            <p:ph type="body" idx="1"/>
+          </p:nvPr>
+        </p:nvSpPr>
+        <p:spPr/>
+        <p:txBody>
+          <a:bodyPr/>
+          <a:lstStyle/>
+          <a:p>
+            <a:endParaRPr lang="de-DE" dirty="0"/>
+          </a:p>
+        </p:txBody>
+      </p:sp>
+      <p:sp>
+        <p:nvSpPr>
+          <p:cNvPr id="4" name="Foliennummernplatzhalter 3"/>
+          <p:cNvSpPr>
+            <a:spLocks noGrp="1"/>
+          </p:cNvSpPr>
+          <p:nvPr>
+            <p:ph type="sldNum" sz="quarter" idx="5"/>
+          </p:nvPr>
+        </p:nvSpPr>
+        <p:spPr/>
+        <p:txBody>
+          <a:bodyPr/>
+          <a:lstStyle/>
+          <a:p>
+            <a:fld id="{18182567-388C-4D33-8B7B-A651F195F118}" type="slidenum">
+              <a:rPr lang="de-DE" altLang="de-DE" smtClean="0"/>
+              <a:pPr/>
+              <a:t>25</a:t>
+            </a:fld>
+            <a:endParaRPr lang="de-DE" altLang="de-DE"/>
+          </a:p>
+        </p:txBody>
+      </p:sp>
+    </p:spTree>
+    <p:extLst>
+      <p:ext uri="{BB962C8B-B14F-4D97-AF65-F5344CB8AC3E}">
+        <p14:creationId xmlns:p14="http://schemas.microsoft.com/office/powerpoint/2010/main" val="511039819"/>
       </p:ext>
     </p:extLst>
   </p:cSld>
@@ -1071,25 +1418,7 @@
           <a:p>
             <a:r>
               <a:rPr lang="de-DE" dirty="0"/>
-              <a:t>https://semver.org/lang/de/</a:t>
-            </a:r>
-          </a:p>
-          <a:p>
-            <a:endParaRPr lang="de-DE" dirty="0"/>
-          </a:p>
-          <a:p>
-            <a:r>
-              <a:rPr lang="de-DE" dirty="0"/>
-              <a:t>https://container-registry.com/posts/container-image-versioning/</a:t>
-            </a:r>
-          </a:p>
-          <a:p>
-            <a:endParaRPr lang="de-DE" dirty="0"/>
-          </a:p>
-          <a:p>
-            <a:r>
-              <a:rPr lang="de-DE" dirty="0"/>
-              <a:t>https://medium.com/@nirmalkushwah08/docker-image-tagging-strategy-4aa886fb4fcc</a:t>
+              <a:t>https://kodekloud.com/blog/docker-image-tag/</a:t>
             </a:r>
           </a:p>
         </p:txBody>
@@ -1112,7 +1441,7 @@
             <a:fld id="{18182567-388C-4D33-8B7B-A651F195F118}" type="slidenum">
               <a:rPr lang="de-DE" altLang="de-DE" smtClean="0"/>
               <a:pPr/>
-              <a:t>12</a:t>
+              <a:t>8</a:t>
             </a:fld>
             <a:endParaRPr lang="de-DE" altLang="de-DE"/>
           </a:p>
@@ -1121,7 +1450,7 @@
     </p:spTree>
     <p:extLst>
       <p:ext uri="{BB962C8B-B14F-4D97-AF65-F5344CB8AC3E}">
-        <p14:creationId xmlns:p14="http://schemas.microsoft.com/office/powerpoint/2010/main" val="3489991838"/>
+        <p14:creationId xmlns:p14="http://schemas.microsoft.com/office/powerpoint/2010/main" val="4220598971"/>
       </p:ext>
     </p:extLst>
   </p:cSld>
@@ -1180,6 +1509,24 @@
               <a:t>https://semver.org/lang/de/</a:t>
             </a:r>
           </a:p>
+          <a:p>
+            <a:endParaRPr lang="de-DE" dirty="0"/>
+          </a:p>
+          <a:p>
+            <a:r>
+              <a:rPr lang="de-DE" dirty="0"/>
+              <a:t>https://container-registry.com/posts/container-image-versioning/</a:t>
+            </a:r>
+          </a:p>
+          <a:p>
+            <a:endParaRPr lang="de-DE" dirty="0"/>
+          </a:p>
+          <a:p>
+            <a:r>
+              <a:rPr lang="de-DE" dirty="0"/>
+              <a:t>https://medium.com/@nirmalkushwah08/docker-image-tagging-strategy-4aa886fb4fcc</a:t>
+            </a:r>
+          </a:p>
         </p:txBody>
       </p:sp>
       <p:sp>
@@ -1200,7 +1547,7 @@
             <a:fld id="{18182567-388C-4D33-8B7B-A651F195F118}" type="slidenum">
               <a:rPr lang="de-DE" altLang="de-DE" smtClean="0"/>
               <a:pPr/>
-              <a:t>13</a:t>
+              <a:t>12</a:t>
             </a:fld>
             <a:endParaRPr lang="de-DE" altLang="de-DE"/>
           </a:p>
@@ -1209,7 +1556,7 @@
     </p:spTree>
     <p:extLst>
       <p:ext uri="{BB962C8B-B14F-4D97-AF65-F5344CB8AC3E}">
-        <p14:creationId xmlns:p14="http://schemas.microsoft.com/office/powerpoint/2010/main" val="3085793975"/>
+        <p14:creationId xmlns:p14="http://schemas.microsoft.com/office/powerpoint/2010/main" val="3489991838"/>
       </p:ext>
     </p:extLst>
   </p:cSld>
@@ -1288,7 +1635,7 @@
             <a:fld id="{18182567-388C-4D33-8B7B-A651F195F118}" type="slidenum">
               <a:rPr lang="de-DE" altLang="de-DE" smtClean="0"/>
               <a:pPr/>
-              <a:t>17</a:t>
+              <a:t>13</a:t>
             </a:fld>
             <a:endParaRPr lang="de-DE" altLang="de-DE"/>
           </a:p>
@@ -1297,7 +1644,7 @@
     </p:spTree>
     <p:extLst>
       <p:ext uri="{BB962C8B-B14F-4D97-AF65-F5344CB8AC3E}">
-        <p14:creationId xmlns:p14="http://schemas.microsoft.com/office/powerpoint/2010/main" val="8064563"/>
+        <p14:creationId xmlns:p14="http://schemas.microsoft.com/office/powerpoint/2010/main" val="3085793975"/>
       </p:ext>
     </p:extLst>
   </p:cSld>
@@ -1351,73 +1698,10 @@
           <a:bodyPr/>
           <a:lstStyle/>
           <a:p>
-            <a:pPr algn="l"/>
-            <a:r>
-              <a:rPr lang="en-US" b="0" i="0">
-                <a:solidFill>
-                  <a:srgbClr val="3F3F3F"/>
-                </a:solidFill>
-                <a:effectLst/>
-                <a:latin typeface="open sans" panose="020B0606030504020204" pitchFamily="34" charset="0"/>
-              </a:rPr>
-              <a:t>A </a:t>
-            </a:r>
-            <a:r>
-              <a:rPr lang="en-US" b="1" i="0" dirty="0">
-                <a:solidFill>
-                  <a:srgbClr val="3F3F3F"/>
-                </a:solidFill>
-                <a:effectLst/>
-                <a:latin typeface="open sans semibold" panose="020F0502020204030204" pitchFamily="34" charset="0"/>
-              </a:rPr>
-              <a:t>timestamp</a:t>
-            </a:r>
-            <a:r>
-              <a:rPr lang="en-US" b="0" i="0" dirty="0">
-                <a:solidFill>
-                  <a:srgbClr val="3F3F3F"/>
-                </a:solidFill>
-                <a:effectLst/>
-                <a:latin typeface="open sans" panose="020B0606030504020204" pitchFamily="34" charset="0"/>
-              </a:rPr>
-              <a:t> is, indeed, an easy solution. But it has more drawbacks than advantages. It lacks a correlation to the included changeset(s) for the container image release since you cannot match it with the respective build.</a:t>
-            </a:r>
-          </a:p>
-          <a:p>
-            <a:pPr algn="l"/>
-            <a:r>
-              <a:rPr lang="en-US" b="0" i="0" dirty="0">
-                <a:solidFill>
-                  <a:srgbClr val="3F3F3F"/>
-                </a:solidFill>
-                <a:effectLst/>
-                <a:latin typeface="open sans" panose="020B0606030504020204" pitchFamily="34" charset="0"/>
-              </a:rPr>
-              <a:t>Do not forget about the evil </a:t>
-            </a:r>
-            <a:r>
-              <a:rPr lang="en-US" b="0" i="0" dirty="0" err="1">
-                <a:solidFill>
-                  <a:srgbClr val="3F3F3F"/>
-                </a:solidFill>
-                <a:effectLst/>
-                <a:latin typeface="open sans" panose="020B0606030504020204" pitchFamily="34" charset="0"/>
-              </a:rPr>
-              <a:t>timezone</a:t>
-            </a:r>
-            <a:r>
-              <a:rPr lang="en-US" b="0" i="0" dirty="0">
-                <a:solidFill>
-                  <a:srgbClr val="3F3F3F"/>
-                </a:solidFill>
-                <a:effectLst/>
-                <a:latin typeface="open sans" panose="020B0606030504020204" pitchFamily="34" charset="0"/>
-              </a:rPr>
-              <a:t>: which time was it actually in yours? Moreover, what if you created more than one image at exactly the same time? Last but not least, someone can push an image with the same tag just by adding it manually.</a:t>
-            </a:r>
-          </a:p>
-          <a:p>
-            <a:endParaRPr lang="de-DE" dirty="0"/>
+            <a:r>
+              <a:rPr lang="de-DE" dirty="0"/>
+              <a:t>https://semver.org/lang/de/</a:t>
+            </a:r>
           </a:p>
         </p:txBody>
       </p:sp>
@@ -1439,7 +1723,7 @@
             <a:fld id="{18182567-388C-4D33-8B7B-A651F195F118}" type="slidenum">
               <a:rPr lang="de-DE" altLang="de-DE" smtClean="0"/>
               <a:pPr/>
-              <a:t>18</a:t>
+              <a:t>17</a:t>
             </a:fld>
             <a:endParaRPr lang="de-DE" altLang="de-DE"/>
           </a:p>
@@ -1448,7 +1732,7 @@
     </p:spTree>
     <p:extLst>
       <p:ext uri="{BB962C8B-B14F-4D97-AF65-F5344CB8AC3E}">
-        <p14:creationId xmlns:p14="http://schemas.microsoft.com/office/powerpoint/2010/main" val="3532218253"/>
+        <p14:creationId xmlns:p14="http://schemas.microsoft.com/office/powerpoint/2010/main" val="8064563"/>
       </p:ext>
     </p:extLst>
   </p:cSld>
@@ -1502,10 +1786,73 @@
           <a:bodyPr/>
           <a:lstStyle/>
           <a:p>
-            <a:r>
-              <a:rPr lang="de-DE" dirty="0"/>
-              <a:t>https://semver.org/lang/de/</a:t>
-            </a:r>
+            <a:pPr algn="l"/>
+            <a:r>
+              <a:rPr lang="en-US" b="0" i="0" dirty="0">
+                <a:solidFill>
+                  <a:srgbClr val="3F3F3F"/>
+                </a:solidFill>
+                <a:effectLst/>
+                <a:latin typeface="open sans" panose="020B0606030504020204" pitchFamily="34" charset="0"/>
+              </a:rPr>
+              <a:t>A </a:t>
+            </a:r>
+            <a:r>
+              <a:rPr lang="en-US" b="1" i="0" dirty="0">
+                <a:solidFill>
+                  <a:srgbClr val="3F3F3F"/>
+                </a:solidFill>
+                <a:effectLst/>
+                <a:latin typeface="open sans semibold" panose="020F0502020204030204" pitchFamily="34" charset="0"/>
+              </a:rPr>
+              <a:t>timestamp</a:t>
+            </a:r>
+            <a:r>
+              <a:rPr lang="en-US" b="0" i="0" dirty="0">
+                <a:solidFill>
+                  <a:srgbClr val="3F3F3F"/>
+                </a:solidFill>
+                <a:effectLst/>
+                <a:latin typeface="open sans" panose="020B0606030504020204" pitchFamily="34" charset="0"/>
+              </a:rPr>
+              <a:t> is, indeed, an easy solution. But it has more drawbacks than advantages. It lacks a correlation to the included changeset(s) for the container image release since you cannot match it with the respective build.</a:t>
+            </a:r>
+          </a:p>
+          <a:p>
+            <a:pPr algn="l"/>
+            <a:r>
+              <a:rPr lang="en-US" b="0" i="0" dirty="0">
+                <a:solidFill>
+                  <a:srgbClr val="3F3F3F"/>
+                </a:solidFill>
+                <a:effectLst/>
+                <a:latin typeface="open sans" panose="020B0606030504020204" pitchFamily="34" charset="0"/>
+              </a:rPr>
+              <a:t>Do not forget about the evil </a:t>
+            </a:r>
+            <a:r>
+              <a:rPr lang="en-US" b="0" i="0" dirty="0" err="1">
+                <a:solidFill>
+                  <a:srgbClr val="3F3F3F"/>
+                </a:solidFill>
+                <a:effectLst/>
+                <a:latin typeface="open sans" panose="020B0606030504020204" pitchFamily="34" charset="0"/>
+              </a:rPr>
+              <a:t>timezone</a:t>
+            </a:r>
+            <a:r>
+              <a:rPr lang="en-US" b="0" i="0" dirty="0">
+                <a:solidFill>
+                  <a:srgbClr val="3F3F3F"/>
+                </a:solidFill>
+                <a:effectLst/>
+                <a:latin typeface="open sans" panose="020B0606030504020204" pitchFamily="34" charset="0"/>
+              </a:rPr>
+              <a:t>: which time was it actually in yours? Moreover, what if you created more than one image at exactly the same time? Last but not least, someone can push an image with the same tag just by adding it manually.</a:t>
+            </a:r>
+          </a:p>
+          <a:p>
+            <a:endParaRPr lang="de-DE" dirty="0"/>
           </a:p>
         </p:txBody>
       </p:sp>
@@ -1527,7 +1874,7 @@
             <a:fld id="{18182567-388C-4D33-8B7B-A651F195F118}" type="slidenum">
               <a:rPr lang="de-DE" altLang="de-DE" smtClean="0"/>
               <a:pPr/>
-              <a:t>19</a:t>
+              <a:t>18</a:t>
             </a:fld>
             <a:endParaRPr lang="de-DE" altLang="de-DE"/>
           </a:p>
@@ -1536,7 +1883,7 @@
     </p:spTree>
     <p:extLst>
       <p:ext uri="{BB962C8B-B14F-4D97-AF65-F5344CB8AC3E}">
-        <p14:creationId xmlns:p14="http://schemas.microsoft.com/office/powerpoint/2010/main" val="624751404"/>
+        <p14:creationId xmlns:p14="http://schemas.microsoft.com/office/powerpoint/2010/main" val="3532218253"/>
       </p:ext>
     </p:extLst>
   </p:cSld>
@@ -1592,11 +1939,8 @@
           <a:p>
             <a:r>
               <a:rPr lang="de-DE" dirty="0"/>
-              <a:t>https://container-registry.com/posts/container-image-versioning/</a:t>
-            </a:r>
-          </a:p>
-          <a:p>
-            <a:endParaRPr lang="de-DE" dirty="0"/>
+              <a:t>https://semver.org/lang/de/</a:t>
+            </a:r>
           </a:p>
         </p:txBody>
       </p:sp>
@@ -1618,6 +1962,97 @@
             <a:fld id="{18182567-388C-4D33-8B7B-A651F195F118}" type="slidenum">
               <a:rPr lang="de-DE" altLang="de-DE" smtClean="0"/>
               <a:pPr/>
+              <a:t>19</a:t>
+            </a:fld>
+            <a:endParaRPr lang="de-DE" altLang="de-DE"/>
+          </a:p>
+        </p:txBody>
+      </p:sp>
+    </p:spTree>
+    <p:extLst>
+      <p:ext uri="{BB962C8B-B14F-4D97-AF65-F5344CB8AC3E}">
+        <p14:creationId xmlns:p14="http://schemas.microsoft.com/office/powerpoint/2010/main" val="624751404"/>
+      </p:ext>
+    </p:extLst>
+  </p:cSld>
+  <p:clrMapOvr>
+    <a:masterClrMapping/>
+  </p:clrMapOvr>
+</p:notes>
+</file>
+
+<file path=ppt/notesSlides/notesSlide8.xml><?xml version="1.0" encoding="utf-8"?>
+<p:notes xmlns:a="http://schemas.openxmlformats.org/drawingml/2006/main" xmlns:r="http://schemas.openxmlformats.org/officeDocument/2006/relationships" xmlns:p="http://schemas.openxmlformats.org/presentationml/2006/main">
+  <p:cSld>
+    <p:spTree>
+      <p:nvGrpSpPr>
+        <p:cNvPr id="1" name=""/>
+        <p:cNvGrpSpPr/>
+        <p:nvPr/>
+      </p:nvGrpSpPr>
+      <p:grpSpPr>
+        <a:xfrm>
+          <a:off x="0" y="0"/>
+          <a:ext cx="0" cy="0"/>
+          <a:chOff x="0" y="0"/>
+          <a:chExt cx="0" cy="0"/>
+        </a:xfrm>
+      </p:grpSpPr>
+      <p:sp>
+        <p:nvSpPr>
+          <p:cNvPr id="2" name="Folienbildplatzhalter 1"/>
+          <p:cNvSpPr>
+            <a:spLocks noGrp="1" noRot="1" noChangeAspect="1"/>
+          </p:cNvSpPr>
+          <p:nvPr>
+            <p:ph type="sldImg"/>
+          </p:nvPr>
+        </p:nvSpPr>
+        <p:spPr/>
+      </p:sp>
+      <p:sp>
+        <p:nvSpPr>
+          <p:cNvPr id="3" name="Notizenplatzhalter 2"/>
+          <p:cNvSpPr>
+            <a:spLocks noGrp="1"/>
+          </p:cNvSpPr>
+          <p:nvPr>
+            <p:ph type="body" idx="1"/>
+          </p:nvPr>
+        </p:nvSpPr>
+        <p:spPr/>
+        <p:txBody>
+          <a:bodyPr/>
+          <a:lstStyle/>
+          <a:p>
+            <a:r>
+              <a:rPr lang="de-DE" dirty="0"/>
+              <a:t>https://container-registry.com/posts/container-image-versioning/</a:t>
+            </a:r>
+          </a:p>
+          <a:p>
+            <a:endParaRPr lang="de-DE" dirty="0"/>
+          </a:p>
+        </p:txBody>
+      </p:sp>
+      <p:sp>
+        <p:nvSpPr>
+          <p:cNvPr id="4" name="Foliennummernplatzhalter 3"/>
+          <p:cNvSpPr>
+            <a:spLocks noGrp="1"/>
+          </p:cNvSpPr>
+          <p:nvPr>
+            <p:ph type="sldNum" sz="quarter" idx="5"/>
+          </p:nvPr>
+        </p:nvSpPr>
+        <p:spPr/>
+        <p:txBody>
+          <a:bodyPr/>
+          <a:lstStyle/>
+          <a:p>
+            <a:fld id="{18182567-388C-4D33-8B7B-A651F195F118}" type="slidenum">
+              <a:rPr lang="de-DE" altLang="de-DE" smtClean="0"/>
+              <a:pPr/>
               <a:t>20</a:t>
             </a:fld>
             <a:endParaRPr lang="de-DE" altLang="de-DE"/>
@@ -1637,7 +2072,7 @@
 </p:notes>
 </file>
 
-<file path=ppt/notesSlides/notesSlide8.xml><?xml version="1.0" encoding="utf-8"?>
+<file path=ppt/notesSlides/notesSlide9.xml><?xml version="1.0" encoding="utf-8"?>
 <p:notes xmlns:a="http://schemas.openxmlformats.org/drawingml/2006/main" xmlns:r="http://schemas.openxmlformats.org/officeDocument/2006/relationships" xmlns:p="http://schemas.openxmlformats.org/presentationml/2006/main">
   <p:cSld>
     <p:spTree>
@@ -7533,6 +7968,472 @@
 </p:sld>
 </file>
 
+<file path=ppt/slides/slide22.xml><?xml version="1.0" encoding="utf-8"?>
+<p:sld xmlns:a="http://schemas.openxmlformats.org/drawingml/2006/main" xmlns:r="http://schemas.openxmlformats.org/officeDocument/2006/relationships" xmlns:p="http://schemas.openxmlformats.org/presentationml/2006/main">
+  <p:cSld>
+    <p:spTree>
+      <p:nvGrpSpPr>
+        <p:cNvPr id="1" name=""/>
+        <p:cNvGrpSpPr/>
+        <p:nvPr/>
+      </p:nvGrpSpPr>
+      <p:grpSpPr>
+        <a:xfrm>
+          <a:off x="0" y="0"/>
+          <a:ext cx="0" cy="0"/>
+          <a:chOff x="0" y="0"/>
+          <a:chExt cx="0" cy="0"/>
+        </a:xfrm>
+      </p:grpSpPr>
+      <p:sp>
+        <p:nvSpPr>
+          <p:cNvPr id="2" name="Titel 1">
+            <a:extLst>
+              <a:ext uri="{FF2B5EF4-FFF2-40B4-BE49-F238E27FC236}">
+                <a16:creationId xmlns:a16="http://schemas.microsoft.com/office/drawing/2014/main" id="{184AFD09-5210-6F86-C2FD-BBC016D382A6}"/>
+              </a:ext>
+            </a:extLst>
+          </p:cNvPr>
+          <p:cNvSpPr>
+            <a:spLocks noGrp="1"/>
+          </p:cNvSpPr>
+          <p:nvPr>
+            <p:ph type="title"/>
+          </p:nvPr>
+        </p:nvSpPr>
+        <p:spPr/>
+        <p:txBody>
+          <a:bodyPr/>
+          <a:lstStyle/>
+          <a:p>
+            <a:r>
+              <a:rPr lang="de-DE" cap="none" dirty="0"/>
+              <a:t>Release- und </a:t>
+            </a:r>
+            <a:r>
+              <a:rPr lang="de-DE" cap="none" dirty="0" err="1"/>
+              <a:t>Tagged</a:t>
+            </a:r>
+            <a:r>
+              <a:rPr lang="de-DE" cap="none" dirty="0"/>
+              <a:t>-Images</a:t>
+            </a:r>
+            <a:endParaRPr lang="de-DE" dirty="0"/>
+          </a:p>
+        </p:txBody>
+      </p:sp>
+      <p:sp>
+        <p:nvSpPr>
+          <p:cNvPr id="6" name="Inhaltsplatzhalter 5">
+            <a:extLst>
+              <a:ext uri="{FF2B5EF4-FFF2-40B4-BE49-F238E27FC236}">
+                <a16:creationId xmlns:a16="http://schemas.microsoft.com/office/drawing/2014/main" id="{D2412707-84D3-F572-4709-FD9A95F28E5B}"/>
+              </a:ext>
+            </a:extLst>
+          </p:cNvPr>
+          <p:cNvSpPr>
+            <a:spLocks noGrp="1"/>
+          </p:cNvSpPr>
+          <p:nvPr>
+            <p:ph idx="1"/>
+          </p:nvPr>
+        </p:nvSpPr>
+        <p:spPr/>
+        <p:txBody>
+          <a:bodyPr/>
+          <a:lstStyle/>
+          <a:p>
+            <a:pPr marL="0" indent="0">
+              <a:buNone/>
+            </a:pPr>
+            <a:r>
+              <a:rPr lang="de-DE" b="1" dirty="0"/>
+              <a:t>Authentifizierung mit der Container Registry</a:t>
+            </a:r>
+          </a:p>
+          <a:p>
+            <a:pPr lvl="2">
+              <a:buFont typeface="Arial" panose="020B0604020202020204" pitchFamily="34" charset="0"/>
+              <a:buChar char="•"/>
+            </a:pPr>
+            <a:endParaRPr lang="de-DE" dirty="0"/>
+          </a:p>
+          <a:p>
+            <a:pPr lvl="2">
+              <a:buFont typeface="Arial" panose="020B0604020202020204" pitchFamily="34" charset="0"/>
+              <a:buChar char="•"/>
+            </a:pPr>
+            <a:endParaRPr lang="de-DE" dirty="0"/>
+          </a:p>
+          <a:p>
+            <a:pPr lvl="1">
+              <a:buFont typeface="Arial" panose="020B0604020202020204" pitchFamily="34" charset="0"/>
+              <a:buChar char="•"/>
+            </a:pPr>
+            <a:endParaRPr lang="de-DE" dirty="0"/>
+          </a:p>
+        </p:txBody>
+      </p:sp>
+    </p:spTree>
+    <p:extLst>
+      <p:ext uri="{BB962C8B-B14F-4D97-AF65-F5344CB8AC3E}">
+        <p14:creationId xmlns:p14="http://schemas.microsoft.com/office/powerpoint/2010/main" val="1809655481"/>
+      </p:ext>
+    </p:extLst>
+  </p:cSld>
+  <p:clrMapOvr>
+    <a:masterClrMapping/>
+  </p:clrMapOvr>
+</p:sld>
+</file>
+
+<file path=ppt/slides/slide23.xml><?xml version="1.0" encoding="utf-8"?>
+<p:sld xmlns:a="http://schemas.openxmlformats.org/drawingml/2006/main" xmlns:r="http://schemas.openxmlformats.org/officeDocument/2006/relationships" xmlns:p="http://schemas.openxmlformats.org/presentationml/2006/main">
+  <p:cSld>
+    <p:spTree>
+      <p:nvGrpSpPr>
+        <p:cNvPr id="1" name=""/>
+        <p:cNvGrpSpPr/>
+        <p:nvPr/>
+      </p:nvGrpSpPr>
+      <p:grpSpPr>
+        <a:xfrm>
+          <a:off x="0" y="0"/>
+          <a:ext cx="0" cy="0"/>
+          <a:chOff x="0" y="0"/>
+          <a:chExt cx="0" cy="0"/>
+        </a:xfrm>
+      </p:grpSpPr>
+      <p:sp>
+        <p:nvSpPr>
+          <p:cNvPr id="2" name="Titel 1">
+            <a:extLst>
+              <a:ext uri="{FF2B5EF4-FFF2-40B4-BE49-F238E27FC236}">
+                <a16:creationId xmlns:a16="http://schemas.microsoft.com/office/drawing/2014/main" id="{184AFD09-5210-6F86-C2FD-BBC016D382A6}"/>
+              </a:ext>
+            </a:extLst>
+          </p:cNvPr>
+          <p:cNvSpPr>
+            <a:spLocks noGrp="1"/>
+          </p:cNvSpPr>
+          <p:nvPr>
+            <p:ph type="title"/>
+          </p:nvPr>
+        </p:nvSpPr>
+        <p:spPr/>
+        <p:txBody>
+          <a:bodyPr/>
+          <a:lstStyle/>
+          <a:p>
+            <a:r>
+              <a:rPr lang="de-DE" cap="none" dirty="0"/>
+              <a:t>Release- und </a:t>
+            </a:r>
+            <a:r>
+              <a:rPr lang="de-DE" cap="none" dirty="0" err="1"/>
+              <a:t>Tagged</a:t>
+            </a:r>
+            <a:r>
+              <a:rPr lang="de-DE" cap="none" dirty="0"/>
+              <a:t>-Images</a:t>
+            </a:r>
+            <a:endParaRPr lang="de-DE" dirty="0"/>
+          </a:p>
+        </p:txBody>
+      </p:sp>
+      <p:sp>
+        <p:nvSpPr>
+          <p:cNvPr id="6" name="Inhaltsplatzhalter 5">
+            <a:extLst>
+              <a:ext uri="{FF2B5EF4-FFF2-40B4-BE49-F238E27FC236}">
+                <a16:creationId xmlns:a16="http://schemas.microsoft.com/office/drawing/2014/main" id="{D2412707-84D3-F572-4709-FD9A95F28E5B}"/>
+              </a:ext>
+            </a:extLst>
+          </p:cNvPr>
+          <p:cNvSpPr>
+            <a:spLocks noGrp="1"/>
+          </p:cNvSpPr>
+          <p:nvPr>
+            <p:ph idx="1"/>
+          </p:nvPr>
+        </p:nvSpPr>
+        <p:spPr/>
+        <p:txBody>
+          <a:bodyPr/>
+          <a:lstStyle/>
+          <a:p>
+            <a:pPr marL="0" indent="0">
+              <a:buNone/>
+            </a:pPr>
+            <a:r>
+              <a:rPr lang="de-DE" b="1" dirty="0" err="1"/>
+              <a:t>GitLab</a:t>
+            </a:r>
+            <a:r>
+              <a:rPr lang="de-DE" b="1" dirty="0"/>
+              <a:t> CI/CD zum authentifizieren</a:t>
+            </a:r>
+            <a:endParaRPr lang="de-DE" dirty="0"/>
+          </a:p>
+          <a:p>
+            <a:pPr lvl="2">
+              <a:buFont typeface="Arial" panose="020B0604020202020204" pitchFamily="34" charset="0"/>
+              <a:buChar char="•"/>
+            </a:pPr>
+            <a:endParaRPr lang="de-DE" dirty="0"/>
+          </a:p>
+          <a:p>
+            <a:pPr lvl="1">
+              <a:buFont typeface="Arial" panose="020B0604020202020204" pitchFamily="34" charset="0"/>
+              <a:buChar char="•"/>
+            </a:pPr>
+            <a:endParaRPr lang="de-DE" dirty="0"/>
+          </a:p>
+        </p:txBody>
+      </p:sp>
+    </p:spTree>
+    <p:extLst>
+      <p:ext uri="{BB962C8B-B14F-4D97-AF65-F5344CB8AC3E}">
+        <p14:creationId xmlns:p14="http://schemas.microsoft.com/office/powerpoint/2010/main" val="1650913132"/>
+      </p:ext>
+    </p:extLst>
+  </p:cSld>
+  <p:clrMapOvr>
+    <a:masterClrMapping/>
+  </p:clrMapOvr>
+</p:sld>
+</file>
+
+<file path=ppt/slides/slide24.xml><?xml version="1.0" encoding="utf-8"?>
+<p:sld xmlns:a="http://schemas.openxmlformats.org/drawingml/2006/main" xmlns:r="http://schemas.openxmlformats.org/officeDocument/2006/relationships" xmlns:p="http://schemas.openxmlformats.org/presentationml/2006/main">
+  <p:cSld>
+    <p:spTree>
+      <p:nvGrpSpPr>
+        <p:cNvPr id="1" name=""/>
+        <p:cNvGrpSpPr/>
+        <p:nvPr/>
+      </p:nvGrpSpPr>
+      <p:grpSpPr>
+        <a:xfrm>
+          <a:off x="0" y="0"/>
+          <a:ext cx="0" cy="0"/>
+          <a:chOff x="0" y="0"/>
+          <a:chExt cx="0" cy="0"/>
+        </a:xfrm>
+      </p:grpSpPr>
+      <p:sp>
+        <p:nvSpPr>
+          <p:cNvPr id="2" name="Titel 1">
+            <a:extLst>
+              <a:ext uri="{FF2B5EF4-FFF2-40B4-BE49-F238E27FC236}">
+                <a16:creationId xmlns:a16="http://schemas.microsoft.com/office/drawing/2014/main" id="{184AFD09-5210-6F86-C2FD-BBC016D382A6}"/>
+              </a:ext>
+            </a:extLst>
+          </p:cNvPr>
+          <p:cNvSpPr>
+            <a:spLocks noGrp="1"/>
+          </p:cNvSpPr>
+          <p:nvPr>
+            <p:ph type="title"/>
+          </p:nvPr>
+        </p:nvSpPr>
+        <p:spPr/>
+        <p:txBody>
+          <a:bodyPr/>
+          <a:lstStyle/>
+          <a:p>
+            <a:r>
+              <a:rPr lang="de-DE" cap="none" dirty="0"/>
+              <a:t>Release- und </a:t>
+            </a:r>
+            <a:r>
+              <a:rPr lang="de-DE" cap="none" dirty="0" err="1"/>
+              <a:t>Tagged</a:t>
+            </a:r>
+            <a:r>
+              <a:rPr lang="de-DE" cap="none" dirty="0"/>
+              <a:t>-Images</a:t>
+            </a:r>
+            <a:endParaRPr lang="de-DE" dirty="0"/>
+          </a:p>
+        </p:txBody>
+      </p:sp>
+      <p:sp>
+        <p:nvSpPr>
+          <p:cNvPr id="6" name="Inhaltsplatzhalter 5">
+            <a:extLst>
+              <a:ext uri="{FF2B5EF4-FFF2-40B4-BE49-F238E27FC236}">
+                <a16:creationId xmlns:a16="http://schemas.microsoft.com/office/drawing/2014/main" id="{D2412707-84D3-F572-4709-FD9A95F28E5B}"/>
+              </a:ext>
+            </a:extLst>
+          </p:cNvPr>
+          <p:cNvSpPr>
+            <a:spLocks noGrp="1"/>
+          </p:cNvSpPr>
+          <p:nvPr>
+            <p:ph idx="1"/>
+          </p:nvPr>
+        </p:nvSpPr>
+        <p:spPr/>
+        <p:txBody>
+          <a:bodyPr/>
+          <a:lstStyle/>
+          <a:p>
+            <a:pPr marL="0" indent="0">
+              <a:buNone/>
+            </a:pPr>
+            <a:r>
+              <a:rPr lang="de-DE" b="1" dirty="0"/>
+              <a:t>Images bauen und pushen</a:t>
+            </a:r>
+            <a:endParaRPr lang="de-DE" dirty="0"/>
+          </a:p>
+          <a:p>
+            <a:pPr lvl="2">
+              <a:buFont typeface="Arial" panose="020B0604020202020204" pitchFamily="34" charset="0"/>
+              <a:buChar char="•"/>
+            </a:pPr>
+            <a:endParaRPr lang="de-DE" dirty="0"/>
+          </a:p>
+          <a:p>
+            <a:pPr lvl="1">
+              <a:buFont typeface="Arial" panose="020B0604020202020204" pitchFamily="34" charset="0"/>
+              <a:buChar char="•"/>
+            </a:pPr>
+            <a:endParaRPr lang="de-DE" dirty="0"/>
+          </a:p>
+        </p:txBody>
+      </p:sp>
+    </p:spTree>
+    <p:extLst>
+      <p:ext uri="{BB962C8B-B14F-4D97-AF65-F5344CB8AC3E}">
+        <p14:creationId xmlns:p14="http://schemas.microsoft.com/office/powerpoint/2010/main" val="1954217682"/>
+      </p:ext>
+    </p:extLst>
+  </p:cSld>
+  <p:clrMapOvr>
+    <a:masterClrMapping/>
+  </p:clrMapOvr>
+</p:sld>
+</file>
+
+<file path=ppt/slides/slide25.xml><?xml version="1.0" encoding="utf-8"?>
+<p:sld xmlns:a="http://schemas.openxmlformats.org/drawingml/2006/main" xmlns:r="http://schemas.openxmlformats.org/officeDocument/2006/relationships" xmlns:p="http://schemas.openxmlformats.org/presentationml/2006/main">
+  <p:cSld>
+    <p:spTree>
+      <p:nvGrpSpPr>
+        <p:cNvPr id="1" name=""/>
+        <p:cNvGrpSpPr/>
+        <p:nvPr/>
+      </p:nvGrpSpPr>
+      <p:grpSpPr>
+        <a:xfrm>
+          <a:off x="0" y="0"/>
+          <a:ext cx="0" cy="0"/>
+          <a:chOff x="0" y="0"/>
+          <a:chExt cx="0" cy="0"/>
+        </a:xfrm>
+      </p:grpSpPr>
+      <p:sp>
+        <p:nvSpPr>
+          <p:cNvPr id="2" name="Titel 1">
+            <a:extLst>
+              <a:ext uri="{FF2B5EF4-FFF2-40B4-BE49-F238E27FC236}">
+                <a16:creationId xmlns:a16="http://schemas.microsoft.com/office/drawing/2014/main" id="{184AFD09-5210-6F86-C2FD-BBC016D382A6}"/>
+              </a:ext>
+            </a:extLst>
+          </p:cNvPr>
+          <p:cNvSpPr>
+            <a:spLocks noGrp="1"/>
+          </p:cNvSpPr>
+          <p:nvPr>
+            <p:ph type="title"/>
+          </p:nvPr>
+        </p:nvSpPr>
+        <p:spPr/>
+        <p:txBody>
+          <a:bodyPr/>
+          <a:lstStyle/>
+          <a:p>
+            <a:r>
+              <a:rPr lang="de-DE" cap="none" dirty="0"/>
+              <a:t>Release- und </a:t>
+            </a:r>
+            <a:r>
+              <a:rPr lang="de-DE" cap="none" dirty="0" err="1"/>
+              <a:t>Tagged</a:t>
+            </a:r>
+            <a:r>
+              <a:rPr lang="de-DE" cap="none" dirty="0"/>
+              <a:t>-Images</a:t>
+            </a:r>
+            <a:endParaRPr lang="de-DE" dirty="0"/>
+          </a:p>
+        </p:txBody>
+      </p:sp>
+      <p:sp>
+        <p:nvSpPr>
+          <p:cNvPr id="6" name="Inhaltsplatzhalter 5">
+            <a:extLst>
+              <a:ext uri="{FF2B5EF4-FFF2-40B4-BE49-F238E27FC236}">
+                <a16:creationId xmlns:a16="http://schemas.microsoft.com/office/drawing/2014/main" id="{D2412707-84D3-F572-4709-FD9A95F28E5B}"/>
+              </a:ext>
+            </a:extLst>
+          </p:cNvPr>
+          <p:cNvSpPr>
+            <a:spLocks noGrp="1"/>
+          </p:cNvSpPr>
+          <p:nvPr>
+            <p:ph idx="1"/>
+          </p:nvPr>
+        </p:nvSpPr>
+        <p:spPr/>
+        <p:txBody>
+          <a:bodyPr/>
+          <a:lstStyle/>
+          <a:p>
+            <a:pPr marL="0" indent="0">
+              <a:buNone/>
+            </a:pPr>
+            <a:r>
+              <a:rPr lang="de-DE" b="1" dirty="0"/>
+              <a:t>Verwendung mit </a:t>
+            </a:r>
+            <a:r>
+              <a:rPr lang="de-DE" b="1"/>
+              <a:t>GitLab</a:t>
+            </a:r>
+            <a:endParaRPr lang="de-DE" dirty="0"/>
+          </a:p>
+          <a:p>
+            <a:pPr lvl="2">
+              <a:buFont typeface="Arial" panose="020B0604020202020204" pitchFamily="34" charset="0"/>
+              <a:buChar char="•"/>
+            </a:pPr>
+            <a:endParaRPr lang="de-DE" dirty="0"/>
+          </a:p>
+          <a:p>
+            <a:pPr lvl="1">
+              <a:buFont typeface="Arial" panose="020B0604020202020204" pitchFamily="34" charset="0"/>
+              <a:buChar char="•"/>
+            </a:pPr>
+            <a:endParaRPr lang="de-DE" dirty="0"/>
+          </a:p>
+        </p:txBody>
+      </p:sp>
+    </p:spTree>
+    <p:extLst>
+      <p:ext uri="{BB962C8B-B14F-4D97-AF65-F5344CB8AC3E}">
+        <p14:creationId xmlns:p14="http://schemas.microsoft.com/office/powerpoint/2010/main" val="2121417730"/>
+      </p:ext>
+    </p:extLst>
+  </p:cSld>
+  <p:clrMapOvr>
+    <a:masterClrMapping/>
+  </p:clrMapOvr>
+</p:sld>
+</file>
+
 <file path=ppt/slides/slide3.xml><?xml version="1.0" encoding="utf-8"?>
 <p:sld xmlns:a="http://schemas.openxmlformats.org/drawingml/2006/main" xmlns:r="http://schemas.openxmlformats.org/officeDocument/2006/relationships" xmlns:p="http://schemas.openxmlformats.org/presentationml/2006/main">
   <p:cSld>
@@ -8476,6 +9377,56 @@
               <a:t>Einfacher zu benutzen</a:t>
             </a:r>
           </a:p>
+          <a:p>
+            <a:pPr lvl="1">
+              <a:buFont typeface="Arial" panose="020B0604020202020204" pitchFamily="34" charset="0"/>
+              <a:buChar char="•"/>
+            </a:pPr>
+            <a:endParaRPr lang="de-DE" dirty="0"/>
+          </a:p>
+          <a:p>
+            <a:pPr>
+              <a:buFont typeface="Arial" panose="020B0604020202020204" pitchFamily="34" charset="0"/>
+              <a:buChar char="•"/>
+            </a:pPr>
+            <a:r>
+              <a:rPr lang="de-DE" dirty="0"/>
+              <a:t>Image Name = Repository Name</a:t>
+            </a:r>
+          </a:p>
+          <a:p>
+            <a:pPr>
+              <a:buFont typeface="Arial" panose="020B0604020202020204" pitchFamily="34" charset="0"/>
+              <a:buChar char="•"/>
+            </a:pPr>
+            <a:r>
+              <a:rPr lang="de-DE" dirty="0"/>
+              <a:t>Tag = optionaler Identifier</a:t>
+            </a:r>
+          </a:p>
+          <a:p>
+            <a:pPr>
+              <a:buFont typeface="Arial" panose="020B0604020202020204" pitchFamily="34" charset="0"/>
+              <a:buChar char="•"/>
+            </a:pPr>
+            <a:r>
+              <a:rPr lang="de-DE" dirty="0"/>
+              <a:t>Beispiel: </a:t>
+            </a:r>
+            <a:r>
+              <a:rPr lang="de-DE" dirty="0">
+                <a:latin typeface="Consolas" panose="020B0609020204030204" pitchFamily="49" charset="0"/>
+              </a:rPr>
+              <a:t>Ubuntu:24.04</a:t>
+            </a:r>
+          </a:p>
+          <a:p>
+            <a:pPr lvl="1">
+              <a:buFont typeface="Arial" panose="020B0604020202020204" pitchFamily="34" charset="0"/>
+              <a:buChar char="•"/>
+            </a:pPr>
+            <a:endParaRPr lang="de-DE" dirty="0"/>
+          </a:p>
         </p:txBody>
       </p:sp>
     </p:spTree>
@@ -8629,6 +9580,41 @@
             </a:pPr>
             <a:r>
               <a:rPr lang="de-DE" dirty="0"/>
+              <a:t>Rückverfolgbarkeit und Verantwortlichkeit</a:t>
+            </a:r>
+          </a:p>
+          <a:p>
+            <a:pPr lvl="1">
+              <a:buFont typeface="Arial" panose="020B0604020202020204" pitchFamily="34" charset="0"/>
+              <a:buChar char="•"/>
+            </a:pPr>
+            <a:r>
+              <a:rPr lang="de-DE" dirty="0"/>
+              <a:t>Herkunft und Verlauf eines </a:t>
+            </a:r>
+            <a:r>
+              <a:rPr lang="de-DE" dirty="0" err="1"/>
+              <a:t>Builds</a:t>
+            </a:r>
+            <a:endParaRPr lang="de-DE" dirty="0"/>
+          </a:p>
+          <a:p>
+            <a:pPr lvl="1">
+              <a:buFont typeface="Arial" panose="020B0604020202020204" pitchFamily="34" charset="0"/>
+              <a:buChar char="•"/>
+            </a:pPr>
+            <a:r>
+              <a:rPr lang="de-DE" dirty="0"/>
+              <a:t>Wann wurde was durch wen aktualisiert/geändert</a:t>
+            </a:r>
+          </a:p>
+          <a:p>
+            <a:pPr>
+              <a:buFont typeface="Arial" panose="020B0604020202020204" pitchFamily="34" charset="0"/>
+              <a:buChar char="•"/>
+            </a:pPr>
+            <a:r>
+              <a:rPr lang="de-DE" dirty="0"/>
               <a:t>Convenience</a:t>
             </a:r>
           </a:p>
@@ -8641,6 +9627,75 @@
               <a:rPr lang="de-DE" dirty="0"/>
               <a:t>In Befehlen und Skripten leichter zu verwenden</a:t>
             </a:r>
+          </a:p>
+          <a:p>
+            <a:pPr>
+              <a:buFont typeface="Arial" panose="020B0604020202020204" pitchFamily="34" charset="0"/>
+              <a:buChar char="•"/>
+            </a:pPr>
+            <a:r>
+              <a:rPr lang="de-DE" dirty="0"/>
+              <a:t>Vereinfachtes </a:t>
+            </a:r>
+            <a:r>
+              <a:rPr lang="de-DE" dirty="0" err="1"/>
+              <a:t>Deployment</a:t>
+            </a:r>
+            <a:r>
+              <a:rPr lang="de-DE" dirty="0"/>
+              <a:t> &amp; Automatisierung</a:t>
+            </a:r>
+          </a:p>
+          <a:p>
+            <a:pPr lvl="1">
+              <a:buFont typeface="Arial" panose="020B0604020202020204" pitchFamily="34" charset="0"/>
+              <a:buChar char="•"/>
+            </a:pPr>
+            <a:r>
+              <a:rPr lang="de-DE" dirty="0"/>
+              <a:t>Konsistente Tagging-Strategie macht automatisierte </a:t>
+            </a:r>
+            <a:r>
+              <a:rPr lang="de-DE" dirty="0" err="1"/>
+              <a:t>Deployments</a:t>
+            </a:r>
+            <a:r>
+              <a:rPr lang="de-DE" dirty="0"/>
+              <a:t> einfacher</a:t>
+            </a:r>
+          </a:p>
+          <a:p>
+            <a:pPr lvl="2">
+              <a:buFont typeface="Arial" panose="020B0604020202020204" pitchFamily="34" charset="0"/>
+              <a:buChar char="•"/>
+            </a:pPr>
+            <a:r>
+              <a:rPr lang="de-DE" sz="1800" dirty="0"/>
+              <a:t>CI/CD Pipeline automatisch: </a:t>
+            </a:r>
+            <a:r>
+              <a:rPr lang="de-DE" sz="1800" dirty="0" err="1"/>
+              <a:t>build</a:t>
+            </a:r>
+            <a:r>
+              <a:rPr lang="de-DE" sz="1800" dirty="0"/>
+              <a:t>, </a:t>
+            </a:r>
+            <a:r>
+              <a:rPr lang="de-DE" sz="1800" dirty="0" err="1"/>
+              <a:t>test</a:t>
+            </a:r>
+            <a:r>
+              <a:rPr lang="de-DE" sz="1800" dirty="0"/>
+              <a:t> and deploy </a:t>
+            </a:r>
+            <a:r>
+              <a:rPr lang="de-DE" sz="1800" dirty="0">
+                <a:sym typeface="Wingdings" panose="05000000000000000000" pitchFamily="2" charset="2"/>
+              </a:rPr>
+              <a:t></a:t>
+            </a:r>
+            <a:endParaRPr lang="de-DE" dirty="0"/>
           </a:p>
         </p:txBody>
       </p:sp>

</xml_diff>

<commit_message>
Tag-3_3: Zwischenstand zur Verwendung von GitLab für Docker-Images
</commit_message>
<xml_diff>
--- a/slides/Tag-3_3-Release-und-Tagged-Images.pptx
+++ b/slides/Tag-3_3-Release-und-Tagged-Images.pptx
@@ -6,10 +6,10 @@
     <p:sldMasterId id="2147483649" r:id="rId2"/>
   </p:sldMasterIdLst>
   <p:notesMasterIdLst>
-    <p:notesMasterId r:id="rId28"/>
+    <p:notesMasterId r:id="rId35"/>
   </p:notesMasterIdLst>
   <p:handoutMasterIdLst>
-    <p:handoutMasterId r:id="rId29"/>
+    <p:handoutMasterId r:id="rId36"/>
   </p:handoutMasterIdLst>
   <p:sldIdLst>
     <p:sldId id="288" r:id="rId3"/>
@@ -36,7 +36,14 @@
     <p:sldId id="607" r:id="rId24"/>
     <p:sldId id="608" r:id="rId25"/>
     <p:sldId id="609" r:id="rId26"/>
-    <p:sldId id="610" r:id="rId27"/>
+    <p:sldId id="611" r:id="rId27"/>
+    <p:sldId id="610" r:id="rId28"/>
+    <p:sldId id="612" r:id="rId29"/>
+    <p:sldId id="613" r:id="rId30"/>
+    <p:sldId id="617" r:id="rId31"/>
+    <p:sldId id="616" r:id="rId32"/>
+    <p:sldId id="614" r:id="rId33"/>
+    <p:sldId id="615" r:id="rId34"/>
   </p:sldIdLst>
   <p:sldSz cx="9144000" cy="6858000" type="screen4x3"/>
   <p:notesSz cx="6784975" cy="9921875"/>
@@ -1334,7 +1341,10 @@
           <a:bodyPr/>
           <a:lstStyle/>
           <a:p>
-            <a:endParaRPr lang="de-DE" dirty="0"/>
+            <a:r>
+              <a:rPr lang="de-DE" dirty="0"/>
+              <a:t>https://docs.gitlab.com/ee/user/packages/container_registry/build_and_push_images.html#configure-your-gitlab-ciyml-file</a:t>
+            </a:r>
           </a:p>
         </p:txBody>
       </p:sp>
@@ -1365,7 +1375,535 @@
     </p:spTree>
     <p:extLst>
       <p:ext uri="{BB962C8B-B14F-4D97-AF65-F5344CB8AC3E}">
+        <p14:creationId xmlns:p14="http://schemas.microsoft.com/office/powerpoint/2010/main" val="474099646"/>
+      </p:ext>
+    </p:extLst>
+  </p:cSld>
+  <p:clrMapOvr>
+    <a:masterClrMapping/>
+  </p:clrMapOvr>
+</p:notes>
+</file>
+
+<file path=ppt/notesSlides/notesSlide14.xml><?xml version="1.0" encoding="utf-8"?>
+<p:notes xmlns:a="http://schemas.openxmlformats.org/drawingml/2006/main" xmlns:r="http://schemas.openxmlformats.org/officeDocument/2006/relationships" xmlns:p="http://schemas.openxmlformats.org/presentationml/2006/main">
+  <p:cSld>
+    <p:spTree>
+      <p:nvGrpSpPr>
+        <p:cNvPr id="1" name=""/>
+        <p:cNvGrpSpPr/>
+        <p:nvPr/>
+      </p:nvGrpSpPr>
+      <p:grpSpPr>
+        <a:xfrm>
+          <a:off x="0" y="0"/>
+          <a:ext cx="0" cy="0"/>
+          <a:chOff x="0" y="0"/>
+          <a:chExt cx="0" cy="0"/>
+        </a:xfrm>
+      </p:grpSpPr>
+      <p:sp>
+        <p:nvSpPr>
+          <p:cNvPr id="2" name="Folienbildplatzhalter 1"/>
+          <p:cNvSpPr>
+            <a:spLocks noGrp="1" noRot="1" noChangeAspect="1"/>
+          </p:cNvSpPr>
+          <p:nvPr>
+            <p:ph type="sldImg"/>
+          </p:nvPr>
+        </p:nvSpPr>
+        <p:spPr/>
+      </p:sp>
+      <p:sp>
+        <p:nvSpPr>
+          <p:cNvPr id="3" name="Notizenplatzhalter 2"/>
+          <p:cNvSpPr>
+            <a:spLocks noGrp="1"/>
+          </p:cNvSpPr>
+          <p:nvPr>
+            <p:ph type="body" idx="1"/>
+          </p:nvPr>
+        </p:nvSpPr>
+        <p:spPr/>
+        <p:txBody>
+          <a:bodyPr/>
+          <a:lstStyle/>
+          <a:p>
+            <a:r>
+              <a:rPr lang="de-DE" dirty="0"/>
+              <a:t>https://docs.gitlab.com/ee/user/packages/container_registry/build_and_push_images.html#use-gitlab-cicd</a:t>
+            </a:r>
+          </a:p>
+        </p:txBody>
+      </p:sp>
+      <p:sp>
+        <p:nvSpPr>
+          <p:cNvPr id="4" name="Foliennummernplatzhalter 3"/>
+          <p:cNvSpPr>
+            <a:spLocks noGrp="1"/>
+          </p:cNvSpPr>
+          <p:nvPr>
+            <p:ph type="sldNum" sz="quarter" idx="5"/>
+          </p:nvPr>
+        </p:nvSpPr>
+        <p:spPr/>
+        <p:txBody>
+          <a:bodyPr/>
+          <a:lstStyle/>
+          <a:p>
+            <a:fld id="{18182567-388C-4D33-8B7B-A651F195F118}" type="slidenum">
+              <a:rPr lang="de-DE" altLang="de-DE" smtClean="0"/>
+              <a:pPr/>
+              <a:t>26</a:t>
+            </a:fld>
+            <a:endParaRPr lang="de-DE" altLang="de-DE"/>
+          </a:p>
+        </p:txBody>
+      </p:sp>
+    </p:spTree>
+    <p:extLst>
+      <p:ext uri="{BB962C8B-B14F-4D97-AF65-F5344CB8AC3E}">
         <p14:creationId xmlns:p14="http://schemas.microsoft.com/office/powerpoint/2010/main" val="511039819"/>
+      </p:ext>
+    </p:extLst>
+  </p:cSld>
+  <p:clrMapOvr>
+    <a:masterClrMapping/>
+  </p:clrMapOvr>
+</p:notes>
+</file>
+
+<file path=ppt/notesSlides/notesSlide15.xml><?xml version="1.0" encoding="utf-8"?>
+<p:notes xmlns:a="http://schemas.openxmlformats.org/drawingml/2006/main" xmlns:r="http://schemas.openxmlformats.org/officeDocument/2006/relationships" xmlns:p="http://schemas.openxmlformats.org/presentationml/2006/main">
+  <p:cSld>
+    <p:spTree>
+      <p:nvGrpSpPr>
+        <p:cNvPr id="1" name=""/>
+        <p:cNvGrpSpPr/>
+        <p:nvPr/>
+      </p:nvGrpSpPr>
+      <p:grpSpPr>
+        <a:xfrm>
+          <a:off x="0" y="0"/>
+          <a:ext cx="0" cy="0"/>
+          <a:chOff x="0" y="0"/>
+          <a:chExt cx="0" cy="0"/>
+        </a:xfrm>
+      </p:grpSpPr>
+      <p:sp>
+        <p:nvSpPr>
+          <p:cNvPr id="2" name="Folienbildplatzhalter 1"/>
+          <p:cNvSpPr>
+            <a:spLocks noGrp="1" noRot="1" noChangeAspect="1"/>
+          </p:cNvSpPr>
+          <p:nvPr>
+            <p:ph type="sldImg"/>
+          </p:nvPr>
+        </p:nvSpPr>
+        <p:spPr/>
+      </p:sp>
+      <p:sp>
+        <p:nvSpPr>
+          <p:cNvPr id="3" name="Notizenplatzhalter 2"/>
+          <p:cNvSpPr>
+            <a:spLocks noGrp="1"/>
+          </p:cNvSpPr>
+          <p:nvPr>
+            <p:ph type="body" idx="1"/>
+          </p:nvPr>
+        </p:nvSpPr>
+        <p:spPr/>
+        <p:txBody>
+          <a:bodyPr/>
+          <a:lstStyle/>
+          <a:p>
+            <a:r>
+              <a:rPr lang="de-DE" dirty="0"/>
+              <a:t>https://docs.gitlab.com/ee/user/packages/container_registry/build_and_push_images.html#use-a-docker-in-docker-container-image-from-your-container-registry</a:t>
+            </a:r>
+          </a:p>
+        </p:txBody>
+      </p:sp>
+      <p:sp>
+        <p:nvSpPr>
+          <p:cNvPr id="4" name="Foliennummernplatzhalter 3"/>
+          <p:cNvSpPr>
+            <a:spLocks noGrp="1"/>
+          </p:cNvSpPr>
+          <p:nvPr>
+            <p:ph type="sldNum" sz="quarter" idx="5"/>
+          </p:nvPr>
+        </p:nvSpPr>
+        <p:spPr/>
+        <p:txBody>
+          <a:bodyPr/>
+          <a:lstStyle/>
+          <a:p>
+            <a:fld id="{18182567-388C-4D33-8B7B-A651F195F118}" type="slidenum">
+              <a:rPr lang="de-DE" altLang="de-DE" smtClean="0"/>
+              <a:pPr/>
+              <a:t>27</a:t>
+            </a:fld>
+            <a:endParaRPr lang="de-DE" altLang="de-DE"/>
+          </a:p>
+        </p:txBody>
+      </p:sp>
+    </p:spTree>
+    <p:extLst>
+      <p:ext uri="{BB962C8B-B14F-4D97-AF65-F5344CB8AC3E}">
+        <p14:creationId xmlns:p14="http://schemas.microsoft.com/office/powerpoint/2010/main" val="3555957353"/>
+      </p:ext>
+    </p:extLst>
+  </p:cSld>
+  <p:clrMapOvr>
+    <a:masterClrMapping/>
+  </p:clrMapOvr>
+</p:notes>
+</file>
+
+<file path=ppt/notesSlides/notesSlide16.xml><?xml version="1.0" encoding="utf-8"?>
+<p:notes xmlns:a="http://schemas.openxmlformats.org/drawingml/2006/main" xmlns:r="http://schemas.openxmlformats.org/officeDocument/2006/relationships" xmlns:p="http://schemas.openxmlformats.org/presentationml/2006/main">
+  <p:cSld>
+    <p:spTree>
+      <p:nvGrpSpPr>
+        <p:cNvPr id="1" name=""/>
+        <p:cNvGrpSpPr/>
+        <p:nvPr/>
+      </p:nvGrpSpPr>
+      <p:grpSpPr>
+        <a:xfrm>
+          <a:off x="0" y="0"/>
+          <a:ext cx="0" cy="0"/>
+          <a:chOff x="0" y="0"/>
+          <a:chExt cx="0" cy="0"/>
+        </a:xfrm>
+      </p:grpSpPr>
+      <p:sp>
+        <p:nvSpPr>
+          <p:cNvPr id="2" name="Folienbildplatzhalter 1"/>
+          <p:cNvSpPr>
+            <a:spLocks noGrp="1" noRot="1" noChangeAspect="1"/>
+          </p:cNvSpPr>
+          <p:nvPr>
+            <p:ph type="sldImg"/>
+          </p:nvPr>
+        </p:nvSpPr>
+        <p:spPr/>
+      </p:sp>
+      <p:sp>
+        <p:nvSpPr>
+          <p:cNvPr id="3" name="Notizenplatzhalter 2"/>
+          <p:cNvSpPr>
+            <a:spLocks noGrp="1"/>
+          </p:cNvSpPr>
+          <p:nvPr>
+            <p:ph type="body" idx="1"/>
+          </p:nvPr>
+        </p:nvSpPr>
+        <p:spPr/>
+        <p:txBody>
+          <a:bodyPr/>
+          <a:lstStyle/>
+          <a:p>
+            <a:r>
+              <a:rPr lang="de-DE" dirty="0"/>
+              <a:t>https://docs.gitlab.com/ee/user/packages/container_registry/build_and_push_images.html#use-a-docker-in-docker-container-image-with-dependency-proxy</a:t>
+            </a:r>
+          </a:p>
+        </p:txBody>
+      </p:sp>
+      <p:sp>
+        <p:nvSpPr>
+          <p:cNvPr id="4" name="Foliennummernplatzhalter 3"/>
+          <p:cNvSpPr>
+            <a:spLocks noGrp="1"/>
+          </p:cNvSpPr>
+          <p:nvPr>
+            <p:ph type="sldNum" sz="quarter" idx="5"/>
+          </p:nvPr>
+        </p:nvSpPr>
+        <p:spPr/>
+        <p:txBody>
+          <a:bodyPr/>
+          <a:lstStyle/>
+          <a:p>
+            <a:fld id="{18182567-388C-4D33-8B7B-A651F195F118}" type="slidenum">
+              <a:rPr lang="de-DE" altLang="de-DE" smtClean="0"/>
+              <a:pPr/>
+              <a:t>28</a:t>
+            </a:fld>
+            <a:endParaRPr lang="de-DE" altLang="de-DE"/>
+          </a:p>
+        </p:txBody>
+      </p:sp>
+    </p:spTree>
+    <p:extLst>
+      <p:ext uri="{BB962C8B-B14F-4D97-AF65-F5344CB8AC3E}">
+        <p14:creationId xmlns:p14="http://schemas.microsoft.com/office/powerpoint/2010/main" val="1695736135"/>
+      </p:ext>
+    </p:extLst>
+  </p:cSld>
+  <p:clrMapOvr>
+    <a:masterClrMapping/>
+  </p:clrMapOvr>
+</p:notes>
+</file>
+
+<file path=ppt/notesSlides/notesSlide17.xml><?xml version="1.0" encoding="utf-8"?>
+<p:notes xmlns:a="http://schemas.openxmlformats.org/drawingml/2006/main" xmlns:r="http://schemas.openxmlformats.org/officeDocument/2006/relationships" xmlns:p="http://schemas.openxmlformats.org/presentationml/2006/main">
+  <p:cSld>
+    <p:spTree>
+      <p:nvGrpSpPr>
+        <p:cNvPr id="1" name=""/>
+        <p:cNvGrpSpPr/>
+        <p:nvPr/>
+      </p:nvGrpSpPr>
+      <p:grpSpPr>
+        <a:xfrm>
+          <a:off x="0" y="0"/>
+          <a:ext cx="0" cy="0"/>
+          <a:chOff x="0" y="0"/>
+          <a:chExt cx="0" cy="0"/>
+        </a:xfrm>
+      </p:grpSpPr>
+      <p:sp>
+        <p:nvSpPr>
+          <p:cNvPr id="2" name="Folienbildplatzhalter 1"/>
+          <p:cNvSpPr>
+            <a:spLocks noGrp="1" noRot="1" noChangeAspect="1"/>
+          </p:cNvSpPr>
+          <p:nvPr>
+            <p:ph type="sldImg"/>
+          </p:nvPr>
+        </p:nvSpPr>
+        <p:spPr/>
+      </p:sp>
+      <p:sp>
+        <p:nvSpPr>
+          <p:cNvPr id="3" name="Notizenplatzhalter 2"/>
+          <p:cNvSpPr>
+            <a:spLocks noGrp="1"/>
+          </p:cNvSpPr>
+          <p:nvPr>
+            <p:ph type="body" idx="1"/>
+          </p:nvPr>
+        </p:nvSpPr>
+        <p:spPr/>
+        <p:txBody>
+          <a:bodyPr/>
+          <a:lstStyle/>
+          <a:p>
+            <a:r>
+              <a:rPr lang="de-DE" dirty="0"/>
+              <a:t>https://docs.gitlab.com/ee/user/packages/container_registry/build_and_push_images.html#container-registry-examples-with-gitlab-cicd</a:t>
+            </a:r>
+          </a:p>
+        </p:txBody>
+      </p:sp>
+      <p:sp>
+        <p:nvSpPr>
+          <p:cNvPr id="4" name="Foliennummernplatzhalter 3"/>
+          <p:cNvSpPr>
+            <a:spLocks noGrp="1"/>
+          </p:cNvSpPr>
+          <p:nvPr>
+            <p:ph type="sldNum" sz="quarter" idx="5"/>
+          </p:nvPr>
+        </p:nvSpPr>
+        <p:spPr/>
+        <p:txBody>
+          <a:bodyPr/>
+          <a:lstStyle/>
+          <a:p>
+            <a:fld id="{18182567-388C-4D33-8B7B-A651F195F118}" type="slidenum">
+              <a:rPr lang="de-DE" altLang="de-DE" smtClean="0"/>
+              <a:pPr/>
+              <a:t>30</a:t>
+            </a:fld>
+            <a:endParaRPr lang="de-DE" altLang="de-DE"/>
+          </a:p>
+        </p:txBody>
+      </p:sp>
+    </p:spTree>
+    <p:extLst>
+      <p:ext uri="{BB962C8B-B14F-4D97-AF65-F5344CB8AC3E}">
+        <p14:creationId xmlns:p14="http://schemas.microsoft.com/office/powerpoint/2010/main" val="1319990225"/>
+      </p:ext>
+    </p:extLst>
+  </p:cSld>
+  <p:clrMapOvr>
+    <a:masterClrMapping/>
+  </p:clrMapOvr>
+</p:notes>
+</file>
+
+<file path=ppt/notesSlides/notesSlide18.xml><?xml version="1.0" encoding="utf-8"?>
+<p:notes xmlns:a="http://schemas.openxmlformats.org/drawingml/2006/main" xmlns:r="http://schemas.openxmlformats.org/officeDocument/2006/relationships" xmlns:p="http://schemas.openxmlformats.org/presentationml/2006/main">
+  <p:cSld>
+    <p:spTree>
+      <p:nvGrpSpPr>
+        <p:cNvPr id="1" name=""/>
+        <p:cNvGrpSpPr/>
+        <p:nvPr/>
+      </p:nvGrpSpPr>
+      <p:grpSpPr>
+        <a:xfrm>
+          <a:off x="0" y="0"/>
+          <a:ext cx="0" cy="0"/>
+          <a:chOff x="0" y="0"/>
+          <a:chExt cx="0" cy="0"/>
+        </a:xfrm>
+      </p:grpSpPr>
+      <p:sp>
+        <p:nvSpPr>
+          <p:cNvPr id="2" name="Folienbildplatzhalter 1"/>
+          <p:cNvSpPr>
+            <a:spLocks noGrp="1" noRot="1" noChangeAspect="1"/>
+          </p:cNvSpPr>
+          <p:nvPr>
+            <p:ph type="sldImg"/>
+          </p:nvPr>
+        </p:nvSpPr>
+        <p:spPr/>
+      </p:sp>
+      <p:sp>
+        <p:nvSpPr>
+          <p:cNvPr id="3" name="Notizenplatzhalter 2"/>
+          <p:cNvSpPr>
+            <a:spLocks noGrp="1"/>
+          </p:cNvSpPr>
+          <p:nvPr>
+            <p:ph type="body" idx="1"/>
+          </p:nvPr>
+        </p:nvSpPr>
+        <p:spPr/>
+        <p:txBody>
+          <a:bodyPr/>
+          <a:lstStyle/>
+          <a:p>
+            <a:r>
+              <a:rPr lang="de-DE" dirty="0"/>
+              <a:t>https://docs.gitlab.com/ee/user/packages/container_registry/build_and_push_images.html#container-registry-examples-with-gitlab-cicd</a:t>
+            </a:r>
+          </a:p>
+        </p:txBody>
+      </p:sp>
+      <p:sp>
+        <p:nvSpPr>
+          <p:cNvPr id="4" name="Foliennummernplatzhalter 3"/>
+          <p:cNvSpPr>
+            <a:spLocks noGrp="1"/>
+          </p:cNvSpPr>
+          <p:nvPr>
+            <p:ph type="sldNum" sz="quarter" idx="5"/>
+          </p:nvPr>
+        </p:nvSpPr>
+        <p:spPr/>
+        <p:txBody>
+          <a:bodyPr/>
+          <a:lstStyle/>
+          <a:p>
+            <a:fld id="{18182567-388C-4D33-8B7B-A651F195F118}" type="slidenum">
+              <a:rPr lang="de-DE" altLang="de-DE" smtClean="0"/>
+              <a:pPr/>
+              <a:t>31</a:t>
+            </a:fld>
+            <a:endParaRPr lang="de-DE" altLang="de-DE"/>
+          </a:p>
+        </p:txBody>
+      </p:sp>
+    </p:spTree>
+    <p:extLst>
+      <p:ext uri="{BB962C8B-B14F-4D97-AF65-F5344CB8AC3E}">
+        <p14:creationId xmlns:p14="http://schemas.microsoft.com/office/powerpoint/2010/main" val="18823346"/>
+      </p:ext>
+    </p:extLst>
+  </p:cSld>
+  <p:clrMapOvr>
+    <a:masterClrMapping/>
+  </p:clrMapOvr>
+</p:notes>
+</file>
+
+<file path=ppt/notesSlides/notesSlide19.xml><?xml version="1.0" encoding="utf-8"?>
+<p:notes xmlns:a="http://schemas.openxmlformats.org/drawingml/2006/main" xmlns:r="http://schemas.openxmlformats.org/officeDocument/2006/relationships" xmlns:p="http://schemas.openxmlformats.org/presentationml/2006/main">
+  <p:cSld>
+    <p:spTree>
+      <p:nvGrpSpPr>
+        <p:cNvPr id="1" name=""/>
+        <p:cNvGrpSpPr/>
+        <p:nvPr/>
+      </p:nvGrpSpPr>
+      <p:grpSpPr>
+        <a:xfrm>
+          <a:off x="0" y="0"/>
+          <a:ext cx="0" cy="0"/>
+          <a:chOff x="0" y="0"/>
+          <a:chExt cx="0" cy="0"/>
+        </a:xfrm>
+      </p:grpSpPr>
+      <p:sp>
+        <p:nvSpPr>
+          <p:cNvPr id="2" name="Folienbildplatzhalter 1"/>
+          <p:cNvSpPr>
+            <a:spLocks noGrp="1" noRot="1" noChangeAspect="1"/>
+          </p:cNvSpPr>
+          <p:nvPr>
+            <p:ph type="sldImg"/>
+          </p:nvPr>
+        </p:nvSpPr>
+        <p:spPr/>
+      </p:sp>
+      <p:sp>
+        <p:nvSpPr>
+          <p:cNvPr id="3" name="Notizenplatzhalter 2"/>
+          <p:cNvSpPr>
+            <a:spLocks noGrp="1"/>
+          </p:cNvSpPr>
+          <p:nvPr>
+            <p:ph type="body" idx="1"/>
+          </p:nvPr>
+        </p:nvSpPr>
+        <p:spPr/>
+        <p:txBody>
+          <a:bodyPr/>
+          <a:lstStyle/>
+          <a:p>
+            <a:r>
+              <a:rPr lang="de-DE" dirty="0"/>
+              <a:t>https://docs.gitlab.com/ee/user/packages/container_registry/build_and_push_images.html#container-registry-examples-with-gitlab-cicd</a:t>
+            </a:r>
+          </a:p>
+        </p:txBody>
+      </p:sp>
+      <p:sp>
+        <p:nvSpPr>
+          <p:cNvPr id="4" name="Foliennummernplatzhalter 3"/>
+          <p:cNvSpPr>
+            <a:spLocks noGrp="1"/>
+          </p:cNvSpPr>
+          <p:nvPr>
+            <p:ph type="sldNum" sz="quarter" idx="5"/>
+          </p:nvPr>
+        </p:nvSpPr>
+        <p:spPr/>
+        <p:txBody>
+          <a:bodyPr/>
+          <a:lstStyle/>
+          <a:p>
+            <a:fld id="{18182567-388C-4D33-8B7B-A651F195F118}" type="slidenum">
+              <a:rPr lang="de-DE" altLang="de-DE" smtClean="0"/>
+              <a:pPr/>
+              <a:t>32</a:t>
+            </a:fld>
+            <a:endParaRPr lang="de-DE" altLang="de-DE"/>
+          </a:p>
+        </p:txBody>
+      </p:sp>
+    </p:spTree>
+    <p:extLst>
+      <p:ext uri="{BB962C8B-B14F-4D97-AF65-F5344CB8AC3E}">
+        <p14:creationId xmlns:p14="http://schemas.microsoft.com/office/powerpoint/2010/main" val="3169846742"/>
       </p:ext>
     </p:extLst>
   </p:cSld>
@@ -2120,10 +2658,9 @@
           <a:lstStyle/>
           <a:p>
             <a:r>
-              <a:rPr lang="de-DE"/>
+              <a:rPr lang="de-DE" dirty="0"/>
               <a:t>https://docs.gitlab.com/ee/user/packages/container_registry/authenticate_with_container_registry.html</a:t>
             </a:r>
-            <a:endParaRPr lang="de-DE" dirty="0"/>
           </a:p>
         </p:txBody>
       </p:sp>
@@ -2639,7 +3176,7 @@
               <a:pPr algn="ctr">
                 <a:defRPr/>
               </a:pPr>
-              <a:t>31.05.2024</a:t>
+              <a:t>03.06.2024</a:t>
             </a:fld>
             <a:endParaRPr lang="de-DE" sz="1000">
               <a:solidFill>
@@ -8059,6 +8596,306 @@
             </a:r>
           </a:p>
           <a:p>
+            <a:pPr>
+              <a:buFont typeface="Arial" panose="020B0604020202020204" pitchFamily="34" charset="0"/>
+              <a:buChar char="•"/>
+            </a:pPr>
+            <a:r>
+              <a:rPr lang="de-DE" dirty="0"/>
+              <a:t>Verschiedene Möglichkeiten</a:t>
+            </a:r>
+          </a:p>
+          <a:p>
+            <a:pPr lvl="1">
+              <a:buFont typeface="Arial" panose="020B0604020202020204" pitchFamily="34" charset="0"/>
+              <a:buChar char="•"/>
+            </a:pPr>
+            <a:r>
+              <a:rPr lang="de-DE" dirty="0"/>
+              <a:t>Personal </a:t>
+            </a:r>
+            <a:r>
+              <a:rPr lang="de-DE" dirty="0" err="1"/>
+              <a:t>access</a:t>
+            </a:r>
+            <a:r>
+              <a:rPr lang="de-DE" dirty="0"/>
+              <a:t> </a:t>
+            </a:r>
+            <a:r>
+              <a:rPr lang="de-DE" dirty="0" err="1"/>
+              <a:t>token</a:t>
+            </a:r>
+            <a:endParaRPr lang="de-DE" dirty="0"/>
+          </a:p>
+          <a:p>
+            <a:pPr lvl="1">
+              <a:buFont typeface="Arial" panose="020B0604020202020204" pitchFamily="34" charset="0"/>
+              <a:buChar char="•"/>
+            </a:pPr>
+            <a:r>
+              <a:rPr lang="de-DE" dirty="0"/>
+              <a:t>Deploy </a:t>
+            </a:r>
+            <a:r>
+              <a:rPr lang="de-DE" dirty="0" err="1"/>
+              <a:t>token</a:t>
+            </a:r>
+            <a:endParaRPr lang="de-DE" dirty="0"/>
+          </a:p>
+          <a:p>
+            <a:pPr lvl="1">
+              <a:buFont typeface="Arial" panose="020B0604020202020204" pitchFamily="34" charset="0"/>
+              <a:buChar char="•"/>
+            </a:pPr>
+            <a:r>
+              <a:rPr lang="de-DE" dirty="0"/>
+              <a:t>Project </a:t>
+            </a:r>
+            <a:r>
+              <a:rPr lang="de-DE" dirty="0" err="1"/>
+              <a:t>access</a:t>
+            </a:r>
+            <a:r>
+              <a:rPr lang="de-DE" dirty="0"/>
+              <a:t> </a:t>
+            </a:r>
+            <a:r>
+              <a:rPr lang="de-DE" dirty="0" err="1"/>
+              <a:t>token</a:t>
+            </a:r>
+            <a:endParaRPr lang="de-DE" dirty="0"/>
+          </a:p>
+          <a:p>
+            <a:pPr lvl="1">
+              <a:buFont typeface="Arial" panose="020B0604020202020204" pitchFamily="34" charset="0"/>
+              <a:buChar char="•"/>
+            </a:pPr>
+            <a:r>
+              <a:rPr lang="de-DE" dirty="0"/>
+              <a:t>Group </a:t>
+            </a:r>
+            <a:r>
+              <a:rPr lang="de-DE" dirty="0" err="1"/>
+              <a:t>access</a:t>
+            </a:r>
+            <a:r>
+              <a:rPr lang="de-DE" dirty="0"/>
+              <a:t> </a:t>
+            </a:r>
+            <a:r>
+              <a:rPr lang="de-DE" dirty="0" err="1"/>
+              <a:t>token</a:t>
+            </a:r>
+            <a:endParaRPr lang="de-DE" dirty="0"/>
+          </a:p>
+          <a:p>
+            <a:pPr>
+              <a:buFont typeface="Arial" panose="020B0604020202020204" pitchFamily="34" charset="0"/>
+              <a:buChar char="•"/>
+            </a:pPr>
+            <a:r>
+              <a:rPr lang="de-DE" dirty="0"/>
+              <a:t>Alle Methoden erfordern einen Mindestumfang:</a:t>
+            </a:r>
+          </a:p>
+          <a:p>
+            <a:pPr lvl="1">
+              <a:buFont typeface="Arial" panose="020B0604020202020204" pitchFamily="34" charset="0"/>
+              <a:buChar char="•"/>
+            </a:pPr>
+            <a:r>
+              <a:rPr lang="de-DE" dirty="0"/>
+              <a:t>Für </a:t>
+            </a:r>
+            <a:r>
+              <a:rPr lang="de-DE" dirty="0" err="1"/>
+              <a:t>read</a:t>
+            </a:r>
+            <a:r>
+              <a:rPr lang="de-DE" dirty="0"/>
+              <a:t> (pull) in der </a:t>
+            </a:r>
+            <a:r>
+              <a:rPr lang="de-DE" dirty="0" err="1"/>
+              <a:t>read_registry</a:t>
+            </a:r>
+            <a:endParaRPr lang="de-DE" dirty="0"/>
+          </a:p>
+          <a:p>
+            <a:pPr lvl="1">
+              <a:buFont typeface="Arial" panose="020B0604020202020204" pitchFamily="34" charset="0"/>
+              <a:buChar char="•"/>
+            </a:pPr>
+            <a:r>
+              <a:rPr lang="de-DE" dirty="0"/>
+              <a:t>Für </a:t>
+            </a:r>
+            <a:r>
+              <a:rPr lang="de-DE" dirty="0" err="1"/>
+              <a:t>write</a:t>
+            </a:r>
+            <a:r>
+              <a:rPr lang="de-DE" dirty="0"/>
+              <a:t> (push) in der </a:t>
+            </a:r>
+            <a:r>
+              <a:rPr lang="de-DE" dirty="0" err="1"/>
+              <a:t>write_registry</a:t>
+            </a:r>
+            <a:r>
+              <a:rPr lang="de-DE" dirty="0"/>
+              <a:t> und </a:t>
+            </a:r>
+            <a:r>
+              <a:rPr lang="de-DE" dirty="0" err="1"/>
+              <a:t>read_registry</a:t>
+            </a:r>
+            <a:endParaRPr lang="de-DE" dirty="0"/>
+          </a:p>
+          <a:p>
+            <a:pPr>
+              <a:buFont typeface="Arial" panose="020B0604020202020204" pitchFamily="34" charset="0"/>
+              <a:buChar char="•"/>
+            </a:pPr>
+            <a:r>
+              <a:rPr lang="de-DE" dirty="0"/>
+              <a:t>Zum Authentifizieren</a:t>
+            </a:r>
+          </a:p>
+          <a:p>
+            <a:pPr lvl="1">
+              <a:buFont typeface="Arial" panose="020B0604020202020204" pitchFamily="34" charset="0"/>
+              <a:buChar char="•"/>
+            </a:pPr>
+            <a:r>
+              <a:rPr lang="de-DE" sz="1600" dirty="0" err="1">
+                <a:latin typeface="Consolas" panose="020B0609020204030204" pitchFamily="49" charset="0"/>
+              </a:rPr>
+              <a:t>docker</a:t>
+            </a:r>
+            <a:r>
+              <a:rPr lang="de-DE" sz="1600" dirty="0">
+                <a:latin typeface="Consolas" panose="020B0609020204030204" pitchFamily="49" charset="0"/>
+              </a:rPr>
+              <a:t> </a:t>
+            </a:r>
+            <a:r>
+              <a:rPr lang="de-DE" sz="1600" dirty="0" err="1">
+                <a:latin typeface="Consolas" panose="020B0609020204030204" pitchFamily="49" charset="0"/>
+              </a:rPr>
+              <a:t>login</a:t>
+            </a:r>
+            <a:r>
+              <a:rPr lang="de-DE" sz="1600" dirty="0">
+                <a:latin typeface="Consolas" panose="020B0609020204030204" pitchFamily="49" charset="0"/>
+              </a:rPr>
+              <a:t> registry.example.com</a:t>
+            </a:r>
+          </a:p>
+          <a:p>
+            <a:pPr lvl="1">
+              <a:buFont typeface="Arial" panose="020B0604020202020204" pitchFamily="34" charset="0"/>
+              <a:buChar char="•"/>
+            </a:pPr>
+            <a:r>
+              <a:rPr lang="de-DE" sz="1600" dirty="0">
+                <a:latin typeface="+mj-lt"/>
+              </a:rPr>
+              <a:t>oder</a:t>
+            </a:r>
+          </a:p>
+          <a:p>
+            <a:pPr lvl="1">
+              <a:buFont typeface="Arial" panose="020B0604020202020204" pitchFamily="34" charset="0"/>
+              <a:buChar char="•"/>
+            </a:pPr>
+            <a:r>
+              <a:rPr lang="de-DE" sz="1600" dirty="0">
+                <a:latin typeface="Consolas" panose="020B0609020204030204" pitchFamily="49" charset="0"/>
+              </a:rPr>
+              <a:t>TOKEN=&lt;</a:t>
+            </a:r>
+            <a:r>
+              <a:rPr lang="de-DE" sz="1600" dirty="0" err="1">
+                <a:latin typeface="Consolas" panose="020B0609020204030204" pitchFamily="49" charset="0"/>
+              </a:rPr>
+              <a:t>token</a:t>
+            </a:r>
+            <a:r>
+              <a:rPr lang="de-DE" sz="1600" dirty="0">
+                <a:latin typeface="Consolas" panose="020B0609020204030204" pitchFamily="49" charset="0"/>
+              </a:rPr>
+              <a:t>&gt;</a:t>
+            </a:r>
+          </a:p>
+          <a:p>
+            <a:pPr lvl="1">
+              <a:buFont typeface="Arial" panose="020B0604020202020204" pitchFamily="34" charset="0"/>
+              <a:buChar char="•"/>
+            </a:pPr>
+            <a:r>
+              <a:rPr lang="de-DE" sz="1600" dirty="0">
+                <a:latin typeface="Consolas" panose="020B0609020204030204" pitchFamily="49" charset="0"/>
+              </a:rPr>
+              <a:t>echo "$TOKEN" | </a:t>
+            </a:r>
+            <a:r>
+              <a:rPr lang="de-DE" sz="1600" dirty="0" err="1">
+                <a:latin typeface="Consolas" panose="020B0609020204030204" pitchFamily="49" charset="0"/>
+              </a:rPr>
+              <a:t>docker</a:t>
+            </a:r>
+            <a:r>
+              <a:rPr lang="de-DE" sz="1600" dirty="0">
+                <a:latin typeface="Consolas" panose="020B0609020204030204" pitchFamily="49" charset="0"/>
+              </a:rPr>
+              <a:t> </a:t>
+            </a:r>
+            <a:r>
+              <a:rPr lang="de-DE" sz="1600" dirty="0" err="1">
+                <a:latin typeface="Consolas" panose="020B0609020204030204" pitchFamily="49" charset="0"/>
+              </a:rPr>
+              <a:t>login</a:t>
+            </a:r>
+            <a:r>
+              <a:rPr lang="de-DE" sz="1600" dirty="0">
+                <a:latin typeface="Consolas" panose="020B0609020204030204" pitchFamily="49" charset="0"/>
+              </a:rPr>
+              <a:t> registry.example.com -u &lt;</a:t>
+            </a:r>
+            <a:r>
+              <a:rPr lang="de-DE" sz="1600" dirty="0" err="1">
+                <a:latin typeface="Consolas" panose="020B0609020204030204" pitchFamily="49" charset="0"/>
+              </a:rPr>
+              <a:t>username</a:t>
+            </a:r>
+            <a:r>
+              <a:rPr lang="de-DE" sz="1600" dirty="0">
+                <a:latin typeface="Consolas" panose="020B0609020204030204" pitchFamily="49" charset="0"/>
+              </a:rPr>
+              <a:t>&gt; --password-</a:t>
+            </a:r>
+            <a:r>
+              <a:rPr lang="de-DE" sz="1600" dirty="0" err="1">
+                <a:latin typeface="Consolas" panose="020B0609020204030204" pitchFamily="49" charset="0"/>
+              </a:rPr>
+              <a:t>stdin</a:t>
+            </a:r>
+            <a:endParaRPr lang="de-DE" sz="1600" dirty="0">
+              <a:latin typeface="Consolas" panose="020B0609020204030204" pitchFamily="49" charset="0"/>
+            </a:endParaRPr>
+          </a:p>
+          <a:p>
+            <a:pPr lvl="1">
+              <a:buFont typeface="Arial" panose="020B0604020202020204" pitchFamily="34" charset="0"/>
+              <a:buChar char="•"/>
+            </a:pPr>
+            <a:endParaRPr lang="de-DE" sz="1600" dirty="0">
+              <a:latin typeface="Consolas" panose="020B0609020204030204" pitchFamily="49" charset="0"/>
+            </a:endParaRPr>
+          </a:p>
+          <a:p>
             <a:pPr lvl="2">
               <a:buFont typeface="Arial" panose="020B0604020202020204" pitchFamily="34" charset="0"/>
               <a:buChar char="•"/>
@@ -8173,21 +9010,346 @@
               <a:buNone/>
             </a:pPr>
             <a:r>
-              <a:rPr lang="de-DE" b="1" dirty="0" err="1"/>
-              <a:t>GitLab</a:t>
-            </a:r>
-            <a:r>
               <a:rPr lang="de-DE" b="1" dirty="0"/>
-              <a:t> CI/CD zum authentifizieren</a:t>
+              <a:t>CI/CD zur Authentifizierung bei der Container Registry  </a:t>
             </a:r>
             <a:endParaRPr lang="de-DE" dirty="0"/>
           </a:p>
           <a:p>
+            <a:pPr>
+              <a:buFont typeface="Arial" panose="020B0604020202020204" pitchFamily="34" charset="0"/>
+              <a:buChar char="•"/>
+            </a:pPr>
+            <a:r>
+              <a:rPr lang="de-DE" sz="1800" dirty="0"/>
+              <a:t>CI/CD Variable: CI_REGISTRY_USER</a:t>
+            </a:r>
+          </a:p>
+          <a:p>
+            <a:pPr lvl="1">
+              <a:buFont typeface="Arial" panose="020B0604020202020204" pitchFamily="34" charset="0"/>
+              <a:buChar char="•"/>
+            </a:pPr>
+            <a:r>
+              <a:rPr lang="de-DE" sz="1600" dirty="0"/>
+              <a:t>Job-bezogener Benutzer mit Lese- und Schreibrechten in der CR</a:t>
+            </a:r>
+          </a:p>
+          <a:p>
+            <a:pPr lvl="1">
+              <a:buFont typeface="Arial" panose="020B0604020202020204" pitchFamily="34" charset="0"/>
+              <a:buChar char="•"/>
+            </a:pPr>
+            <a:r>
+              <a:rPr lang="de-DE" sz="1600" dirty="0"/>
+              <a:t>Passwort automatisch erzeugt: CI_REGISTRY_PASSWORD</a:t>
+            </a:r>
+          </a:p>
+          <a:p>
+            <a:pPr lvl="1">
+              <a:buFont typeface="Arial" panose="020B0604020202020204" pitchFamily="34" charset="0"/>
+              <a:buChar char="•"/>
+            </a:pPr>
+            <a:r>
+              <a:rPr lang="de-DE" sz="1600" dirty="0">
+                <a:latin typeface="Consolas" panose="020B0609020204030204" pitchFamily="49" charset="0"/>
+              </a:rPr>
+              <a:t>echo "$CI_REGISTRY_PASSWORD" | </a:t>
+            </a:r>
+            <a:r>
+              <a:rPr lang="de-DE" sz="1600" dirty="0" err="1">
+                <a:latin typeface="Consolas" panose="020B0609020204030204" pitchFamily="49" charset="0"/>
+              </a:rPr>
+              <a:t>docker</a:t>
+            </a:r>
+            <a:r>
+              <a:rPr lang="de-DE" sz="1600" dirty="0">
+                <a:latin typeface="Consolas" panose="020B0609020204030204" pitchFamily="49" charset="0"/>
+              </a:rPr>
+              <a:t> </a:t>
+            </a:r>
+            <a:r>
+              <a:rPr lang="de-DE" sz="1600" dirty="0" err="1">
+                <a:latin typeface="Consolas" panose="020B0609020204030204" pitchFamily="49" charset="0"/>
+              </a:rPr>
+              <a:t>login</a:t>
+            </a:r>
+            <a:r>
+              <a:rPr lang="de-DE" sz="1600" dirty="0">
+                <a:latin typeface="Consolas" panose="020B0609020204030204" pitchFamily="49" charset="0"/>
+              </a:rPr>
+              <a:t> $CI_REGISTRY -u $CI_REGISTRY_USER --password-</a:t>
+            </a:r>
+            <a:r>
+              <a:rPr lang="de-DE" sz="1600" dirty="0" err="1">
+                <a:latin typeface="Consolas" panose="020B0609020204030204" pitchFamily="49" charset="0"/>
+              </a:rPr>
+              <a:t>stdin</a:t>
+            </a:r>
+            <a:endParaRPr lang="de-DE" sz="1600" dirty="0">
+              <a:latin typeface="Consolas" panose="020B0609020204030204" pitchFamily="49" charset="0"/>
+            </a:endParaRPr>
+          </a:p>
+          <a:p>
+            <a:pPr>
+              <a:buFont typeface="Arial" panose="020B0604020202020204" pitchFamily="34" charset="0"/>
+              <a:buChar char="•"/>
+            </a:pPr>
+            <a:r>
+              <a:rPr lang="de-DE" sz="1800" dirty="0"/>
+              <a:t>CI Job Token</a:t>
+            </a:r>
+          </a:p>
+          <a:p>
+            <a:pPr lvl="1">
+              <a:buFont typeface="Arial" panose="020B0604020202020204" pitchFamily="34" charset="0"/>
+              <a:buChar char="•"/>
+            </a:pPr>
+            <a:r>
+              <a:rPr lang="de-DE" sz="1600" dirty="0">
+                <a:latin typeface="Consolas" panose="020B0609020204030204" pitchFamily="49" charset="0"/>
+              </a:rPr>
+              <a:t>echo "$CI_JOB_TOKEN" | </a:t>
+            </a:r>
+            <a:r>
+              <a:rPr lang="de-DE" sz="1600" dirty="0" err="1">
+                <a:latin typeface="Consolas" panose="020B0609020204030204" pitchFamily="49" charset="0"/>
+              </a:rPr>
+              <a:t>docker</a:t>
+            </a:r>
+            <a:r>
+              <a:rPr lang="de-DE" sz="1600" dirty="0">
+                <a:latin typeface="Consolas" panose="020B0609020204030204" pitchFamily="49" charset="0"/>
+              </a:rPr>
+              <a:t> </a:t>
+            </a:r>
+            <a:r>
+              <a:rPr lang="de-DE" sz="1600" dirty="0" err="1">
+                <a:latin typeface="Consolas" panose="020B0609020204030204" pitchFamily="49" charset="0"/>
+              </a:rPr>
+              <a:t>login</a:t>
+            </a:r>
+            <a:r>
+              <a:rPr lang="de-DE" sz="1600" dirty="0">
+                <a:latin typeface="Consolas" panose="020B0609020204030204" pitchFamily="49" charset="0"/>
+              </a:rPr>
+              <a:t> $CI_REGISTRY -u $CI_REGISTRY_USER --password-</a:t>
+            </a:r>
+            <a:r>
+              <a:rPr lang="de-DE" sz="1600" dirty="0" err="1">
+                <a:latin typeface="Consolas" panose="020B0609020204030204" pitchFamily="49" charset="0"/>
+              </a:rPr>
+              <a:t>stdin</a:t>
+            </a:r>
+            <a:endParaRPr lang="de-DE" sz="1600" dirty="0">
+              <a:latin typeface="Consolas" panose="020B0609020204030204" pitchFamily="49" charset="0"/>
+            </a:endParaRPr>
+          </a:p>
+          <a:p>
+            <a:pPr>
+              <a:buFont typeface="Arial" panose="020B0604020202020204" pitchFamily="34" charset="0"/>
+              <a:buChar char="•"/>
+            </a:pPr>
+            <a:r>
+              <a:rPr lang="de-DE" sz="1800" dirty="0"/>
+              <a:t>Für </a:t>
+            </a:r>
+            <a:r>
+              <a:rPr lang="de-DE" sz="1800" dirty="0" err="1"/>
+              <a:t>read</a:t>
+            </a:r>
+            <a:r>
+              <a:rPr lang="de-DE" sz="1800" dirty="0"/>
+              <a:t> (pull) </a:t>
+            </a:r>
+            <a:r>
+              <a:rPr lang="de-DE" sz="1800" dirty="0" err="1"/>
+              <a:t>access</a:t>
+            </a:r>
+            <a:r>
+              <a:rPr lang="de-DE" sz="1800" dirty="0"/>
+              <a:t> </a:t>
+            </a:r>
+            <a:r>
+              <a:rPr lang="de-DE" sz="1800" dirty="0">
+                <a:sym typeface="Wingdings" panose="05000000000000000000" pitchFamily="2" charset="2"/>
+              </a:rPr>
+              <a:t> </a:t>
+            </a:r>
+            <a:r>
+              <a:rPr lang="de-DE" sz="1800" dirty="0" err="1">
+                <a:sym typeface="Wingdings" panose="05000000000000000000" pitchFamily="2" charset="2"/>
+              </a:rPr>
+              <a:t>read_registry</a:t>
+            </a:r>
+            <a:endParaRPr lang="de-DE" sz="1800" dirty="0">
+              <a:sym typeface="Wingdings" panose="05000000000000000000" pitchFamily="2" charset="2"/>
+            </a:endParaRPr>
+          </a:p>
+          <a:p>
+            <a:pPr>
+              <a:buFont typeface="Arial" panose="020B0604020202020204" pitchFamily="34" charset="0"/>
+              <a:buChar char="•"/>
+            </a:pPr>
+            <a:r>
+              <a:rPr lang="de-DE" sz="1800" dirty="0">
+                <a:sym typeface="Wingdings" panose="05000000000000000000" pitchFamily="2" charset="2"/>
+              </a:rPr>
+              <a:t>Für </a:t>
+            </a:r>
+            <a:r>
+              <a:rPr lang="de-DE" sz="1800" dirty="0" err="1">
+                <a:sym typeface="Wingdings" panose="05000000000000000000" pitchFamily="2" charset="2"/>
+              </a:rPr>
+              <a:t>write</a:t>
+            </a:r>
+            <a:r>
+              <a:rPr lang="de-DE" sz="1800" dirty="0">
+                <a:sym typeface="Wingdings" panose="05000000000000000000" pitchFamily="2" charset="2"/>
+              </a:rPr>
+              <a:t> (push) </a:t>
+            </a:r>
+            <a:r>
+              <a:rPr lang="de-DE" sz="1800" dirty="0" err="1">
+                <a:sym typeface="Wingdings" panose="05000000000000000000" pitchFamily="2" charset="2"/>
+              </a:rPr>
+              <a:t>access</a:t>
+            </a:r>
+            <a:r>
+              <a:rPr lang="de-DE" sz="1800" dirty="0">
+                <a:sym typeface="Wingdings" panose="05000000000000000000" pitchFamily="2" charset="2"/>
+              </a:rPr>
+              <a:t>  </a:t>
+            </a:r>
+            <a:r>
+              <a:rPr lang="de-DE" sz="1800" dirty="0" err="1">
+                <a:sym typeface="Wingdings" panose="05000000000000000000" pitchFamily="2" charset="2"/>
+              </a:rPr>
+              <a:t>read_registry</a:t>
+            </a:r>
+            <a:r>
+              <a:rPr lang="de-DE" sz="1800" dirty="0">
+                <a:sym typeface="Wingdings" panose="05000000000000000000" pitchFamily="2" charset="2"/>
+              </a:rPr>
+              <a:t> &amp; </a:t>
+            </a:r>
+            <a:r>
+              <a:rPr lang="de-DE" sz="1800" dirty="0" err="1">
+                <a:sym typeface="Wingdings" panose="05000000000000000000" pitchFamily="2" charset="2"/>
+              </a:rPr>
+              <a:t>write_registry</a:t>
+            </a:r>
+            <a:endParaRPr lang="de-DE" sz="1800" dirty="0"/>
+          </a:p>
+          <a:p>
+            <a:pPr lvl="1">
+              <a:buFont typeface="Arial" panose="020B0604020202020204" pitchFamily="34" charset="0"/>
+              <a:buChar char="•"/>
+            </a:pPr>
+            <a:r>
+              <a:rPr lang="de-DE" sz="1600" dirty="0"/>
+              <a:t>Deploy Token</a:t>
+            </a:r>
+          </a:p>
+          <a:p>
             <a:pPr lvl="2">
               <a:buFont typeface="Arial" panose="020B0604020202020204" pitchFamily="34" charset="0"/>
               <a:buChar char="•"/>
             </a:pPr>
-            <a:endParaRPr lang="de-DE" dirty="0"/>
+            <a:r>
+              <a:rPr lang="de-DE" sz="1600" dirty="0">
+                <a:latin typeface="Consolas" panose="020B0609020204030204" pitchFamily="49" charset="0"/>
+              </a:rPr>
+              <a:t>echo "$CI_DEPLOY_PASSWORD" | </a:t>
+            </a:r>
+            <a:r>
+              <a:rPr lang="de-DE" sz="1600" dirty="0" err="1">
+                <a:latin typeface="Consolas" panose="020B0609020204030204" pitchFamily="49" charset="0"/>
+              </a:rPr>
+              <a:t>docker</a:t>
+            </a:r>
+            <a:r>
+              <a:rPr lang="de-DE" sz="1600" dirty="0">
+                <a:latin typeface="Consolas" panose="020B0609020204030204" pitchFamily="49" charset="0"/>
+              </a:rPr>
+              <a:t> </a:t>
+            </a:r>
+            <a:r>
+              <a:rPr lang="de-DE" sz="1600" dirty="0" err="1">
+                <a:latin typeface="Consolas" panose="020B0609020204030204" pitchFamily="49" charset="0"/>
+              </a:rPr>
+              <a:t>login</a:t>
+            </a:r>
+            <a:r>
+              <a:rPr lang="de-DE" sz="1600" dirty="0">
+                <a:latin typeface="Consolas" panose="020B0609020204030204" pitchFamily="49" charset="0"/>
+              </a:rPr>
+              <a:t> $CI_REGISTRY -u $CI_DEPLOY_USER --password-</a:t>
+            </a:r>
+            <a:r>
+              <a:rPr lang="de-DE" sz="1600" dirty="0" err="1">
+                <a:latin typeface="Consolas" panose="020B0609020204030204" pitchFamily="49" charset="0"/>
+              </a:rPr>
+              <a:t>stdin</a:t>
+            </a:r>
+            <a:endParaRPr lang="de-DE" sz="1600" dirty="0">
+              <a:latin typeface="Consolas" panose="020B0609020204030204" pitchFamily="49" charset="0"/>
+            </a:endParaRPr>
+          </a:p>
+          <a:p>
+            <a:pPr lvl="1">
+              <a:buFont typeface="Arial" panose="020B0604020202020204" pitchFamily="34" charset="0"/>
+              <a:buChar char="•"/>
+            </a:pPr>
+            <a:r>
+              <a:rPr lang="de-DE" sz="1600" dirty="0"/>
+              <a:t>Personal Access Token</a:t>
+            </a:r>
+          </a:p>
+          <a:p>
+            <a:pPr lvl="2">
+              <a:buFont typeface="Arial" panose="020B0604020202020204" pitchFamily="34" charset="0"/>
+              <a:buChar char="•"/>
+            </a:pPr>
+            <a:r>
+              <a:rPr lang="en-US" sz="1600" dirty="0">
+                <a:latin typeface="Consolas" panose="020B0609020204030204" pitchFamily="49" charset="0"/>
+              </a:rPr>
+              <a:t>echo "&lt;</a:t>
+            </a:r>
+            <a:r>
+              <a:rPr lang="en-US" sz="1600" dirty="0" err="1">
+                <a:latin typeface="Consolas" panose="020B0609020204030204" pitchFamily="49" charset="0"/>
+              </a:rPr>
+              <a:t>access_token</a:t>
+            </a:r>
+            <a:r>
+              <a:rPr lang="en-US" sz="1600" dirty="0">
+                <a:latin typeface="Consolas" panose="020B0609020204030204" pitchFamily="49" charset="0"/>
+              </a:rPr>
+              <a:t>&gt;" | docker login $CI_REGISTRY -u &lt;username&gt; --password-stdin</a:t>
+            </a:r>
+          </a:p>
+          <a:p>
+            <a:pPr lvl="2">
+              <a:buFont typeface="Arial" panose="020B0604020202020204" pitchFamily="34" charset="0"/>
+              <a:buChar char="•"/>
+            </a:pPr>
+            <a:endParaRPr lang="en-US" sz="2000" dirty="0"/>
+          </a:p>
+          <a:p>
+            <a:pPr lvl="2">
+              <a:buFont typeface="Arial" panose="020B0604020202020204" pitchFamily="34" charset="0"/>
+              <a:buChar char="•"/>
+            </a:pPr>
+            <a:endParaRPr lang="de-DE" sz="2000" dirty="0"/>
+          </a:p>
+          <a:p>
+            <a:pPr lvl="1">
+              <a:buFont typeface="Arial" panose="020B0604020202020204" pitchFamily="34" charset="0"/>
+              <a:buChar char="•"/>
+            </a:pPr>
+            <a:endParaRPr lang="de-DE" sz="1600" dirty="0"/>
           </a:p>
           <a:p>
             <a:pPr lvl="1">
@@ -8296,6 +9458,88 @@
             <a:endParaRPr lang="de-DE" dirty="0"/>
           </a:p>
           <a:p>
+            <a:pPr marL="457200" indent="-457200">
+              <a:buFont typeface="+mj-lt"/>
+              <a:buAutoNum type="arabicPeriod"/>
+            </a:pPr>
+            <a:r>
+              <a:rPr lang="de-DE" dirty="0"/>
+              <a:t>Mit der Container Registry authentifizieren</a:t>
+            </a:r>
+          </a:p>
+          <a:p>
+            <a:pPr marL="457200" indent="-457200">
+              <a:buFont typeface="+mj-lt"/>
+              <a:buAutoNum type="arabicPeriod"/>
+            </a:pPr>
+            <a:r>
+              <a:rPr lang="de-DE" dirty="0"/>
+              <a:t>Docker nutzen</a:t>
+            </a:r>
+          </a:p>
+          <a:p>
+            <a:pPr marL="857250" lvl="1" indent="-457200">
+              <a:buFont typeface="+mj-lt"/>
+              <a:buAutoNum type="arabicPeriod"/>
+            </a:pPr>
+            <a:r>
+              <a:rPr lang="de-DE" dirty="0" err="1"/>
+              <a:t>Build</a:t>
+            </a:r>
+            <a:r>
+              <a:rPr lang="de-DE" dirty="0"/>
+              <a:t>:</a:t>
+            </a:r>
+            <a:br>
+              <a:rPr lang="de-DE" dirty="0"/>
+            </a:br>
+            <a:r>
+              <a:rPr lang="en-US" sz="1800" dirty="0">
+                <a:latin typeface="Consolas" panose="020B0609020204030204" pitchFamily="49" charset="0"/>
+              </a:rPr>
+              <a:t>docker build -t registry.example.com/group/project/image .</a:t>
+            </a:r>
+            <a:endParaRPr lang="de-DE" sz="1800" dirty="0">
+              <a:latin typeface="Consolas" panose="020B0609020204030204" pitchFamily="49" charset="0"/>
+            </a:endParaRPr>
+          </a:p>
+          <a:p>
+            <a:pPr marL="857250" lvl="1" indent="-457200">
+              <a:buFont typeface="+mj-lt"/>
+              <a:buAutoNum type="arabicPeriod"/>
+            </a:pPr>
+            <a:r>
+              <a:rPr lang="de-DE" dirty="0"/>
+              <a:t>Push:</a:t>
+            </a:r>
+            <a:br>
+              <a:rPr lang="de-DE" dirty="0"/>
+            </a:br>
+            <a:r>
+              <a:rPr lang="en-US" sz="1800" dirty="0">
+                <a:latin typeface="Consolas" panose="020B0609020204030204" pitchFamily="49" charset="0"/>
+              </a:rPr>
+              <a:t>docker push registry.example.com/group/project/image</a:t>
+            </a:r>
+            <a:endParaRPr lang="en-US" dirty="0">
+              <a:latin typeface="Consolas" panose="020B0609020204030204" pitchFamily="49" charset="0"/>
+            </a:endParaRPr>
+          </a:p>
+          <a:p>
+            <a:pPr marL="857250" lvl="1" indent="-457200">
+              <a:buFont typeface="+mj-lt"/>
+              <a:buAutoNum type="arabicPeriod"/>
+            </a:pPr>
+            <a:endParaRPr lang="en-US" dirty="0"/>
+          </a:p>
+          <a:p>
+            <a:pPr marL="857250" lvl="1" indent="-457200">
+              <a:buFont typeface="+mj-lt"/>
+              <a:buAutoNum type="arabicPeriod"/>
+            </a:pPr>
+            <a:endParaRPr lang="de-DE" dirty="0"/>
+          </a:p>
+          <a:p>
             <a:pPr lvl="2">
               <a:buFont typeface="Arial" panose="020B0604020202020204" pitchFamily="34" charset="0"/>
               <a:buChar char="•"/>
@@ -8346,6 +9590,201 @@
           <p:cNvPr id="2" name="Titel 1">
             <a:extLst>
               <a:ext uri="{FF2B5EF4-FFF2-40B4-BE49-F238E27FC236}">
+                <a16:creationId xmlns:a16="http://schemas.microsoft.com/office/drawing/2014/main" id="{6A1129EC-B79C-98B8-054A-227290E5E743}"/>
+              </a:ext>
+            </a:extLst>
+          </p:cNvPr>
+          <p:cNvSpPr>
+            <a:spLocks noGrp="1"/>
+          </p:cNvSpPr>
+          <p:nvPr>
+            <p:ph type="title"/>
+          </p:nvPr>
+        </p:nvSpPr>
+        <p:spPr/>
+        <p:txBody>
+          <a:bodyPr/>
+          <a:lstStyle/>
+          <a:p>
+            <a:r>
+              <a:rPr lang="de-DE" cap="none" dirty="0"/>
+              <a:t>Release- und </a:t>
+            </a:r>
+            <a:r>
+              <a:rPr lang="de-DE" cap="none" dirty="0" err="1"/>
+              <a:t>Tagged</a:t>
+            </a:r>
+            <a:r>
+              <a:rPr lang="de-DE" cap="none" dirty="0"/>
+              <a:t>-Images</a:t>
+            </a:r>
+            <a:endParaRPr lang="de-DE" dirty="0"/>
+          </a:p>
+        </p:txBody>
+      </p:sp>
+      <p:sp>
+        <p:nvSpPr>
+          <p:cNvPr id="3" name="Inhaltsplatzhalter 2">
+            <a:extLst>
+              <a:ext uri="{FF2B5EF4-FFF2-40B4-BE49-F238E27FC236}">
+                <a16:creationId xmlns:a16="http://schemas.microsoft.com/office/drawing/2014/main" id="{82E76C24-ACDF-81B8-5FFA-EC3D55CB7211}"/>
+              </a:ext>
+            </a:extLst>
+          </p:cNvPr>
+          <p:cNvSpPr>
+            <a:spLocks noGrp="1"/>
+          </p:cNvSpPr>
+          <p:nvPr>
+            <p:ph idx="1"/>
+          </p:nvPr>
+        </p:nvSpPr>
+        <p:spPr/>
+        <p:txBody>
+          <a:bodyPr/>
+          <a:lstStyle/>
+          <a:p>
+            <a:pPr marL="0" indent="0">
+              <a:buNone/>
+            </a:pPr>
+            <a:r>
+              <a:rPr lang="en-US" dirty="0"/>
+              <a:t>Configure your .</a:t>
+            </a:r>
+            <a:r>
+              <a:rPr lang="en-US" dirty="0" err="1"/>
+              <a:t>gitlab-ci.yml</a:t>
+            </a:r>
+            <a:r>
+              <a:rPr lang="en-US" dirty="0"/>
+              <a:t> file</a:t>
+            </a:r>
+          </a:p>
+          <a:p>
+            <a:pPr marL="0" indent="0">
+              <a:buNone/>
+            </a:pPr>
+            <a:r>
+              <a:rPr lang="en-US" dirty="0"/>
+              <a:t>You can configure your .</a:t>
+            </a:r>
+            <a:r>
+              <a:rPr lang="en-US" dirty="0" err="1"/>
+              <a:t>gitlab-ci.yml</a:t>
+            </a:r>
+            <a:r>
+              <a:rPr lang="en-US" dirty="0"/>
+              <a:t> file to build and push container images to the container registry.</a:t>
+            </a:r>
+          </a:p>
+          <a:p>
+            <a:pPr marL="0" indent="0">
+              <a:buNone/>
+            </a:pPr>
+            <a:endParaRPr lang="en-US" dirty="0"/>
+          </a:p>
+          <a:p>
+            <a:pPr marL="0" indent="0">
+              <a:buNone/>
+            </a:pPr>
+            <a:r>
+              <a:rPr lang="en-US" dirty="0"/>
+              <a:t>If multiple jobs require authentication, put the authentication command in the </a:t>
+            </a:r>
+            <a:r>
+              <a:rPr lang="en-US" dirty="0" err="1"/>
+              <a:t>before_script</a:t>
+            </a:r>
+            <a:r>
+              <a:rPr lang="en-US" dirty="0"/>
+              <a:t>.</a:t>
+            </a:r>
+          </a:p>
+          <a:p>
+            <a:pPr marL="0" indent="0">
+              <a:buNone/>
+            </a:pPr>
+            <a:r>
+              <a:rPr lang="en-US" dirty="0"/>
+              <a:t>Before building, use docker build --pull to fetch changes to base images. It takes slightly longer, but it ensures your image is up-to-date.</a:t>
+            </a:r>
+          </a:p>
+          <a:p>
+            <a:pPr marL="0" indent="0">
+              <a:buNone/>
+            </a:pPr>
+            <a:r>
+              <a:rPr lang="en-US" dirty="0"/>
+              <a:t>Before each docker run, do an explicit docker pull to fetch the image that was just built. This step is especially important if you are using multiple runners that cache images locally.</a:t>
+            </a:r>
+          </a:p>
+          <a:p>
+            <a:pPr marL="0" indent="0">
+              <a:buNone/>
+            </a:pPr>
+            <a:endParaRPr lang="en-US" dirty="0"/>
+          </a:p>
+          <a:p>
+            <a:pPr marL="0" indent="0">
+              <a:buNone/>
+            </a:pPr>
+            <a:r>
+              <a:rPr lang="en-US" dirty="0"/>
+              <a:t>If you use the Git SHA in your image tag, each job is unique and you should never have a stale image. However, it’s still possible to have a stale image if you rebuild a given commit after a dependency has changed.</a:t>
+            </a:r>
+          </a:p>
+          <a:p>
+            <a:pPr marL="0" indent="0">
+              <a:buNone/>
+            </a:pPr>
+            <a:endParaRPr lang="en-US" dirty="0"/>
+          </a:p>
+          <a:p>
+            <a:pPr marL="0" indent="0">
+              <a:buNone/>
+            </a:pPr>
+            <a:r>
+              <a:rPr lang="en-US" dirty="0"/>
+              <a:t>Don’t build directly to the latest tag because multiple jobs may be happening simultaneously.</a:t>
+            </a:r>
+            <a:endParaRPr lang="de-DE" dirty="0"/>
+          </a:p>
+        </p:txBody>
+      </p:sp>
+    </p:spTree>
+    <p:extLst>
+      <p:ext uri="{BB962C8B-B14F-4D97-AF65-F5344CB8AC3E}">
+        <p14:creationId xmlns:p14="http://schemas.microsoft.com/office/powerpoint/2010/main" val="4255989784"/>
+      </p:ext>
+    </p:extLst>
+  </p:cSld>
+  <p:clrMapOvr>
+    <a:masterClrMapping/>
+  </p:clrMapOvr>
+</p:sld>
+</file>
+
+<file path=ppt/slides/slide26.xml><?xml version="1.0" encoding="utf-8"?>
+<p:sld xmlns:a="http://schemas.openxmlformats.org/drawingml/2006/main" xmlns:r="http://schemas.openxmlformats.org/officeDocument/2006/relationships" xmlns:p="http://schemas.openxmlformats.org/presentationml/2006/main">
+  <p:cSld>
+    <p:spTree>
+      <p:nvGrpSpPr>
+        <p:cNvPr id="1" name=""/>
+        <p:cNvGrpSpPr/>
+        <p:nvPr/>
+      </p:nvGrpSpPr>
+      <p:grpSpPr>
+        <a:xfrm>
+          <a:off x="0" y="0"/>
+          <a:ext cx="0" cy="0"/>
+          <a:chOff x="0" y="0"/>
+          <a:chExt cx="0" cy="0"/>
+        </a:xfrm>
+      </p:grpSpPr>
+      <p:sp>
+        <p:nvSpPr>
+          <p:cNvPr id="2" name="Titel 1">
+            <a:extLst>
+              <a:ext uri="{FF2B5EF4-FFF2-40B4-BE49-F238E27FC236}">
                 <a16:creationId xmlns:a16="http://schemas.microsoft.com/office/drawing/2014/main" id="{184AFD09-5210-6F86-C2FD-BBC016D382A6}"/>
               </a:ext>
             </a:extLst>
@@ -8403,19 +9842,106 @@
               <a:buNone/>
             </a:pPr>
             <a:r>
-              <a:rPr lang="de-DE" b="1" dirty="0"/>
-              <a:t>Verwendung mit </a:t>
-            </a:r>
-            <a:r>
               <a:rPr lang="de-DE" b="1" dirty="0" err="1"/>
               <a:t>GitLab</a:t>
             </a:r>
-            <a:endParaRPr lang="de-DE" dirty="0"/>
-          </a:p>
-          <a:p>
-            <a:pPr lvl="2">
-              <a:buFont typeface="Arial" panose="020B0604020202020204" pitchFamily="34" charset="0"/>
-              <a:buChar char="•"/>
+            <a:r>
+              <a:rPr lang="de-DE" b="1" dirty="0"/>
+              <a:t> CI/CD</a:t>
+            </a:r>
+          </a:p>
+          <a:p>
+            <a:pPr algn="l"/>
+            <a:r>
+              <a:rPr lang="en-US" b="1" i="0" dirty="0">
+                <a:solidFill>
+                  <a:srgbClr val="222261"/>
+                </a:solidFill>
+                <a:effectLst/>
+                <a:latin typeface="gitlab sans"/>
+              </a:rPr>
+              <a:t>Use GitLab CI/CD</a:t>
+            </a:r>
+          </a:p>
+          <a:p>
+            <a:pPr algn="l"/>
+            <a:r>
+              <a:rPr lang="en-US" b="0" i="0" dirty="0">
+                <a:solidFill>
+                  <a:srgbClr val="404040"/>
+                </a:solidFill>
+                <a:effectLst/>
+                <a:latin typeface="gitlab sans"/>
+              </a:rPr>
+              <a:t>You can use </a:t>
+            </a:r>
+            <a:r>
+              <a:rPr lang="en-US" b="0" i="0" u="none" strike="noStrike" dirty="0">
+                <a:solidFill>
+                  <a:srgbClr val="5943B6"/>
+                </a:solidFill>
+                <a:effectLst/>
+                <a:latin typeface="gitlab sans"/>
+                <a:hlinkClick r:id="rId3"/>
+              </a:rPr>
+              <a:t>GitLab CI/CD</a:t>
+            </a:r>
+            <a:r>
+              <a:rPr lang="en-US" b="0" i="0" dirty="0">
+                <a:solidFill>
+                  <a:srgbClr val="404040"/>
+                </a:solidFill>
+                <a:effectLst/>
+                <a:latin typeface="gitlab sans"/>
+              </a:rPr>
+              <a:t> to build and push container images to the Container Registry. You can use CI/CD to test, build, and deploy your project from the container image you created.</a:t>
+            </a:r>
+          </a:p>
+          <a:p>
+            <a:pPr marL="0" indent="0">
+              <a:buNone/>
+            </a:pPr>
+            <a:endParaRPr lang="de-DE" b="1" dirty="0"/>
+          </a:p>
+          <a:p>
+            <a:pPr marL="0" indent="0">
+              <a:buNone/>
+            </a:pPr>
+            <a:r>
+              <a:rPr lang="en-US" b="1" i="0" dirty="0">
+                <a:solidFill>
+                  <a:srgbClr val="222261"/>
+                </a:solidFill>
+                <a:effectLst/>
+                <a:latin typeface="gitlab sans"/>
+              </a:rPr>
+              <a:t>Use a Docker-in-Docker container image from your container registry</a:t>
+            </a:r>
+          </a:p>
+          <a:p>
+            <a:pPr marL="0" indent="0">
+              <a:buNone/>
+            </a:pPr>
+            <a:endParaRPr lang="de-DE" b="1" dirty="0"/>
+          </a:p>
+          <a:p>
+            <a:pPr marL="0" indent="0">
+              <a:buNone/>
+            </a:pPr>
+            <a:r>
+              <a:rPr lang="en-US" b="1" i="0" dirty="0">
+                <a:solidFill>
+                  <a:srgbClr val="222261"/>
+                </a:solidFill>
+                <a:effectLst/>
+                <a:latin typeface="gitlab sans"/>
+              </a:rPr>
+              <a:t>Use a Docker-in-Docker container image with Dependency Proxy</a:t>
+            </a:r>
+          </a:p>
+          <a:p>
+            <a:pPr marL="0" indent="0">
+              <a:buNone/>
             </a:pPr>
             <a:endParaRPr lang="de-DE" dirty="0"/>
           </a:p>
@@ -8432,6 +9958,712 @@
     <p:extLst>
       <p:ext uri="{BB962C8B-B14F-4D97-AF65-F5344CB8AC3E}">
         <p14:creationId xmlns:p14="http://schemas.microsoft.com/office/powerpoint/2010/main" val="2121417730"/>
+      </p:ext>
+    </p:extLst>
+  </p:cSld>
+  <p:clrMapOvr>
+    <a:masterClrMapping/>
+  </p:clrMapOvr>
+</p:sld>
+</file>
+
+<file path=ppt/slides/slide27.xml><?xml version="1.0" encoding="utf-8"?>
+<p:sld xmlns:a="http://schemas.openxmlformats.org/drawingml/2006/main" xmlns:r="http://schemas.openxmlformats.org/officeDocument/2006/relationships" xmlns:p="http://schemas.openxmlformats.org/presentationml/2006/main">
+  <p:cSld>
+    <p:spTree>
+      <p:nvGrpSpPr>
+        <p:cNvPr id="1" name=""/>
+        <p:cNvGrpSpPr/>
+        <p:nvPr/>
+      </p:nvGrpSpPr>
+      <p:grpSpPr>
+        <a:xfrm>
+          <a:off x="0" y="0"/>
+          <a:ext cx="0" cy="0"/>
+          <a:chOff x="0" y="0"/>
+          <a:chExt cx="0" cy="0"/>
+        </a:xfrm>
+      </p:grpSpPr>
+      <p:sp>
+        <p:nvSpPr>
+          <p:cNvPr id="2" name="Titel 1">
+            <a:extLst>
+              <a:ext uri="{FF2B5EF4-FFF2-40B4-BE49-F238E27FC236}">
+                <a16:creationId xmlns:a16="http://schemas.microsoft.com/office/drawing/2014/main" id="{184AFD09-5210-6F86-C2FD-BBC016D382A6}"/>
+              </a:ext>
+            </a:extLst>
+          </p:cNvPr>
+          <p:cNvSpPr>
+            <a:spLocks noGrp="1"/>
+          </p:cNvSpPr>
+          <p:nvPr>
+            <p:ph type="title"/>
+          </p:nvPr>
+        </p:nvSpPr>
+        <p:spPr/>
+        <p:txBody>
+          <a:bodyPr/>
+          <a:lstStyle/>
+          <a:p>
+            <a:r>
+              <a:rPr lang="de-DE" cap="none" dirty="0"/>
+              <a:t>Release- und </a:t>
+            </a:r>
+            <a:r>
+              <a:rPr lang="de-DE" cap="none" dirty="0" err="1"/>
+              <a:t>Tagged</a:t>
+            </a:r>
+            <a:r>
+              <a:rPr lang="de-DE" cap="none" dirty="0"/>
+              <a:t>-Images</a:t>
+            </a:r>
+            <a:endParaRPr lang="de-DE" dirty="0"/>
+          </a:p>
+        </p:txBody>
+      </p:sp>
+      <p:sp>
+        <p:nvSpPr>
+          <p:cNvPr id="6" name="Inhaltsplatzhalter 5">
+            <a:extLst>
+              <a:ext uri="{FF2B5EF4-FFF2-40B4-BE49-F238E27FC236}">
+                <a16:creationId xmlns:a16="http://schemas.microsoft.com/office/drawing/2014/main" id="{D2412707-84D3-F572-4709-FD9A95F28E5B}"/>
+              </a:ext>
+            </a:extLst>
+          </p:cNvPr>
+          <p:cNvSpPr>
+            <a:spLocks noGrp="1"/>
+          </p:cNvSpPr>
+          <p:nvPr>
+            <p:ph idx="1"/>
+          </p:nvPr>
+        </p:nvSpPr>
+        <p:spPr/>
+        <p:txBody>
+          <a:bodyPr/>
+          <a:lstStyle/>
+          <a:p>
+            <a:pPr algn="l"/>
+            <a:r>
+              <a:rPr lang="en-US" b="1" i="0" dirty="0">
+                <a:solidFill>
+                  <a:srgbClr val="222261"/>
+                </a:solidFill>
+                <a:effectLst/>
+                <a:latin typeface="gitlab sans"/>
+              </a:rPr>
+              <a:t>Use a Docker-in-Docker container image from your container registry</a:t>
+            </a:r>
+          </a:p>
+          <a:p>
+            <a:pPr marL="0" indent="0" algn="l">
+              <a:buNone/>
+            </a:pPr>
+            <a:r>
+              <a:rPr lang="en-US" dirty="0"/>
+              <a:t>You can use your own container images for Docker-in-Docker.</a:t>
+            </a:r>
+          </a:p>
+          <a:p>
+            <a:pPr marL="0" indent="0" algn="l">
+              <a:buNone/>
+            </a:pPr>
+            <a:endParaRPr lang="en-US" dirty="0"/>
+          </a:p>
+          <a:p>
+            <a:pPr marL="0" indent="0" algn="l">
+              <a:buNone/>
+            </a:pPr>
+            <a:r>
+              <a:rPr lang="en-US" dirty="0"/>
+              <a:t>Set up Docker-in-Docker.</a:t>
+            </a:r>
+          </a:p>
+          <a:p>
+            <a:pPr marL="0" indent="0" algn="l">
+              <a:buNone/>
+            </a:pPr>
+            <a:r>
+              <a:rPr lang="en-US" dirty="0"/>
+              <a:t>Update the image and service to point to your registry.</a:t>
+            </a:r>
+          </a:p>
+          <a:p>
+            <a:pPr marL="0" indent="0" algn="l">
+              <a:buNone/>
+            </a:pPr>
+            <a:r>
+              <a:rPr lang="en-US" dirty="0"/>
+              <a:t>Add a service alias.</a:t>
+            </a:r>
+          </a:p>
+          <a:p>
+            <a:pPr marL="0" indent="0" algn="l">
+              <a:buNone/>
+            </a:pPr>
+            <a:r>
+              <a:rPr lang="en-US" dirty="0"/>
+              <a:t>Your .</a:t>
+            </a:r>
+            <a:r>
+              <a:rPr lang="en-US" dirty="0" err="1"/>
+              <a:t>gitlab-ci.yml</a:t>
+            </a:r>
+            <a:r>
+              <a:rPr lang="en-US" dirty="0"/>
+              <a:t> should look similar to this:</a:t>
+            </a:r>
+          </a:p>
+          <a:p>
+            <a:pPr marL="0" indent="0" algn="l">
+              <a:buNone/>
+            </a:pPr>
+            <a:endParaRPr lang="en-US" dirty="0"/>
+          </a:p>
+          <a:p>
+            <a:pPr marL="0" indent="0" algn="l">
+              <a:buNone/>
+            </a:pPr>
+            <a:r>
+              <a:rPr lang="en-US" dirty="0"/>
+              <a:t>build:</a:t>
+            </a:r>
+          </a:p>
+          <a:p>
+            <a:pPr marL="0" indent="0" algn="l">
+              <a:buNone/>
+            </a:pPr>
+            <a:r>
+              <a:rPr lang="en-US" dirty="0"/>
+              <a:t>  image: $CI_REGISTRY/group/project/docker:20.10.16</a:t>
+            </a:r>
+          </a:p>
+          <a:p>
+            <a:pPr marL="0" indent="0" algn="l">
+              <a:buNone/>
+            </a:pPr>
+            <a:r>
+              <a:rPr lang="en-US" dirty="0"/>
+              <a:t>  services:</a:t>
+            </a:r>
+          </a:p>
+          <a:p>
+            <a:pPr marL="0" indent="0" algn="l">
+              <a:buNone/>
+            </a:pPr>
+            <a:r>
+              <a:rPr lang="en-US" dirty="0"/>
+              <a:t>    - name: $CI_REGISTRY/group/project/docker:20.10.16-dind</a:t>
+            </a:r>
+          </a:p>
+          <a:p>
+            <a:pPr marL="0" indent="0" algn="l">
+              <a:buNone/>
+            </a:pPr>
+            <a:r>
+              <a:rPr lang="en-US" dirty="0"/>
+              <a:t>      alias: docker</a:t>
+            </a:r>
+          </a:p>
+          <a:p>
+            <a:pPr marL="0" indent="0" algn="l">
+              <a:buNone/>
+            </a:pPr>
+            <a:r>
+              <a:rPr lang="en-US" dirty="0"/>
+              <a:t>  stage: build</a:t>
+            </a:r>
+          </a:p>
+          <a:p>
+            <a:pPr marL="0" indent="0" algn="l">
+              <a:buNone/>
+            </a:pPr>
+            <a:r>
+              <a:rPr lang="en-US" dirty="0"/>
+              <a:t>  script:</a:t>
+            </a:r>
+          </a:p>
+          <a:p>
+            <a:pPr marL="0" indent="0" algn="l">
+              <a:buNone/>
+            </a:pPr>
+            <a:r>
+              <a:rPr lang="en-US" dirty="0"/>
+              <a:t>    - docker build -t my-docker-image .</a:t>
+            </a:r>
+          </a:p>
+          <a:p>
+            <a:pPr marL="0" indent="0" algn="l">
+              <a:buNone/>
+            </a:pPr>
+            <a:r>
+              <a:rPr lang="en-US" dirty="0"/>
+              <a:t>    - docker run my-docker-image /script/to/run/tests</a:t>
+            </a:r>
+          </a:p>
+          <a:p>
+            <a:pPr marL="0" indent="0" algn="l">
+              <a:buNone/>
+            </a:pPr>
+            <a:endParaRPr lang="en-US" dirty="0"/>
+          </a:p>
+          <a:p>
+            <a:pPr marL="0" indent="0" algn="l">
+              <a:buNone/>
+            </a:pPr>
+            <a:r>
+              <a:rPr lang="en-US" dirty="0"/>
+              <a:t>If you forget to set the service alias, the container image can’t find the </a:t>
+            </a:r>
+            <a:r>
+              <a:rPr lang="en-US" dirty="0" err="1"/>
+              <a:t>dind</a:t>
+            </a:r>
+            <a:r>
+              <a:rPr lang="en-US" dirty="0"/>
+              <a:t> service, and an error like the following is shown:</a:t>
+            </a:r>
+          </a:p>
+          <a:p>
+            <a:pPr marL="0" indent="0" algn="l">
+              <a:buNone/>
+            </a:pPr>
+            <a:endParaRPr lang="en-US" dirty="0"/>
+          </a:p>
+          <a:p>
+            <a:pPr marL="0" indent="0" algn="l">
+              <a:buNone/>
+            </a:pPr>
+            <a:r>
+              <a:rPr lang="en-US" dirty="0"/>
+              <a:t>error during connect: Get http://docker:2376/v1.39/info: dial </a:t>
+            </a:r>
+            <a:r>
+              <a:rPr lang="en-US" dirty="0" err="1"/>
+              <a:t>tcp</a:t>
+            </a:r>
+            <a:r>
+              <a:rPr lang="en-US" dirty="0"/>
+              <a:t>: lookup docker </a:t>
+            </a:r>
+            <a:endParaRPr lang="de-DE" dirty="0"/>
+          </a:p>
+          <a:p>
+            <a:pPr lvl="1">
+              <a:buFont typeface="Arial" panose="020B0604020202020204" pitchFamily="34" charset="0"/>
+              <a:buChar char="•"/>
+            </a:pPr>
+            <a:endParaRPr lang="de-DE" dirty="0"/>
+          </a:p>
+        </p:txBody>
+      </p:sp>
+    </p:spTree>
+    <p:extLst>
+      <p:ext uri="{BB962C8B-B14F-4D97-AF65-F5344CB8AC3E}">
+        <p14:creationId xmlns:p14="http://schemas.microsoft.com/office/powerpoint/2010/main" val="2278471957"/>
+      </p:ext>
+    </p:extLst>
+  </p:cSld>
+  <p:clrMapOvr>
+    <a:masterClrMapping/>
+  </p:clrMapOvr>
+</p:sld>
+</file>
+
+<file path=ppt/slides/slide28.xml><?xml version="1.0" encoding="utf-8"?>
+<p:sld xmlns:a="http://schemas.openxmlformats.org/drawingml/2006/main" xmlns:r="http://schemas.openxmlformats.org/officeDocument/2006/relationships" xmlns:p="http://schemas.openxmlformats.org/presentationml/2006/main">
+  <p:cSld>
+    <p:spTree>
+      <p:nvGrpSpPr>
+        <p:cNvPr id="1" name=""/>
+        <p:cNvGrpSpPr/>
+        <p:nvPr/>
+      </p:nvGrpSpPr>
+      <p:grpSpPr>
+        <a:xfrm>
+          <a:off x="0" y="0"/>
+          <a:ext cx="0" cy="0"/>
+          <a:chOff x="0" y="0"/>
+          <a:chExt cx="0" cy="0"/>
+        </a:xfrm>
+      </p:grpSpPr>
+      <p:sp>
+        <p:nvSpPr>
+          <p:cNvPr id="2" name="Titel 1">
+            <a:extLst>
+              <a:ext uri="{FF2B5EF4-FFF2-40B4-BE49-F238E27FC236}">
+                <a16:creationId xmlns:a16="http://schemas.microsoft.com/office/drawing/2014/main" id="{184AFD09-5210-6F86-C2FD-BBC016D382A6}"/>
+              </a:ext>
+            </a:extLst>
+          </p:cNvPr>
+          <p:cNvSpPr>
+            <a:spLocks noGrp="1"/>
+          </p:cNvSpPr>
+          <p:nvPr>
+            <p:ph type="title"/>
+          </p:nvPr>
+        </p:nvSpPr>
+        <p:spPr/>
+        <p:txBody>
+          <a:bodyPr/>
+          <a:lstStyle/>
+          <a:p>
+            <a:r>
+              <a:rPr lang="de-DE" cap="none" dirty="0"/>
+              <a:t>Release- und </a:t>
+            </a:r>
+            <a:r>
+              <a:rPr lang="de-DE" cap="none" dirty="0" err="1"/>
+              <a:t>Tagged</a:t>
+            </a:r>
+            <a:r>
+              <a:rPr lang="de-DE" cap="none" dirty="0"/>
+              <a:t>-Images</a:t>
+            </a:r>
+            <a:endParaRPr lang="de-DE" dirty="0"/>
+          </a:p>
+        </p:txBody>
+      </p:sp>
+      <p:sp>
+        <p:nvSpPr>
+          <p:cNvPr id="6" name="Inhaltsplatzhalter 5">
+            <a:extLst>
+              <a:ext uri="{FF2B5EF4-FFF2-40B4-BE49-F238E27FC236}">
+                <a16:creationId xmlns:a16="http://schemas.microsoft.com/office/drawing/2014/main" id="{D2412707-84D3-F572-4709-FD9A95F28E5B}"/>
+              </a:ext>
+            </a:extLst>
+          </p:cNvPr>
+          <p:cNvSpPr>
+            <a:spLocks noGrp="1"/>
+          </p:cNvSpPr>
+          <p:nvPr>
+            <p:ph idx="1"/>
+          </p:nvPr>
+        </p:nvSpPr>
+        <p:spPr/>
+        <p:txBody>
+          <a:bodyPr/>
+          <a:lstStyle/>
+          <a:p>
+            <a:pPr algn="l"/>
+            <a:r>
+              <a:rPr lang="en-US" b="1" i="0" dirty="0">
+                <a:solidFill>
+                  <a:srgbClr val="222261"/>
+                </a:solidFill>
+                <a:effectLst/>
+                <a:latin typeface="gitlab sans"/>
+              </a:rPr>
+              <a:t>Use a Docker-in-Docker container image with Dependency Proxy</a:t>
+            </a:r>
+          </a:p>
+          <a:p>
+            <a:pPr marL="0" indent="0" algn="l">
+              <a:buNone/>
+            </a:pPr>
+            <a:r>
+              <a:rPr lang="en-US" dirty="0"/>
+              <a:t>You can use your own container images with Dependency Proxy.</a:t>
+            </a:r>
+          </a:p>
+          <a:p>
+            <a:pPr marL="0" indent="0" algn="l">
+              <a:buNone/>
+            </a:pPr>
+            <a:endParaRPr lang="en-US" dirty="0"/>
+          </a:p>
+          <a:p>
+            <a:pPr marL="0" indent="0" algn="l">
+              <a:buNone/>
+            </a:pPr>
+            <a:r>
+              <a:rPr lang="en-US" dirty="0"/>
+              <a:t>Set up Docker-in-Docker.</a:t>
+            </a:r>
+          </a:p>
+          <a:p>
+            <a:pPr marL="0" indent="0" algn="l">
+              <a:buNone/>
+            </a:pPr>
+            <a:r>
+              <a:rPr lang="en-US" dirty="0"/>
+              <a:t>Update the image and service to point to your registry.</a:t>
+            </a:r>
+          </a:p>
+          <a:p>
+            <a:pPr marL="0" indent="0" algn="l">
+              <a:buNone/>
+            </a:pPr>
+            <a:r>
+              <a:rPr lang="en-US" dirty="0"/>
+              <a:t>Add a service alias.</a:t>
+            </a:r>
+          </a:p>
+          <a:p>
+            <a:pPr marL="0" indent="0" algn="l">
+              <a:buNone/>
+            </a:pPr>
+            <a:r>
+              <a:rPr lang="en-US" dirty="0"/>
+              <a:t>Your .</a:t>
+            </a:r>
+            <a:r>
+              <a:rPr lang="en-US" dirty="0" err="1"/>
+              <a:t>gitlab-ci.yml</a:t>
+            </a:r>
+            <a:r>
+              <a:rPr lang="en-US" dirty="0"/>
+              <a:t> should look similar to this:</a:t>
+            </a:r>
+          </a:p>
+          <a:p>
+            <a:pPr marL="0" indent="0" algn="l">
+              <a:buNone/>
+            </a:pPr>
+            <a:endParaRPr lang="en-US" dirty="0"/>
+          </a:p>
+          <a:p>
+            <a:pPr marL="0" indent="0" algn="l">
+              <a:buNone/>
+            </a:pPr>
+            <a:r>
+              <a:rPr lang="en-US" dirty="0"/>
+              <a:t>build:</a:t>
+            </a:r>
+          </a:p>
+          <a:p>
+            <a:pPr marL="0" indent="0" algn="l">
+              <a:buNone/>
+            </a:pPr>
+            <a:r>
+              <a:rPr lang="en-US" dirty="0"/>
+              <a:t>  image: ${CI_DEPENDENCY_PROXY_GROUP_IMAGE_PREFIX}/docker:20.10.16</a:t>
+            </a:r>
+          </a:p>
+          <a:p>
+            <a:pPr marL="0" indent="0" algn="l">
+              <a:buNone/>
+            </a:pPr>
+            <a:r>
+              <a:rPr lang="en-US" dirty="0"/>
+              <a:t>  services:</a:t>
+            </a:r>
+          </a:p>
+          <a:p>
+            <a:pPr marL="0" indent="0" algn="l">
+              <a:buNone/>
+            </a:pPr>
+            <a:r>
+              <a:rPr lang="en-US" dirty="0"/>
+              <a:t>    - name: ${CI_DEPENDENCY_PROXY_GROUP_IMAGE_PREFIX}/docker:18.09.7-dind</a:t>
+            </a:r>
+          </a:p>
+          <a:p>
+            <a:pPr marL="0" indent="0" algn="l">
+              <a:buNone/>
+            </a:pPr>
+            <a:r>
+              <a:rPr lang="en-US" dirty="0"/>
+              <a:t>      alias: docker</a:t>
+            </a:r>
+          </a:p>
+          <a:p>
+            <a:pPr marL="0" indent="0" algn="l">
+              <a:buNone/>
+            </a:pPr>
+            <a:r>
+              <a:rPr lang="en-US" dirty="0"/>
+              <a:t>  stage: build</a:t>
+            </a:r>
+          </a:p>
+          <a:p>
+            <a:pPr marL="0" indent="0" algn="l">
+              <a:buNone/>
+            </a:pPr>
+            <a:r>
+              <a:rPr lang="en-US" dirty="0"/>
+              <a:t>  script:</a:t>
+            </a:r>
+          </a:p>
+          <a:p>
+            <a:pPr marL="0" indent="0" algn="l">
+              <a:buNone/>
+            </a:pPr>
+            <a:r>
+              <a:rPr lang="en-US" dirty="0"/>
+              <a:t>    - docker build -t my-docker-image .</a:t>
+            </a:r>
+          </a:p>
+          <a:p>
+            <a:pPr marL="0" indent="0" algn="l">
+              <a:buNone/>
+            </a:pPr>
+            <a:r>
+              <a:rPr lang="en-US" dirty="0"/>
+              <a:t>    - docker run my-docker-image /script/to/run/tests</a:t>
+            </a:r>
+          </a:p>
+          <a:p>
+            <a:pPr marL="0" indent="0" algn="l">
+              <a:buNone/>
+            </a:pPr>
+            <a:endParaRPr lang="en-US" dirty="0"/>
+          </a:p>
+          <a:p>
+            <a:pPr marL="0" indent="0" algn="l">
+              <a:buNone/>
+            </a:pPr>
+            <a:r>
+              <a:rPr lang="en-US" dirty="0"/>
+              <a:t>If you forget to set the service alias, the container image can’t find the </a:t>
+            </a:r>
+            <a:r>
+              <a:rPr lang="en-US" dirty="0" err="1"/>
+              <a:t>dind</a:t>
+            </a:r>
+            <a:r>
+              <a:rPr lang="en-US" dirty="0"/>
+              <a:t> service, and an error like the following is shown:</a:t>
+            </a:r>
+          </a:p>
+          <a:p>
+            <a:pPr marL="0" indent="0" algn="l">
+              <a:buNone/>
+            </a:pPr>
+            <a:endParaRPr lang="en-US" dirty="0"/>
+          </a:p>
+          <a:p>
+            <a:pPr marL="0" indent="0" algn="l">
+              <a:buNone/>
+            </a:pPr>
+            <a:r>
+              <a:rPr lang="en-US" dirty="0"/>
+              <a:t>error during connect: Get http://docker:2376/v1.39/info: dial </a:t>
+            </a:r>
+            <a:r>
+              <a:rPr lang="en-US" dirty="0" err="1"/>
+              <a:t>tcp</a:t>
+            </a:r>
+            <a:r>
+              <a:rPr lang="en-US" dirty="0"/>
+              <a:t>: lookup docker o</a:t>
+            </a:r>
+            <a:endParaRPr lang="de-DE" dirty="0"/>
+          </a:p>
+          <a:p>
+            <a:pPr lvl="1">
+              <a:buFont typeface="Arial" panose="020B0604020202020204" pitchFamily="34" charset="0"/>
+              <a:buChar char="•"/>
+            </a:pPr>
+            <a:endParaRPr lang="de-DE" dirty="0"/>
+          </a:p>
+        </p:txBody>
+      </p:sp>
+    </p:spTree>
+    <p:extLst>
+      <p:ext uri="{BB962C8B-B14F-4D97-AF65-F5344CB8AC3E}">
+        <p14:creationId xmlns:p14="http://schemas.microsoft.com/office/powerpoint/2010/main" val="1160348306"/>
+      </p:ext>
+    </p:extLst>
+  </p:cSld>
+  <p:clrMapOvr>
+    <a:masterClrMapping/>
+  </p:clrMapOvr>
+</p:sld>
+</file>
+
+<file path=ppt/slides/slide29.xml><?xml version="1.0" encoding="utf-8"?>
+<p:sld xmlns:a="http://schemas.openxmlformats.org/drawingml/2006/main" xmlns:r="http://schemas.openxmlformats.org/officeDocument/2006/relationships" xmlns:p="http://schemas.openxmlformats.org/presentationml/2006/main">
+  <p:cSld>
+    <p:spTree>
+      <p:nvGrpSpPr>
+        <p:cNvPr id="1" name=""/>
+        <p:cNvGrpSpPr/>
+        <p:nvPr/>
+      </p:nvGrpSpPr>
+      <p:grpSpPr>
+        <a:xfrm>
+          <a:off x="0" y="0"/>
+          <a:ext cx="0" cy="0"/>
+          <a:chOff x="0" y="0"/>
+          <a:chExt cx="0" cy="0"/>
+        </a:xfrm>
+      </p:grpSpPr>
+      <p:sp>
+        <p:nvSpPr>
+          <p:cNvPr id="2" name="Titel 1">
+            <a:extLst>
+              <a:ext uri="{FF2B5EF4-FFF2-40B4-BE49-F238E27FC236}">
+                <a16:creationId xmlns:a16="http://schemas.microsoft.com/office/drawing/2014/main" id="{DB1F447C-2F61-B060-8EFE-D98620927A6E}"/>
+              </a:ext>
+            </a:extLst>
+          </p:cNvPr>
+          <p:cNvSpPr>
+            <a:spLocks noGrp="1"/>
+          </p:cNvSpPr>
+          <p:nvPr>
+            <p:ph type="title"/>
+          </p:nvPr>
+        </p:nvSpPr>
+        <p:spPr/>
+        <p:txBody>
+          <a:bodyPr/>
+          <a:lstStyle/>
+          <a:p>
+            <a:endParaRPr lang="de-DE" dirty="0"/>
+          </a:p>
+        </p:txBody>
+      </p:sp>
+      <p:sp>
+        <p:nvSpPr>
+          <p:cNvPr id="3" name="Inhaltsplatzhalter 2">
+            <a:extLst>
+              <a:ext uri="{FF2B5EF4-FFF2-40B4-BE49-F238E27FC236}">
+                <a16:creationId xmlns:a16="http://schemas.microsoft.com/office/drawing/2014/main" id="{68EC2247-CA50-F34D-5B3B-2171A8AD687B}"/>
+              </a:ext>
+            </a:extLst>
+          </p:cNvPr>
+          <p:cNvSpPr>
+            <a:spLocks noGrp="1"/>
+          </p:cNvSpPr>
+          <p:nvPr>
+            <p:ph idx="1"/>
+          </p:nvPr>
+        </p:nvSpPr>
+        <p:spPr/>
+        <p:txBody>
+          <a:bodyPr/>
+          <a:lstStyle/>
+          <a:p>
+            <a:r>
+              <a:rPr lang="de-DE" dirty="0" err="1"/>
+              <a:t>Dependency</a:t>
+            </a:r>
+            <a:r>
+              <a:rPr lang="de-DE" dirty="0"/>
+              <a:t> Proxy:</a:t>
+            </a:r>
+          </a:p>
+          <a:p>
+            <a:r>
+              <a:rPr lang="de-DE" dirty="0">
+                <a:hlinkClick r:id="rId2"/>
+              </a:rPr>
+              <a:t>https://docs.gitlab.com/ee/user/packages/dependency_proxy/</a:t>
+            </a:r>
+            <a:endParaRPr lang="de-DE" dirty="0"/>
+          </a:p>
+          <a:p>
+            <a:pPr marL="0" indent="0">
+              <a:buNone/>
+            </a:pPr>
+            <a:endParaRPr lang="de-DE" dirty="0"/>
+          </a:p>
+        </p:txBody>
+      </p:sp>
+    </p:spTree>
+    <p:extLst>
+      <p:ext uri="{BB962C8B-B14F-4D97-AF65-F5344CB8AC3E}">
+        <p14:creationId xmlns:p14="http://schemas.microsoft.com/office/powerpoint/2010/main" val="844561808"/>
       </p:ext>
     </p:extLst>
   </p:cSld>
@@ -8827,6 +11059,1752 @@
     <p:extLst>
       <p:ext uri="{BB962C8B-B14F-4D97-AF65-F5344CB8AC3E}">
         <p14:creationId xmlns:p14="http://schemas.microsoft.com/office/powerpoint/2010/main" val="3071277897"/>
+      </p:ext>
+    </p:extLst>
+  </p:cSld>
+  <p:clrMapOvr>
+    <a:masterClrMapping/>
+  </p:clrMapOvr>
+</p:sld>
+</file>
+
+<file path=ppt/slides/slide30.xml><?xml version="1.0" encoding="utf-8"?>
+<p:sld xmlns:a="http://schemas.openxmlformats.org/drawingml/2006/main" xmlns:r="http://schemas.openxmlformats.org/officeDocument/2006/relationships" xmlns:p="http://schemas.openxmlformats.org/presentationml/2006/main">
+  <p:cSld>
+    <p:spTree>
+      <p:nvGrpSpPr>
+        <p:cNvPr id="1" name=""/>
+        <p:cNvGrpSpPr/>
+        <p:nvPr/>
+      </p:nvGrpSpPr>
+      <p:grpSpPr>
+        <a:xfrm>
+          <a:off x="0" y="0"/>
+          <a:ext cx="0" cy="0"/>
+          <a:chOff x="0" y="0"/>
+          <a:chExt cx="0" cy="0"/>
+        </a:xfrm>
+      </p:grpSpPr>
+      <p:sp>
+        <p:nvSpPr>
+          <p:cNvPr id="2" name="Titel 1">
+            <a:extLst>
+              <a:ext uri="{FF2B5EF4-FFF2-40B4-BE49-F238E27FC236}">
+                <a16:creationId xmlns:a16="http://schemas.microsoft.com/office/drawing/2014/main" id="{184AFD09-5210-6F86-C2FD-BBC016D382A6}"/>
+              </a:ext>
+            </a:extLst>
+          </p:cNvPr>
+          <p:cNvSpPr>
+            <a:spLocks noGrp="1"/>
+          </p:cNvSpPr>
+          <p:nvPr>
+            <p:ph type="title"/>
+          </p:nvPr>
+        </p:nvSpPr>
+        <p:spPr/>
+        <p:txBody>
+          <a:bodyPr/>
+          <a:lstStyle/>
+          <a:p>
+            <a:r>
+              <a:rPr lang="de-DE" cap="none" dirty="0"/>
+              <a:t>Release- und </a:t>
+            </a:r>
+            <a:r>
+              <a:rPr lang="de-DE" cap="none" dirty="0" err="1"/>
+              <a:t>Tagged</a:t>
+            </a:r>
+            <a:r>
+              <a:rPr lang="de-DE" cap="none" dirty="0"/>
+              <a:t>-Images</a:t>
+            </a:r>
+            <a:endParaRPr lang="de-DE" dirty="0"/>
+          </a:p>
+        </p:txBody>
+      </p:sp>
+      <p:sp>
+        <p:nvSpPr>
+          <p:cNvPr id="6" name="Inhaltsplatzhalter 5">
+            <a:extLst>
+              <a:ext uri="{FF2B5EF4-FFF2-40B4-BE49-F238E27FC236}">
+                <a16:creationId xmlns:a16="http://schemas.microsoft.com/office/drawing/2014/main" id="{D2412707-84D3-F572-4709-FD9A95F28E5B}"/>
+              </a:ext>
+            </a:extLst>
+          </p:cNvPr>
+          <p:cNvSpPr>
+            <a:spLocks noGrp="1"/>
+          </p:cNvSpPr>
+          <p:nvPr>
+            <p:ph idx="1"/>
+          </p:nvPr>
+        </p:nvSpPr>
+        <p:spPr/>
+        <p:txBody>
+          <a:bodyPr/>
+          <a:lstStyle/>
+          <a:p>
+            <a:pPr algn="l"/>
+            <a:r>
+              <a:rPr lang="en-US" b="1" i="0" dirty="0">
+                <a:solidFill>
+                  <a:srgbClr val="222261"/>
+                </a:solidFill>
+                <a:effectLst/>
+                <a:latin typeface="gitlab sans"/>
+              </a:rPr>
+              <a:t>Container registry examples with GitLab CI/CD</a:t>
+            </a:r>
+          </a:p>
+          <a:p>
+            <a:pPr marL="0" indent="0">
+              <a:buNone/>
+            </a:pPr>
+            <a:r>
+              <a:rPr lang="de-DE" dirty="0" err="1"/>
+              <a:t>If</a:t>
+            </a:r>
+            <a:r>
+              <a:rPr lang="de-DE" dirty="0"/>
+              <a:t> </a:t>
+            </a:r>
+            <a:r>
+              <a:rPr lang="de-DE" dirty="0" err="1"/>
+              <a:t>you’re</a:t>
+            </a:r>
+            <a:r>
+              <a:rPr lang="de-DE" dirty="0"/>
+              <a:t> </a:t>
+            </a:r>
+            <a:r>
+              <a:rPr lang="de-DE" dirty="0" err="1"/>
+              <a:t>using</a:t>
+            </a:r>
+            <a:r>
+              <a:rPr lang="de-DE" dirty="0"/>
+              <a:t> Docker-in-Docker on </a:t>
+            </a:r>
+            <a:r>
+              <a:rPr lang="de-DE" dirty="0" err="1"/>
+              <a:t>your</a:t>
+            </a:r>
+            <a:r>
+              <a:rPr lang="de-DE" dirty="0"/>
+              <a:t> </a:t>
+            </a:r>
+            <a:r>
+              <a:rPr lang="de-DE" dirty="0" err="1"/>
+              <a:t>runners</a:t>
+            </a:r>
+            <a:r>
+              <a:rPr lang="de-DE" dirty="0"/>
+              <a:t>, </a:t>
+            </a:r>
+            <a:r>
+              <a:rPr lang="de-DE" dirty="0" err="1"/>
+              <a:t>your</a:t>
+            </a:r>
+            <a:r>
+              <a:rPr lang="de-DE" dirty="0"/>
+              <a:t> .</a:t>
+            </a:r>
+            <a:r>
+              <a:rPr lang="de-DE" dirty="0" err="1"/>
+              <a:t>gitlab-ci.yml</a:t>
+            </a:r>
+            <a:r>
+              <a:rPr lang="de-DE" dirty="0"/>
+              <a:t> </a:t>
+            </a:r>
+            <a:r>
+              <a:rPr lang="de-DE" dirty="0" err="1"/>
+              <a:t>file</a:t>
+            </a:r>
+            <a:r>
+              <a:rPr lang="de-DE" dirty="0"/>
+              <a:t> </a:t>
+            </a:r>
+            <a:r>
+              <a:rPr lang="de-DE" dirty="0" err="1"/>
+              <a:t>should</a:t>
+            </a:r>
+            <a:r>
+              <a:rPr lang="de-DE" dirty="0"/>
+              <a:t> </a:t>
+            </a:r>
+            <a:r>
+              <a:rPr lang="de-DE" dirty="0" err="1"/>
+              <a:t>look</a:t>
+            </a:r>
+            <a:r>
+              <a:rPr lang="de-DE" dirty="0"/>
+              <a:t> </a:t>
+            </a:r>
+            <a:r>
+              <a:rPr lang="de-DE" dirty="0" err="1"/>
+              <a:t>similar</a:t>
+            </a:r>
+            <a:r>
+              <a:rPr lang="de-DE" dirty="0"/>
+              <a:t> </a:t>
+            </a:r>
+            <a:r>
+              <a:rPr lang="de-DE" dirty="0" err="1"/>
+              <a:t>to</a:t>
+            </a:r>
+            <a:r>
+              <a:rPr lang="de-DE" dirty="0"/>
+              <a:t> </a:t>
+            </a:r>
+            <a:r>
+              <a:rPr lang="de-DE" dirty="0" err="1"/>
+              <a:t>this</a:t>
+            </a:r>
+            <a:r>
+              <a:rPr lang="de-DE" dirty="0"/>
+              <a:t>:</a:t>
+            </a:r>
+          </a:p>
+          <a:p>
+            <a:pPr marL="0" indent="0">
+              <a:buNone/>
+            </a:pPr>
+            <a:endParaRPr lang="de-DE" dirty="0"/>
+          </a:p>
+          <a:p>
+            <a:pPr marL="0" indent="0">
+              <a:buNone/>
+            </a:pPr>
+            <a:r>
+              <a:rPr lang="de-DE" dirty="0" err="1"/>
+              <a:t>build</a:t>
+            </a:r>
+            <a:r>
+              <a:rPr lang="de-DE" dirty="0"/>
+              <a:t>:</a:t>
+            </a:r>
+          </a:p>
+          <a:p>
+            <a:pPr marL="0" indent="0">
+              <a:buNone/>
+            </a:pPr>
+            <a:r>
+              <a:rPr lang="de-DE" dirty="0"/>
+              <a:t>  </a:t>
+            </a:r>
+            <a:r>
+              <a:rPr lang="de-DE" dirty="0" err="1"/>
+              <a:t>image</a:t>
+            </a:r>
+            <a:r>
+              <a:rPr lang="de-DE" dirty="0"/>
+              <a:t>: docker:20.10.16</a:t>
+            </a:r>
+          </a:p>
+          <a:p>
+            <a:pPr marL="0" indent="0">
+              <a:buNone/>
+            </a:pPr>
+            <a:r>
+              <a:rPr lang="de-DE" dirty="0"/>
+              <a:t>  </a:t>
+            </a:r>
+            <a:r>
+              <a:rPr lang="de-DE" dirty="0" err="1"/>
+              <a:t>stage</a:t>
+            </a:r>
+            <a:r>
+              <a:rPr lang="de-DE" dirty="0"/>
+              <a:t>: </a:t>
+            </a:r>
+            <a:r>
+              <a:rPr lang="de-DE" dirty="0" err="1"/>
+              <a:t>build</a:t>
+            </a:r>
+            <a:endParaRPr lang="de-DE" dirty="0"/>
+          </a:p>
+          <a:p>
+            <a:pPr marL="0" indent="0">
+              <a:buNone/>
+            </a:pPr>
+            <a:r>
+              <a:rPr lang="de-DE" dirty="0"/>
+              <a:t>  </a:t>
+            </a:r>
+            <a:r>
+              <a:rPr lang="de-DE" dirty="0" err="1"/>
+              <a:t>services</a:t>
+            </a:r>
+            <a:r>
+              <a:rPr lang="de-DE" dirty="0"/>
+              <a:t>:</a:t>
+            </a:r>
+          </a:p>
+          <a:p>
+            <a:pPr marL="0" indent="0">
+              <a:buNone/>
+            </a:pPr>
+            <a:r>
+              <a:rPr lang="de-DE" dirty="0"/>
+              <a:t>    - docker:20.10.16-dind</a:t>
+            </a:r>
+          </a:p>
+          <a:p>
+            <a:pPr marL="0" indent="0">
+              <a:buNone/>
+            </a:pPr>
+            <a:r>
+              <a:rPr lang="de-DE" dirty="0"/>
+              <a:t>  </a:t>
+            </a:r>
+            <a:r>
+              <a:rPr lang="de-DE" dirty="0" err="1"/>
+              <a:t>script</a:t>
+            </a:r>
+            <a:r>
+              <a:rPr lang="de-DE" dirty="0"/>
+              <a:t>:</a:t>
+            </a:r>
+          </a:p>
+          <a:p>
+            <a:pPr marL="0" indent="0">
+              <a:buNone/>
+            </a:pPr>
+            <a:r>
+              <a:rPr lang="de-DE" dirty="0"/>
+              <a:t>    - </a:t>
+            </a:r>
+            <a:r>
+              <a:rPr lang="de-DE" dirty="0" err="1"/>
+              <a:t>docker</a:t>
+            </a:r>
+            <a:r>
+              <a:rPr lang="de-DE" dirty="0"/>
+              <a:t> </a:t>
+            </a:r>
+            <a:r>
+              <a:rPr lang="de-DE" dirty="0" err="1"/>
+              <a:t>login</a:t>
+            </a:r>
+            <a:r>
+              <a:rPr lang="de-DE" dirty="0"/>
+              <a:t> -u $CI_REGISTRY_USER -p $CI_REGISTRY_PASSWORD $CI_REGISTRY</a:t>
+            </a:r>
+          </a:p>
+          <a:p>
+            <a:pPr marL="0" indent="0">
+              <a:buNone/>
+            </a:pPr>
+            <a:r>
+              <a:rPr lang="de-DE" dirty="0"/>
+              <a:t>    - </a:t>
+            </a:r>
+            <a:r>
+              <a:rPr lang="de-DE" dirty="0" err="1"/>
+              <a:t>docker</a:t>
+            </a:r>
+            <a:r>
+              <a:rPr lang="de-DE" dirty="0"/>
+              <a:t> </a:t>
+            </a:r>
+            <a:r>
+              <a:rPr lang="de-DE" dirty="0" err="1"/>
+              <a:t>build</a:t>
+            </a:r>
+            <a:r>
+              <a:rPr lang="de-DE" dirty="0"/>
+              <a:t> -t $CI_REGISTRY/</a:t>
+            </a:r>
+            <a:r>
+              <a:rPr lang="de-DE" dirty="0" err="1"/>
+              <a:t>group</a:t>
+            </a:r>
+            <a:r>
+              <a:rPr lang="de-DE" dirty="0"/>
+              <a:t>/</a:t>
+            </a:r>
+            <a:r>
+              <a:rPr lang="de-DE" dirty="0" err="1"/>
+              <a:t>project</a:t>
+            </a:r>
+            <a:r>
+              <a:rPr lang="de-DE" dirty="0"/>
+              <a:t>/</a:t>
+            </a:r>
+            <a:r>
+              <a:rPr lang="de-DE" dirty="0" err="1"/>
+              <a:t>image:latest</a:t>
+            </a:r>
+            <a:r>
+              <a:rPr lang="de-DE" dirty="0"/>
+              <a:t> .</a:t>
+            </a:r>
+          </a:p>
+          <a:p>
+            <a:pPr marL="0" indent="0">
+              <a:buNone/>
+            </a:pPr>
+            <a:r>
+              <a:rPr lang="de-DE" dirty="0"/>
+              <a:t>    - </a:t>
+            </a:r>
+            <a:r>
+              <a:rPr lang="de-DE" dirty="0" err="1"/>
+              <a:t>docker</a:t>
+            </a:r>
+            <a:r>
+              <a:rPr lang="de-DE" dirty="0"/>
+              <a:t> push $CI_REGISTRY/</a:t>
+            </a:r>
+            <a:r>
+              <a:rPr lang="de-DE" dirty="0" err="1"/>
+              <a:t>group</a:t>
+            </a:r>
+            <a:r>
+              <a:rPr lang="de-DE" dirty="0"/>
+              <a:t>/</a:t>
+            </a:r>
+            <a:r>
+              <a:rPr lang="de-DE" dirty="0" err="1"/>
+              <a:t>project</a:t>
+            </a:r>
+            <a:r>
+              <a:rPr lang="de-DE" dirty="0"/>
+              <a:t>/</a:t>
+            </a:r>
+            <a:r>
+              <a:rPr lang="de-DE" dirty="0" err="1"/>
+              <a:t>image:latest</a:t>
+            </a:r>
+            <a:endParaRPr lang="de-DE" dirty="0"/>
+          </a:p>
+          <a:p>
+            <a:pPr lvl="1">
+              <a:buFont typeface="Arial" panose="020B0604020202020204" pitchFamily="34" charset="0"/>
+              <a:buChar char="•"/>
+            </a:pPr>
+            <a:endParaRPr lang="de-DE" dirty="0"/>
+          </a:p>
+        </p:txBody>
+      </p:sp>
+    </p:spTree>
+    <p:extLst>
+      <p:ext uri="{BB962C8B-B14F-4D97-AF65-F5344CB8AC3E}">
+        <p14:creationId xmlns:p14="http://schemas.microsoft.com/office/powerpoint/2010/main" val="3178729389"/>
+      </p:ext>
+    </p:extLst>
+  </p:cSld>
+  <p:clrMapOvr>
+    <a:masterClrMapping/>
+  </p:clrMapOvr>
+</p:sld>
+</file>
+
+<file path=ppt/slides/slide31.xml><?xml version="1.0" encoding="utf-8"?>
+<p:sld xmlns:a="http://schemas.openxmlformats.org/drawingml/2006/main" xmlns:r="http://schemas.openxmlformats.org/officeDocument/2006/relationships" xmlns:p="http://schemas.openxmlformats.org/presentationml/2006/main">
+  <p:cSld>
+    <p:spTree>
+      <p:nvGrpSpPr>
+        <p:cNvPr id="1" name=""/>
+        <p:cNvGrpSpPr/>
+        <p:nvPr/>
+      </p:nvGrpSpPr>
+      <p:grpSpPr>
+        <a:xfrm>
+          <a:off x="0" y="0"/>
+          <a:ext cx="0" cy="0"/>
+          <a:chOff x="0" y="0"/>
+          <a:chExt cx="0" cy="0"/>
+        </a:xfrm>
+      </p:grpSpPr>
+      <p:sp>
+        <p:nvSpPr>
+          <p:cNvPr id="2" name="Titel 1">
+            <a:extLst>
+              <a:ext uri="{FF2B5EF4-FFF2-40B4-BE49-F238E27FC236}">
+                <a16:creationId xmlns:a16="http://schemas.microsoft.com/office/drawing/2014/main" id="{184AFD09-5210-6F86-C2FD-BBC016D382A6}"/>
+              </a:ext>
+            </a:extLst>
+          </p:cNvPr>
+          <p:cNvSpPr>
+            <a:spLocks noGrp="1"/>
+          </p:cNvSpPr>
+          <p:nvPr>
+            <p:ph type="title"/>
+          </p:nvPr>
+        </p:nvSpPr>
+        <p:spPr/>
+        <p:txBody>
+          <a:bodyPr/>
+          <a:lstStyle/>
+          <a:p>
+            <a:r>
+              <a:rPr lang="de-DE" cap="none" dirty="0"/>
+              <a:t>Release- und </a:t>
+            </a:r>
+            <a:r>
+              <a:rPr lang="de-DE" cap="none" dirty="0" err="1"/>
+              <a:t>Tagged</a:t>
+            </a:r>
+            <a:r>
+              <a:rPr lang="de-DE" cap="none" dirty="0"/>
+              <a:t>-Images</a:t>
+            </a:r>
+            <a:endParaRPr lang="de-DE" dirty="0"/>
+          </a:p>
+        </p:txBody>
+      </p:sp>
+      <p:sp>
+        <p:nvSpPr>
+          <p:cNvPr id="6" name="Inhaltsplatzhalter 5">
+            <a:extLst>
+              <a:ext uri="{FF2B5EF4-FFF2-40B4-BE49-F238E27FC236}">
+                <a16:creationId xmlns:a16="http://schemas.microsoft.com/office/drawing/2014/main" id="{D2412707-84D3-F572-4709-FD9A95F28E5B}"/>
+              </a:ext>
+            </a:extLst>
+          </p:cNvPr>
+          <p:cNvSpPr>
+            <a:spLocks noGrp="1"/>
+          </p:cNvSpPr>
+          <p:nvPr>
+            <p:ph idx="1"/>
+          </p:nvPr>
+        </p:nvSpPr>
+        <p:spPr/>
+        <p:txBody>
+          <a:bodyPr/>
+          <a:lstStyle/>
+          <a:p>
+            <a:pPr algn="l"/>
+            <a:r>
+              <a:rPr lang="en-US" b="1" i="0" dirty="0">
+                <a:solidFill>
+                  <a:srgbClr val="222261"/>
+                </a:solidFill>
+                <a:effectLst/>
+                <a:latin typeface="gitlab sans"/>
+              </a:rPr>
+              <a:t>Container registry examples with GitLab CI/CD</a:t>
+            </a:r>
+          </a:p>
+          <a:p>
+            <a:pPr marL="0" indent="0" algn="l">
+              <a:buNone/>
+            </a:pPr>
+            <a:r>
+              <a:rPr lang="en-US" b="1" i="0" dirty="0">
+                <a:solidFill>
+                  <a:srgbClr val="222261"/>
+                </a:solidFill>
+                <a:effectLst/>
+                <a:latin typeface="gitlab sans"/>
+              </a:rPr>
+              <a:t>You can use CI/CD variables in your .</a:t>
+            </a:r>
+            <a:r>
+              <a:rPr lang="en-US" b="1" i="0" dirty="0" err="1">
+                <a:solidFill>
+                  <a:srgbClr val="222261"/>
+                </a:solidFill>
+                <a:effectLst/>
+                <a:latin typeface="gitlab sans"/>
+              </a:rPr>
+              <a:t>gitlab-ci.yml</a:t>
+            </a:r>
+            <a:r>
+              <a:rPr lang="en-US" b="1" i="0" dirty="0">
+                <a:solidFill>
+                  <a:srgbClr val="222261"/>
+                </a:solidFill>
+                <a:effectLst/>
+                <a:latin typeface="gitlab sans"/>
+              </a:rPr>
+              <a:t> file. For example:</a:t>
+            </a:r>
+          </a:p>
+          <a:p>
+            <a:pPr marL="0" indent="0" algn="l">
+              <a:buNone/>
+            </a:pPr>
+            <a:endParaRPr lang="en-US" b="1" i="0" dirty="0">
+              <a:solidFill>
+                <a:srgbClr val="222261"/>
+              </a:solidFill>
+              <a:effectLst/>
+              <a:latin typeface="gitlab sans"/>
+            </a:endParaRPr>
+          </a:p>
+          <a:p>
+            <a:pPr marL="0" indent="0" algn="l">
+              <a:buNone/>
+            </a:pPr>
+            <a:r>
+              <a:rPr lang="en-US" b="1" i="0" dirty="0">
+                <a:solidFill>
+                  <a:srgbClr val="222261"/>
+                </a:solidFill>
+                <a:effectLst/>
+                <a:latin typeface="gitlab sans"/>
+              </a:rPr>
+              <a:t>build:</a:t>
+            </a:r>
+          </a:p>
+          <a:p>
+            <a:pPr marL="0" indent="0" algn="l">
+              <a:buNone/>
+            </a:pPr>
+            <a:r>
+              <a:rPr lang="en-US" b="1" i="0" dirty="0">
+                <a:solidFill>
+                  <a:srgbClr val="222261"/>
+                </a:solidFill>
+                <a:effectLst/>
+                <a:latin typeface="gitlab sans"/>
+              </a:rPr>
+              <a:t>  image: docker:20.10.16</a:t>
+            </a:r>
+          </a:p>
+          <a:p>
+            <a:pPr marL="0" indent="0" algn="l">
+              <a:buNone/>
+            </a:pPr>
+            <a:r>
+              <a:rPr lang="en-US" b="1" i="0" dirty="0">
+                <a:solidFill>
+                  <a:srgbClr val="222261"/>
+                </a:solidFill>
+                <a:effectLst/>
+                <a:latin typeface="gitlab sans"/>
+              </a:rPr>
+              <a:t>  stage: build</a:t>
+            </a:r>
+          </a:p>
+          <a:p>
+            <a:pPr marL="0" indent="0" algn="l">
+              <a:buNone/>
+            </a:pPr>
+            <a:r>
+              <a:rPr lang="en-US" b="1" i="0" dirty="0">
+                <a:solidFill>
+                  <a:srgbClr val="222261"/>
+                </a:solidFill>
+                <a:effectLst/>
+                <a:latin typeface="gitlab sans"/>
+              </a:rPr>
+              <a:t>  services:</a:t>
+            </a:r>
+          </a:p>
+          <a:p>
+            <a:pPr marL="0" indent="0" algn="l">
+              <a:buNone/>
+            </a:pPr>
+            <a:r>
+              <a:rPr lang="en-US" b="1" i="0" dirty="0">
+                <a:solidFill>
+                  <a:srgbClr val="222261"/>
+                </a:solidFill>
+                <a:effectLst/>
+                <a:latin typeface="gitlab sans"/>
+              </a:rPr>
+              <a:t>    - docker:20.10.16-dind</a:t>
+            </a:r>
+          </a:p>
+          <a:p>
+            <a:pPr marL="0" indent="0" algn="l">
+              <a:buNone/>
+            </a:pPr>
+            <a:r>
+              <a:rPr lang="en-US" b="1" i="0" dirty="0">
+                <a:solidFill>
+                  <a:srgbClr val="222261"/>
+                </a:solidFill>
+                <a:effectLst/>
+                <a:latin typeface="gitlab sans"/>
+              </a:rPr>
+              <a:t>  variables:</a:t>
+            </a:r>
+          </a:p>
+          <a:p>
+            <a:pPr marL="0" indent="0" algn="l">
+              <a:buNone/>
+            </a:pPr>
+            <a:r>
+              <a:rPr lang="en-US" b="1" i="0" dirty="0">
+                <a:solidFill>
+                  <a:srgbClr val="222261"/>
+                </a:solidFill>
+                <a:effectLst/>
+                <a:latin typeface="gitlab sans"/>
+              </a:rPr>
+              <a:t>    IMAGE_TAG: $CI_REGISTRY_IMAGE:$CI_COMMIT_REF_SLUG</a:t>
+            </a:r>
+          </a:p>
+          <a:p>
+            <a:pPr marL="0" indent="0" algn="l">
+              <a:buNone/>
+            </a:pPr>
+            <a:r>
+              <a:rPr lang="en-US" b="1" i="0" dirty="0">
+                <a:solidFill>
+                  <a:srgbClr val="222261"/>
+                </a:solidFill>
+                <a:effectLst/>
+                <a:latin typeface="gitlab sans"/>
+              </a:rPr>
+              <a:t>  script:</a:t>
+            </a:r>
+          </a:p>
+          <a:p>
+            <a:pPr marL="0" indent="0" algn="l">
+              <a:buNone/>
+            </a:pPr>
+            <a:r>
+              <a:rPr lang="en-US" b="1" i="0" dirty="0">
+                <a:solidFill>
+                  <a:srgbClr val="222261"/>
+                </a:solidFill>
+                <a:effectLst/>
+                <a:latin typeface="gitlab sans"/>
+              </a:rPr>
+              <a:t>    - docker login -u $CI_REGISTRY_USER -p $CI_REGISTRY_PASSWORD $CI_REGISTRY</a:t>
+            </a:r>
+          </a:p>
+          <a:p>
+            <a:pPr marL="0" indent="0" algn="l">
+              <a:buNone/>
+            </a:pPr>
+            <a:r>
+              <a:rPr lang="en-US" b="1" i="0" dirty="0">
+                <a:solidFill>
+                  <a:srgbClr val="222261"/>
+                </a:solidFill>
+                <a:effectLst/>
+                <a:latin typeface="gitlab sans"/>
+              </a:rPr>
+              <a:t>    - docker build -t $IMAGE_TAG .</a:t>
+            </a:r>
+          </a:p>
+          <a:p>
+            <a:pPr marL="0" indent="0" algn="l">
+              <a:buNone/>
+            </a:pPr>
+            <a:r>
+              <a:rPr lang="en-US" b="1" i="0" dirty="0">
+                <a:solidFill>
+                  <a:srgbClr val="222261"/>
+                </a:solidFill>
+                <a:effectLst/>
+                <a:latin typeface="gitlab sans"/>
+              </a:rPr>
+              <a:t>    - docker push $IMAGE_TAG</a:t>
+            </a:r>
+          </a:p>
+          <a:p>
+            <a:pPr marL="0" indent="0" algn="l">
+              <a:buNone/>
+            </a:pPr>
+            <a:endParaRPr lang="en-US" b="1" i="0" dirty="0">
+              <a:solidFill>
+                <a:srgbClr val="222261"/>
+              </a:solidFill>
+              <a:effectLst/>
+              <a:latin typeface="gitlab sans"/>
+            </a:endParaRPr>
+          </a:p>
+          <a:p>
+            <a:pPr marL="0" indent="0" algn="l">
+              <a:buNone/>
+            </a:pPr>
+            <a:r>
+              <a:rPr lang="en-US" b="1" i="0" dirty="0">
+                <a:solidFill>
+                  <a:srgbClr val="222261"/>
+                </a:solidFill>
+                <a:effectLst/>
+                <a:latin typeface="gitlab sans"/>
+              </a:rPr>
+              <a:t>In this example, $CI_REGISTRY_IMAGE resolves to the address of the registry tied to this project. $CI_COMMIT_REF_NAME resolves to the branch or tag name, which can contain forward slashes. Image tags can’t contain forward slashes. Use $CI_COMMIT_REF_SLUG as the image tag. You can declare the variable, $IMAGE_TAG, combining $CI_REGISTRY_IMAGE and $CI_COMMIT_REF_NAME to save some typing in the script section.</a:t>
+            </a:r>
+          </a:p>
+          <a:p>
+            <a:pPr lvl="2">
+              <a:buFont typeface="Arial" panose="020B0604020202020204" pitchFamily="34" charset="0"/>
+              <a:buChar char="•"/>
+            </a:pPr>
+            <a:endParaRPr lang="de-DE" dirty="0"/>
+          </a:p>
+          <a:p>
+            <a:pPr lvl="1">
+              <a:buFont typeface="Arial" panose="020B0604020202020204" pitchFamily="34" charset="0"/>
+              <a:buChar char="•"/>
+            </a:pPr>
+            <a:endParaRPr lang="de-DE" dirty="0"/>
+          </a:p>
+        </p:txBody>
+      </p:sp>
+    </p:spTree>
+    <p:extLst>
+      <p:ext uri="{BB962C8B-B14F-4D97-AF65-F5344CB8AC3E}">
+        <p14:creationId xmlns:p14="http://schemas.microsoft.com/office/powerpoint/2010/main" val="2220673560"/>
+      </p:ext>
+    </p:extLst>
+  </p:cSld>
+  <p:clrMapOvr>
+    <a:masterClrMapping/>
+  </p:clrMapOvr>
+</p:sld>
+</file>
+
+<file path=ppt/slides/slide32.xml><?xml version="1.0" encoding="utf-8"?>
+<p:sld xmlns:a="http://schemas.openxmlformats.org/drawingml/2006/main" xmlns:r="http://schemas.openxmlformats.org/officeDocument/2006/relationships" xmlns:p="http://schemas.openxmlformats.org/presentationml/2006/main">
+  <p:cSld>
+    <p:spTree>
+      <p:nvGrpSpPr>
+        <p:cNvPr id="1" name=""/>
+        <p:cNvGrpSpPr/>
+        <p:nvPr/>
+      </p:nvGrpSpPr>
+      <p:grpSpPr>
+        <a:xfrm>
+          <a:off x="0" y="0"/>
+          <a:ext cx="0" cy="0"/>
+          <a:chOff x="0" y="0"/>
+          <a:chExt cx="0" cy="0"/>
+        </a:xfrm>
+      </p:grpSpPr>
+      <p:sp>
+        <p:nvSpPr>
+          <p:cNvPr id="2" name="Titel 1">
+            <a:extLst>
+              <a:ext uri="{FF2B5EF4-FFF2-40B4-BE49-F238E27FC236}">
+                <a16:creationId xmlns:a16="http://schemas.microsoft.com/office/drawing/2014/main" id="{184AFD09-5210-6F86-C2FD-BBC016D382A6}"/>
+              </a:ext>
+            </a:extLst>
+          </p:cNvPr>
+          <p:cNvSpPr>
+            <a:spLocks noGrp="1"/>
+          </p:cNvSpPr>
+          <p:nvPr>
+            <p:ph type="title"/>
+          </p:nvPr>
+        </p:nvSpPr>
+        <p:spPr/>
+        <p:txBody>
+          <a:bodyPr/>
+          <a:lstStyle/>
+          <a:p>
+            <a:r>
+              <a:rPr lang="de-DE" cap="none" dirty="0"/>
+              <a:t>Release- und </a:t>
+            </a:r>
+            <a:r>
+              <a:rPr lang="de-DE" cap="none" dirty="0" err="1"/>
+              <a:t>Tagged</a:t>
+            </a:r>
+            <a:r>
+              <a:rPr lang="de-DE" cap="none" dirty="0"/>
+              <a:t>-Images</a:t>
+            </a:r>
+            <a:endParaRPr lang="de-DE" dirty="0"/>
+          </a:p>
+        </p:txBody>
+      </p:sp>
+      <p:sp>
+        <p:nvSpPr>
+          <p:cNvPr id="6" name="Inhaltsplatzhalter 5">
+            <a:extLst>
+              <a:ext uri="{FF2B5EF4-FFF2-40B4-BE49-F238E27FC236}">
+                <a16:creationId xmlns:a16="http://schemas.microsoft.com/office/drawing/2014/main" id="{D2412707-84D3-F572-4709-FD9A95F28E5B}"/>
+              </a:ext>
+            </a:extLst>
+          </p:cNvPr>
+          <p:cNvSpPr>
+            <a:spLocks noGrp="1"/>
+          </p:cNvSpPr>
+          <p:nvPr>
+            <p:ph idx="1"/>
+          </p:nvPr>
+        </p:nvSpPr>
+        <p:spPr/>
+        <p:txBody>
+          <a:bodyPr/>
+          <a:lstStyle/>
+          <a:p>
+            <a:pPr algn="l"/>
+            <a:r>
+              <a:rPr lang="en-US" b="1" i="0" dirty="0">
+                <a:solidFill>
+                  <a:srgbClr val="222261"/>
+                </a:solidFill>
+                <a:effectLst/>
+                <a:latin typeface="gitlab sans"/>
+              </a:rPr>
+              <a:t>Container registry examples with GitLab CI/CD</a:t>
+            </a:r>
+          </a:p>
+          <a:p>
+            <a:pPr marL="0" indent="0">
+              <a:buNone/>
+            </a:pPr>
+            <a:r>
+              <a:rPr lang="en-US" dirty="0"/>
+              <a:t>This example splits the tasks into 4 pipeline stages, including two tests that run in parallel. The build is stored in the container registry and used by subsequent stages, downloading the container image when needed. Changes to main also get tagged as latest and deployed using an application-specific deploy script:</a:t>
+            </a:r>
+          </a:p>
+          <a:p>
+            <a:pPr marL="0" indent="0">
+              <a:buNone/>
+            </a:pPr>
+            <a:endParaRPr lang="en-US" dirty="0"/>
+          </a:p>
+          <a:p>
+            <a:pPr marL="0" indent="0">
+              <a:buNone/>
+            </a:pPr>
+            <a:r>
+              <a:rPr lang="de-DE" dirty="0" err="1"/>
+              <a:t>default</a:t>
+            </a:r>
+            <a:r>
+              <a:rPr lang="de-DE" dirty="0"/>
+              <a:t>:</a:t>
+            </a:r>
+          </a:p>
+          <a:p>
+            <a:pPr marL="0" indent="0">
+              <a:buNone/>
+            </a:pPr>
+            <a:r>
+              <a:rPr lang="de-DE" dirty="0"/>
+              <a:t>  </a:t>
+            </a:r>
+            <a:r>
+              <a:rPr lang="de-DE" dirty="0" err="1"/>
+              <a:t>image</a:t>
+            </a:r>
+            <a:r>
+              <a:rPr lang="de-DE" dirty="0"/>
+              <a:t>: docker:20.10.16</a:t>
+            </a:r>
+          </a:p>
+          <a:p>
+            <a:pPr marL="0" indent="0">
+              <a:buNone/>
+            </a:pPr>
+            <a:r>
+              <a:rPr lang="de-DE" dirty="0"/>
+              <a:t>  </a:t>
+            </a:r>
+            <a:r>
+              <a:rPr lang="de-DE" dirty="0" err="1"/>
+              <a:t>services</a:t>
+            </a:r>
+            <a:r>
+              <a:rPr lang="de-DE" dirty="0"/>
+              <a:t>:</a:t>
+            </a:r>
+          </a:p>
+          <a:p>
+            <a:pPr marL="0" indent="0">
+              <a:buNone/>
+            </a:pPr>
+            <a:r>
+              <a:rPr lang="de-DE" dirty="0"/>
+              <a:t>    - docker:20.10.16-dind</a:t>
+            </a:r>
+          </a:p>
+          <a:p>
+            <a:pPr marL="0" indent="0">
+              <a:buNone/>
+            </a:pPr>
+            <a:r>
+              <a:rPr lang="de-DE" dirty="0"/>
+              <a:t>  </a:t>
+            </a:r>
+            <a:r>
+              <a:rPr lang="de-DE" dirty="0" err="1"/>
+              <a:t>before_script</a:t>
+            </a:r>
+            <a:r>
+              <a:rPr lang="de-DE" dirty="0"/>
+              <a:t>:</a:t>
+            </a:r>
+          </a:p>
+          <a:p>
+            <a:pPr marL="0" indent="0">
+              <a:buNone/>
+            </a:pPr>
+            <a:r>
+              <a:rPr lang="de-DE" dirty="0"/>
+              <a:t>    - </a:t>
+            </a:r>
+            <a:r>
+              <a:rPr lang="de-DE" dirty="0" err="1"/>
+              <a:t>docker</a:t>
+            </a:r>
+            <a:r>
+              <a:rPr lang="de-DE" dirty="0"/>
+              <a:t> </a:t>
+            </a:r>
+            <a:r>
+              <a:rPr lang="de-DE" dirty="0" err="1"/>
+              <a:t>login</a:t>
+            </a:r>
+            <a:r>
+              <a:rPr lang="de-DE" dirty="0"/>
+              <a:t> -u $CI_REGISTRY_USER -p $CI_REGISTRY_PASSWORD $CI_REGISTRY</a:t>
+            </a:r>
+          </a:p>
+          <a:p>
+            <a:pPr marL="0" indent="0">
+              <a:buNone/>
+            </a:pPr>
+            <a:endParaRPr lang="de-DE" dirty="0"/>
+          </a:p>
+          <a:p>
+            <a:pPr marL="0" indent="0">
+              <a:buNone/>
+            </a:pPr>
+            <a:r>
+              <a:rPr lang="de-DE" dirty="0" err="1"/>
+              <a:t>stages</a:t>
+            </a:r>
+            <a:r>
+              <a:rPr lang="de-DE" dirty="0"/>
+              <a:t>:</a:t>
+            </a:r>
+          </a:p>
+          <a:p>
+            <a:pPr marL="0" indent="0">
+              <a:buNone/>
+            </a:pPr>
+            <a:r>
+              <a:rPr lang="de-DE" dirty="0"/>
+              <a:t>  - </a:t>
+            </a:r>
+            <a:r>
+              <a:rPr lang="de-DE" dirty="0" err="1"/>
+              <a:t>build</a:t>
+            </a:r>
+            <a:endParaRPr lang="de-DE" dirty="0"/>
+          </a:p>
+          <a:p>
+            <a:pPr marL="0" indent="0">
+              <a:buNone/>
+            </a:pPr>
+            <a:r>
+              <a:rPr lang="de-DE" dirty="0"/>
+              <a:t>  - </a:t>
+            </a:r>
+            <a:r>
+              <a:rPr lang="de-DE" dirty="0" err="1"/>
+              <a:t>test</a:t>
+            </a:r>
+            <a:endParaRPr lang="de-DE" dirty="0"/>
+          </a:p>
+          <a:p>
+            <a:pPr marL="0" indent="0">
+              <a:buNone/>
+            </a:pPr>
+            <a:r>
+              <a:rPr lang="de-DE" dirty="0"/>
+              <a:t>  - release</a:t>
+            </a:r>
+          </a:p>
+          <a:p>
+            <a:pPr marL="0" indent="0">
+              <a:buNone/>
+            </a:pPr>
+            <a:r>
+              <a:rPr lang="de-DE" dirty="0"/>
+              <a:t>  - deploy</a:t>
+            </a:r>
+          </a:p>
+          <a:p>
+            <a:pPr marL="0" indent="0">
+              <a:buNone/>
+            </a:pPr>
+            <a:endParaRPr lang="de-DE" dirty="0"/>
+          </a:p>
+          <a:p>
+            <a:pPr marL="0" indent="0">
+              <a:buNone/>
+            </a:pPr>
+            <a:r>
+              <a:rPr lang="de-DE" dirty="0"/>
+              <a:t>variables:</a:t>
+            </a:r>
+          </a:p>
+          <a:p>
+            <a:pPr marL="0" indent="0">
+              <a:buNone/>
+            </a:pPr>
+            <a:r>
+              <a:rPr lang="de-DE" dirty="0"/>
+              <a:t>  # Use TLS https://docs.gitlab.com/ee/ci/docker/using_docker_build.html#tls-enabled</a:t>
+            </a:r>
+          </a:p>
+          <a:p>
+            <a:pPr marL="0" indent="0">
+              <a:buNone/>
+            </a:pPr>
+            <a:r>
+              <a:rPr lang="de-DE" dirty="0"/>
+              <a:t>  DOCKER_HOST: tcp://docker:2376</a:t>
+            </a:r>
+          </a:p>
+          <a:p>
+            <a:pPr marL="0" indent="0">
+              <a:buNone/>
+            </a:pPr>
+            <a:r>
+              <a:rPr lang="de-DE" dirty="0"/>
+              <a:t>  DOCKER_TLS_CERTDIR: "/</a:t>
+            </a:r>
+            <a:r>
+              <a:rPr lang="de-DE" dirty="0" err="1"/>
+              <a:t>certs</a:t>
+            </a:r>
+            <a:r>
+              <a:rPr lang="de-DE" dirty="0"/>
+              <a:t>"</a:t>
+            </a:r>
+          </a:p>
+          <a:p>
+            <a:pPr marL="0" indent="0">
+              <a:buNone/>
+            </a:pPr>
+            <a:r>
+              <a:rPr lang="de-DE" dirty="0"/>
+              <a:t>  CONTAINER_TEST_IMAGE: $CI_REGISTRY_IMAGE:$CI_COMMIT_REF_SLUG</a:t>
+            </a:r>
+          </a:p>
+          <a:p>
+            <a:pPr marL="0" indent="0">
+              <a:buNone/>
+            </a:pPr>
+            <a:r>
+              <a:rPr lang="de-DE" dirty="0"/>
+              <a:t>  CONTAINER_RELEASE_IMAGE: $</a:t>
+            </a:r>
+            <a:r>
+              <a:rPr lang="de-DE" dirty="0" err="1"/>
+              <a:t>CI_REGISTRY_IMAGE:latest</a:t>
+            </a:r>
+            <a:endParaRPr lang="de-DE" dirty="0"/>
+          </a:p>
+          <a:p>
+            <a:pPr marL="0" indent="0">
+              <a:buNone/>
+            </a:pPr>
+            <a:endParaRPr lang="de-DE" dirty="0"/>
+          </a:p>
+          <a:p>
+            <a:pPr marL="0" indent="0">
+              <a:buNone/>
+            </a:pPr>
+            <a:r>
+              <a:rPr lang="de-DE" dirty="0" err="1"/>
+              <a:t>build</a:t>
+            </a:r>
+            <a:r>
+              <a:rPr lang="de-DE" dirty="0"/>
+              <a:t>:</a:t>
+            </a:r>
+          </a:p>
+          <a:p>
+            <a:pPr marL="0" indent="0">
+              <a:buNone/>
+            </a:pPr>
+            <a:r>
+              <a:rPr lang="de-DE" dirty="0"/>
+              <a:t>  </a:t>
+            </a:r>
+            <a:r>
+              <a:rPr lang="de-DE" dirty="0" err="1"/>
+              <a:t>stage</a:t>
+            </a:r>
+            <a:r>
+              <a:rPr lang="de-DE" dirty="0"/>
+              <a:t>: </a:t>
+            </a:r>
+            <a:r>
+              <a:rPr lang="de-DE" dirty="0" err="1"/>
+              <a:t>build</a:t>
+            </a:r>
+            <a:endParaRPr lang="de-DE" dirty="0"/>
+          </a:p>
+          <a:p>
+            <a:pPr marL="0" indent="0">
+              <a:buNone/>
+            </a:pPr>
+            <a:r>
+              <a:rPr lang="de-DE" dirty="0"/>
+              <a:t>  </a:t>
+            </a:r>
+            <a:r>
+              <a:rPr lang="de-DE" dirty="0" err="1"/>
+              <a:t>script</a:t>
+            </a:r>
+            <a:r>
+              <a:rPr lang="de-DE" dirty="0"/>
+              <a:t>:</a:t>
+            </a:r>
+          </a:p>
+          <a:p>
+            <a:pPr marL="0" indent="0">
+              <a:buNone/>
+            </a:pPr>
+            <a:r>
+              <a:rPr lang="de-DE" dirty="0"/>
+              <a:t>    - </a:t>
+            </a:r>
+            <a:r>
+              <a:rPr lang="de-DE" dirty="0" err="1"/>
+              <a:t>docker</a:t>
+            </a:r>
+            <a:r>
+              <a:rPr lang="de-DE" dirty="0"/>
+              <a:t> </a:t>
+            </a:r>
+            <a:r>
+              <a:rPr lang="de-DE" dirty="0" err="1"/>
+              <a:t>build</a:t>
+            </a:r>
+            <a:r>
+              <a:rPr lang="de-DE" dirty="0"/>
+              <a:t> --pull -t $CONTAINER_TEST_IMAGE .</a:t>
+            </a:r>
+          </a:p>
+          <a:p>
+            <a:pPr marL="0" indent="0">
+              <a:buNone/>
+            </a:pPr>
+            <a:r>
+              <a:rPr lang="de-DE" dirty="0"/>
+              <a:t>    - </a:t>
+            </a:r>
+            <a:r>
+              <a:rPr lang="de-DE" dirty="0" err="1"/>
+              <a:t>docker</a:t>
+            </a:r>
+            <a:r>
+              <a:rPr lang="de-DE" dirty="0"/>
+              <a:t> push $CONTAINER_TEST_IMAGE</a:t>
+            </a:r>
+          </a:p>
+          <a:p>
+            <a:pPr marL="0" indent="0">
+              <a:buNone/>
+            </a:pPr>
+            <a:endParaRPr lang="de-DE" dirty="0"/>
+          </a:p>
+          <a:p>
+            <a:pPr marL="0" indent="0">
+              <a:buNone/>
+            </a:pPr>
+            <a:r>
+              <a:rPr lang="de-DE" dirty="0"/>
+              <a:t>test1:</a:t>
+            </a:r>
+          </a:p>
+          <a:p>
+            <a:pPr marL="0" indent="0">
+              <a:buNone/>
+            </a:pPr>
+            <a:r>
+              <a:rPr lang="de-DE" dirty="0"/>
+              <a:t>  </a:t>
+            </a:r>
+            <a:r>
+              <a:rPr lang="de-DE" dirty="0" err="1"/>
+              <a:t>stage</a:t>
+            </a:r>
+            <a:r>
+              <a:rPr lang="de-DE" dirty="0"/>
+              <a:t>: </a:t>
+            </a:r>
+            <a:r>
+              <a:rPr lang="de-DE" dirty="0" err="1"/>
+              <a:t>test</a:t>
+            </a:r>
+            <a:endParaRPr lang="de-DE" dirty="0"/>
+          </a:p>
+          <a:p>
+            <a:pPr marL="0" indent="0">
+              <a:buNone/>
+            </a:pPr>
+            <a:r>
+              <a:rPr lang="de-DE" dirty="0"/>
+              <a:t>  </a:t>
+            </a:r>
+            <a:r>
+              <a:rPr lang="de-DE" dirty="0" err="1"/>
+              <a:t>script</a:t>
+            </a:r>
+            <a:r>
+              <a:rPr lang="de-DE" dirty="0"/>
+              <a:t>:</a:t>
+            </a:r>
+          </a:p>
+          <a:p>
+            <a:pPr marL="0" indent="0">
+              <a:buNone/>
+            </a:pPr>
+            <a:r>
+              <a:rPr lang="de-DE" dirty="0"/>
+              <a:t>    - </a:t>
+            </a:r>
+            <a:r>
+              <a:rPr lang="de-DE" dirty="0" err="1"/>
+              <a:t>docker</a:t>
+            </a:r>
+            <a:r>
+              <a:rPr lang="de-DE" dirty="0"/>
+              <a:t> pull $CONTAINER_TEST_IMAGE</a:t>
+            </a:r>
+          </a:p>
+          <a:p>
+            <a:pPr marL="0" indent="0">
+              <a:buNone/>
+            </a:pPr>
+            <a:r>
+              <a:rPr lang="de-DE" dirty="0"/>
+              <a:t>    - </a:t>
+            </a:r>
+            <a:r>
+              <a:rPr lang="de-DE" dirty="0" err="1"/>
+              <a:t>docker</a:t>
+            </a:r>
+            <a:r>
+              <a:rPr lang="de-DE" dirty="0"/>
+              <a:t> </a:t>
+            </a:r>
+            <a:r>
+              <a:rPr lang="de-DE" dirty="0" err="1"/>
+              <a:t>run</a:t>
+            </a:r>
+            <a:r>
+              <a:rPr lang="de-DE" dirty="0"/>
+              <a:t> $CONTAINER_TEST_IMAGE /</a:t>
+            </a:r>
+            <a:r>
+              <a:rPr lang="de-DE" dirty="0" err="1"/>
+              <a:t>script</a:t>
+            </a:r>
+            <a:r>
+              <a:rPr lang="de-DE" dirty="0"/>
+              <a:t>/</a:t>
+            </a:r>
+            <a:r>
+              <a:rPr lang="de-DE" dirty="0" err="1"/>
+              <a:t>to</a:t>
+            </a:r>
+            <a:r>
+              <a:rPr lang="de-DE" dirty="0"/>
+              <a:t>/</a:t>
+            </a:r>
+            <a:r>
+              <a:rPr lang="de-DE" dirty="0" err="1"/>
+              <a:t>run</a:t>
+            </a:r>
+            <a:r>
+              <a:rPr lang="de-DE" dirty="0"/>
+              <a:t>/</a:t>
+            </a:r>
+            <a:r>
+              <a:rPr lang="de-DE" dirty="0" err="1"/>
+              <a:t>tests</a:t>
+            </a:r>
+            <a:endParaRPr lang="de-DE" dirty="0"/>
+          </a:p>
+          <a:p>
+            <a:pPr marL="0" indent="0">
+              <a:buNone/>
+            </a:pPr>
+            <a:endParaRPr lang="de-DE" dirty="0"/>
+          </a:p>
+          <a:p>
+            <a:pPr marL="0" indent="0">
+              <a:buNone/>
+            </a:pPr>
+            <a:r>
+              <a:rPr lang="de-DE" dirty="0"/>
+              <a:t>test2:</a:t>
+            </a:r>
+          </a:p>
+          <a:p>
+            <a:pPr marL="0" indent="0">
+              <a:buNone/>
+            </a:pPr>
+            <a:r>
+              <a:rPr lang="de-DE" dirty="0"/>
+              <a:t>  </a:t>
+            </a:r>
+            <a:r>
+              <a:rPr lang="de-DE" dirty="0" err="1"/>
+              <a:t>stage</a:t>
+            </a:r>
+            <a:r>
+              <a:rPr lang="de-DE" dirty="0"/>
+              <a:t>: </a:t>
+            </a:r>
+            <a:r>
+              <a:rPr lang="de-DE" dirty="0" err="1"/>
+              <a:t>test</a:t>
+            </a:r>
+            <a:endParaRPr lang="de-DE" dirty="0"/>
+          </a:p>
+          <a:p>
+            <a:pPr marL="0" indent="0">
+              <a:buNone/>
+            </a:pPr>
+            <a:r>
+              <a:rPr lang="de-DE" dirty="0"/>
+              <a:t>  </a:t>
+            </a:r>
+            <a:r>
+              <a:rPr lang="de-DE" dirty="0" err="1"/>
+              <a:t>script</a:t>
+            </a:r>
+            <a:r>
+              <a:rPr lang="de-DE" dirty="0"/>
+              <a:t>:</a:t>
+            </a:r>
+          </a:p>
+          <a:p>
+            <a:pPr marL="0" indent="0">
+              <a:buNone/>
+            </a:pPr>
+            <a:r>
+              <a:rPr lang="de-DE" dirty="0"/>
+              <a:t>    - </a:t>
+            </a:r>
+            <a:r>
+              <a:rPr lang="de-DE" dirty="0" err="1"/>
+              <a:t>docker</a:t>
+            </a:r>
+            <a:r>
+              <a:rPr lang="de-DE" dirty="0"/>
+              <a:t> pull $CONTAINER_TEST_IMAGE</a:t>
+            </a:r>
+          </a:p>
+          <a:p>
+            <a:pPr marL="0" indent="0">
+              <a:buNone/>
+            </a:pPr>
+            <a:r>
+              <a:rPr lang="de-DE" dirty="0"/>
+              <a:t>    - </a:t>
+            </a:r>
+            <a:r>
+              <a:rPr lang="de-DE" dirty="0" err="1"/>
+              <a:t>docker</a:t>
+            </a:r>
+            <a:r>
+              <a:rPr lang="de-DE" dirty="0"/>
+              <a:t> </a:t>
+            </a:r>
+            <a:r>
+              <a:rPr lang="de-DE" dirty="0" err="1"/>
+              <a:t>run</a:t>
+            </a:r>
+            <a:r>
+              <a:rPr lang="de-DE" dirty="0"/>
+              <a:t> $CONTAINER_TEST_IMAGE /</a:t>
+            </a:r>
+            <a:r>
+              <a:rPr lang="de-DE" dirty="0" err="1"/>
+              <a:t>script</a:t>
+            </a:r>
+            <a:r>
+              <a:rPr lang="de-DE" dirty="0"/>
+              <a:t>/</a:t>
+            </a:r>
+            <a:r>
+              <a:rPr lang="de-DE" dirty="0" err="1"/>
+              <a:t>to</a:t>
+            </a:r>
+            <a:r>
+              <a:rPr lang="de-DE" dirty="0"/>
+              <a:t>/</a:t>
+            </a:r>
+            <a:r>
+              <a:rPr lang="de-DE" dirty="0" err="1"/>
+              <a:t>run</a:t>
+            </a:r>
+            <a:r>
+              <a:rPr lang="de-DE" dirty="0"/>
+              <a:t>/</a:t>
+            </a:r>
+            <a:r>
+              <a:rPr lang="de-DE" dirty="0" err="1"/>
+              <a:t>another</a:t>
+            </a:r>
+            <a:r>
+              <a:rPr lang="de-DE" dirty="0"/>
+              <a:t>/</a:t>
+            </a:r>
+            <a:r>
+              <a:rPr lang="de-DE" dirty="0" err="1"/>
+              <a:t>test</a:t>
+            </a:r>
+            <a:endParaRPr lang="de-DE" dirty="0"/>
+          </a:p>
+          <a:p>
+            <a:pPr marL="0" indent="0">
+              <a:buNone/>
+            </a:pPr>
+            <a:endParaRPr lang="de-DE" dirty="0"/>
+          </a:p>
+          <a:p>
+            <a:pPr marL="0" indent="0">
+              <a:buNone/>
+            </a:pPr>
+            <a:r>
+              <a:rPr lang="de-DE" dirty="0"/>
+              <a:t>release-image:</a:t>
+            </a:r>
+          </a:p>
+          <a:p>
+            <a:pPr marL="0" indent="0">
+              <a:buNone/>
+            </a:pPr>
+            <a:r>
+              <a:rPr lang="de-DE" dirty="0"/>
+              <a:t>  </a:t>
+            </a:r>
+            <a:r>
+              <a:rPr lang="de-DE" dirty="0" err="1"/>
+              <a:t>stage</a:t>
+            </a:r>
+            <a:r>
+              <a:rPr lang="de-DE" dirty="0"/>
+              <a:t>: release</a:t>
+            </a:r>
+          </a:p>
+          <a:p>
+            <a:pPr marL="0" indent="0">
+              <a:buNone/>
+            </a:pPr>
+            <a:r>
+              <a:rPr lang="de-DE" dirty="0"/>
+              <a:t>  </a:t>
+            </a:r>
+            <a:r>
+              <a:rPr lang="de-DE" dirty="0" err="1"/>
+              <a:t>script</a:t>
+            </a:r>
+            <a:r>
+              <a:rPr lang="de-DE" dirty="0"/>
+              <a:t>:</a:t>
+            </a:r>
+          </a:p>
+          <a:p>
+            <a:pPr marL="0" indent="0">
+              <a:buNone/>
+            </a:pPr>
+            <a:r>
+              <a:rPr lang="de-DE" dirty="0"/>
+              <a:t>    - </a:t>
+            </a:r>
+            <a:r>
+              <a:rPr lang="de-DE" dirty="0" err="1"/>
+              <a:t>docker</a:t>
+            </a:r>
+            <a:r>
+              <a:rPr lang="de-DE" dirty="0"/>
+              <a:t> pull $CONTAINER_TEST_IMAGE</a:t>
+            </a:r>
+          </a:p>
+          <a:p>
+            <a:pPr marL="0" indent="0">
+              <a:buNone/>
+            </a:pPr>
+            <a:r>
+              <a:rPr lang="de-DE" dirty="0"/>
+              <a:t>    - </a:t>
+            </a:r>
+            <a:r>
+              <a:rPr lang="de-DE" dirty="0" err="1"/>
+              <a:t>docker</a:t>
+            </a:r>
+            <a:r>
+              <a:rPr lang="de-DE" dirty="0"/>
+              <a:t> tag $CONTAINER_TEST_IMAGE $CONTAINER_RELEASE_IMAGE</a:t>
+            </a:r>
+          </a:p>
+          <a:p>
+            <a:pPr marL="0" indent="0">
+              <a:buNone/>
+            </a:pPr>
+            <a:r>
+              <a:rPr lang="de-DE" dirty="0"/>
+              <a:t>    - </a:t>
+            </a:r>
+            <a:r>
+              <a:rPr lang="de-DE" dirty="0" err="1"/>
+              <a:t>docker</a:t>
+            </a:r>
+            <a:r>
+              <a:rPr lang="de-DE" dirty="0"/>
+              <a:t> push $CONTAINER_RELEASE_IMAGE</a:t>
+            </a:r>
+          </a:p>
+          <a:p>
+            <a:pPr marL="0" indent="0">
+              <a:buNone/>
+            </a:pPr>
+            <a:r>
+              <a:rPr lang="de-DE" dirty="0"/>
+              <a:t>  </a:t>
+            </a:r>
+            <a:r>
+              <a:rPr lang="de-DE" dirty="0" err="1"/>
+              <a:t>only</a:t>
+            </a:r>
+            <a:r>
+              <a:rPr lang="de-DE" dirty="0"/>
+              <a:t>:</a:t>
+            </a:r>
+          </a:p>
+          <a:p>
+            <a:pPr marL="0" indent="0">
+              <a:buNone/>
+            </a:pPr>
+            <a:r>
+              <a:rPr lang="de-DE" dirty="0"/>
+              <a:t>    - </a:t>
+            </a:r>
+            <a:r>
+              <a:rPr lang="de-DE" dirty="0" err="1"/>
+              <a:t>main</a:t>
+            </a:r>
+            <a:endParaRPr lang="de-DE" dirty="0"/>
+          </a:p>
+          <a:p>
+            <a:pPr marL="0" indent="0">
+              <a:buNone/>
+            </a:pPr>
+            <a:endParaRPr lang="de-DE" dirty="0"/>
+          </a:p>
+          <a:p>
+            <a:pPr marL="0" indent="0">
+              <a:buNone/>
+            </a:pPr>
+            <a:r>
+              <a:rPr lang="de-DE" dirty="0"/>
+              <a:t>deploy:</a:t>
+            </a:r>
+          </a:p>
+          <a:p>
+            <a:pPr marL="0" indent="0">
+              <a:buNone/>
+            </a:pPr>
+            <a:r>
+              <a:rPr lang="de-DE" dirty="0"/>
+              <a:t>  </a:t>
+            </a:r>
+            <a:r>
+              <a:rPr lang="de-DE" dirty="0" err="1"/>
+              <a:t>stage</a:t>
+            </a:r>
+            <a:r>
+              <a:rPr lang="de-DE" dirty="0"/>
+              <a:t>: deploy</a:t>
+            </a:r>
+          </a:p>
+          <a:p>
+            <a:pPr marL="0" indent="0">
+              <a:buNone/>
+            </a:pPr>
+            <a:r>
+              <a:rPr lang="de-DE" dirty="0"/>
+              <a:t>  </a:t>
+            </a:r>
+            <a:r>
+              <a:rPr lang="de-DE" dirty="0" err="1"/>
+              <a:t>script</a:t>
+            </a:r>
+            <a:r>
+              <a:rPr lang="de-DE" dirty="0"/>
+              <a:t>:</a:t>
+            </a:r>
+          </a:p>
+          <a:p>
+            <a:pPr marL="0" indent="0">
+              <a:buNone/>
+            </a:pPr>
+            <a:r>
+              <a:rPr lang="de-DE" dirty="0"/>
+              <a:t>    - ./deploy.sh</a:t>
+            </a:r>
+          </a:p>
+          <a:p>
+            <a:pPr marL="0" indent="0">
+              <a:buNone/>
+            </a:pPr>
+            <a:r>
+              <a:rPr lang="de-DE" dirty="0"/>
+              <a:t>  </a:t>
+            </a:r>
+            <a:r>
+              <a:rPr lang="de-DE" dirty="0" err="1"/>
+              <a:t>only</a:t>
+            </a:r>
+            <a:r>
+              <a:rPr lang="de-DE" dirty="0"/>
+              <a:t>:</a:t>
+            </a:r>
+          </a:p>
+          <a:p>
+            <a:pPr marL="0" indent="0">
+              <a:buNone/>
+            </a:pPr>
+            <a:r>
+              <a:rPr lang="de-DE" dirty="0"/>
+              <a:t>    - </a:t>
+            </a:r>
+            <a:r>
+              <a:rPr lang="de-DE" dirty="0" err="1"/>
+              <a:t>main</a:t>
+            </a:r>
+            <a:endParaRPr lang="de-DE" dirty="0"/>
+          </a:p>
+          <a:p>
+            <a:pPr marL="0" indent="0">
+              <a:buNone/>
+            </a:pPr>
+            <a:r>
+              <a:rPr lang="de-DE" dirty="0"/>
+              <a:t>  </a:t>
+            </a:r>
+            <a:r>
+              <a:rPr lang="de-DE" dirty="0" err="1"/>
+              <a:t>environment</a:t>
+            </a:r>
+            <a:r>
+              <a:rPr lang="de-DE" dirty="0"/>
+              <a:t>: </a:t>
+            </a:r>
+            <a:r>
+              <a:rPr lang="de-DE" dirty="0" err="1"/>
+              <a:t>production</a:t>
+            </a:r>
+            <a:endParaRPr lang="de-DE" dirty="0"/>
+          </a:p>
+          <a:p>
+            <a:pPr lvl="1">
+              <a:buFont typeface="Arial" panose="020B0604020202020204" pitchFamily="34" charset="0"/>
+              <a:buChar char="•"/>
+            </a:pPr>
+            <a:endParaRPr lang="de-DE" dirty="0"/>
+          </a:p>
+        </p:txBody>
+      </p:sp>
+    </p:spTree>
+    <p:extLst>
+      <p:ext uri="{BB962C8B-B14F-4D97-AF65-F5344CB8AC3E}">
+        <p14:creationId xmlns:p14="http://schemas.microsoft.com/office/powerpoint/2010/main" val="570750762"/>
       </p:ext>
     </p:extLst>
   </p:cSld>

</xml_diff>

<commit_message>
Tag-3_3: Images bauen und pushen, Docker-in-Docker
</commit_message>
<xml_diff>
--- a/slides/Tag-3_3-Release-und-Tagged-Images.pptx
+++ b/slides/Tag-3_3-Release-und-Tagged-Images.pptx
@@ -6,10 +6,10 @@
     <p:sldMasterId id="2147483649" r:id="rId2"/>
   </p:sldMasterIdLst>
   <p:notesMasterIdLst>
-    <p:notesMasterId r:id="rId35"/>
+    <p:notesMasterId r:id="rId36"/>
   </p:notesMasterIdLst>
   <p:handoutMasterIdLst>
-    <p:handoutMasterId r:id="rId36"/>
+    <p:handoutMasterId r:id="rId37"/>
   </p:handoutMasterIdLst>
   <p:sldIdLst>
     <p:sldId id="288" r:id="rId3"/>
@@ -36,14 +36,15 @@
     <p:sldId id="607" r:id="rId24"/>
     <p:sldId id="608" r:id="rId25"/>
     <p:sldId id="609" r:id="rId26"/>
-    <p:sldId id="611" r:id="rId27"/>
-    <p:sldId id="610" r:id="rId28"/>
-    <p:sldId id="612" r:id="rId29"/>
-    <p:sldId id="613" r:id="rId30"/>
-    <p:sldId id="617" r:id="rId31"/>
-    <p:sldId id="616" r:id="rId32"/>
-    <p:sldId id="614" r:id="rId33"/>
-    <p:sldId id="615" r:id="rId34"/>
+    <p:sldId id="619" r:id="rId27"/>
+    <p:sldId id="618" r:id="rId28"/>
+    <p:sldId id="610" r:id="rId29"/>
+    <p:sldId id="612" r:id="rId30"/>
+    <p:sldId id="613" r:id="rId31"/>
+    <p:sldId id="617" r:id="rId32"/>
+    <p:sldId id="616" r:id="rId33"/>
+    <p:sldId id="614" r:id="rId34"/>
+    <p:sldId id="615" r:id="rId35"/>
   </p:sldIdLst>
   <p:sldSz cx="9144000" cy="6858000" type="screen4x3"/>
   <p:notesSz cx="6784975" cy="9921875"/>
@@ -1256,6 +1257,43 @@
           <a:bodyPr/>
           <a:lstStyle/>
           <a:p>
+            <a:pPr algn="l"/>
+            <a:r>
+              <a:rPr lang="en-US" b="0" i="0" dirty="0">
+                <a:solidFill>
+                  <a:srgbClr val="404040"/>
+                </a:solidFill>
+                <a:effectLst/>
+                <a:latin typeface="gitlab sans"/>
+              </a:rPr>
+              <a:t>You can use </a:t>
+            </a:r>
+            <a:r>
+              <a:rPr lang="en-US" b="0" i="0" u="none" strike="noStrike" dirty="0">
+                <a:solidFill>
+                  <a:srgbClr val="5943B6"/>
+                </a:solidFill>
+                <a:effectLst/>
+                <a:latin typeface="gitlab sans"/>
+                <a:hlinkClick r:id="rId3"/>
+              </a:rPr>
+              <a:t>GitLab CI/CD</a:t>
+            </a:r>
+            <a:r>
+              <a:rPr lang="en-US" b="0" i="0" dirty="0">
+                <a:solidFill>
+                  <a:srgbClr val="404040"/>
+                </a:solidFill>
+                <a:effectLst/>
+                <a:latin typeface="gitlab sans"/>
+              </a:rPr>
+              <a:t> to build and push container images to the Container Registry. You can use CI/CD to test, build, and deploy your project from the container image you created.</a:t>
+            </a:r>
+          </a:p>
+          <a:p>
+            <a:br>
+              <a:rPr lang="en-US" dirty="0"/>
+            </a:br>
             <a:endParaRPr lang="de-DE" dirty="0"/>
           </a:p>
         </p:txBody>
@@ -1343,7 +1381,7 @@
           <a:p>
             <a:r>
               <a:rPr lang="de-DE" dirty="0"/>
-              <a:t>https://docs.gitlab.com/ee/user/packages/container_registry/build_and_push_images.html#configure-your-gitlab-ciyml-file</a:t>
+              <a:t>https://docs.gitlab.com/ee/ci/docker/using_docker_build.html#use-docker-in-docker</a:t>
             </a:r>
           </a:p>
         </p:txBody>
@@ -1375,7 +1413,7 @@
     </p:spTree>
     <p:extLst>
       <p:ext uri="{BB962C8B-B14F-4D97-AF65-F5344CB8AC3E}">
-        <p14:creationId xmlns:p14="http://schemas.microsoft.com/office/powerpoint/2010/main" val="474099646"/>
+        <p14:creationId xmlns:p14="http://schemas.microsoft.com/office/powerpoint/2010/main" val="3929006885"/>
       </p:ext>
     </p:extLst>
   </p:cSld>
@@ -1431,7 +1469,7 @@
           <a:p>
             <a:r>
               <a:rPr lang="de-DE" dirty="0"/>
-              <a:t>https://docs.gitlab.com/ee/user/packages/container_registry/build_and_push_images.html#use-gitlab-cicd</a:t>
+              <a:t>https://docs.gitlab.com/ee/user/packages/container_registry/build_and_push_images.html#configure-your-gitlab-ciyml-file</a:t>
             </a:r>
           </a:p>
         </p:txBody>
@@ -1463,7 +1501,7 @@
     </p:spTree>
     <p:extLst>
       <p:ext uri="{BB962C8B-B14F-4D97-AF65-F5344CB8AC3E}">
-        <p14:creationId xmlns:p14="http://schemas.microsoft.com/office/powerpoint/2010/main" val="511039819"/>
+        <p14:creationId xmlns:p14="http://schemas.microsoft.com/office/powerpoint/2010/main" val="3635466979"/>
       </p:ext>
     </p:extLst>
   </p:cSld>
@@ -1519,7 +1557,7 @@
           <a:p>
             <a:r>
               <a:rPr lang="de-DE" dirty="0"/>
-              <a:t>https://docs.gitlab.com/ee/user/packages/container_registry/build_and_push_images.html#use-a-docker-in-docker-container-image-from-your-container-registry</a:t>
+              <a:t>https://docs.gitlab.com/ee/user/packages/container_registry/build_and_push_images.html#use-gitlab-cicd</a:t>
             </a:r>
           </a:p>
         </p:txBody>
@@ -1551,7 +1589,7 @@
     </p:spTree>
     <p:extLst>
       <p:ext uri="{BB962C8B-B14F-4D97-AF65-F5344CB8AC3E}">
-        <p14:creationId xmlns:p14="http://schemas.microsoft.com/office/powerpoint/2010/main" val="3555957353"/>
+        <p14:creationId xmlns:p14="http://schemas.microsoft.com/office/powerpoint/2010/main" val="511039819"/>
       </p:ext>
     </p:extLst>
   </p:cSld>
@@ -1607,7 +1645,7 @@
           <a:p>
             <a:r>
               <a:rPr lang="de-DE" dirty="0"/>
-              <a:t>https://docs.gitlab.com/ee/user/packages/container_registry/build_and_push_images.html#use-a-docker-in-docker-container-image-with-dependency-proxy</a:t>
+              <a:t>https://docs.gitlab.com/ee/user/packages/container_registry/build_and_push_images.html#use-a-docker-in-docker-container-image-from-your-container-registry</a:t>
             </a:r>
           </a:p>
         </p:txBody>
@@ -1639,7 +1677,7 @@
     </p:spTree>
     <p:extLst>
       <p:ext uri="{BB962C8B-B14F-4D97-AF65-F5344CB8AC3E}">
-        <p14:creationId xmlns:p14="http://schemas.microsoft.com/office/powerpoint/2010/main" val="1695736135"/>
+        <p14:creationId xmlns:p14="http://schemas.microsoft.com/office/powerpoint/2010/main" val="3555957353"/>
       </p:ext>
     </p:extLst>
   </p:cSld>
@@ -1695,7 +1733,7 @@
           <a:p>
             <a:r>
               <a:rPr lang="de-DE" dirty="0"/>
-              <a:t>https://docs.gitlab.com/ee/user/packages/container_registry/build_and_push_images.html#container-registry-examples-with-gitlab-cicd</a:t>
+              <a:t>https://docs.gitlab.com/ee/user/packages/container_registry/build_and_push_images.html#use-a-docker-in-docker-container-image-with-dependency-proxy</a:t>
             </a:r>
           </a:p>
         </p:txBody>
@@ -1718,7 +1756,7 @@
             <a:fld id="{18182567-388C-4D33-8B7B-A651F195F118}" type="slidenum">
               <a:rPr lang="de-DE" altLang="de-DE" smtClean="0"/>
               <a:pPr/>
-              <a:t>30</a:t>
+              <a:t>29</a:t>
             </a:fld>
             <a:endParaRPr lang="de-DE" altLang="de-DE"/>
           </a:p>
@@ -1727,7 +1765,7 @@
     </p:spTree>
     <p:extLst>
       <p:ext uri="{BB962C8B-B14F-4D97-AF65-F5344CB8AC3E}">
-        <p14:creationId xmlns:p14="http://schemas.microsoft.com/office/powerpoint/2010/main" val="1319990225"/>
+        <p14:creationId xmlns:p14="http://schemas.microsoft.com/office/powerpoint/2010/main" val="1695736135"/>
       </p:ext>
     </p:extLst>
   </p:cSld>
@@ -1815,7 +1853,7 @@
     </p:spTree>
     <p:extLst>
       <p:ext uri="{BB962C8B-B14F-4D97-AF65-F5344CB8AC3E}">
-        <p14:creationId xmlns:p14="http://schemas.microsoft.com/office/powerpoint/2010/main" val="18823346"/>
+        <p14:creationId xmlns:p14="http://schemas.microsoft.com/office/powerpoint/2010/main" val="1319990225"/>
       </p:ext>
     </p:extLst>
   </p:cSld>
@@ -1903,7 +1941,7 @@
     </p:spTree>
     <p:extLst>
       <p:ext uri="{BB962C8B-B14F-4D97-AF65-F5344CB8AC3E}">
-        <p14:creationId xmlns:p14="http://schemas.microsoft.com/office/powerpoint/2010/main" val="3169846742"/>
+        <p14:creationId xmlns:p14="http://schemas.microsoft.com/office/powerpoint/2010/main" val="18823346"/>
       </p:ext>
     </p:extLst>
   </p:cSld>
@@ -1992,6 +2030,94 @@
     <p:extLst>
       <p:ext uri="{BB962C8B-B14F-4D97-AF65-F5344CB8AC3E}">
         <p14:creationId xmlns:p14="http://schemas.microsoft.com/office/powerpoint/2010/main" val="4220598971"/>
+      </p:ext>
+    </p:extLst>
+  </p:cSld>
+  <p:clrMapOvr>
+    <a:masterClrMapping/>
+  </p:clrMapOvr>
+</p:notes>
+</file>
+
+<file path=ppt/notesSlides/notesSlide20.xml><?xml version="1.0" encoding="utf-8"?>
+<p:notes xmlns:a="http://schemas.openxmlformats.org/drawingml/2006/main" xmlns:r="http://schemas.openxmlformats.org/officeDocument/2006/relationships" xmlns:p="http://schemas.openxmlformats.org/presentationml/2006/main">
+  <p:cSld>
+    <p:spTree>
+      <p:nvGrpSpPr>
+        <p:cNvPr id="1" name=""/>
+        <p:cNvGrpSpPr/>
+        <p:nvPr/>
+      </p:nvGrpSpPr>
+      <p:grpSpPr>
+        <a:xfrm>
+          <a:off x="0" y="0"/>
+          <a:ext cx="0" cy="0"/>
+          <a:chOff x="0" y="0"/>
+          <a:chExt cx="0" cy="0"/>
+        </a:xfrm>
+      </p:grpSpPr>
+      <p:sp>
+        <p:nvSpPr>
+          <p:cNvPr id="2" name="Folienbildplatzhalter 1"/>
+          <p:cNvSpPr>
+            <a:spLocks noGrp="1" noRot="1" noChangeAspect="1"/>
+          </p:cNvSpPr>
+          <p:nvPr>
+            <p:ph type="sldImg"/>
+          </p:nvPr>
+        </p:nvSpPr>
+        <p:spPr/>
+      </p:sp>
+      <p:sp>
+        <p:nvSpPr>
+          <p:cNvPr id="3" name="Notizenplatzhalter 2"/>
+          <p:cNvSpPr>
+            <a:spLocks noGrp="1"/>
+          </p:cNvSpPr>
+          <p:nvPr>
+            <p:ph type="body" idx="1"/>
+          </p:nvPr>
+        </p:nvSpPr>
+        <p:spPr/>
+        <p:txBody>
+          <a:bodyPr/>
+          <a:lstStyle/>
+          <a:p>
+            <a:r>
+              <a:rPr lang="de-DE" dirty="0"/>
+              <a:t>https://docs.gitlab.com/ee/user/packages/container_registry/build_and_push_images.html#container-registry-examples-with-gitlab-cicd</a:t>
+            </a:r>
+          </a:p>
+        </p:txBody>
+      </p:sp>
+      <p:sp>
+        <p:nvSpPr>
+          <p:cNvPr id="4" name="Foliennummernplatzhalter 3"/>
+          <p:cNvSpPr>
+            <a:spLocks noGrp="1"/>
+          </p:cNvSpPr>
+          <p:nvPr>
+            <p:ph type="sldNum" sz="quarter" idx="5"/>
+          </p:nvPr>
+        </p:nvSpPr>
+        <p:spPr/>
+        <p:txBody>
+          <a:bodyPr/>
+          <a:lstStyle/>
+          <a:p>
+            <a:fld id="{18182567-388C-4D33-8B7B-A651F195F118}" type="slidenum">
+              <a:rPr lang="de-DE" altLang="de-DE" smtClean="0"/>
+              <a:pPr/>
+              <a:t>33</a:t>
+            </a:fld>
+            <a:endParaRPr lang="de-DE" altLang="de-DE"/>
+          </a:p>
+        </p:txBody>
+      </p:sp>
+    </p:spTree>
+    <p:extLst>
+      <p:ext uri="{BB962C8B-B14F-4D97-AF65-F5344CB8AC3E}">
+        <p14:creationId xmlns:p14="http://schemas.microsoft.com/office/powerpoint/2010/main" val="3169846742"/>
       </p:ext>
     </p:extLst>
   </p:cSld>
@@ -9521,9 +9647,87 @@
               </a:rPr>
               <a:t>docker push registry.example.com/group/project/image</a:t>
             </a:r>
-            <a:endParaRPr lang="en-US" dirty="0">
+          </a:p>
+          <a:p>
+            <a:pPr marL="857250" lvl="1" indent="-457200">
+              <a:buFont typeface="+mj-lt"/>
+              <a:buAutoNum type="arabicPeriod"/>
+            </a:pPr>
+            <a:endParaRPr lang="en-US" sz="1800" dirty="0">
               <a:latin typeface="Consolas" panose="020B0609020204030204" pitchFamily="49" charset="0"/>
             </a:endParaRPr>
+          </a:p>
+          <a:p>
+            <a:pPr>
+              <a:buFont typeface="Arial" panose="020B0604020202020204" pitchFamily="34" charset="0"/>
+              <a:buChar char="•"/>
+            </a:pPr>
+            <a:r>
+              <a:rPr lang="en-US" dirty="0">
+                <a:latin typeface="+mj-lt"/>
+              </a:rPr>
+              <a:t>CI/CD </a:t>
+            </a:r>
+            <a:r>
+              <a:rPr lang="en-US" dirty="0" err="1">
+                <a:latin typeface="+mj-lt"/>
+              </a:rPr>
+              <a:t>fürs</a:t>
+            </a:r>
+            <a:r>
+              <a:rPr lang="en-US" dirty="0">
+                <a:latin typeface="+mj-lt"/>
+              </a:rPr>
+              <a:t> </a:t>
+            </a:r>
+            <a:r>
+              <a:rPr lang="en-US" dirty="0" err="1">
+                <a:latin typeface="+mj-lt"/>
+              </a:rPr>
+              <a:t>Testen</a:t>
+            </a:r>
+            <a:r>
+              <a:rPr lang="en-US" dirty="0">
+                <a:latin typeface="+mj-lt"/>
+              </a:rPr>
+              <a:t>, </a:t>
+            </a:r>
+            <a:r>
+              <a:rPr lang="en-US" dirty="0" err="1">
+                <a:latin typeface="+mj-lt"/>
+              </a:rPr>
+              <a:t>Bauen</a:t>
+            </a:r>
+            <a:r>
+              <a:rPr lang="en-US" dirty="0">
+                <a:latin typeface="+mj-lt"/>
+              </a:rPr>
+              <a:t>, </a:t>
+            </a:r>
+            <a:r>
+              <a:rPr lang="en-US" dirty="0" err="1">
+                <a:latin typeface="+mj-lt"/>
+              </a:rPr>
+              <a:t>Pushen</a:t>
+            </a:r>
+            <a:r>
+              <a:rPr lang="en-US" dirty="0">
+                <a:latin typeface="+mj-lt"/>
+              </a:rPr>
+              <a:t> und </a:t>
+            </a:r>
+            <a:r>
+              <a:rPr lang="en-US" dirty="0" err="1">
+                <a:latin typeface="+mj-lt"/>
+              </a:rPr>
+              <a:t>Deployen</a:t>
+            </a:r>
+            <a:r>
+              <a:rPr lang="en-US" dirty="0">
+                <a:latin typeface="+mj-lt"/>
+              </a:rPr>
+              <a:t> </a:t>
+            </a:r>
           </a:p>
           <a:p>
             <a:pPr marL="857250" lvl="1" indent="-457200">
@@ -9590,7 +9794,7 @@
           <p:cNvPr id="2" name="Titel 1">
             <a:extLst>
               <a:ext uri="{FF2B5EF4-FFF2-40B4-BE49-F238E27FC236}">
-                <a16:creationId xmlns:a16="http://schemas.microsoft.com/office/drawing/2014/main" id="{6A1129EC-B79C-98B8-054A-227290E5E743}"/>
+                <a16:creationId xmlns:a16="http://schemas.microsoft.com/office/drawing/2014/main" id="{A1BAC26B-426A-E50B-5A33-950885BE5CD1}"/>
               </a:ext>
             </a:extLst>
           </p:cNvPr>
@@ -9627,7 +9831,7 @@
           <p:cNvPr id="3" name="Inhaltsplatzhalter 2">
             <a:extLst>
               <a:ext uri="{FF2B5EF4-FFF2-40B4-BE49-F238E27FC236}">
-                <a16:creationId xmlns:a16="http://schemas.microsoft.com/office/drawing/2014/main" id="{82E76C24-ACDF-81B8-5FFA-EC3D55CB7211}"/>
+                <a16:creationId xmlns:a16="http://schemas.microsoft.com/office/drawing/2014/main" id="{8037877A-731E-E191-4EA0-AB43492F7242}"/>
               </a:ext>
             </a:extLst>
           </p:cNvPr>
@@ -9647,105 +9851,210 @@
               <a:buNone/>
             </a:pPr>
             <a:r>
-              <a:rPr lang="en-US" dirty="0"/>
-              <a:t>Configure your .</a:t>
-            </a:r>
-            <a:r>
-              <a:rPr lang="en-US" dirty="0" err="1"/>
-              <a:t>gitlab-ci.yml</a:t>
-            </a:r>
-            <a:r>
-              <a:rPr lang="en-US" dirty="0"/>
-              <a:t> file</a:t>
-            </a:r>
-          </a:p>
-          <a:p>
-            <a:pPr marL="0" indent="0">
-              <a:buNone/>
-            </a:pPr>
-            <a:r>
-              <a:rPr lang="en-US" dirty="0"/>
-              <a:t>You can configure your .</a:t>
-            </a:r>
-            <a:r>
-              <a:rPr lang="en-US" dirty="0" err="1"/>
-              <a:t>gitlab-ci.yml</a:t>
-            </a:r>
-            <a:r>
-              <a:rPr lang="en-US" dirty="0"/>
-              <a:t> file to build and push container images to the container registry.</a:t>
-            </a:r>
-          </a:p>
-          <a:p>
-            <a:pPr marL="0" indent="0">
-              <a:buNone/>
-            </a:pPr>
-            <a:endParaRPr lang="en-US" dirty="0"/>
-          </a:p>
-          <a:p>
-            <a:pPr marL="0" indent="0">
-              <a:buNone/>
-            </a:pPr>
-            <a:r>
-              <a:rPr lang="en-US" dirty="0"/>
-              <a:t>If multiple jobs require authentication, put the authentication command in the </a:t>
-            </a:r>
-            <a:r>
-              <a:rPr lang="en-US" dirty="0" err="1"/>
-              <a:t>before_script</a:t>
-            </a:r>
-            <a:r>
-              <a:rPr lang="en-US" dirty="0"/>
-              <a:t>.</a:t>
-            </a:r>
-          </a:p>
-          <a:p>
-            <a:pPr marL="0" indent="0">
-              <a:buNone/>
-            </a:pPr>
-            <a:r>
-              <a:rPr lang="en-US" dirty="0"/>
-              <a:t>Before building, use docker build --pull to fetch changes to base images. It takes slightly longer, but it ensures your image is up-to-date.</a:t>
-            </a:r>
-          </a:p>
-          <a:p>
-            <a:pPr marL="0" indent="0">
-              <a:buNone/>
-            </a:pPr>
-            <a:r>
-              <a:rPr lang="en-US" dirty="0"/>
-              <a:t>Before each docker run, do an explicit docker pull to fetch the image that was just built. This step is especially important if you are using multiple runners that cache images locally.</a:t>
-            </a:r>
-          </a:p>
-          <a:p>
-            <a:pPr marL="0" indent="0">
-              <a:buNone/>
-            </a:pPr>
-            <a:endParaRPr lang="en-US" dirty="0"/>
-          </a:p>
-          <a:p>
-            <a:pPr marL="0" indent="0">
-              <a:buNone/>
-            </a:pPr>
-            <a:r>
-              <a:rPr lang="en-US" dirty="0"/>
-              <a:t>If you use the Git SHA in your image tag, each job is unique and you should never have a stale image. However, it’s still possible to have a stale image if you rebuild a given commit after a dependency has changed.</a:t>
-            </a:r>
-          </a:p>
-          <a:p>
-            <a:pPr marL="0" indent="0">
-              <a:buNone/>
-            </a:pPr>
-            <a:endParaRPr lang="en-US" dirty="0"/>
-          </a:p>
-          <a:p>
-            <a:pPr marL="0" indent="0">
-              <a:buNone/>
-            </a:pPr>
-            <a:r>
-              <a:rPr lang="en-US" dirty="0"/>
-              <a:t>Don’t build directly to the latest tag because multiple jobs may be happening simultaneously.</a:t>
-            </a:r>
+              <a:rPr lang="de-DE" b="1" dirty="0"/>
+              <a:t>Docker-in-Docker (</a:t>
+            </a:r>
+            <a:r>
+              <a:rPr lang="de-DE" b="1" dirty="0" err="1">
+                <a:latin typeface="Consolas" panose="020B0609020204030204" pitchFamily="49" charset="0"/>
+              </a:rPr>
+              <a:t>dind</a:t>
+            </a:r>
+            <a:r>
+              <a:rPr lang="de-DE" b="1" dirty="0"/>
+              <a:t>)</a:t>
+            </a:r>
+          </a:p>
+          <a:p>
+            <a:pPr>
+              <a:buFont typeface="Arial" panose="020B0604020202020204" pitchFamily="34" charset="0"/>
+              <a:buChar char="•"/>
+            </a:pPr>
+            <a:r>
+              <a:rPr lang="de-DE" dirty="0"/>
+              <a:t>Registrierter Runner nutzt</a:t>
+            </a:r>
+          </a:p>
+          <a:p>
+            <a:pPr lvl="1">
+              <a:buFont typeface="Arial" panose="020B0604020202020204" pitchFamily="34" charset="0"/>
+              <a:buChar char="•"/>
+            </a:pPr>
+            <a:r>
+              <a:rPr lang="de-DE" dirty="0"/>
+              <a:t>Docker </a:t>
+            </a:r>
+            <a:r>
+              <a:rPr lang="de-DE" dirty="0" err="1"/>
+              <a:t>Executor</a:t>
+            </a:r>
+            <a:r>
+              <a:rPr lang="de-DE" dirty="0"/>
+              <a:t> oder</a:t>
+            </a:r>
+          </a:p>
+          <a:p>
+            <a:pPr lvl="1">
+              <a:buFont typeface="Arial" panose="020B0604020202020204" pitchFamily="34" charset="0"/>
+              <a:buChar char="•"/>
+            </a:pPr>
+            <a:r>
+              <a:rPr lang="de-DE" dirty="0" err="1"/>
+              <a:t>Kubernetes</a:t>
+            </a:r>
+            <a:r>
+              <a:rPr lang="de-DE" dirty="0"/>
+              <a:t> </a:t>
+            </a:r>
+            <a:r>
+              <a:rPr lang="de-DE" dirty="0" err="1"/>
+              <a:t>Executor</a:t>
+            </a:r>
+            <a:endParaRPr lang="de-DE" dirty="0"/>
+          </a:p>
+          <a:p>
+            <a:pPr>
+              <a:buFont typeface="Arial" panose="020B0604020202020204" pitchFamily="34" charset="0"/>
+              <a:buChar char="•"/>
+            </a:pPr>
+            <a:r>
+              <a:rPr lang="de-DE" dirty="0" err="1"/>
+              <a:t>Executor</a:t>
+            </a:r>
+            <a:r>
+              <a:rPr lang="de-DE" dirty="0"/>
+              <a:t> nutzt ein Container Image von Docker</a:t>
+            </a:r>
+          </a:p>
+          <a:p>
+            <a:pPr lvl="1">
+              <a:buFont typeface="Arial" panose="020B0604020202020204" pitchFamily="34" charset="0"/>
+              <a:buChar char="•"/>
+            </a:pPr>
+            <a:r>
+              <a:rPr lang="de-DE" dirty="0"/>
+              <a:t>Bereitgestellt von Docker, um die CI/CD </a:t>
+            </a:r>
+            <a:r>
+              <a:rPr lang="de-DE" dirty="0" err="1"/>
+              <a:t>jobs</a:t>
+            </a:r>
+            <a:r>
+              <a:rPr lang="de-DE" dirty="0"/>
+              <a:t> auszuführen</a:t>
+            </a:r>
+          </a:p>
+          <a:p>
+            <a:pPr>
+              <a:buFont typeface="Arial" panose="020B0604020202020204" pitchFamily="34" charset="0"/>
+              <a:buChar char="•"/>
+            </a:pPr>
+            <a:r>
+              <a:rPr lang="de-DE" dirty="0"/>
+              <a:t>Docker Image beinhaltet alle </a:t>
+            </a:r>
+            <a:r>
+              <a:rPr lang="de-DE" dirty="0" err="1"/>
+              <a:t>docker</a:t>
+            </a:r>
+            <a:r>
+              <a:rPr lang="de-DE" dirty="0"/>
+              <a:t> </a:t>
+            </a:r>
+            <a:r>
+              <a:rPr lang="de-DE" dirty="0" err="1"/>
+              <a:t>tools</a:t>
+            </a:r>
+            <a:endParaRPr lang="de-DE" dirty="0"/>
+          </a:p>
+          <a:p>
+            <a:pPr lvl="1">
+              <a:buFont typeface="Arial" panose="020B0604020202020204" pitchFamily="34" charset="0"/>
+              <a:buChar char="•"/>
+            </a:pPr>
+            <a:r>
+              <a:rPr lang="de-DE" dirty="0"/>
+              <a:t>Und kann das Job-</a:t>
+            </a:r>
+            <a:r>
+              <a:rPr lang="de-DE" dirty="0" err="1"/>
+              <a:t>Script</a:t>
+            </a:r>
+            <a:r>
+              <a:rPr lang="de-DE" dirty="0"/>
+              <a:t> im Kontext des Images im privilegierten Modus ausführen</a:t>
+            </a:r>
+          </a:p>
+          <a:p>
+            <a:pPr>
+              <a:buFont typeface="Arial" panose="020B0604020202020204" pitchFamily="34" charset="0"/>
+              <a:buChar char="•"/>
+            </a:pPr>
+            <a:r>
+              <a:rPr lang="de-DE" dirty="0"/>
+              <a:t>Immer eine spezifische Version nutzen!</a:t>
+            </a:r>
+          </a:p>
+          <a:p>
+            <a:pPr lvl="1">
+              <a:buFont typeface="Arial" panose="020B0604020202020204" pitchFamily="34" charset="0"/>
+              <a:buChar char="•"/>
+            </a:pPr>
+            <a:r>
+              <a:rPr lang="de-DE" dirty="0"/>
+              <a:t>Beispiel: </a:t>
+            </a:r>
+            <a:r>
+              <a:rPr lang="de-DE" dirty="0">
+                <a:latin typeface="Consolas" panose="020B0609020204030204" pitchFamily="49" charset="0"/>
+              </a:rPr>
+              <a:t>docker:24.0.5</a:t>
+            </a:r>
+          </a:p>
+          <a:p>
+            <a:pPr lvl="1">
+              <a:buFont typeface="Arial" panose="020B0604020202020204" pitchFamily="34" charset="0"/>
+              <a:buChar char="•"/>
+            </a:pPr>
+            <a:r>
+              <a:rPr lang="de-DE" dirty="0"/>
+              <a:t>Ansonsten bei </a:t>
+            </a:r>
+            <a:r>
+              <a:rPr lang="de-DE" dirty="0">
+                <a:latin typeface="Consolas" panose="020B0609020204030204" pitchFamily="49" charset="0"/>
+              </a:rPr>
+              <a:t>:</a:t>
+            </a:r>
+            <a:r>
+              <a:rPr lang="de-DE" dirty="0" err="1">
+                <a:latin typeface="Consolas" panose="020B0609020204030204" pitchFamily="49" charset="0"/>
+              </a:rPr>
+              <a:t>latest</a:t>
+            </a:r>
+            <a:r>
+              <a:rPr lang="de-DE" dirty="0">
+                <a:latin typeface="Consolas" panose="020B0609020204030204" pitchFamily="49" charset="0"/>
+              </a:rPr>
+              <a:t> </a:t>
+            </a:r>
+            <a:r>
+              <a:rPr lang="de-DE" dirty="0"/>
+              <a:t>Inkompatibilitätsproblemen, falls Update des Images</a:t>
+            </a:r>
+          </a:p>
+          <a:p>
+            <a:pPr lvl="1">
+              <a:buFont typeface="Arial" panose="020B0604020202020204" pitchFamily="34" charset="0"/>
+              <a:buChar char="•"/>
+            </a:pPr>
+            <a:endParaRPr lang="de-DE" dirty="0"/>
+          </a:p>
+          <a:p>
+            <a:pPr>
+              <a:buFont typeface="Arial" panose="020B0604020202020204" pitchFamily="34" charset="0"/>
+              <a:buChar char="•"/>
+            </a:pPr>
             <a:endParaRPr lang="de-DE" dirty="0"/>
           </a:p>
         </p:txBody>
@@ -9753,7 +10062,7 @@
     </p:spTree>
     <p:extLst>
       <p:ext uri="{BB962C8B-B14F-4D97-AF65-F5344CB8AC3E}">
-        <p14:creationId xmlns:p14="http://schemas.microsoft.com/office/powerpoint/2010/main" val="4255989784"/>
+        <p14:creationId xmlns:p14="http://schemas.microsoft.com/office/powerpoint/2010/main" val="3692726304"/>
       </p:ext>
     </p:extLst>
   </p:cSld>
@@ -9785,7 +10094,7 @@
           <p:cNvPr id="2" name="Titel 1">
             <a:extLst>
               <a:ext uri="{FF2B5EF4-FFF2-40B4-BE49-F238E27FC236}">
-                <a16:creationId xmlns:a16="http://schemas.microsoft.com/office/drawing/2014/main" id="{184AFD09-5210-6F86-C2FD-BBC016D382A6}"/>
+                <a16:creationId xmlns:a16="http://schemas.microsoft.com/office/drawing/2014/main" id="{73FEA322-ABCF-FE66-D047-5245BEC88A79}"/>
               </a:ext>
             </a:extLst>
           </p:cNvPr>
@@ -9819,10 +10128,10 @@
       </p:sp>
       <p:sp>
         <p:nvSpPr>
-          <p:cNvPr id="6" name="Inhaltsplatzhalter 5">
+          <p:cNvPr id="3" name="Inhaltsplatzhalter 2">
             <a:extLst>
               <a:ext uri="{FF2B5EF4-FFF2-40B4-BE49-F238E27FC236}">
-                <a16:creationId xmlns:a16="http://schemas.microsoft.com/office/drawing/2014/main" id="{D2412707-84D3-F572-4709-FD9A95F28E5B}"/>
+                <a16:creationId xmlns:a16="http://schemas.microsoft.com/office/drawing/2014/main" id="{C3FAE0C2-4BBD-D636-FAB6-5022AB351FD4}"/>
               </a:ext>
             </a:extLst>
           </p:cNvPr>
@@ -9842,122 +10151,272 @@
               <a:buNone/>
             </a:pPr>
             <a:r>
+              <a:rPr lang="de-DE" b="1" dirty="0"/>
+              <a:t>.</a:t>
+            </a:r>
+            <a:r>
               <a:rPr lang="de-DE" b="1" dirty="0" err="1"/>
-              <a:t>GitLab</a:t>
+              <a:t>gitlab-ci.yml</a:t>
             </a:r>
             <a:r>
               <a:rPr lang="de-DE" b="1" dirty="0"/>
-              <a:t> CI/CD</a:t>
-            </a:r>
-          </a:p>
-          <a:p>
-            <a:pPr algn="l"/>
-            <a:r>
-              <a:rPr lang="en-US" b="1" i="0" dirty="0">
-                <a:solidFill>
-                  <a:srgbClr val="222261"/>
-                </a:solidFill>
-                <a:effectLst/>
-                <a:latin typeface="gitlab sans"/>
-              </a:rPr>
-              <a:t>Use GitLab CI/CD</a:t>
-            </a:r>
-          </a:p>
-          <a:p>
-            <a:pPr algn="l"/>
-            <a:r>
-              <a:rPr lang="en-US" b="0" i="0" dirty="0">
-                <a:solidFill>
-                  <a:srgbClr val="404040"/>
-                </a:solidFill>
-                <a:effectLst/>
-                <a:latin typeface="gitlab sans"/>
-              </a:rPr>
-              <a:t>You can use </a:t>
-            </a:r>
-            <a:r>
-              <a:rPr lang="en-US" b="0" i="0" u="none" strike="noStrike" dirty="0">
-                <a:solidFill>
-                  <a:srgbClr val="5943B6"/>
-                </a:solidFill>
-                <a:effectLst/>
-                <a:latin typeface="gitlab sans"/>
-                <a:hlinkClick r:id="rId3"/>
-              </a:rPr>
-              <a:t>GitLab CI/CD</a:t>
-            </a:r>
-            <a:r>
-              <a:rPr lang="en-US" b="0" i="0" dirty="0">
-                <a:solidFill>
-                  <a:srgbClr val="404040"/>
-                </a:solidFill>
-                <a:effectLst/>
-                <a:latin typeface="gitlab sans"/>
-              </a:rPr>
-              <a:t> to build and push container images to the Container Registry. You can use CI/CD to test, build, and deploy your project from the container image you created.</a:t>
-            </a:r>
+              <a:t> </a:t>
+            </a:r>
+          </a:p>
+          <a:p>
+            <a:pPr>
+              <a:buFont typeface="Arial" panose="020B0604020202020204" pitchFamily="34" charset="0"/>
+              <a:buChar char="•"/>
+            </a:pPr>
+            <a:r>
+              <a:rPr lang="de-DE" dirty="0"/>
+              <a:t>Bauen und Pushen von Images in die Registry</a:t>
+            </a:r>
+          </a:p>
+          <a:p>
+            <a:pPr>
+              <a:buFont typeface="Arial" panose="020B0604020202020204" pitchFamily="34" charset="0"/>
+              <a:buChar char="•"/>
+            </a:pPr>
+            <a:r>
+              <a:rPr lang="de-DE" dirty="0"/>
+              <a:t>Falls mehrere </a:t>
+            </a:r>
+            <a:r>
+              <a:rPr lang="de-DE" dirty="0" err="1"/>
+              <a:t>jobs</a:t>
+            </a:r>
+            <a:r>
+              <a:rPr lang="de-DE" dirty="0"/>
+              <a:t> Authentifizierung benötigen</a:t>
+            </a:r>
+          </a:p>
+          <a:p>
+            <a:pPr lvl="1">
+              <a:buFont typeface="Arial" panose="020B0604020202020204" pitchFamily="34" charset="0"/>
+              <a:buChar char="•"/>
+            </a:pPr>
+            <a:r>
+              <a:rPr lang="de-DE" dirty="0" err="1"/>
+              <a:t>Authentifierzungsbefehl</a:t>
+            </a:r>
+            <a:r>
+              <a:rPr lang="de-DE" dirty="0"/>
+              <a:t> in </a:t>
+            </a:r>
+            <a:r>
+              <a:rPr lang="de-DE" dirty="0" err="1">
+                <a:latin typeface="Consolas" panose="020B0609020204030204" pitchFamily="49" charset="0"/>
+              </a:rPr>
+              <a:t>before_script</a:t>
+            </a:r>
+            <a:endParaRPr lang="de-DE" dirty="0">
+              <a:latin typeface="Consolas" panose="020B0609020204030204" pitchFamily="49" charset="0"/>
+            </a:endParaRPr>
+          </a:p>
+          <a:p>
+            <a:pPr>
+              <a:buFont typeface="Arial" panose="020B0604020202020204" pitchFamily="34" charset="0"/>
+              <a:buChar char="•"/>
+            </a:pPr>
+            <a:r>
+              <a:rPr lang="de-DE" dirty="0" err="1">
+                <a:latin typeface="Consolas" panose="020B0609020204030204" pitchFamily="49" charset="0"/>
+              </a:rPr>
+              <a:t>docker</a:t>
+            </a:r>
+            <a:r>
+              <a:rPr lang="de-DE" dirty="0">
+                <a:latin typeface="Consolas" panose="020B0609020204030204" pitchFamily="49" charset="0"/>
+              </a:rPr>
+              <a:t> </a:t>
+            </a:r>
+            <a:r>
+              <a:rPr lang="de-DE" dirty="0" err="1">
+                <a:latin typeface="Consolas" panose="020B0609020204030204" pitchFamily="49" charset="0"/>
+              </a:rPr>
+              <a:t>build</a:t>
+            </a:r>
+            <a:r>
+              <a:rPr lang="de-DE" dirty="0">
+                <a:latin typeface="Consolas" panose="020B0609020204030204" pitchFamily="49" charset="0"/>
+              </a:rPr>
+              <a:t> –pull </a:t>
+            </a:r>
+            <a:r>
+              <a:rPr lang="de-DE" dirty="0">
+                <a:latin typeface="+mj-lt"/>
+              </a:rPr>
+              <a:t>um Änderungen am Base Image zu ziehen</a:t>
+            </a:r>
+          </a:p>
+          <a:p>
+            <a:pPr lvl="1">
+              <a:buFont typeface="Arial" panose="020B0604020202020204" pitchFamily="34" charset="0"/>
+              <a:buChar char="•"/>
+            </a:pPr>
+            <a:r>
+              <a:rPr lang="de-DE" dirty="0" err="1">
+                <a:latin typeface="+mj-lt"/>
+              </a:rPr>
+              <a:t>Build</a:t>
+            </a:r>
+            <a:r>
+              <a:rPr lang="de-DE" dirty="0">
+                <a:latin typeface="+mj-lt"/>
+              </a:rPr>
+              <a:t> dauert dadurch länger, aber das Image ist </a:t>
+            </a:r>
+            <a:r>
+              <a:rPr lang="de-DE" dirty="0" err="1">
+                <a:latin typeface="+mj-lt"/>
+              </a:rPr>
+              <a:t>up</a:t>
+            </a:r>
+            <a:r>
+              <a:rPr lang="de-DE" dirty="0">
+                <a:latin typeface="+mj-lt"/>
+              </a:rPr>
+              <a:t>-</a:t>
+            </a:r>
+            <a:r>
+              <a:rPr lang="de-DE" dirty="0" err="1">
+                <a:latin typeface="+mj-lt"/>
+              </a:rPr>
+              <a:t>to</a:t>
+            </a:r>
+            <a:r>
+              <a:rPr lang="de-DE" dirty="0">
+                <a:latin typeface="+mj-lt"/>
+              </a:rPr>
+              <a:t>-date</a:t>
+            </a:r>
+          </a:p>
+          <a:p>
+            <a:pPr>
+              <a:buFont typeface="Arial" panose="020B0604020202020204" pitchFamily="34" charset="0"/>
+              <a:buChar char="•"/>
+            </a:pPr>
+            <a:r>
+              <a:rPr lang="de-DE" dirty="0">
+                <a:latin typeface="+mj-lt"/>
+              </a:rPr>
+              <a:t>Vor jedem </a:t>
+            </a:r>
+            <a:r>
+              <a:rPr lang="de-DE" dirty="0" err="1">
+                <a:latin typeface="Consolas" panose="020B0609020204030204" pitchFamily="49" charset="0"/>
+              </a:rPr>
+              <a:t>docker</a:t>
+            </a:r>
+            <a:r>
+              <a:rPr lang="de-DE" dirty="0">
+                <a:latin typeface="Consolas" panose="020B0609020204030204" pitchFamily="49" charset="0"/>
+              </a:rPr>
+              <a:t> </a:t>
+            </a:r>
+            <a:r>
+              <a:rPr lang="de-DE" dirty="0" err="1">
+                <a:latin typeface="Consolas" panose="020B0609020204030204" pitchFamily="49" charset="0"/>
+              </a:rPr>
+              <a:t>run</a:t>
+            </a:r>
+            <a:r>
+              <a:rPr lang="de-DE" dirty="0">
+                <a:latin typeface="Consolas" panose="020B0609020204030204" pitchFamily="49" charset="0"/>
+              </a:rPr>
+              <a:t> </a:t>
+            </a:r>
+            <a:r>
+              <a:rPr lang="de-DE" dirty="0">
+                <a:latin typeface="+mj-lt"/>
+              </a:rPr>
+              <a:t>ein</a:t>
+            </a:r>
+            <a:r>
+              <a:rPr lang="de-DE" dirty="0">
+                <a:latin typeface="Consolas" panose="020B0609020204030204" pitchFamily="49" charset="0"/>
+              </a:rPr>
+              <a:t> </a:t>
+            </a:r>
+            <a:r>
+              <a:rPr lang="de-DE" dirty="0" err="1">
+                <a:latin typeface="Consolas" panose="020B0609020204030204" pitchFamily="49" charset="0"/>
+              </a:rPr>
+              <a:t>docker</a:t>
+            </a:r>
+            <a:r>
+              <a:rPr lang="de-DE" dirty="0">
+                <a:latin typeface="Consolas" panose="020B0609020204030204" pitchFamily="49" charset="0"/>
+              </a:rPr>
+              <a:t> </a:t>
+            </a:r>
+            <a:r>
+              <a:rPr lang="de-DE" dirty="0" err="1">
+                <a:latin typeface="Consolas" panose="020B0609020204030204" pitchFamily="49" charset="0"/>
+              </a:rPr>
+              <a:t>fetch</a:t>
+            </a:r>
+            <a:endParaRPr lang="de-DE" dirty="0">
+              <a:latin typeface="Consolas" panose="020B0609020204030204" pitchFamily="49" charset="0"/>
+            </a:endParaRPr>
+          </a:p>
+          <a:p>
+            <a:pPr lvl="1">
+              <a:buFont typeface="Arial" panose="020B0604020202020204" pitchFamily="34" charset="0"/>
+              <a:buChar char="•"/>
+            </a:pPr>
+            <a:r>
+              <a:rPr lang="de-DE" dirty="0">
+                <a:latin typeface="+mj-lt"/>
+              </a:rPr>
+              <a:t>Um das aktuelle Image zu </a:t>
+            </a:r>
+            <a:r>
+              <a:rPr lang="de-DE" dirty="0" err="1">
+                <a:latin typeface="+mj-lt"/>
+              </a:rPr>
+              <a:t>fetchen</a:t>
+            </a:r>
+            <a:endParaRPr lang="de-DE" dirty="0">
+              <a:latin typeface="+mj-lt"/>
+            </a:endParaRPr>
+          </a:p>
+          <a:p>
+            <a:pPr lvl="1">
+              <a:buFont typeface="Arial" panose="020B0604020202020204" pitchFamily="34" charset="0"/>
+              <a:buChar char="•"/>
+            </a:pPr>
+            <a:r>
+              <a:rPr lang="de-DE" dirty="0">
+                <a:latin typeface="+mj-lt"/>
+              </a:rPr>
+              <a:t>Besonders wichtig bei mehreren Runnern, welche Images lokal </a:t>
+            </a:r>
+            <a:r>
+              <a:rPr lang="de-DE" dirty="0" err="1">
+                <a:latin typeface="+mj-lt"/>
+              </a:rPr>
+              <a:t>cachen</a:t>
+            </a:r>
+            <a:endParaRPr lang="de-DE" dirty="0">
+              <a:latin typeface="+mj-lt"/>
+            </a:endParaRPr>
           </a:p>
           <a:p>
             <a:pPr marL="0" indent="0">
               <a:buNone/>
             </a:pPr>
-            <a:endParaRPr lang="de-DE" b="1" dirty="0"/>
-          </a:p>
-          <a:p>
-            <a:pPr marL="0" indent="0">
-              <a:buNone/>
-            </a:pPr>
-            <a:r>
-              <a:rPr lang="en-US" b="1" i="0" dirty="0">
-                <a:solidFill>
-                  <a:srgbClr val="222261"/>
-                </a:solidFill>
-                <a:effectLst/>
-                <a:latin typeface="gitlab sans"/>
-              </a:rPr>
-              <a:t>Use a Docker-in-Docker container image from your container registry</a:t>
-            </a:r>
-          </a:p>
-          <a:p>
-            <a:pPr marL="0" indent="0">
-              <a:buNone/>
-            </a:pPr>
-            <a:endParaRPr lang="de-DE" b="1" dirty="0"/>
-          </a:p>
-          <a:p>
-            <a:pPr marL="0" indent="0">
-              <a:buNone/>
-            </a:pPr>
-            <a:r>
-              <a:rPr lang="en-US" b="1" i="0" dirty="0">
-                <a:solidFill>
-                  <a:srgbClr val="222261"/>
-                </a:solidFill>
-                <a:effectLst/>
-                <a:latin typeface="gitlab sans"/>
-              </a:rPr>
-              <a:t>Use a Docker-in-Docker container image with Dependency Proxy</a:t>
-            </a:r>
-          </a:p>
-          <a:p>
-            <a:pPr marL="0" indent="0">
-              <a:buNone/>
-            </a:pPr>
-            <a:endParaRPr lang="de-DE" dirty="0"/>
-          </a:p>
-          <a:p>
-            <a:pPr lvl="1">
-              <a:buFont typeface="Arial" panose="020B0604020202020204" pitchFamily="34" charset="0"/>
-              <a:buChar char="•"/>
-            </a:pPr>
-            <a:endParaRPr lang="de-DE" dirty="0"/>
+            <a:endParaRPr lang="de-DE" dirty="0">
+              <a:latin typeface="+mj-lt"/>
+            </a:endParaRPr>
           </a:p>
         </p:txBody>
       </p:sp>
     </p:spTree>
     <p:extLst>
       <p:ext uri="{BB962C8B-B14F-4D97-AF65-F5344CB8AC3E}">
-        <p14:creationId xmlns:p14="http://schemas.microsoft.com/office/powerpoint/2010/main" val="2121417730"/>
+        <p14:creationId xmlns:p14="http://schemas.microsoft.com/office/powerpoint/2010/main" val="3527997771"/>
       </p:ext>
     </p:extLst>
   </p:cSld>
@@ -10042,6 +10501,19 @@
           <a:bodyPr/>
           <a:lstStyle/>
           <a:p>
+            <a:pPr marL="0" indent="0">
+              <a:buNone/>
+            </a:pPr>
+            <a:r>
+              <a:rPr lang="de-DE" b="1" dirty="0" err="1"/>
+              <a:t>GitLab</a:t>
+            </a:r>
+            <a:r>
+              <a:rPr lang="de-DE" b="1" dirty="0"/>
+              <a:t> CI/CD</a:t>
+            </a:r>
+          </a:p>
+          <a:p>
             <a:pPr algn="l"/>
             <a:r>
               <a:rPr lang="en-US" b="1" i="0" dirty="0">
@@ -10051,200 +10523,89 @@
                 <a:effectLst/>
                 <a:latin typeface="gitlab sans"/>
               </a:rPr>
+              <a:t>Use GitLab CI/CD</a:t>
+            </a:r>
+          </a:p>
+          <a:p>
+            <a:pPr algn="l"/>
+            <a:r>
+              <a:rPr lang="en-US" b="0" i="0" dirty="0">
+                <a:solidFill>
+                  <a:srgbClr val="404040"/>
+                </a:solidFill>
+                <a:effectLst/>
+                <a:latin typeface="gitlab sans"/>
+              </a:rPr>
+              <a:t>You can use </a:t>
+            </a:r>
+            <a:r>
+              <a:rPr lang="en-US" b="0" i="0" u="none" strike="noStrike" dirty="0">
+                <a:solidFill>
+                  <a:srgbClr val="5943B6"/>
+                </a:solidFill>
+                <a:effectLst/>
+                <a:latin typeface="gitlab sans"/>
+                <a:hlinkClick r:id="rId3"/>
+              </a:rPr>
+              <a:t>GitLab CI/CD</a:t>
+            </a:r>
+            <a:r>
+              <a:rPr lang="en-US" b="0" i="0" dirty="0">
+                <a:solidFill>
+                  <a:srgbClr val="404040"/>
+                </a:solidFill>
+                <a:effectLst/>
+                <a:latin typeface="gitlab sans"/>
+              </a:rPr>
+              <a:t> to build and push container images to the Container Registry. You can use CI/CD to test, build, and deploy your project from the container image you created.</a:t>
+            </a:r>
+          </a:p>
+          <a:p>
+            <a:pPr marL="0" indent="0">
+              <a:buNone/>
+            </a:pPr>
+            <a:endParaRPr lang="de-DE" b="1" dirty="0"/>
+          </a:p>
+          <a:p>
+            <a:pPr marL="0" indent="0">
+              <a:buNone/>
+            </a:pPr>
+            <a:r>
+              <a:rPr lang="en-US" b="1" i="0" dirty="0">
+                <a:solidFill>
+                  <a:srgbClr val="222261"/>
+                </a:solidFill>
+                <a:effectLst/>
+                <a:latin typeface="gitlab sans"/>
+              </a:rPr>
               <a:t>Use a Docker-in-Docker container image from your container registry</a:t>
             </a:r>
           </a:p>
           <a:p>
-            <a:pPr marL="0" indent="0" algn="l">
+            <a:pPr marL="0" indent="0">
               <a:buNone/>
             </a:pPr>
-            <a:r>
-              <a:rPr lang="en-US" dirty="0"/>
-              <a:t>You can use your own container images for Docker-in-Docker.</a:t>
-            </a:r>
-          </a:p>
-          <a:p>
-            <a:pPr marL="0" indent="0" algn="l">
+            <a:endParaRPr lang="de-DE" b="1" dirty="0"/>
+          </a:p>
+          <a:p>
+            <a:pPr marL="0" indent="0">
               <a:buNone/>
             </a:pPr>
-            <a:endParaRPr lang="en-US" dirty="0"/>
-          </a:p>
-          <a:p>
-            <a:pPr marL="0" indent="0" algn="l">
+            <a:r>
+              <a:rPr lang="en-US" b="1" i="0" dirty="0">
+                <a:solidFill>
+                  <a:srgbClr val="222261"/>
+                </a:solidFill>
+                <a:effectLst/>
+                <a:latin typeface="gitlab sans"/>
+              </a:rPr>
+              <a:t>Use a Docker-in-Docker container image with Dependency Proxy</a:t>
+            </a:r>
+          </a:p>
+          <a:p>
+            <a:pPr marL="0" indent="0">
               <a:buNone/>
             </a:pPr>
-            <a:r>
-              <a:rPr lang="en-US" dirty="0"/>
-              <a:t>Set up Docker-in-Docker.</a:t>
-            </a:r>
-          </a:p>
-          <a:p>
-            <a:pPr marL="0" indent="0" algn="l">
-              <a:buNone/>
-            </a:pPr>
-            <a:r>
-              <a:rPr lang="en-US" dirty="0"/>
-              <a:t>Update the image and service to point to your registry.</a:t>
-            </a:r>
-          </a:p>
-          <a:p>
-            <a:pPr marL="0" indent="0" algn="l">
-              <a:buNone/>
-            </a:pPr>
-            <a:r>
-              <a:rPr lang="en-US" dirty="0"/>
-              <a:t>Add a service alias.</a:t>
-            </a:r>
-          </a:p>
-          <a:p>
-            <a:pPr marL="0" indent="0" algn="l">
-              <a:buNone/>
-            </a:pPr>
-            <a:r>
-              <a:rPr lang="en-US" dirty="0"/>
-              <a:t>Your .</a:t>
-            </a:r>
-            <a:r>
-              <a:rPr lang="en-US" dirty="0" err="1"/>
-              <a:t>gitlab-ci.yml</a:t>
-            </a:r>
-            <a:r>
-              <a:rPr lang="en-US" dirty="0"/>
-              <a:t> should look similar to this:</a:t>
-            </a:r>
-          </a:p>
-          <a:p>
-            <a:pPr marL="0" indent="0" algn="l">
-              <a:buNone/>
-            </a:pPr>
-            <a:endParaRPr lang="en-US" dirty="0"/>
-          </a:p>
-          <a:p>
-            <a:pPr marL="0" indent="0" algn="l">
-              <a:buNone/>
-            </a:pPr>
-            <a:r>
-              <a:rPr lang="en-US" dirty="0"/>
-              <a:t>build:</a:t>
-            </a:r>
-          </a:p>
-          <a:p>
-            <a:pPr marL="0" indent="0" algn="l">
-              <a:buNone/>
-            </a:pPr>
-            <a:r>
-              <a:rPr lang="en-US" dirty="0"/>
-              <a:t>  image: $CI_REGISTRY/group/project/docker:20.10.16</a:t>
-            </a:r>
-          </a:p>
-          <a:p>
-            <a:pPr marL="0" indent="0" algn="l">
-              <a:buNone/>
-            </a:pPr>
-            <a:r>
-              <a:rPr lang="en-US" dirty="0"/>
-              <a:t>  services:</a:t>
-            </a:r>
-          </a:p>
-          <a:p>
-            <a:pPr marL="0" indent="0" algn="l">
-              <a:buNone/>
-            </a:pPr>
-            <a:r>
-              <a:rPr lang="en-US" dirty="0"/>
-              <a:t>    - name: $CI_REGISTRY/group/project/docker:20.10.16-dind</a:t>
-            </a:r>
-          </a:p>
-          <a:p>
-            <a:pPr marL="0" indent="0" algn="l">
-              <a:buNone/>
-            </a:pPr>
-            <a:r>
-              <a:rPr lang="en-US" dirty="0"/>
-              <a:t>      alias: docker</a:t>
-            </a:r>
-          </a:p>
-          <a:p>
-            <a:pPr marL="0" indent="0" algn="l">
-              <a:buNone/>
-            </a:pPr>
-            <a:r>
-              <a:rPr lang="en-US" dirty="0"/>
-              <a:t>  stage: build</a:t>
-            </a:r>
-          </a:p>
-          <a:p>
-            <a:pPr marL="0" indent="0" algn="l">
-              <a:buNone/>
-            </a:pPr>
-            <a:r>
-              <a:rPr lang="en-US" dirty="0"/>
-              <a:t>  script:</a:t>
-            </a:r>
-          </a:p>
-          <a:p>
-            <a:pPr marL="0" indent="0" algn="l">
-              <a:buNone/>
-            </a:pPr>
-            <a:r>
-              <a:rPr lang="en-US" dirty="0"/>
-              <a:t>    - docker build -t my-docker-image .</a:t>
-            </a:r>
-          </a:p>
-          <a:p>
-            <a:pPr marL="0" indent="0" algn="l">
-              <a:buNone/>
-            </a:pPr>
-            <a:r>
-              <a:rPr lang="en-US" dirty="0"/>
-              <a:t>    - docker run my-docker-image /script/to/run/tests</a:t>
-            </a:r>
-          </a:p>
-          <a:p>
-            <a:pPr marL="0" indent="0" algn="l">
-              <a:buNone/>
-            </a:pPr>
-            <a:endParaRPr lang="en-US" dirty="0"/>
-          </a:p>
-          <a:p>
-            <a:pPr marL="0" indent="0" algn="l">
-              <a:buNone/>
-            </a:pPr>
-            <a:r>
-              <a:rPr lang="en-US" dirty="0"/>
-              <a:t>If you forget to set the service alias, the container image can’t find the </a:t>
-            </a:r>
-            <a:r>
-              <a:rPr lang="en-US" dirty="0" err="1"/>
-              <a:t>dind</a:t>
-            </a:r>
-            <a:r>
-              <a:rPr lang="en-US" dirty="0"/>
-              <a:t> service, and an error like the following is shown:</a:t>
-            </a:r>
-          </a:p>
-          <a:p>
-            <a:pPr marL="0" indent="0" algn="l">
-              <a:buNone/>
-            </a:pPr>
-            <a:endParaRPr lang="en-US" dirty="0"/>
-          </a:p>
-          <a:p>
-            <a:pPr marL="0" indent="0" algn="l">
-              <a:buNone/>
-            </a:pPr>
-            <a:r>
-              <a:rPr lang="en-US" dirty="0"/>
-              <a:t>error during connect: Get http://docker:2376/v1.39/info: dial </a:t>
-            </a:r>
-            <a:r>
-              <a:rPr lang="en-US" dirty="0" err="1"/>
-              <a:t>tcp</a:t>
-            </a:r>
-            <a:r>
-              <a:rPr lang="en-US" dirty="0"/>
-              <a:t>: lookup docker </a:t>
-            </a:r>
             <a:endParaRPr lang="de-DE" dirty="0"/>
           </a:p>
           <a:p>
@@ -10259,7 +10620,7 @@
     </p:spTree>
     <p:extLst>
       <p:ext uri="{BB962C8B-B14F-4D97-AF65-F5344CB8AC3E}">
-        <p14:creationId xmlns:p14="http://schemas.microsoft.com/office/powerpoint/2010/main" val="2278471957"/>
+        <p14:creationId xmlns:p14="http://schemas.microsoft.com/office/powerpoint/2010/main" val="2121417730"/>
       </p:ext>
     </p:extLst>
   </p:cSld>
@@ -10353,7 +10714,7 @@
                 <a:effectLst/>
                 <a:latin typeface="gitlab sans"/>
               </a:rPr>
-              <a:t>Use a Docker-in-Docker container image with Dependency Proxy</a:t>
+              <a:t>Use a Docker-in-Docker container image from your container registry</a:t>
             </a:r>
           </a:p>
           <a:p>
@@ -10362,7 +10723,7 @@
             </a:pPr>
             <a:r>
               <a:rPr lang="en-US" dirty="0"/>
-              <a:t>You can use your own container images with Dependency Proxy.</a:t>
+              <a:t>You can use your own container images for Docker-in-Docker.</a:t>
             </a:r>
           </a:p>
           <a:p>
@@ -10436,7 +10797,7 @@
             </a:pPr>
             <a:r>
               <a:rPr lang="en-US" dirty="0"/>
-              <a:t>  image: ${CI_DEPENDENCY_PROXY_GROUP_IMAGE_PREFIX}/docker:20.10.16</a:t>
+              <a:t>  image: $CI_REGISTRY/group/project/docker:20.10.16</a:t>
             </a:r>
           </a:p>
           <a:p>
@@ -10454,7 +10815,7 @@
             </a:pPr>
             <a:r>
               <a:rPr lang="en-US" dirty="0"/>
-              <a:t>    - name: ${CI_DEPENDENCY_PROXY_GROUP_IMAGE_PREFIX}/docker:18.09.7-dind</a:t>
+              <a:t>    - name: $CI_REGISTRY/group/project/docker:20.10.16-dind</a:t>
             </a:r>
           </a:p>
           <a:p>
@@ -10545,7 +10906,7 @@
             </a:r>
             <a:r>
               <a:rPr lang="en-US" dirty="0"/>
-              <a:t>: lookup docker o</a:t>
+              <a:t>: lookup docker </a:t>
             </a:r>
             <a:endParaRPr lang="de-DE" dirty="0"/>
           </a:p>
@@ -10561,7 +10922,7 @@
     </p:spTree>
     <p:extLst>
       <p:ext uri="{BB962C8B-B14F-4D97-AF65-F5344CB8AC3E}">
-        <p14:creationId xmlns:p14="http://schemas.microsoft.com/office/powerpoint/2010/main" val="1160348306"/>
+        <p14:creationId xmlns:p14="http://schemas.microsoft.com/office/powerpoint/2010/main" val="2278471957"/>
       </p:ext>
     </p:extLst>
   </p:cSld>
@@ -10593,7 +10954,7 @@
           <p:cNvPr id="2" name="Titel 1">
             <a:extLst>
               <a:ext uri="{FF2B5EF4-FFF2-40B4-BE49-F238E27FC236}">
-                <a16:creationId xmlns:a16="http://schemas.microsoft.com/office/drawing/2014/main" id="{DB1F447C-2F61-B060-8EFE-D98620927A6E}"/>
+                <a16:creationId xmlns:a16="http://schemas.microsoft.com/office/drawing/2014/main" id="{184AFD09-5210-6F86-C2FD-BBC016D382A6}"/>
               </a:ext>
             </a:extLst>
           </p:cNvPr>
@@ -10609,16 +10970,28 @@
           <a:bodyPr/>
           <a:lstStyle/>
           <a:p>
+            <a:r>
+              <a:rPr lang="de-DE" cap="none" dirty="0"/>
+              <a:t>Release- und </a:t>
+            </a:r>
+            <a:r>
+              <a:rPr lang="de-DE" cap="none" dirty="0" err="1"/>
+              <a:t>Tagged</a:t>
+            </a:r>
+            <a:r>
+              <a:rPr lang="de-DE" cap="none" dirty="0"/>
+              <a:t>-Images</a:t>
+            </a:r>
             <a:endParaRPr lang="de-DE" dirty="0"/>
           </a:p>
         </p:txBody>
       </p:sp>
       <p:sp>
         <p:nvSpPr>
-          <p:cNvPr id="3" name="Inhaltsplatzhalter 2">
+          <p:cNvPr id="6" name="Inhaltsplatzhalter 5">
             <a:extLst>
               <a:ext uri="{FF2B5EF4-FFF2-40B4-BE49-F238E27FC236}">
-                <a16:creationId xmlns:a16="http://schemas.microsoft.com/office/drawing/2014/main" id="{68EC2247-CA50-F34D-5B3B-2171A8AD687B}"/>
+                <a16:creationId xmlns:a16="http://schemas.microsoft.com/office/drawing/2014/main" id="{D2412707-84D3-F572-4709-FD9A95F28E5B}"/>
               </a:ext>
             </a:extLst>
           </p:cNvPr>
@@ -10634,27 +11007,215 @@
           <a:bodyPr/>
           <a:lstStyle/>
           <a:p>
-            <a:r>
-              <a:rPr lang="de-DE" dirty="0" err="1"/>
-              <a:t>Dependency</a:t>
-            </a:r>
-            <a:r>
-              <a:rPr lang="de-DE" dirty="0"/>
-              <a:t> Proxy:</a:t>
-            </a:r>
-          </a:p>
-          <a:p>
-            <a:r>
-              <a:rPr lang="de-DE" dirty="0">
-                <a:hlinkClick r:id="rId2"/>
-              </a:rPr>
-              <a:t>https://docs.gitlab.com/ee/user/packages/dependency_proxy/</a:t>
+            <a:pPr algn="l"/>
+            <a:r>
+              <a:rPr lang="en-US" b="1" i="0" dirty="0">
+                <a:solidFill>
+                  <a:srgbClr val="222261"/>
+                </a:solidFill>
+                <a:effectLst/>
+                <a:latin typeface="gitlab sans"/>
+              </a:rPr>
+              <a:t>Use a Docker-in-Docker container image with Dependency Proxy</a:t>
+            </a:r>
+          </a:p>
+          <a:p>
+            <a:pPr marL="0" indent="0" algn="l">
+              <a:buNone/>
+            </a:pPr>
+            <a:r>
+              <a:rPr lang="en-US" dirty="0"/>
+              <a:t>You can use your own container images with Dependency Proxy.</a:t>
+            </a:r>
+          </a:p>
+          <a:p>
+            <a:pPr marL="0" indent="0" algn="l">
+              <a:buNone/>
+            </a:pPr>
+            <a:endParaRPr lang="en-US" dirty="0"/>
+          </a:p>
+          <a:p>
+            <a:pPr marL="0" indent="0" algn="l">
+              <a:buNone/>
+            </a:pPr>
+            <a:r>
+              <a:rPr lang="en-US" dirty="0"/>
+              <a:t>Set up Docker-in-Docker.</a:t>
+            </a:r>
+          </a:p>
+          <a:p>
+            <a:pPr marL="0" indent="0" algn="l">
+              <a:buNone/>
+            </a:pPr>
+            <a:r>
+              <a:rPr lang="en-US" dirty="0"/>
+              <a:t>Update the image and service to point to your registry.</a:t>
+            </a:r>
+          </a:p>
+          <a:p>
+            <a:pPr marL="0" indent="0" algn="l">
+              <a:buNone/>
+            </a:pPr>
+            <a:r>
+              <a:rPr lang="en-US" dirty="0"/>
+              <a:t>Add a service alias.</a:t>
+            </a:r>
+          </a:p>
+          <a:p>
+            <a:pPr marL="0" indent="0" algn="l">
+              <a:buNone/>
+            </a:pPr>
+            <a:r>
+              <a:rPr lang="en-US" dirty="0"/>
+              <a:t>Your .</a:t>
+            </a:r>
+            <a:r>
+              <a:rPr lang="en-US" dirty="0" err="1"/>
+              <a:t>gitlab-ci.yml</a:t>
+            </a:r>
+            <a:r>
+              <a:rPr lang="en-US" dirty="0"/>
+              <a:t> should look similar to this:</a:t>
+            </a:r>
+          </a:p>
+          <a:p>
+            <a:pPr marL="0" indent="0" algn="l">
+              <a:buNone/>
+            </a:pPr>
+            <a:endParaRPr lang="en-US" dirty="0"/>
+          </a:p>
+          <a:p>
+            <a:pPr marL="0" indent="0" algn="l">
+              <a:buNone/>
+            </a:pPr>
+            <a:r>
+              <a:rPr lang="en-US" dirty="0"/>
+              <a:t>build:</a:t>
+            </a:r>
+          </a:p>
+          <a:p>
+            <a:pPr marL="0" indent="0" algn="l">
+              <a:buNone/>
+            </a:pPr>
+            <a:r>
+              <a:rPr lang="en-US" dirty="0"/>
+              <a:t>  image: ${CI_DEPENDENCY_PROXY_GROUP_IMAGE_PREFIX}/docker:20.10.16</a:t>
+            </a:r>
+          </a:p>
+          <a:p>
+            <a:pPr marL="0" indent="0" algn="l">
+              <a:buNone/>
+            </a:pPr>
+            <a:r>
+              <a:rPr lang="en-US" dirty="0"/>
+              <a:t>  services:</a:t>
+            </a:r>
+          </a:p>
+          <a:p>
+            <a:pPr marL="0" indent="0" algn="l">
+              <a:buNone/>
+            </a:pPr>
+            <a:r>
+              <a:rPr lang="en-US" dirty="0"/>
+              <a:t>    - name: ${CI_DEPENDENCY_PROXY_GROUP_IMAGE_PREFIX}/docker:18.09.7-dind</a:t>
+            </a:r>
+          </a:p>
+          <a:p>
+            <a:pPr marL="0" indent="0" algn="l">
+              <a:buNone/>
+            </a:pPr>
+            <a:r>
+              <a:rPr lang="en-US" dirty="0"/>
+              <a:t>      alias: docker</a:t>
+            </a:r>
+          </a:p>
+          <a:p>
+            <a:pPr marL="0" indent="0" algn="l">
+              <a:buNone/>
+            </a:pPr>
+            <a:r>
+              <a:rPr lang="en-US" dirty="0"/>
+              <a:t>  stage: build</a:t>
+            </a:r>
+          </a:p>
+          <a:p>
+            <a:pPr marL="0" indent="0" algn="l">
+              <a:buNone/>
+            </a:pPr>
+            <a:r>
+              <a:rPr lang="en-US" dirty="0"/>
+              <a:t>  script:</a:t>
+            </a:r>
+          </a:p>
+          <a:p>
+            <a:pPr marL="0" indent="0" algn="l">
+              <a:buNone/>
+            </a:pPr>
+            <a:r>
+              <a:rPr lang="en-US" dirty="0"/>
+              <a:t>    - docker build -t my-docker-image .</a:t>
+            </a:r>
+          </a:p>
+          <a:p>
+            <a:pPr marL="0" indent="0" algn="l">
+              <a:buNone/>
+            </a:pPr>
+            <a:r>
+              <a:rPr lang="en-US" dirty="0"/>
+              <a:t>    - docker run my-docker-image /script/to/run/tests</a:t>
+            </a:r>
+          </a:p>
+          <a:p>
+            <a:pPr marL="0" indent="0" algn="l">
+              <a:buNone/>
+            </a:pPr>
+            <a:endParaRPr lang="en-US" dirty="0"/>
+          </a:p>
+          <a:p>
+            <a:pPr marL="0" indent="0" algn="l">
+              <a:buNone/>
+            </a:pPr>
+            <a:r>
+              <a:rPr lang="en-US" dirty="0"/>
+              <a:t>If you forget to set the service alias, the container image can’t find the </a:t>
+            </a:r>
+            <a:r>
+              <a:rPr lang="en-US" dirty="0" err="1"/>
+              <a:t>dind</a:t>
+            </a:r>
+            <a:r>
+              <a:rPr lang="en-US" dirty="0"/>
+              <a:t> service, and an error like the following is shown:</a:t>
+            </a:r>
+          </a:p>
+          <a:p>
+            <a:pPr marL="0" indent="0" algn="l">
+              <a:buNone/>
+            </a:pPr>
+            <a:endParaRPr lang="en-US" dirty="0"/>
+          </a:p>
+          <a:p>
+            <a:pPr marL="0" indent="0" algn="l">
+              <a:buNone/>
+            </a:pPr>
+            <a:r>
+              <a:rPr lang="en-US" dirty="0"/>
+              <a:t>error during connect: Get http://docker:2376/v1.39/info: dial </a:t>
+            </a:r>
+            <a:r>
+              <a:rPr lang="en-US" dirty="0" err="1"/>
+              <a:t>tcp</a:t>
+            </a:r>
+            <a:r>
+              <a:rPr lang="en-US" dirty="0"/>
+              <a:t>: lookup docker o</a:t>
             </a:r>
             <a:endParaRPr lang="de-DE" dirty="0"/>
           </a:p>
           <a:p>
-            <a:pPr marL="0" indent="0">
-              <a:buNone/>
+            <a:pPr lvl="1">
+              <a:buFont typeface="Arial" panose="020B0604020202020204" pitchFamily="34" charset="0"/>
+              <a:buChar char="•"/>
             </a:pPr>
             <a:endParaRPr lang="de-DE" dirty="0"/>
           </a:p>
@@ -10663,7 +11224,7 @@
     </p:spTree>
     <p:extLst>
       <p:ext uri="{BB962C8B-B14F-4D97-AF65-F5344CB8AC3E}">
-        <p14:creationId xmlns:p14="http://schemas.microsoft.com/office/powerpoint/2010/main" val="844561808"/>
+        <p14:creationId xmlns:p14="http://schemas.microsoft.com/office/powerpoint/2010/main" val="1160348306"/>
       </p:ext>
     </p:extLst>
   </p:cSld>
@@ -11090,7 +11651,7 @@
           <p:cNvPr id="2" name="Titel 1">
             <a:extLst>
               <a:ext uri="{FF2B5EF4-FFF2-40B4-BE49-F238E27FC236}">
-                <a16:creationId xmlns:a16="http://schemas.microsoft.com/office/drawing/2014/main" id="{184AFD09-5210-6F86-C2FD-BBC016D382A6}"/>
+                <a16:creationId xmlns:a16="http://schemas.microsoft.com/office/drawing/2014/main" id="{DB1F447C-2F61-B060-8EFE-D98620927A6E}"/>
               </a:ext>
             </a:extLst>
           </p:cNvPr>
@@ -11106,28 +11667,16 @@
           <a:bodyPr/>
           <a:lstStyle/>
           <a:p>
-            <a:r>
-              <a:rPr lang="de-DE" cap="none" dirty="0"/>
-              <a:t>Release- und </a:t>
-            </a:r>
-            <a:r>
-              <a:rPr lang="de-DE" cap="none" dirty="0" err="1"/>
-              <a:t>Tagged</a:t>
-            </a:r>
-            <a:r>
-              <a:rPr lang="de-DE" cap="none" dirty="0"/>
-              <a:t>-Images</a:t>
-            </a:r>
             <a:endParaRPr lang="de-DE" dirty="0"/>
           </a:p>
         </p:txBody>
       </p:sp>
       <p:sp>
         <p:nvSpPr>
-          <p:cNvPr id="6" name="Inhaltsplatzhalter 5">
+          <p:cNvPr id="3" name="Inhaltsplatzhalter 2">
             <a:extLst>
               <a:ext uri="{FF2B5EF4-FFF2-40B4-BE49-F238E27FC236}">
-                <a16:creationId xmlns:a16="http://schemas.microsoft.com/office/drawing/2014/main" id="{D2412707-84D3-F572-4709-FD9A95F28E5B}"/>
+                <a16:creationId xmlns:a16="http://schemas.microsoft.com/office/drawing/2014/main" id="{68EC2247-CA50-F34D-5B3B-2171A8AD687B}"/>
               </a:ext>
             </a:extLst>
           </p:cNvPr>
@@ -11143,344 +11692,27 @@
           <a:bodyPr/>
           <a:lstStyle/>
           <a:p>
-            <a:pPr algn="l"/>
-            <a:r>
-              <a:rPr lang="en-US" b="1" i="0" dirty="0">
-                <a:solidFill>
-                  <a:srgbClr val="222261"/>
-                </a:solidFill>
-                <a:effectLst/>
-                <a:latin typeface="gitlab sans"/>
-              </a:rPr>
-              <a:t>Container registry examples with GitLab CI/CD</a:t>
-            </a:r>
+            <a:r>
+              <a:rPr lang="de-DE" dirty="0" err="1"/>
+              <a:t>Dependency</a:t>
+            </a:r>
+            <a:r>
+              <a:rPr lang="de-DE" dirty="0"/>
+              <a:t> Proxy:</a:t>
+            </a:r>
+          </a:p>
+          <a:p>
+            <a:r>
+              <a:rPr lang="de-DE" dirty="0">
+                <a:hlinkClick r:id="rId2"/>
+              </a:rPr>
+              <a:t>https://docs.gitlab.com/ee/user/packages/dependency_proxy/</a:t>
+            </a:r>
+            <a:endParaRPr lang="de-DE" dirty="0"/>
           </a:p>
           <a:p>
             <a:pPr marL="0" indent="0">
               <a:buNone/>
-            </a:pPr>
-            <a:r>
-              <a:rPr lang="de-DE" dirty="0" err="1"/>
-              <a:t>If</a:t>
-            </a:r>
-            <a:r>
-              <a:rPr lang="de-DE" dirty="0"/>
-              <a:t> </a:t>
-            </a:r>
-            <a:r>
-              <a:rPr lang="de-DE" dirty="0" err="1"/>
-              <a:t>you’re</a:t>
-            </a:r>
-            <a:r>
-              <a:rPr lang="de-DE" dirty="0"/>
-              <a:t> </a:t>
-            </a:r>
-            <a:r>
-              <a:rPr lang="de-DE" dirty="0" err="1"/>
-              <a:t>using</a:t>
-            </a:r>
-            <a:r>
-              <a:rPr lang="de-DE" dirty="0"/>
-              <a:t> Docker-in-Docker on </a:t>
-            </a:r>
-            <a:r>
-              <a:rPr lang="de-DE" dirty="0" err="1"/>
-              <a:t>your</a:t>
-            </a:r>
-            <a:r>
-              <a:rPr lang="de-DE" dirty="0"/>
-              <a:t> </a:t>
-            </a:r>
-            <a:r>
-              <a:rPr lang="de-DE" dirty="0" err="1"/>
-              <a:t>runners</a:t>
-            </a:r>
-            <a:r>
-              <a:rPr lang="de-DE" dirty="0"/>
-              <a:t>, </a:t>
-            </a:r>
-            <a:r>
-              <a:rPr lang="de-DE" dirty="0" err="1"/>
-              <a:t>your</a:t>
-            </a:r>
-            <a:r>
-              <a:rPr lang="de-DE" dirty="0"/>
-              <a:t> .</a:t>
-            </a:r>
-            <a:r>
-              <a:rPr lang="de-DE" dirty="0" err="1"/>
-              <a:t>gitlab-ci.yml</a:t>
-            </a:r>
-            <a:r>
-              <a:rPr lang="de-DE" dirty="0"/>
-              <a:t> </a:t>
-            </a:r>
-            <a:r>
-              <a:rPr lang="de-DE" dirty="0" err="1"/>
-              <a:t>file</a:t>
-            </a:r>
-            <a:r>
-              <a:rPr lang="de-DE" dirty="0"/>
-              <a:t> </a:t>
-            </a:r>
-            <a:r>
-              <a:rPr lang="de-DE" dirty="0" err="1"/>
-              <a:t>should</a:t>
-            </a:r>
-            <a:r>
-              <a:rPr lang="de-DE" dirty="0"/>
-              <a:t> </a:t>
-            </a:r>
-            <a:r>
-              <a:rPr lang="de-DE" dirty="0" err="1"/>
-              <a:t>look</a:t>
-            </a:r>
-            <a:r>
-              <a:rPr lang="de-DE" dirty="0"/>
-              <a:t> </a:t>
-            </a:r>
-            <a:r>
-              <a:rPr lang="de-DE" dirty="0" err="1"/>
-              <a:t>similar</a:t>
-            </a:r>
-            <a:r>
-              <a:rPr lang="de-DE" dirty="0"/>
-              <a:t> </a:t>
-            </a:r>
-            <a:r>
-              <a:rPr lang="de-DE" dirty="0" err="1"/>
-              <a:t>to</a:t>
-            </a:r>
-            <a:r>
-              <a:rPr lang="de-DE" dirty="0"/>
-              <a:t> </a:t>
-            </a:r>
-            <a:r>
-              <a:rPr lang="de-DE" dirty="0" err="1"/>
-              <a:t>this</a:t>
-            </a:r>
-            <a:r>
-              <a:rPr lang="de-DE" dirty="0"/>
-              <a:t>:</a:t>
-            </a:r>
-          </a:p>
-          <a:p>
-            <a:pPr marL="0" indent="0">
-              <a:buNone/>
-            </a:pPr>
-            <a:endParaRPr lang="de-DE" dirty="0"/>
-          </a:p>
-          <a:p>
-            <a:pPr marL="0" indent="0">
-              <a:buNone/>
-            </a:pPr>
-            <a:r>
-              <a:rPr lang="de-DE" dirty="0" err="1"/>
-              <a:t>build</a:t>
-            </a:r>
-            <a:r>
-              <a:rPr lang="de-DE" dirty="0"/>
-              <a:t>:</a:t>
-            </a:r>
-          </a:p>
-          <a:p>
-            <a:pPr marL="0" indent="0">
-              <a:buNone/>
-            </a:pPr>
-            <a:r>
-              <a:rPr lang="de-DE" dirty="0"/>
-              <a:t>  </a:t>
-            </a:r>
-            <a:r>
-              <a:rPr lang="de-DE" dirty="0" err="1"/>
-              <a:t>image</a:t>
-            </a:r>
-            <a:r>
-              <a:rPr lang="de-DE" dirty="0"/>
-              <a:t>: docker:20.10.16</a:t>
-            </a:r>
-          </a:p>
-          <a:p>
-            <a:pPr marL="0" indent="0">
-              <a:buNone/>
-            </a:pPr>
-            <a:r>
-              <a:rPr lang="de-DE" dirty="0"/>
-              <a:t>  </a:t>
-            </a:r>
-            <a:r>
-              <a:rPr lang="de-DE" dirty="0" err="1"/>
-              <a:t>stage</a:t>
-            </a:r>
-            <a:r>
-              <a:rPr lang="de-DE" dirty="0"/>
-              <a:t>: </a:t>
-            </a:r>
-            <a:r>
-              <a:rPr lang="de-DE" dirty="0" err="1"/>
-              <a:t>build</a:t>
-            </a:r>
-            <a:endParaRPr lang="de-DE" dirty="0"/>
-          </a:p>
-          <a:p>
-            <a:pPr marL="0" indent="0">
-              <a:buNone/>
-            </a:pPr>
-            <a:r>
-              <a:rPr lang="de-DE" dirty="0"/>
-              <a:t>  </a:t>
-            </a:r>
-            <a:r>
-              <a:rPr lang="de-DE" dirty="0" err="1"/>
-              <a:t>services</a:t>
-            </a:r>
-            <a:r>
-              <a:rPr lang="de-DE" dirty="0"/>
-              <a:t>:</a:t>
-            </a:r>
-          </a:p>
-          <a:p>
-            <a:pPr marL="0" indent="0">
-              <a:buNone/>
-            </a:pPr>
-            <a:r>
-              <a:rPr lang="de-DE" dirty="0"/>
-              <a:t>    - docker:20.10.16-dind</a:t>
-            </a:r>
-          </a:p>
-          <a:p>
-            <a:pPr marL="0" indent="0">
-              <a:buNone/>
-            </a:pPr>
-            <a:r>
-              <a:rPr lang="de-DE" dirty="0"/>
-              <a:t>  </a:t>
-            </a:r>
-            <a:r>
-              <a:rPr lang="de-DE" dirty="0" err="1"/>
-              <a:t>script</a:t>
-            </a:r>
-            <a:r>
-              <a:rPr lang="de-DE" dirty="0"/>
-              <a:t>:</a:t>
-            </a:r>
-          </a:p>
-          <a:p>
-            <a:pPr marL="0" indent="0">
-              <a:buNone/>
-            </a:pPr>
-            <a:r>
-              <a:rPr lang="de-DE" dirty="0"/>
-              <a:t>    - </a:t>
-            </a:r>
-            <a:r>
-              <a:rPr lang="de-DE" dirty="0" err="1"/>
-              <a:t>docker</a:t>
-            </a:r>
-            <a:r>
-              <a:rPr lang="de-DE" dirty="0"/>
-              <a:t> </a:t>
-            </a:r>
-            <a:r>
-              <a:rPr lang="de-DE" dirty="0" err="1"/>
-              <a:t>login</a:t>
-            </a:r>
-            <a:r>
-              <a:rPr lang="de-DE" dirty="0"/>
-              <a:t> -u $CI_REGISTRY_USER -p $CI_REGISTRY_PASSWORD $CI_REGISTRY</a:t>
-            </a:r>
-          </a:p>
-          <a:p>
-            <a:pPr marL="0" indent="0">
-              <a:buNone/>
-            </a:pPr>
-            <a:r>
-              <a:rPr lang="de-DE" dirty="0"/>
-              <a:t>    - </a:t>
-            </a:r>
-            <a:r>
-              <a:rPr lang="de-DE" dirty="0" err="1"/>
-              <a:t>docker</a:t>
-            </a:r>
-            <a:r>
-              <a:rPr lang="de-DE" dirty="0"/>
-              <a:t> </a:t>
-            </a:r>
-            <a:r>
-              <a:rPr lang="de-DE" dirty="0" err="1"/>
-              <a:t>build</a:t>
-            </a:r>
-            <a:r>
-              <a:rPr lang="de-DE" dirty="0"/>
-              <a:t> -t $CI_REGISTRY/</a:t>
-            </a:r>
-            <a:r>
-              <a:rPr lang="de-DE" dirty="0" err="1"/>
-              <a:t>group</a:t>
-            </a:r>
-            <a:r>
-              <a:rPr lang="de-DE" dirty="0"/>
-              <a:t>/</a:t>
-            </a:r>
-            <a:r>
-              <a:rPr lang="de-DE" dirty="0" err="1"/>
-              <a:t>project</a:t>
-            </a:r>
-            <a:r>
-              <a:rPr lang="de-DE" dirty="0"/>
-              <a:t>/</a:t>
-            </a:r>
-            <a:r>
-              <a:rPr lang="de-DE" dirty="0" err="1"/>
-              <a:t>image:latest</a:t>
-            </a:r>
-            <a:r>
-              <a:rPr lang="de-DE" dirty="0"/>
-              <a:t> .</a:t>
-            </a:r>
-          </a:p>
-          <a:p>
-            <a:pPr marL="0" indent="0">
-              <a:buNone/>
-            </a:pPr>
-            <a:r>
-              <a:rPr lang="de-DE" dirty="0"/>
-              <a:t>    - </a:t>
-            </a:r>
-            <a:r>
-              <a:rPr lang="de-DE" dirty="0" err="1"/>
-              <a:t>docker</a:t>
-            </a:r>
-            <a:r>
-              <a:rPr lang="de-DE" dirty="0"/>
-              <a:t> push $CI_REGISTRY/</a:t>
-            </a:r>
-            <a:r>
-              <a:rPr lang="de-DE" dirty="0" err="1"/>
-              <a:t>group</a:t>
-            </a:r>
-            <a:r>
-              <a:rPr lang="de-DE" dirty="0"/>
-              <a:t>/</a:t>
-            </a:r>
-            <a:r>
-              <a:rPr lang="de-DE" dirty="0" err="1"/>
-              <a:t>project</a:t>
-            </a:r>
-            <a:r>
-              <a:rPr lang="de-DE" dirty="0"/>
-              <a:t>/</a:t>
-            </a:r>
-            <a:r>
-              <a:rPr lang="de-DE" dirty="0" err="1"/>
-              <a:t>image:latest</a:t>
-            </a:r>
-            <a:endParaRPr lang="de-DE" dirty="0"/>
-          </a:p>
-          <a:p>
-            <a:pPr lvl="1">
-              <a:buFont typeface="Arial" panose="020B0604020202020204" pitchFamily="34" charset="0"/>
-              <a:buChar char="•"/>
             </a:pPr>
             <a:endParaRPr lang="de-DE" dirty="0"/>
           </a:p>
@@ -11489,7 +11721,7 @@
     </p:spTree>
     <p:extLst>
       <p:ext uri="{BB962C8B-B14F-4D97-AF65-F5344CB8AC3E}">
-        <p14:creationId xmlns:p14="http://schemas.microsoft.com/office/powerpoint/2010/main" val="3178729389"/>
+        <p14:creationId xmlns:p14="http://schemas.microsoft.com/office/powerpoint/2010/main" val="844561808"/>
       </p:ext>
     </p:extLst>
   </p:cSld>
@@ -11587,6 +11819,437 @@
             </a:r>
           </a:p>
           <a:p>
+            <a:pPr marL="0" indent="0">
+              <a:buNone/>
+            </a:pPr>
+            <a:r>
+              <a:rPr lang="de-DE" dirty="0" err="1"/>
+              <a:t>If</a:t>
+            </a:r>
+            <a:r>
+              <a:rPr lang="de-DE" dirty="0"/>
+              <a:t> </a:t>
+            </a:r>
+            <a:r>
+              <a:rPr lang="de-DE" dirty="0" err="1"/>
+              <a:t>you’re</a:t>
+            </a:r>
+            <a:r>
+              <a:rPr lang="de-DE" dirty="0"/>
+              <a:t> </a:t>
+            </a:r>
+            <a:r>
+              <a:rPr lang="de-DE" dirty="0" err="1"/>
+              <a:t>using</a:t>
+            </a:r>
+            <a:r>
+              <a:rPr lang="de-DE" dirty="0"/>
+              <a:t> Docker-in-Docker on </a:t>
+            </a:r>
+            <a:r>
+              <a:rPr lang="de-DE" dirty="0" err="1"/>
+              <a:t>your</a:t>
+            </a:r>
+            <a:r>
+              <a:rPr lang="de-DE" dirty="0"/>
+              <a:t> </a:t>
+            </a:r>
+            <a:r>
+              <a:rPr lang="de-DE" dirty="0" err="1"/>
+              <a:t>runners</a:t>
+            </a:r>
+            <a:r>
+              <a:rPr lang="de-DE" dirty="0"/>
+              <a:t>, </a:t>
+            </a:r>
+            <a:r>
+              <a:rPr lang="de-DE" dirty="0" err="1"/>
+              <a:t>your</a:t>
+            </a:r>
+            <a:r>
+              <a:rPr lang="de-DE" dirty="0"/>
+              <a:t> .</a:t>
+            </a:r>
+            <a:r>
+              <a:rPr lang="de-DE" dirty="0" err="1"/>
+              <a:t>gitlab-ci.yml</a:t>
+            </a:r>
+            <a:r>
+              <a:rPr lang="de-DE" dirty="0"/>
+              <a:t> </a:t>
+            </a:r>
+            <a:r>
+              <a:rPr lang="de-DE" dirty="0" err="1"/>
+              <a:t>file</a:t>
+            </a:r>
+            <a:r>
+              <a:rPr lang="de-DE" dirty="0"/>
+              <a:t> </a:t>
+            </a:r>
+            <a:r>
+              <a:rPr lang="de-DE" dirty="0" err="1"/>
+              <a:t>should</a:t>
+            </a:r>
+            <a:r>
+              <a:rPr lang="de-DE" dirty="0"/>
+              <a:t> </a:t>
+            </a:r>
+            <a:r>
+              <a:rPr lang="de-DE" dirty="0" err="1"/>
+              <a:t>look</a:t>
+            </a:r>
+            <a:r>
+              <a:rPr lang="de-DE" dirty="0"/>
+              <a:t> </a:t>
+            </a:r>
+            <a:r>
+              <a:rPr lang="de-DE" dirty="0" err="1"/>
+              <a:t>similar</a:t>
+            </a:r>
+            <a:r>
+              <a:rPr lang="de-DE" dirty="0"/>
+              <a:t> </a:t>
+            </a:r>
+            <a:r>
+              <a:rPr lang="de-DE" dirty="0" err="1"/>
+              <a:t>to</a:t>
+            </a:r>
+            <a:r>
+              <a:rPr lang="de-DE" dirty="0"/>
+              <a:t> </a:t>
+            </a:r>
+            <a:r>
+              <a:rPr lang="de-DE" dirty="0" err="1"/>
+              <a:t>this</a:t>
+            </a:r>
+            <a:r>
+              <a:rPr lang="de-DE" dirty="0"/>
+              <a:t>:</a:t>
+            </a:r>
+          </a:p>
+          <a:p>
+            <a:pPr marL="0" indent="0">
+              <a:buNone/>
+            </a:pPr>
+            <a:endParaRPr lang="de-DE" dirty="0"/>
+          </a:p>
+          <a:p>
+            <a:pPr marL="0" indent="0">
+              <a:buNone/>
+            </a:pPr>
+            <a:r>
+              <a:rPr lang="de-DE" dirty="0" err="1"/>
+              <a:t>build</a:t>
+            </a:r>
+            <a:r>
+              <a:rPr lang="de-DE" dirty="0"/>
+              <a:t>:</a:t>
+            </a:r>
+          </a:p>
+          <a:p>
+            <a:pPr marL="0" indent="0">
+              <a:buNone/>
+            </a:pPr>
+            <a:r>
+              <a:rPr lang="de-DE" dirty="0"/>
+              <a:t>  </a:t>
+            </a:r>
+            <a:r>
+              <a:rPr lang="de-DE" dirty="0" err="1"/>
+              <a:t>image</a:t>
+            </a:r>
+            <a:r>
+              <a:rPr lang="de-DE" dirty="0"/>
+              <a:t>: docker:20.10.16</a:t>
+            </a:r>
+          </a:p>
+          <a:p>
+            <a:pPr marL="0" indent="0">
+              <a:buNone/>
+            </a:pPr>
+            <a:r>
+              <a:rPr lang="de-DE" dirty="0"/>
+              <a:t>  </a:t>
+            </a:r>
+            <a:r>
+              <a:rPr lang="de-DE" dirty="0" err="1"/>
+              <a:t>stage</a:t>
+            </a:r>
+            <a:r>
+              <a:rPr lang="de-DE" dirty="0"/>
+              <a:t>: </a:t>
+            </a:r>
+            <a:r>
+              <a:rPr lang="de-DE" dirty="0" err="1"/>
+              <a:t>build</a:t>
+            </a:r>
+            <a:endParaRPr lang="de-DE" dirty="0"/>
+          </a:p>
+          <a:p>
+            <a:pPr marL="0" indent="0">
+              <a:buNone/>
+            </a:pPr>
+            <a:r>
+              <a:rPr lang="de-DE" dirty="0"/>
+              <a:t>  </a:t>
+            </a:r>
+            <a:r>
+              <a:rPr lang="de-DE" dirty="0" err="1"/>
+              <a:t>services</a:t>
+            </a:r>
+            <a:r>
+              <a:rPr lang="de-DE" dirty="0"/>
+              <a:t>:</a:t>
+            </a:r>
+          </a:p>
+          <a:p>
+            <a:pPr marL="0" indent="0">
+              <a:buNone/>
+            </a:pPr>
+            <a:r>
+              <a:rPr lang="de-DE" dirty="0"/>
+              <a:t>    - docker:20.10.16-dind</a:t>
+            </a:r>
+          </a:p>
+          <a:p>
+            <a:pPr marL="0" indent="0">
+              <a:buNone/>
+            </a:pPr>
+            <a:r>
+              <a:rPr lang="de-DE" dirty="0"/>
+              <a:t>  </a:t>
+            </a:r>
+            <a:r>
+              <a:rPr lang="de-DE" dirty="0" err="1"/>
+              <a:t>script</a:t>
+            </a:r>
+            <a:r>
+              <a:rPr lang="de-DE" dirty="0"/>
+              <a:t>:</a:t>
+            </a:r>
+          </a:p>
+          <a:p>
+            <a:pPr marL="0" indent="0">
+              <a:buNone/>
+            </a:pPr>
+            <a:r>
+              <a:rPr lang="de-DE" dirty="0"/>
+              <a:t>    - </a:t>
+            </a:r>
+            <a:r>
+              <a:rPr lang="de-DE" dirty="0" err="1"/>
+              <a:t>docker</a:t>
+            </a:r>
+            <a:r>
+              <a:rPr lang="de-DE" dirty="0"/>
+              <a:t> </a:t>
+            </a:r>
+            <a:r>
+              <a:rPr lang="de-DE" dirty="0" err="1"/>
+              <a:t>login</a:t>
+            </a:r>
+            <a:r>
+              <a:rPr lang="de-DE" dirty="0"/>
+              <a:t> -u $CI_REGISTRY_USER -p $CI_REGISTRY_PASSWORD $CI_REGISTRY</a:t>
+            </a:r>
+          </a:p>
+          <a:p>
+            <a:pPr marL="0" indent="0">
+              <a:buNone/>
+            </a:pPr>
+            <a:r>
+              <a:rPr lang="de-DE" dirty="0"/>
+              <a:t>    - </a:t>
+            </a:r>
+            <a:r>
+              <a:rPr lang="de-DE" dirty="0" err="1"/>
+              <a:t>docker</a:t>
+            </a:r>
+            <a:r>
+              <a:rPr lang="de-DE" dirty="0"/>
+              <a:t> </a:t>
+            </a:r>
+            <a:r>
+              <a:rPr lang="de-DE" dirty="0" err="1"/>
+              <a:t>build</a:t>
+            </a:r>
+            <a:r>
+              <a:rPr lang="de-DE" dirty="0"/>
+              <a:t> -t $CI_REGISTRY/</a:t>
+            </a:r>
+            <a:r>
+              <a:rPr lang="de-DE" dirty="0" err="1"/>
+              <a:t>group</a:t>
+            </a:r>
+            <a:r>
+              <a:rPr lang="de-DE" dirty="0"/>
+              <a:t>/</a:t>
+            </a:r>
+            <a:r>
+              <a:rPr lang="de-DE" dirty="0" err="1"/>
+              <a:t>project</a:t>
+            </a:r>
+            <a:r>
+              <a:rPr lang="de-DE" dirty="0"/>
+              <a:t>/</a:t>
+            </a:r>
+            <a:r>
+              <a:rPr lang="de-DE" dirty="0" err="1"/>
+              <a:t>image:latest</a:t>
+            </a:r>
+            <a:r>
+              <a:rPr lang="de-DE" dirty="0"/>
+              <a:t> .</a:t>
+            </a:r>
+          </a:p>
+          <a:p>
+            <a:pPr marL="0" indent="0">
+              <a:buNone/>
+            </a:pPr>
+            <a:r>
+              <a:rPr lang="de-DE" dirty="0"/>
+              <a:t>    - </a:t>
+            </a:r>
+            <a:r>
+              <a:rPr lang="de-DE" dirty="0" err="1"/>
+              <a:t>docker</a:t>
+            </a:r>
+            <a:r>
+              <a:rPr lang="de-DE" dirty="0"/>
+              <a:t> push $CI_REGISTRY/</a:t>
+            </a:r>
+            <a:r>
+              <a:rPr lang="de-DE" dirty="0" err="1"/>
+              <a:t>group</a:t>
+            </a:r>
+            <a:r>
+              <a:rPr lang="de-DE" dirty="0"/>
+              <a:t>/</a:t>
+            </a:r>
+            <a:r>
+              <a:rPr lang="de-DE" dirty="0" err="1"/>
+              <a:t>project</a:t>
+            </a:r>
+            <a:r>
+              <a:rPr lang="de-DE" dirty="0"/>
+              <a:t>/</a:t>
+            </a:r>
+            <a:r>
+              <a:rPr lang="de-DE" dirty="0" err="1"/>
+              <a:t>image:latest</a:t>
+            </a:r>
+            <a:endParaRPr lang="de-DE" dirty="0"/>
+          </a:p>
+          <a:p>
+            <a:pPr lvl="1">
+              <a:buFont typeface="Arial" panose="020B0604020202020204" pitchFamily="34" charset="0"/>
+              <a:buChar char="•"/>
+            </a:pPr>
+            <a:endParaRPr lang="de-DE" dirty="0"/>
+          </a:p>
+        </p:txBody>
+      </p:sp>
+    </p:spTree>
+    <p:extLst>
+      <p:ext uri="{BB962C8B-B14F-4D97-AF65-F5344CB8AC3E}">
+        <p14:creationId xmlns:p14="http://schemas.microsoft.com/office/powerpoint/2010/main" val="3178729389"/>
+      </p:ext>
+    </p:extLst>
+  </p:cSld>
+  <p:clrMapOvr>
+    <a:masterClrMapping/>
+  </p:clrMapOvr>
+</p:sld>
+</file>
+
+<file path=ppt/slides/slide32.xml><?xml version="1.0" encoding="utf-8"?>
+<p:sld xmlns:a="http://schemas.openxmlformats.org/drawingml/2006/main" xmlns:r="http://schemas.openxmlformats.org/officeDocument/2006/relationships" xmlns:p="http://schemas.openxmlformats.org/presentationml/2006/main">
+  <p:cSld>
+    <p:spTree>
+      <p:nvGrpSpPr>
+        <p:cNvPr id="1" name=""/>
+        <p:cNvGrpSpPr/>
+        <p:nvPr/>
+      </p:nvGrpSpPr>
+      <p:grpSpPr>
+        <a:xfrm>
+          <a:off x="0" y="0"/>
+          <a:ext cx="0" cy="0"/>
+          <a:chOff x="0" y="0"/>
+          <a:chExt cx="0" cy="0"/>
+        </a:xfrm>
+      </p:grpSpPr>
+      <p:sp>
+        <p:nvSpPr>
+          <p:cNvPr id="2" name="Titel 1">
+            <a:extLst>
+              <a:ext uri="{FF2B5EF4-FFF2-40B4-BE49-F238E27FC236}">
+                <a16:creationId xmlns:a16="http://schemas.microsoft.com/office/drawing/2014/main" id="{184AFD09-5210-6F86-C2FD-BBC016D382A6}"/>
+              </a:ext>
+            </a:extLst>
+          </p:cNvPr>
+          <p:cNvSpPr>
+            <a:spLocks noGrp="1"/>
+          </p:cNvSpPr>
+          <p:nvPr>
+            <p:ph type="title"/>
+          </p:nvPr>
+        </p:nvSpPr>
+        <p:spPr/>
+        <p:txBody>
+          <a:bodyPr/>
+          <a:lstStyle/>
+          <a:p>
+            <a:r>
+              <a:rPr lang="de-DE" cap="none" dirty="0"/>
+              <a:t>Release- und </a:t>
+            </a:r>
+            <a:r>
+              <a:rPr lang="de-DE" cap="none" dirty="0" err="1"/>
+              <a:t>Tagged</a:t>
+            </a:r>
+            <a:r>
+              <a:rPr lang="de-DE" cap="none" dirty="0"/>
+              <a:t>-Images</a:t>
+            </a:r>
+            <a:endParaRPr lang="de-DE" dirty="0"/>
+          </a:p>
+        </p:txBody>
+      </p:sp>
+      <p:sp>
+        <p:nvSpPr>
+          <p:cNvPr id="6" name="Inhaltsplatzhalter 5">
+            <a:extLst>
+              <a:ext uri="{FF2B5EF4-FFF2-40B4-BE49-F238E27FC236}">
+                <a16:creationId xmlns:a16="http://schemas.microsoft.com/office/drawing/2014/main" id="{D2412707-84D3-F572-4709-FD9A95F28E5B}"/>
+              </a:ext>
+            </a:extLst>
+          </p:cNvPr>
+          <p:cNvSpPr>
+            <a:spLocks noGrp="1"/>
+          </p:cNvSpPr>
+          <p:nvPr>
+            <p:ph idx="1"/>
+          </p:nvPr>
+        </p:nvSpPr>
+        <p:spPr/>
+        <p:txBody>
+          <a:bodyPr/>
+          <a:lstStyle/>
+          <a:p>
+            <a:pPr algn="l"/>
+            <a:r>
+              <a:rPr lang="en-US" b="1" i="0" dirty="0">
+                <a:solidFill>
+                  <a:srgbClr val="222261"/>
+                </a:solidFill>
+                <a:effectLst/>
+                <a:latin typeface="gitlab sans"/>
+              </a:rPr>
+              <a:t>Container registry examples with GitLab CI/CD</a:t>
+            </a:r>
+          </a:p>
+          <a:p>
             <a:pPr marL="0" indent="0" algn="l">
               <a:buNone/>
             </a:pPr>
@@ -11854,7 +12517,7 @@
 </p:sld>
 </file>
 
-<file path=ppt/slides/slide32.xml><?xml version="1.0" encoding="utf-8"?>
+<file path=ppt/slides/slide33.xml><?xml version="1.0" encoding="utf-8"?>
 <p:sld xmlns:a="http://schemas.openxmlformats.org/drawingml/2006/main" xmlns:r="http://schemas.openxmlformats.org/officeDocument/2006/relationships" xmlns:p="http://schemas.openxmlformats.org/presentationml/2006/main">
   <p:cSld>
     <p:spTree>

</xml_diff>

<commit_message>
Aufgaben aus den Folien extrahiert
</commit_message>
<xml_diff>
--- a/slides/Tag-3_3-Release-und-Tagged-Images.pptx
+++ b/slides/Tag-3_3-Release-und-Tagged-Images.pptx
@@ -3087,7 +3087,7 @@
               <a:pPr algn="ctr">
                 <a:defRPr/>
               </a:pPr>
-              <a:t>05.06.2024</a:t>
+              <a:t>06.06.2024</a:t>
             </a:fld>
             <a:endParaRPr lang="de-DE" sz="1000">
               <a:solidFill>
@@ -14113,7 +14113,7 @@
 </file>
 
 <file path=ppt/slides/slide32.xml><?xml version="1.0" encoding="utf-8"?>
-<p:sld xmlns:a="http://schemas.openxmlformats.org/drawingml/2006/main" xmlns:r="http://schemas.openxmlformats.org/officeDocument/2006/relationships" xmlns:p="http://schemas.openxmlformats.org/presentationml/2006/main">
+<p:sld xmlns:a="http://schemas.openxmlformats.org/drawingml/2006/main" xmlns:r="http://schemas.openxmlformats.org/officeDocument/2006/relationships" xmlns:p="http://schemas.openxmlformats.org/presentationml/2006/main" show="0">
   <p:cSld>
     <p:spTree>
       <p:nvGrpSpPr>
@@ -14474,7 +14474,7 @@
 </file>
 
 <file path=ppt/slides/slide33.xml><?xml version="1.0" encoding="utf-8"?>
-<p:sld xmlns:a="http://schemas.openxmlformats.org/drawingml/2006/main" xmlns:r="http://schemas.openxmlformats.org/officeDocument/2006/relationships" xmlns:p="http://schemas.openxmlformats.org/presentationml/2006/main">
+<p:sld xmlns:a="http://schemas.openxmlformats.org/drawingml/2006/main" xmlns:r="http://schemas.openxmlformats.org/officeDocument/2006/relationships" xmlns:p="http://schemas.openxmlformats.org/presentationml/2006/main" show="0">
   <p:cSld>
     <p:spTree>
       <p:nvGrpSpPr>
@@ -14753,7 +14753,7 @@
 </file>
 
 <file path=ppt/slides/slide34.xml><?xml version="1.0" encoding="utf-8"?>
-<p:sld xmlns:a="http://schemas.openxmlformats.org/drawingml/2006/main" xmlns:r="http://schemas.openxmlformats.org/officeDocument/2006/relationships" xmlns:p="http://schemas.openxmlformats.org/presentationml/2006/main">
+<p:sld xmlns:a="http://schemas.openxmlformats.org/drawingml/2006/main" xmlns:r="http://schemas.openxmlformats.org/officeDocument/2006/relationships" xmlns:p="http://schemas.openxmlformats.org/presentationml/2006/main" show="0">
   <p:cSld>
     <p:spTree>
       <p:nvGrpSpPr>
@@ -14871,7 +14871,7 @@
 </file>
 
 <file path=ppt/slides/slide35.xml><?xml version="1.0" encoding="utf-8"?>
-<p:sld xmlns:a="http://schemas.openxmlformats.org/drawingml/2006/main" xmlns:r="http://schemas.openxmlformats.org/officeDocument/2006/relationships" xmlns:p="http://schemas.openxmlformats.org/presentationml/2006/main">
+<p:sld xmlns:a="http://schemas.openxmlformats.org/drawingml/2006/main" xmlns:r="http://schemas.openxmlformats.org/officeDocument/2006/relationships" xmlns:p="http://schemas.openxmlformats.org/presentationml/2006/main" show="0">
   <p:cSld>
     <p:spTree>
       <p:nvGrpSpPr>
@@ -15303,7 +15303,7 @@
 </file>
 
 <file path=ppt/slides/slide36.xml><?xml version="1.0" encoding="utf-8"?>
-<p:sld xmlns:a="http://schemas.openxmlformats.org/drawingml/2006/main" xmlns:r="http://schemas.openxmlformats.org/officeDocument/2006/relationships" xmlns:p="http://schemas.openxmlformats.org/presentationml/2006/main">
+<p:sld xmlns:a="http://schemas.openxmlformats.org/drawingml/2006/main" xmlns:r="http://schemas.openxmlformats.org/officeDocument/2006/relationships" xmlns:p="http://schemas.openxmlformats.org/presentationml/2006/main" show="0">
   <p:cSld>
     <p:spTree>
       <p:nvGrpSpPr>

</xml_diff>